<commit_message>
Some changes to the code example GP problem and a few more things. working on presentation I give this on Thursday next week
</commit_message>
<xml_diff>
--- a/AdditiveModels_9_2_2021.pptx
+++ b/AdditiveModels_9_2_2021.pptx
@@ -230,7 +230,7 @@
           <a:p>
             <a:fld id="{C148EF82-3550-4E2E-A923-6D425E2E1F1E}" type="datetimeFigureOut">
               <a:rPr lang="en-US" smtClean="0"/>
-              <a:t>8/19/2021</a:t>
+              <a:t>8/20/2021</a:t>
             </a:fld>
             <a:endParaRPr lang="en-US"/>
           </a:p>
@@ -877,6 +877,107 @@
           <a:bodyPr/>
           <a:lstStyle/>
           <a:p>
+            <a:r>
+              <a:rPr lang="en-US" dirty="0"/>
+              <a:t>White board on what is additive mean from the </a:t>
+            </a:r>
+            <a:r>
+              <a:rPr lang="en-US" dirty="0" err="1"/>
+              <a:t>PoV</a:t>
+            </a:r>
+            <a:r>
+              <a:rPr lang="en-US" dirty="0"/>
+              <a:t> of the x-y plot with allele scoring. </a:t>
+            </a:r>
+          </a:p>
+          <a:p>
+            <a:r>
+              <a:rPr lang="en-US" dirty="0"/>
+              <a:t>Dominance, epistasis, and Overdominance. </a:t>
+            </a:r>
+          </a:p>
+        </p:txBody>
+      </p:sp>
+      <p:sp>
+        <p:nvSpPr>
+          <p:cNvPr id="4" name="Slide Number Placeholder 3"/>
+          <p:cNvSpPr>
+            <a:spLocks noGrp="1"/>
+          </p:cNvSpPr>
+          <p:nvPr>
+            <p:ph type="sldNum" sz="quarter" idx="5"/>
+          </p:nvPr>
+        </p:nvSpPr>
+        <p:spPr/>
+        <p:txBody>
+          <a:bodyPr/>
+          <a:lstStyle/>
+          <a:p>
+            <a:fld id="{2A799501-FF39-4DDB-88D6-1F9BF577AF3F}" type="slidenum">
+              <a:rPr lang="en-US" smtClean="0"/>
+              <a:t>18</a:t>
+            </a:fld>
+            <a:endParaRPr lang="en-US"/>
+          </a:p>
+        </p:txBody>
+      </p:sp>
+    </p:spTree>
+    <p:extLst>
+      <p:ext uri="{BB962C8B-B14F-4D97-AF65-F5344CB8AC3E}">
+        <p14:creationId xmlns:p14="http://schemas.microsoft.com/office/powerpoint/2010/main" val="80761967"/>
+      </p:ext>
+    </p:extLst>
+  </p:cSld>
+  <p:clrMapOvr>
+    <a:masterClrMapping/>
+  </p:clrMapOvr>
+</p:notes>
+</file>
+
+<file path=ppt/notesSlides/notesSlide6.xml><?xml version="1.0" encoding="utf-8"?>
+<p:notes xmlns:a="http://schemas.openxmlformats.org/drawingml/2006/main" xmlns:r="http://schemas.openxmlformats.org/officeDocument/2006/relationships" xmlns:p="http://schemas.openxmlformats.org/presentationml/2006/main">
+  <p:cSld>
+    <p:spTree>
+      <p:nvGrpSpPr>
+        <p:cNvPr id="1" name=""/>
+        <p:cNvGrpSpPr/>
+        <p:nvPr/>
+      </p:nvGrpSpPr>
+      <p:grpSpPr>
+        <a:xfrm>
+          <a:off x="0" y="0"/>
+          <a:ext cx="0" cy="0"/>
+          <a:chOff x="0" y="0"/>
+          <a:chExt cx="0" cy="0"/>
+        </a:xfrm>
+      </p:grpSpPr>
+      <p:sp>
+        <p:nvSpPr>
+          <p:cNvPr id="2" name="Slide Image Placeholder 1"/>
+          <p:cNvSpPr>
+            <a:spLocks noGrp="1" noRot="1" noChangeAspect="1"/>
+          </p:cNvSpPr>
+          <p:nvPr>
+            <p:ph type="sldImg"/>
+          </p:nvPr>
+        </p:nvSpPr>
+        <p:spPr/>
+      </p:sp>
+      <p:sp>
+        <p:nvSpPr>
+          <p:cNvPr id="3" name="Notes Placeholder 2"/>
+          <p:cNvSpPr>
+            <a:spLocks noGrp="1"/>
+          </p:cNvSpPr>
+          <p:nvPr>
+            <p:ph type="body" idx="1"/>
+          </p:nvPr>
+        </p:nvSpPr>
+        <p:spPr/>
+        <p:txBody>
+          <a:bodyPr/>
+          <a:lstStyle/>
+          <a:p>
             <a:endParaRPr lang="en-US" dirty="0"/>
           </a:p>
         </p:txBody>
@@ -917,7 +1018,7 @@
 </p:notes>
 </file>
 
-<file path=ppt/notesSlides/notesSlide6.xml><?xml version="1.0" encoding="utf-8"?>
+<file path=ppt/notesSlides/notesSlide7.xml><?xml version="1.0" encoding="utf-8"?>
 <p:notes xmlns:a="http://schemas.openxmlformats.org/drawingml/2006/main" xmlns:r="http://schemas.openxmlformats.org/officeDocument/2006/relationships" xmlns:p="http://schemas.openxmlformats.org/presentationml/2006/main">
   <p:cSld>
     <p:spTree>
@@ -1148,7 +1249,7 @@
           <a:p>
             <a:fld id="{0C8916EF-510E-4505-B6BD-8984124DB551}" type="datetimeFigureOut">
               <a:rPr lang="en-US" smtClean="0"/>
-              <a:t>8/19/2021</a:t>
+              <a:t>8/20/2021</a:t>
             </a:fld>
             <a:endParaRPr lang="en-US"/>
           </a:p>
@@ -1346,7 +1447,7 @@
           <a:p>
             <a:fld id="{0C8916EF-510E-4505-B6BD-8984124DB551}" type="datetimeFigureOut">
               <a:rPr lang="en-US" smtClean="0"/>
-              <a:t>8/19/2021</a:t>
+              <a:t>8/20/2021</a:t>
             </a:fld>
             <a:endParaRPr lang="en-US"/>
           </a:p>
@@ -1554,7 +1655,7 @@
           <a:p>
             <a:fld id="{0C8916EF-510E-4505-B6BD-8984124DB551}" type="datetimeFigureOut">
               <a:rPr lang="en-US" smtClean="0"/>
-              <a:t>8/19/2021</a:t>
+              <a:t>8/20/2021</a:t>
             </a:fld>
             <a:endParaRPr lang="en-US"/>
           </a:p>
@@ -1752,7 +1853,7 @@
           <a:p>
             <a:fld id="{0C8916EF-510E-4505-B6BD-8984124DB551}" type="datetimeFigureOut">
               <a:rPr lang="en-US" smtClean="0"/>
-              <a:t>8/19/2021</a:t>
+              <a:t>8/20/2021</a:t>
             </a:fld>
             <a:endParaRPr lang="en-US"/>
           </a:p>
@@ -2027,7 +2128,7 @@
           <a:p>
             <a:fld id="{0C8916EF-510E-4505-B6BD-8984124DB551}" type="datetimeFigureOut">
               <a:rPr lang="en-US" smtClean="0"/>
-              <a:t>8/19/2021</a:t>
+              <a:t>8/20/2021</a:t>
             </a:fld>
             <a:endParaRPr lang="en-US"/>
           </a:p>
@@ -2292,7 +2393,7 @@
           <a:p>
             <a:fld id="{0C8916EF-510E-4505-B6BD-8984124DB551}" type="datetimeFigureOut">
               <a:rPr lang="en-US" smtClean="0"/>
-              <a:t>8/19/2021</a:t>
+              <a:t>8/20/2021</a:t>
             </a:fld>
             <a:endParaRPr lang="en-US"/>
           </a:p>
@@ -2704,7 +2805,7 @@
           <a:p>
             <a:fld id="{0C8916EF-510E-4505-B6BD-8984124DB551}" type="datetimeFigureOut">
               <a:rPr lang="en-US" smtClean="0"/>
-              <a:t>8/19/2021</a:t>
+              <a:t>8/20/2021</a:t>
             </a:fld>
             <a:endParaRPr lang="en-US"/>
           </a:p>
@@ -2845,7 +2946,7 @@
           <a:p>
             <a:fld id="{0C8916EF-510E-4505-B6BD-8984124DB551}" type="datetimeFigureOut">
               <a:rPr lang="en-US" smtClean="0"/>
-              <a:t>8/19/2021</a:t>
+              <a:t>8/20/2021</a:t>
             </a:fld>
             <a:endParaRPr lang="en-US"/>
           </a:p>
@@ -2958,7 +3059,7 @@
           <a:p>
             <a:fld id="{0C8916EF-510E-4505-B6BD-8984124DB551}" type="datetimeFigureOut">
               <a:rPr lang="en-US" smtClean="0"/>
-              <a:t>8/19/2021</a:t>
+              <a:t>8/20/2021</a:t>
             </a:fld>
             <a:endParaRPr lang="en-US"/>
           </a:p>
@@ -3269,7 +3370,7 @@
           <a:p>
             <a:fld id="{0C8916EF-510E-4505-B6BD-8984124DB551}" type="datetimeFigureOut">
               <a:rPr lang="en-US" smtClean="0"/>
-              <a:t>8/19/2021</a:t>
+              <a:t>8/20/2021</a:t>
             </a:fld>
             <a:endParaRPr lang="en-US"/>
           </a:p>
@@ -3557,7 +3658,7 @@
           <a:p>
             <a:fld id="{0C8916EF-510E-4505-B6BD-8984124DB551}" type="datetimeFigureOut">
               <a:rPr lang="en-US" smtClean="0"/>
-              <a:t>8/19/2021</a:t>
+              <a:t>8/20/2021</a:t>
             </a:fld>
             <a:endParaRPr lang="en-US"/>
           </a:p>
@@ -3798,7 +3899,7 @@
           <a:p>
             <a:fld id="{0C8916EF-510E-4505-B6BD-8984124DB551}" type="datetimeFigureOut">
               <a:rPr lang="en-US" smtClean="0"/>
-              <a:t>8/19/2021</a:t>
+              <a:t>8/20/2021</a:t>
             </a:fld>
             <a:endParaRPr lang="en-US"/>
           </a:p>
@@ -30889,8 +30990,8 @@
             <a:chExt cx="3591376" cy="6510770"/>
           </a:xfrm>
         </p:grpSpPr>
-        <mc:AlternateContent xmlns:mc="http://schemas.openxmlformats.org/markup-compatibility/2006">
-          <mc:Choice xmlns:a14="http://schemas.microsoft.com/office/drawing/2010/main" Requires="a14">
+        <mc:AlternateContent xmlns:mc="http://schemas.openxmlformats.org/markup-compatibility/2006" xmlns:a14="http://schemas.microsoft.com/office/drawing/2010/main">
+          <mc:Choice Requires="a14">
             <p:sp>
               <p:nvSpPr>
                 <p:cNvPr id="314" name="TextBox 313">
@@ -30919,6 +31020,7 @@
                 </a:bodyPr>
                 <a:lstStyle/>
                 <a:p>
+                  <a:pPr/>
                   <a14:m>
                     <m:oMathPara xmlns:m="http://schemas.openxmlformats.org/officeDocument/2006/math">
                       <m:oMathParaPr>
@@ -31120,7 +31222,7 @@
               </p:txBody>
             </p:sp>
           </mc:Choice>
-          <mc:Fallback>
+          <mc:Fallback xmlns="">
             <p:sp>
               <p:nvSpPr>
                 <p:cNvPr id="314" name="TextBox 313">
@@ -31165,8 +31267,8 @@
             </p:sp>
           </mc:Fallback>
         </mc:AlternateContent>
-        <mc:AlternateContent xmlns:mc="http://schemas.openxmlformats.org/markup-compatibility/2006">
-          <mc:Choice xmlns:a14="http://schemas.microsoft.com/office/drawing/2010/main" Requires="a14">
+        <mc:AlternateContent xmlns:mc="http://schemas.openxmlformats.org/markup-compatibility/2006" xmlns:a14="http://schemas.microsoft.com/office/drawing/2010/main">
+          <mc:Choice Requires="a14">
             <p:sp>
               <p:nvSpPr>
                 <p:cNvPr id="315" name="TextBox 314">
@@ -31195,6 +31297,7 @@
                 </a:bodyPr>
                 <a:lstStyle/>
                 <a:p>
+                  <a:pPr/>
                   <a14:m>
                     <m:oMathPara xmlns:m="http://schemas.openxmlformats.org/officeDocument/2006/math">
                       <m:oMathParaPr>
@@ -31392,7 +31495,7 @@
               </p:txBody>
             </p:sp>
           </mc:Choice>
-          <mc:Fallback>
+          <mc:Fallback xmlns="">
             <p:sp>
               <p:nvSpPr>
                 <p:cNvPr id="315" name="TextBox 314">
@@ -31505,8 +31608,8 @@
             </a:p>
           </p:txBody>
         </p:sp>
-        <mc:AlternateContent xmlns:mc="http://schemas.openxmlformats.org/markup-compatibility/2006">
-          <mc:Choice xmlns:a14="http://schemas.microsoft.com/office/drawing/2010/main" Requires="a14">
+        <mc:AlternateContent xmlns:mc="http://schemas.openxmlformats.org/markup-compatibility/2006" xmlns:a14="http://schemas.microsoft.com/office/drawing/2010/main">
+          <mc:Choice Requires="a14">
             <p:sp>
               <p:nvSpPr>
                 <p:cNvPr id="318" name="TextBox 317">
@@ -31535,6 +31638,7 @@
                 </a:bodyPr>
                 <a:lstStyle/>
                 <a:p>
+                  <a:pPr/>
                   <a14:m>
                     <m:oMathPara xmlns:m="http://schemas.openxmlformats.org/officeDocument/2006/math">
                       <m:oMathParaPr>
@@ -31732,7 +31836,7 @@
               </p:txBody>
             </p:sp>
           </mc:Choice>
-          <mc:Fallback>
+          <mc:Fallback xmlns="">
             <p:sp>
               <p:nvSpPr>
                 <p:cNvPr id="318" name="TextBox 317">
@@ -32003,8 +32107,8 @@
             </a:p>
           </p:txBody>
         </p:sp>
-        <mc:AlternateContent xmlns:mc="http://schemas.openxmlformats.org/markup-compatibility/2006">
-          <mc:Choice xmlns:a14="http://schemas.microsoft.com/office/drawing/2010/main" Requires="a14">
+        <mc:AlternateContent xmlns:mc="http://schemas.openxmlformats.org/markup-compatibility/2006" xmlns:a14="http://schemas.microsoft.com/office/drawing/2010/main">
+          <mc:Choice Requires="a14">
             <p:sp>
               <p:nvSpPr>
                 <p:cNvPr id="324" name="TextBox 323">
@@ -32033,6 +32137,7 @@
                 </a:bodyPr>
                 <a:lstStyle/>
                 <a:p>
+                  <a:pPr/>
                   <a14:m>
                     <m:oMathPara xmlns:m="http://schemas.openxmlformats.org/officeDocument/2006/math">
                       <m:oMathParaPr>
@@ -32234,7 +32339,7 @@
               </p:txBody>
             </p:sp>
           </mc:Choice>
-          <mc:Fallback>
+          <mc:Fallback xmlns="">
             <p:sp>
               <p:nvSpPr>
                 <p:cNvPr id="324" name="TextBox 323">
@@ -32279,8 +32384,8 @@
             </p:sp>
           </mc:Fallback>
         </mc:AlternateContent>
-        <mc:AlternateContent xmlns:mc="http://schemas.openxmlformats.org/markup-compatibility/2006">
-          <mc:Choice xmlns:a14="http://schemas.microsoft.com/office/drawing/2010/main" Requires="a14">
+        <mc:AlternateContent xmlns:mc="http://schemas.openxmlformats.org/markup-compatibility/2006" xmlns:a14="http://schemas.microsoft.com/office/drawing/2010/main">
+          <mc:Choice Requires="a14">
             <p:sp>
               <p:nvSpPr>
                 <p:cNvPr id="325" name="TextBox 324">
@@ -32309,6 +32414,7 @@
                 </a:bodyPr>
                 <a:lstStyle/>
                 <a:p>
+                  <a:pPr/>
                   <a14:m>
                     <m:oMathPara xmlns:m="http://schemas.openxmlformats.org/officeDocument/2006/math">
                       <m:oMathParaPr>
@@ -32510,7 +32616,7 @@
               </p:txBody>
             </p:sp>
           </mc:Choice>
-          <mc:Fallback>
+          <mc:Fallback xmlns="">
             <p:sp>
               <p:nvSpPr>
                 <p:cNvPr id="325" name="TextBox 324">
@@ -32555,8 +32661,8 @@
             </p:sp>
           </mc:Fallback>
         </mc:AlternateContent>
-        <mc:AlternateContent xmlns:mc="http://schemas.openxmlformats.org/markup-compatibility/2006">
-          <mc:Choice xmlns:a14="http://schemas.microsoft.com/office/drawing/2010/main" Requires="a14">
+        <mc:AlternateContent xmlns:mc="http://schemas.openxmlformats.org/markup-compatibility/2006" xmlns:a14="http://schemas.microsoft.com/office/drawing/2010/main">
+          <mc:Choice Requires="a14">
             <p:sp>
               <p:nvSpPr>
                 <p:cNvPr id="327" name="TextBox 326">
@@ -32585,6 +32691,7 @@
                 </a:bodyPr>
                 <a:lstStyle/>
                 <a:p>
+                  <a:pPr/>
                   <a14:m>
                     <m:oMathPara xmlns:m="http://schemas.openxmlformats.org/officeDocument/2006/math">
                       <m:oMathParaPr>
@@ -32605,7 +32712,7 @@
               </p:txBody>
             </p:sp>
           </mc:Choice>
-          <mc:Fallback>
+          <mc:Fallback xmlns="">
             <p:sp>
               <p:nvSpPr>
                 <p:cNvPr id="327" name="TextBox 326">
@@ -33707,8 +33814,8 @@
             </p:txBody>
           </p:sp>
         </p:grpSp>
-        <mc:AlternateContent xmlns:mc="http://schemas.openxmlformats.org/markup-compatibility/2006">
-          <mc:Choice xmlns:a14="http://schemas.microsoft.com/office/drawing/2010/main" Requires="a14">
+        <mc:AlternateContent xmlns:mc="http://schemas.openxmlformats.org/markup-compatibility/2006" xmlns:a14="http://schemas.microsoft.com/office/drawing/2010/main">
+          <mc:Choice Requires="a14">
             <p:sp>
               <p:nvSpPr>
                 <p:cNvPr id="486" name="TextBox 485">
@@ -33737,6 +33844,7 @@
                 </a:bodyPr>
                 <a:lstStyle/>
                 <a:p>
+                  <a:pPr/>
                   <a14:m>
                     <m:oMathPara xmlns:m="http://schemas.openxmlformats.org/officeDocument/2006/math">
                       <m:oMathParaPr>
@@ -33938,7 +34046,7 @@
               </p:txBody>
             </p:sp>
           </mc:Choice>
-          <mc:Fallback>
+          <mc:Fallback xmlns="">
             <p:sp>
               <p:nvSpPr>
                 <p:cNvPr id="486" name="TextBox 485">
@@ -33983,8 +34091,8 @@
             </p:sp>
           </mc:Fallback>
         </mc:AlternateContent>
-        <mc:AlternateContent xmlns:mc="http://schemas.openxmlformats.org/markup-compatibility/2006">
-          <mc:Choice xmlns:a14="http://schemas.microsoft.com/office/drawing/2010/main" Requires="a14">
+        <mc:AlternateContent xmlns:mc="http://schemas.openxmlformats.org/markup-compatibility/2006" xmlns:a14="http://schemas.microsoft.com/office/drawing/2010/main">
+          <mc:Choice Requires="a14">
             <p:sp>
               <p:nvSpPr>
                 <p:cNvPr id="487" name="TextBox 486">
@@ -34013,6 +34121,7 @@
                 </a:bodyPr>
                 <a:lstStyle/>
                 <a:p>
+                  <a:pPr/>
                   <a14:m>
                     <m:oMathPara xmlns:m="http://schemas.openxmlformats.org/officeDocument/2006/math">
                       <m:oMathParaPr>
@@ -34226,7 +34335,7 @@
               </p:txBody>
             </p:sp>
           </mc:Choice>
-          <mc:Fallback>
+          <mc:Fallback xmlns="">
             <p:sp>
               <p:nvSpPr>
                 <p:cNvPr id="487" name="TextBox 486">
@@ -34271,8 +34380,8 @@
             </p:sp>
           </mc:Fallback>
         </mc:AlternateContent>
-        <mc:AlternateContent xmlns:mc="http://schemas.openxmlformats.org/markup-compatibility/2006">
-          <mc:Choice xmlns:a14="http://schemas.microsoft.com/office/drawing/2010/main" Requires="a14">
+        <mc:AlternateContent xmlns:mc="http://schemas.openxmlformats.org/markup-compatibility/2006" xmlns:a14="http://schemas.microsoft.com/office/drawing/2010/main">
+          <mc:Choice Requires="a14">
             <p:sp>
               <p:nvSpPr>
                 <p:cNvPr id="490" name="TextBox 489">
@@ -34301,6 +34410,7 @@
                 </a:bodyPr>
                 <a:lstStyle/>
                 <a:p>
+                  <a:pPr/>
                   <a14:m>
                     <m:oMathPara xmlns:m="http://schemas.openxmlformats.org/officeDocument/2006/math">
                       <m:oMathParaPr>
@@ -34505,7 +34615,7 @@
               </p:txBody>
             </p:sp>
           </mc:Choice>
-          <mc:Fallback>
+          <mc:Fallback xmlns="">
             <p:sp>
               <p:nvSpPr>
                 <p:cNvPr id="490" name="TextBox 489">
@@ -34550,8 +34660,8 @@
             </p:sp>
           </mc:Fallback>
         </mc:AlternateContent>
-        <mc:AlternateContent xmlns:mc="http://schemas.openxmlformats.org/markup-compatibility/2006">
-          <mc:Choice xmlns:a14="http://schemas.microsoft.com/office/drawing/2010/main" Requires="a14">
+        <mc:AlternateContent xmlns:mc="http://schemas.openxmlformats.org/markup-compatibility/2006" xmlns:a14="http://schemas.microsoft.com/office/drawing/2010/main">
+          <mc:Choice Requires="a14">
             <p:sp>
               <p:nvSpPr>
                 <p:cNvPr id="492" name="TextBox 491">
@@ -34580,6 +34690,7 @@
                 </a:bodyPr>
                 <a:lstStyle/>
                 <a:p>
+                  <a:pPr/>
                   <a14:m>
                     <m:oMathPara xmlns:m="http://schemas.openxmlformats.org/officeDocument/2006/math">
                       <m:oMathParaPr>
@@ -34600,7 +34711,7 @@
               </p:txBody>
             </p:sp>
           </mc:Choice>
-          <mc:Fallback>
+          <mc:Fallback xmlns="">
             <p:sp>
               <p:nvSpPr>
                 <p:cNvPr id="492" name="TextBox 491">
@@ -34802,8 +34913,8 @@
             <a:chExt cx="3591376" cy="6510770"/>
           </a:xfrm>
         </p:grpSpPr>
-        <mc:AlternateContent xmlns:mc="http://schemas.openxmlformats.org/markup-compatibility/2006">
-          <mc:Choice xmlns:a14="http://schemas.microsoft.com/office/drawing/2010/main" Requires="a14">
+        <mc:AlternateContent xmlns:mc="http://schemas.openxmlformats.org/markup-compatibility/2006" xmlns:a14="http://schemas.microsoft.com/office/drawing/2010/main">
+          <mc:Choice Requires="a14">
             <p:sp>
               <p:nvSpPr>
                 <p:cNvPr id="5" name="TextBox 4">
@@ -34832,6 +34943,7 @@
                 </a:bodyPr>
                 <a:lstStyle/>
                 <a:p>
+                  <a:pPr/>
                   <a14:m>
                     <m:oMathPara xmlns:m="http://schemas.openxmlformats.org/officeDocument/2006/math">
                       <m:oMathParaPr>
@@ -35033,7 +35145,7 @@
               </p:txBody>
             </p:sp>
           </mc:Choice>
-          <mc:Fallback>
+          <mc:Fallback xmlns="">
             <p:sp>
               <p:nvSpPr>
                 <p:cNvPr id="5" name="TextBox 4">
@@ -35078,8 +35190,8 @@
             </p:sp>
           </mc:Fallback>
         </mc:AlternateContent>
-        <mc:AlternateContent xmlns:mc="http://schemas.openxmlformats.org/markup-compatibility/2006">
-          <mc:Choice xmlns:a14="http://schemas.microsoft.com/office/drawing/2010/main" Requires="a14">
+        <mc:AlternateContent xmlns:mc="http://schemas.openxmlformats.org/markup-compatibility/2006" xmlns:a14="http://schemas.microsoft.com/office/drawing/2010/main">
+          <mc:Choice Requires="a14">
             <p:sp>
               <p:nvSpPr>
                 <p:cNvPr id="6" name="TextBox 5">
@@ -35108,6 +35220,7 @@
                 </a:bodyPr>
                 <a:lstStyle/>
                 <a:p>
+                  <a:pPr/>
                   <a14:m>
                     <m:oMathPara xmlns:m="http://schemas.openxmlformats.org/officeDocument/2006/math">
                       <m:oMathParaPr>
@@ -35305,7 +35418,7 @@
               </p:txBody>
             </p:sp>
           </mc:Choice>
-          <mc:Fallback>
+          <mc:Fallback xmlns="">
             <p:sp>
               <p:nvSpPr>
                 <p:cNvPr id="6" name="TextBox 5">
@@ -35418,8 +35531,8 @@
             </a:p>
           </p:txBody>
         </p:sp>
-        <mc:AlternateContent xmlns:mc="http://schemas.openxmlformats.org/markup-compatibility/2006">
-          <mc:Choice xmlns:a14="http://schemas.microsoft.com/office/drawing/2010/main" Requires="a14">
+        <mc:AlternateContent xmlns:mc="http://schemas.openxmlformats.org/markup-compatibility/2006" xmlns:a14="http://schemas.microsoft.com/office/drawing/2010/main">
+          <mc:Choice Requires="a14">
             <p:sp>
               <p:nvSpPr>
                 <p:cNvPr id="9" name="TextBox 8">
@@ -35448,6 +35561,7 @@
                 </a:bodyPr>
                 <a:lstStyle/>
                 <a:p>
+                  <a:pPr/>
                   <a14:m>
                     <m:oMathPara xmlns:m="http://schemas.openxmlformats.org/officeDocument/2006/math">
                       <m:oMathParaPr>
@@ -35645,7 +35759,7 @@
               </p:txBody>
             </p:sp>
           </mc:Choice>
-          <mc:Fallback>
+          <mc:Fallback xmlns="">
             <p:sp>
               <p:nvSpPr>
                 <p:cNvPr id="9" name="TextBox 8">
@@ -35916,8 +36030,8 @@
             </a:p>
           </p:txBody>
         </p:sp>
-        <mc:AlternateContent xmlns:mc="http://schemas.openxmlformats.org/markup-compatibility/2006">
-          <mc:Choice xmlns:a14="http://schemas.microsoft.com/office/drawing/2010/main" Requires="a14">
+        <mc:AlternateContent xmlns:mc="http://schemas.openxmlformats.org/markup-compatibility/2006" xmlns:a14="http://schemas.microsoft.com/office/drawing/2010/main">
+          <mc:Choice Requires="a14">
             <p:sp>
               <p:nvSpPr>
                 <p:cNvPr id="15" name="TextBox 14">
@@ -35946,6 +36060,7 @@
                 </a:bodyPr>
                 <a:lstStyle/>
                 <a:p>
+                  <a:pPr/>
                   <a14:m>
                     <m:oMathPara xmlns:m="http://schemas.openxmlformats.org/officeDocument/2006/math">
                       <m:oMathParaPr>
@@ -36147,7 +36262,7 @@
               </p:txBody>
             </p:sp>
           </mc:Choice>
-          <mc:Fallback>
+          <mc:Fallback xmlns="">
             <p:sp>
               <p:nvSpPr>
                 <p:cNvPr id="15" name="TextBox 14">
@@ -36192,8 +36307,8 @@
             </p:sp>
           </mc:Fallback>
         </mc:AlternateContent>
-        <mc:AlternateContent xmlns:mc="http://schemas.openxmlformats.org/markup-compatibility/2006">
-          <mc:Choice xmlns:a14="http://schemas.microsoft.com/office/drawing/2010/main" Requires="a14">
+        <mc:AlternateContent xmlns:mc="http://schemas.openxmlformats.org/markup-compatibility/2006" xmlns:a14="http://schemas.microsoft.com/office/drawing/2010/main">
+          <mc:Choice Requires="a14">
             <p:sp>
               <p:nvSpPr>
                 <p:cNvPr id="16" name="TextBox 15">
@@ -36222,6 +36337,7 @@
                 </a:bodyPr>
                 <a:lstStyle/>
                 <a:p>
+                  <a:pPr/>
                   <a14:m>
                     <m:oMathPara xmlns:m="http://schemas.openxmlformats.org/officeDocument/2006/math">
                       <m:oMathParaPr>
@@ -36423,7 +36539,7 @@
               </p:txBody>
             </p:sp>
           </mc:Choice>
-          <mc:Fallback>
+          <mc:Fallback xmlns="">
             <p:sp>
               <p:nvSpPr>
                 <p:cNvPr id="16" name="TextBox 15">
@@ -36468,8 +36584,8 @@
             </p:sp>
           </mc:Fallback>
         </mc:AlternateContent>
-        <mc:AlternateContent xmlns:mc="http://schemas.openxmlformats.org/markup-compatibility/2006">
-          <mc:Choice xmlns:a14="http://schemas.microsoft.com/office/drawing/2010/main" Requires="a14">
+        <mc:AlternateContent xmlns:mc="http://schemas.openxmlformats.org/markup-compatibility/2006" xmlns:a14="http://schemas.microsoft.com/office/drawing/2010/main">
+          <mc:Choice Requires="a14">
             <p:sp>
               <p:nvSpPr>
                 <p:cNvPr id="17" name="TextBox 16">
@@ -36498,6 +36614,7 @@
                 </a:bodyPr>
                 <a:lstStyle/>
                 <a:p>
+                  <a:pPr/>
                   <a14:m>
                     <m:oMathPara xmlns:m="http://schemas.openxmlformats.org/officeDocument/2006/math">
                       <m:oMathParaPr>
@@ -36518,7 +36635,7 @@
               </p:txBody>
             </p:sp>
           </mc:Choice>
-          <mc:Fallback>
+          <mc:Fallback xmlns="">
             <p:sp>
               <p:nvSpPr>
                 <p:cNvPr id="17" name="TextBox 16">
@@ -37620,8 +37737,8 @@
             </p:txBody>
           </p:sp>
         </p:grpSp>
-        <mc:AlternateContent xmlns:mc="http://schemas.openxmlformats.org/markup-compatibility/2006">
-          <mc:Choice xmlns:a14="http://schemas.microsoft.com/office/drawing/2010/main" Requires="a14">
+        <mc:AlternateContent xmlns:mc="http://schemas.openxmlformats.org/markup-compatibility/2006" xmlns:a14="http://schemas.microsoft.com/office/drawing/2010/main">
+          <mc:Choice Requires="a14">
             <p:sp>
               <p:nvSpPr>
                 <p:cNvPr id="19" name="TextBox 18">
@@ -37650,6 +37767,7 @@
                 </a:bodyPr>
                 <a:lstStyle/>
                 <a:p>
+                  <a:pPr/>
                   <a14:m>
                     <m:oMathPara xmlns:m="http://schemas.openxmlformats.org/officeDocument/2006/math">
                       <m:oMathParaPr>
@@ -37851,7 +37969,7 @@
               </p:txBody>
             </p:sp>
           </mc:Choice>
-          <mc:Fallback>
+          <mc:Fallback xmlns="">
             <p:sp>
               <p:nvSpPr>
                 <p:cNvPr id="19" name="TextBox 18">
@@ -37896,8 +38014,8 @@
             </p:sp>
           </mc:Fallback>
         </mc:AlternateContent>
-        <mc:AlternateContent xmlns:mc="http://schemas.openxmlformats.org/markup-compatibility/2006">
-          <mc:Choice xmlns:a14="http://schemas.microsoft.com/office/drawing/2010/main" Requires="a14">
+        <mc:AlternateContent xmlns:mc="http://schemas.openxmlformats.org/markup-compatibility/2006" xmlns:a14="http://schemas.microsoft.com/office/drawing/2010/main">
+          <mc:Choice Requires="a14">
             <p:sp>
               <p:nvSpPr>
                 <p:cNvPr id="20" name="TextBox 19">
@@ -37926,6 +38044,7 @@
                 </a:bodyPr>
                 <a:lstStyle/>
                 <a:p>
+                  <a:pPr/>
                   <a14:m>
                     <m:oMathPara xmlns:m="http://schemas.openxmlformats.org/officeDocument/2006/math">
                       <m:oMathParaPr>
@@ -38139,7 +38258,7 @@
               </p:txBody>
             </p:sp>
           </mc:Choice>
-          <mc:Fallback>
+          <mc:Fallback xmlns="">
             <p:sp>
               <p:nvSpPr>
                 <p:cNvPr id="20" name="TextBox 19">
@@ -38184,8 +38303,8 @@
             </p:sp>
           </mc:Fallback>
         </mc:AlternateContent>
-        <mc:AlternateContent xmlns:mc="http://schemas.openxmlformats.org/markup-compatibility/2006">
-          <mc:Choice xmlns:a14="http://schemas.microsoft.com/office/drawing/2010/main" Requires="a14">
+        <mc:AlternateContent xmlns:mc="http://schemas.openxmlformats.org/markup-compatibility/2006" xmlns:a14="http://schemas.microsoft.com/office/drawing/2010/main">
+          <mc:Choice Requires="a14">
             <p:sp>
               <p:nvSpPr>
                 <p:cNvPr id="21" name="TextBox 20">
@@ -38214,6 +38333,7 @@
                 </a:bodyPr>
                 <a:lstStyle/>
                 <a:p>
+                  <a:pPr/>
                   <a14:m>
                     <m:oMathPara xmlns:m="http://schemas.openxmlformats.org/officeDocument/2006/math">
                       <m:oMathParaPr>
@@ -38418,7 +38538,7 @@
               </p:txBody>
             </p:sp>
           </mc:Choice>
-          <mc:Fallback>
+          <mc:Fallback xmlns="">
             <p:sp>
               <p:nvSpPr>
                 <p:cNvPr id="21" name="TextBox 20">
@@ -38463,8 +38583,8 @@
             </p:sp>
           </mc:Fallback>
         </mc:AlternateContent>
-        <mc:AlternateContent xmlns:mc="http://schemas.openxmlformats.org/markup-compatibility/2006">
-          <mc:Choice xmlns:a14="http://schemas.microsoft.com/office/drawing/2010/main" Requires="a14">
+        <mc:AlternateContent xmlns:mc="http://schemas.openxmlformats.org/markup-compatibility/2006" xmlns:a14="http://schemas.microsoft.com/office/drawing/2010/main">
+          <mc:Choice Requires="a14">
             <p:sp>
               <p:nvSpPr>
                 <p:cNvPr id="22" name="TextBox 21">
@@ -38493,6 +38613,7 @@
                 </a:bodyPr>
                 <a:lstStyle/>
                 <a:p>
+                  <a:pPr/>
                   <a14:m>
                     <m:oMathPara xmlns:m="http://schemas.openxmlformats.org/officeDocument/2006/math">
                       <m:oMathParaPr>
@@ -38513,7 +38634,7 @@
               </p:txBody>
             </p:sp>
           </mc:Choice>
-          <mc:Fallback>
+          <mc:Fallback xmlns="">
             <p:sp>
               <p:nvSpPr>
                 <p:cNvPr id="22" name="TextBox 21">
@@ -38579,8 +38700,8 @@
             <a:chExt cx="3591376" cy="6531754"/>
           </a:xfrm>
         </p:grpSpPr>
-        <mc:AlternateContent xmlns:mc="http://schemas.openxmlformats.org/markup-compatibility/2006">
-          <mc:Choice xmlns:a14="http://schemas.microsoft.com/office/drawing/2010/main" Requires="a14">
+        <mc:AlternateContent xmlns:mc="http://schemas.openxmlformats.org/markup-compatibility/2006" xmlns:a14="http://schemas.microsoft.com/office/drawing/2010/main">
+          <mc:Choice Requires="a14">
             <p:sp>
               <p:nvSpPr>
                 <p:cNvPr id="46" name="TextBox 45">
@@ -38609,6 +38730,7 @@
                 </a:bodyPr>
                 <a:lstStyle/>
                 <a:p>
+                  <a:pPr/>
                   <a14:m>
                     <m:oMathPara xmlns:m="http://schemas.openxmlformats.org/officeDocument/2006/math">
                       <m:oMathParaPr>
@@ -38710,7 +38832,7 @@
               </p:txBody>
             </p:sp>
           </mc:Choice>
-          <mc:Fallback>
+          <mc:Fallback xmlns="">
             <p:sp>
               <p:nvSpPr>
                 <p:cNvPr id="46" name="TextBox 45">
@@ -38755,8 +38877,8 @@
             </p:sp>
           </mc:Fallback>
         </mc:AlternateContent>
-        <mc:AlternateContent xmlns:mc="http://schemas.openxmlformats.org/markup-compatibility/2006">
-          <mc:Choice xmlns:a14="http://schemas.microsoft.com/office/drawing/2010/main" Requires="a14">
+        <mc:AlternateContent xmlns:mc="http://schemas.openxmlformats.org/markup-compatibility/2006" xmlns:a14="http://schemas.microsoft.com/office/drawing/2010/main">
+          <mc:Choice Requires="a14">
             <p:sp>
               <p:nvSpPr>
                 <p:cNvPr id="47" name="TextBox 46">
@@ -38785,6 +38907,7 @@
                 </a:bodyPr>
                 <a:lstStyle/>
                 <a:p>
+                  <a:pPr/>
                   <a14:m>
                     <m:oMathPara xmlns:m="http://schemas.openxmlformats.org/officeDocument/2006/math">
                       <m:oMathParaPr>
@@ -38882,7 +39005,7 @@
               </p:txBody>
             </p:sp>
           </mc:Choice>
-          <mc:Fallback>
+          <mc:Fallback xmlns="">
             <p:sp>
               <p:nvSpPr>
                 <p:cNvPr id="47" name="TextBox 46">
@@ -38995,8 +39118,8 @@
             </a:p>
           </p:txBody>
         </p:sp>
-        <mc:AlternateContent xmlns:mc="http://schemas.openxmlformats.org/markup-compatibility/2006">
-          <mc:Choice xmlns:a14="http://schemas.microsoft.com/office/drawing/2010/main" Requires="a14">
+        <mc:AlternateContent xmlns:mc="http://schemas.openxmlformats.org/markup-compatibility/2006" xmlns:a14="http://schemas.microsoft.com/office/drawing/2010/main">
+          <mc:Choice Requires="a14">
             <p:sp>
               <p:nvSpPr>
                 <p:cNvPr id="50" name="TextBox 49">
@@ -39025,6 +39148,7 @@
                 </a:bodyPr>
                 <a:lstStyle/>
                 <a:p>
+                  <a:pPr/>
                   <a14:m>
                     <m:oMathPara xmlns:m="http://schemas.openxmlformats.org/officeDocument/2006/math">
                       <m:oMathParaPr>
@@ -39122,7 +39246,7 @@
               </p:txBody>
             </p:sp>
           </mc:Choice>
-          <mc:Fallback>
+          <mc:Fallback xmlns="">
             <p:sp>
               <p:nvSpPr>
                 <p:cNvPr id="50" name="TextBox 49">
@@ -39393,8 +39517,8 @@
             </a:p>
           </p:txBody>
         </p:sp>
-        <mc:AlternateContent xmlns:mc="http://schemas.openxmlformats.org/markup-compatibility/2006">
-          <mc:Choice xmlns:a14="http://schemas.microsoft.com/office/drawing/2010/main" Requires="a14">
+        <mc:AlternateContent xmlns:mc="http://schemas.openxmlformats.org/markup-compatibility/2006" xmlns:a14="http://schemas.microsoft.com/office/drawing/2010/main">
+          <mc:Choice Requires="a14">
             <p:sp>
               <p:nvSpPr>
                 <p:cNvPr id="56" name="TextBox 55">
@@ -39423,6 +39547,7 @@
                 </a:bodyPr>
                 <a:lstStyle/>
                 <a:p>
+                  <a:pPr/>
                   <a14:m>
                     <m:oMathPara xmlns:m="http://schemas.openxmlformats.org/officeDocument/2006/math">
                       <m:oMathParaPr>
@@ -39524,7 +39649,7 @@
               </p:txBody>
             </p:sp>
           </mc:Choice>
-          <mc:Fallback>
+          <mc:Fallback xmlns="">
             <p:sp>
               <p:nvSpPr>
                 <p:cNvPr id="56" name="TextBox 55">
@@ -39569,8 +39694,8 @@
             </p:sp>
           </mc:Fallback>
         </mc:AlternateContent>
-        <mc:AlternateContent xmlns:mc="http://schemas.openxmlformats.org/markup-compatibility/2006">
-          <mc:Choice xmlns:a14="http://schemas.microsoft.com/office/drawing/2010/main" Requires="a14">
+        <mc:AlternateContent xmlns:mc="http://schemas.openxmlformats.org/markup-compatibility/2006" xmlns:a14="http://schemas.microsoft.com/office/drawing/2010/main">
+          <mc:Choice Requires="a14">
             <p:sp>
               <p:nvSpPr>
                 <p:cNvPr id="57" name="TextBox 56">
@@ -39599,6 +39724,7 @@
                 </a:bodyPr>
                 <a:lstStyle/>
                 <a:p>
+                  <a:pPr/>
                   <a14:m>
                     <m:oMathPara xmlns:m="http://schemas.openxmlformats.org/officeDocument/2006/math">
                       <m:oMathParaPr>
@@ -39700,7 +39826,7 @@
               </p:txBody>
             </p:sp>
           </mc:Choice>
-          <mc:Fallback>
+          <mc:Fallback xmlns="">
             <p:sp>
               <p:nvSpPr>
                 <p:cNvPr id="57" name="TextBox 56">
@@ -39745,8 +39871,8 @@
             </p:sp>
           </mc:Fallback>
         </mc:AlternateContent>
-        <mc:AlternateContent xmlns:mc="http://schemas.openxmlformats.org/markup-compatibility/2006">
-          <mc:Choice xmlns:a14="http://schemas.microsoft.com/office/drawing/2010/main" Requires="a14">
+        <mc:AlternateContent xmlns:mc="http://schemas.openxmlformats.org/markup-compatibility/2006" xmlns:a14="http://schemas.microsoft.com/office/drawing/2010/main">
+          <mc:Choice Requires="a14">
             <p:sp>
               <p:nvSpPr>
                 <p:cNvPr id="58" name="TextBox 57">
@@ -39775,6 +39901,7 @@
                 </a:bodyPr>
                 <a:lstStyle/>
                 <a:p>
+                  <a:pPr/>
                   <a14:m>
                     <m:oMathPara xmlns:m="http://schemas.openxmlformats.org/officeDocument/2006/math">
                       <m:oMathParaPr>
@@ -39795,7 +39922,7 @@
               </p:txBody>
             </p:sp>
           </mc:Choice>
-          <mc:Fallback>
+          <mc:Fallback xmlns="">
             <p:sp>
               <p:nvSpPr>
                 <p:cNvPr id="58" name="TextBox 57">
@@ -40897,8 +41024,8 @@
             </p:txBody>
           </p:sp>
         </p:grpSp>
-        <mc:AlternateContent xmlns:mc="http://schemas.openxmlformats.org/markup-compatibility/2006">
-          <mc:Choice xmlns:a14="http://schemas.microsoft.com/office/drawing/2010/main" Requires="a14">
+        <mc:AlternateContent xmlns:mc="http://schemas.openxmlformats.org/markup-compatibility/2006" xmlns:a14="http://schemas.microsoft.com/office/drawing/2010/main">
+          <mc:Choice Requires="a14">
             <p:sp>
               <p:nvSpPr>
                 <p:cNvPr id="60" name="TextBox 59">
@@ -40927,6 +41054,7 @@
                 </a:bodyPr>
                 <a:lstStyle/>
                 <a:p>
+                  <a:pPr/>
                   <a14:m>
                     <m:oMathPara xmlns:m="http://schemas.openxmlformats.org/officeDocument/2006/math">
                       <m:oMathParaPr>
@@ -41028,7 +41156,7 @@
               </p:txBody>
             </p:sp>
           </mc:Choice>
-          <mc:Fallback>
+          <mc:Fallback xmlns="">
             <p:sp>
               <p:nvSpPr>
                 <p:cNvPr id="60" name="TextBox 59">
@@ -41073,8 +41201,8 @@
             </p:sp>
           </mc:Fallback>
         </mc:AlternateContent>
-        <mc:AlternateContent xmlns:mc="http://schemas.openxmlformats.org/markup-compatibility/2006">
-          <mc:Choice xmlns:a14="http://schemas.microsoft.com/office/drawing/2010/main" Requires="a14">
+        <mc:AlternateContent xmlns:mc="http://schemas.openxmlformats.org/markup-compatibility/2006" xmlns:a14="http://schemas.microsoft.com/office/drawing/2010/main">
+          <mc:Choice Requires="a14">
             <p:sp>
               <p:nvSpPr>
                 <p:cNvPr id="61" name="TextBox 60">
@@ -41103,6 +41231,7 @@
                 </a:bodyPr>
                 <a:lstStyle/>
                 <a:p>
+                  <a:pPr/>
                   <a14:m>
                     <m:oMathPara xmlns:m="http://schemas.openxmlformats.org/officeDocument/2006/math">
                       <m:oMathParaPr>
@@ -41204,7 +41333,7 @@
               </p:txBody>
             </p:sp>
           </mc:Choice>
-          <mc:Fallback>
+          <mc:Fallback xmlns="">
             <p:sp>
               <p:nvSpPr>
                 <p:cNvPr id="61" name="TextBox 60">
@@ -41249,8 +41378,8 @@
             </p:sp>
           </mc:Fallback>
         </mc:AlternateContent>
-        <mc:AlternateContent xmlns:mc="http://schemas.openxmlformats.org/markup-compatibility/2006">
-          <mc:Choice xmlns:a14="http://schemas.microsoft.com/office/drawing/2010/main" Requires="a14">
+        <mc:AlternateContent xmlns:mc="http://schemas.openxmlformats.org/markup-compatibility/2006" xmlns:a14="http://schemas.microsoft.com/office/drawing/2010/main">
+          <mc:Choice Requires="a14">
             <p:sp>
               <p:nvSpPr>
                 <p:cNvPr id="62" name="TextBox 61">
@@ -41279,6 +41408,7 @@
                 </a:bodyPr>
                 <a:lstStyle/>
                 <a:p>
+                  <a:pPr/>
                   <a14:m>
                     <m:oMathPara xmlns:m="http://schemas.openxmlformats.org/officeDocument/2006/math">
                       <m:oMathParaPr>
@@ -41380,7 +41510,7 @@
               </p:txBody>
             </p:sp>
           </mc:Choice>
-          <mc:Fallback>
+          <mc:Fallback xmlns="">
             <p:sp>
               <p:nvSpPr>
                 <p:cNvPr id="62" name="TextBox 61">
@@ -41425,8 +41555,8 @@
             </p:sp>
           </mc:Fallback>
         </mc:AlternateContent>
-        <mc:AlternateContent xmlns:mc="http://schemas.openxmlformats.org/markup-compatibility/2006">
-          <mc:Choice xmlns:a14="http://schemas.microsoft.com/office/drawing/2010/main" Requires="a14">
+        <mc:AlternateContent xmlns:mc="http://schemas.openxmlformats.org/markup-compatibility/2006" xmlns:a14="http://schemas.microsoft.com/office/drawing/2010/main">
+          <mc:Choice Requires="a14">
             <p:sp>
               <p:nvSpPr>
                 <p:cNvPr id="63" name="TextBox 62">
@@ -41455,6 +41585,7 @@
                 </a:bodyPr>
                 <a:lstStyle/>
                 <a:p>
+                  <a:pPr/>
                   <a14:m>
                     <m:oMathPara xmlns:m="http://schemas.openxmlformats.org/officeDocument/2006/math">
                       <m:oMathParaPr>
@@ -41475,7 +41606,7 @@
               </p:txBody>
             </p:sp>
           </mc:Choice>
-          <mc:Fallback>
+          <mc:Fallback xmlns="">
             <p:sp>
               <p:nvSpPr>
                 <p:cNvPr id="63" name="TextBox 62">
@@ -41886,8 +42017,8 @@
           </a:p>
         </p:txBody>
       </p:sp>
-      <mc:AlternateContent xmlns:mc="http://schemas.openxmlformats.org/markup-compatibility/2006">
-        <mc:Choice xmlns:a14="http://schemas.microsoft.com/office/drawing/2010/main" Requires="a14">
+      <mc:AlternateContent xmlns:mc="http://schemas.openxmlformats.org/markup-compatibility/2006" xmlns:a14="http://schemas.microsoft.com/office/drawing/2010/main">
+        <mc:Choice Requires="a14">
           <p:sp>
             <p:nvSpPr>
               <p:cNvPr id="35" name="TextBox 34">
@@ -41916,6 +42047,7 @@
               </a:bodyPr>
               <a:lstStyle/>
               <a:p>
+                <a:pPr/>
                 <a14:m>
                   <m:oMathPara xmlns:m="http://schemas.openxmlformats.org/officeDocument/2006/math">
                     <m:oMathParaPr>
@@ -42231,7 +42363,7 @@
             </p:txBody>
           </p:sp>
         </mc:Choice>
-        <mc:Fallback>
+        <mc:Fallback xmlns="">
           <p:sp>
             <p:nvSpPr>
               <p:cNvPr id="35" name="TextBox 34">
@@ -43145,7 +43277,10 @@
           </a:bodyPr>
           <a:lstStyle/>
           <a:p>
-            <a:endParaRPr lang="en-US" dirty="0"/>
+            <a:r>
+              <a:rPr lang="en-US" dirty="0"/>
+              <a:t>The additive genetic model:</a:t>
+            </a:r>
           </a:p>
         </p:txBody>
       </p:sp>
@@ -43165,7 +43300,12 @@
             <p:ph idx="1"/>
           </p:nvPr>
         </p:nvSpPr>
-        <p:spPr/>
+        <p:spPr>
+          <a:xfrm>
+            <a:off x="838200" y="1825625"/>
+            <a:ext cx="10515600" cy="4887410"/>
+          </a:xfrm>
+        </p:spPr>
         <p:txBody>
           <a:bodyPr/>
           <a:lstStyle/>
@@ -43175,7 +43315,7 @@
             </a:pPr>
             <a:r>
               <a:rPr lang="en-US" dirty="0"/>
-              <a:t>The additive genetic model: The phenotype (or breeding value) of the individual is a results of the combination of many markers across the genome each with their own unique effect on the phenotype. </a:t>
+              <a:t>The phenotype (or breeding value) of the individual is a results of the  additive combination of many markers across the genome each with their own unique effect on the phenotype. </a:t>
             </a:r>
           </a:p>
           <a:p>
@@ -43192,6 +43332,12 @@
               <a:rPr lang="en-US" dirty="0"/>
               <a:t>The additive model assumes that epistasis and dominance do not play large roles in determining an organisms phenotype, however, in entirely inbred populations dominance is typically not an issue, as there are no heterozygotes. Epistasis or interactions between genes can still cause deviation within inbred species though. </a:t>
             </a:r>
+          </a:p>
+          <a:p>
+            <a:pPr marL="0" indent="0">
+              <a:buNone/>
+            </a:pPr>
+            <a:endParaRPr lang="en-US" dirty="0"/>
           </a:p>
         </p:txBody>
       </p:sp>
@@ -43294,7 +43440,7 @@
           <a:p>
             <a:r>
               <a:rPr lang="en-US" dirty="0"/>
-              <a:t>IN reality we will have the phenotypes (estimated breeding values) and our genotypes</a:t>
+              <a:t>In reality we will have the phenotypes (estimated breeding values) and our genotypes</a:t>
             </a:r>
           </a:p>
           <a:p>
@@ -47398,14 +47544,8 @@
             </a:pPr>
             <a:r>
               <a:rPr lang="en-US" dirty="0"/>
-              <a:t>Lets deal primarily with a self pollinated, diploid species today for simplicity today</a:t>
+              <a:t>Lets deal primarily with a self pollinated, diploid species today for simplicity</a:t>
             </a:r>
-          </a:p>
-          <a:p>
-            <a:pPr marL="0" indent="0">
-              <a:buNone/>
-            </a:pPr>
-            <a:endParaRPr lang="en-US" dirty="0"/>
           </a:p>
         </p:txBody>
       </p:sp>

</xml_diff>

<commit_message>
More eidts on the script and some other things. Presentation edits as wel l
</commit_message>
<xml_diff>
--- a/AdditiveModels_9_2_2021.pptx
+++ b/AdditiveModels_9_2_2021.pptx
@@ -5,7 +5,7 @@
     <p:sldMasterId id="2147483648" r:id="rId1"/>
   </p:sldMasterIdLst>
   <p:notesMasterIdLst>
-    <p:notesMasterId r:id="rId36"/>
+    <p:notesMasterId r:id="rId37"/>
   </p:notesMasterIdLst>
   <p:sldIdLst>
     <p:sldId id="256" r:id="rId2"/>
@@ -26,22 +26,23 @@
     <p:sldId id="282" r:id="rId17"/>
     <p:sldId id="283" r:id="rId18"/>
     <p:sldId id="280" r:id="rId19"/>
-    <p:sldId id="279" r:id="rId20"/>
-    <p:sldId id="284" r:id="rId21"/>
-    <p:sldId id="285" r:id="rId22"/>
-    <p:sldId id="286" r:id="rId23"/>
-    <p:sldId id="287" r:id="rId24"/>
-    <p:sldId id="290" r:id="rId25"/>
-    <p:sldId id="288" r:id="rId26"/>
-    <p:sldId id="289" r:id="rId27"/>
-    <p:sldId id="291" r:id="rId28"/>
-    <p:sldId id="292" r:id="rId29"/>
-    <p:sldId id="294" r:id="rId30"/>
-    <p:sldId id="293" r:id="rId31"/>
-    <p:sldId id="295" r:id="rId32"/>
-    <p:sldId id="296" r:id="rId33"/>
-    <p:sldId id="297" r:id="rId34"/>
-    <p:sldId id="298" r:id="rId35"/>
+    <p:sldId id="299" r:id="rId20"/>
+    <p:sldId id="279" r:id="rId21"/>
+    <p:sldId id="284" r:id="rId22"/>
+    <p:sldId id="285" r:id="rId23"/>
+    <p:sldId id="286" r:id="rId24"/>
+    <p:sldId id="287" r:id="rId25"/>
+    <p:sldId id="290" r:id="rId26"/>
+    <p:sldId id="288" r:id="rId27"/>
+    <p:sldId id="289" r:id="rId28"/>
+    <p:sldId id="291" r:id="rId29"/>
+    <p:sldId id="292" r:id="rId30"/>
+    <p:sldId id="294" r:id="rId31"/>
+    <p:sldId id="293" r:id="rId32"/>
+    <p:sldId id="295" r:id="rId33"/>
+    <p:sldId id="296" r:id="rId34"/>
+    <p:sldId id="297" r:id="rId35"/>
+    <p:sldId id="298" r:id="rId36"/>
   </p:sldIdLst>
   <p:sldSz cx="12192000" cy="6858000"/>
   <p:notesSz cx="6858000" cy="9144000"/>
@@ -999,7 +1000,7 @@
           <a:p>
             <a:fld id="{2A799501-FF39-4DDB-88D6-1F9BF577AF3F}" type="slidenum">
               <a:rPr lang="en-US" smtClean="0"/>
-              <a:t>21</a:t>
+              <a:t>20</a:t>
             </a:fld>
             <a:endParaRPr lang="en-US"/>
           </a:p>
@@ -1008,7 +1009,7 @@
     </p:spTree>
     <p:extLst>
       <p:ext uri="{BB962C8B-B14F-4D97-AF65-F5344CB8AC3E}">
-        <p14:creationId xmlns:p14="http://schemas.microsoft.com/office/powerpoint/2010/main" val="832779747"/>
+        <p14:creationId xmlns:p14="http://schemas.microsoft.com/office/powerpoint/2010/main" val="3027344375"/>
       </p:ext>
     </p:extLst>
   </p:cSld>
@@ -1073,6 +1074,90 @@
             <a:spLocks noGrp="1"/>
           </p:cNvSpPr>
           <p:nvPr>
+            <p:ph type="sldNum" sz="quarter" idx="5"/>
+          </p:nvPr>
+        </p:nvSpPr>
+        <p:spPr/>
+        <p:txBody>
+          <a:bodyPr/>
+          <a:lstStyle/>
+          <a:p>
+            <a:fld id="{2A799501-FF39-4DDB-88D6-1F9BF577AF3F}" type="slidenum">
+              <a:rPr lang="en-US" smtClean="0"/>
+              <a:t>22</a:t>
+            </a:fld>
+            <a:endParaRPr lang="en-US"/>
+          </a:p>
+        </p:txBody>
+      </p:sp>
+    </p:spTree>
+    <p:extLst>
+      <p:ext uri="{BB962C8B-B14F-4D97-AF65-F5344CB8AC3E}">
+        <p14:creationId xmlns:p14="http://schemas.microsoft.com/office/powerpoint/2010/main" val="832779747"/>
+      </p:ext>
+    </p:extLst>
+  </p:cSld>
+  <p:clrMapOvr>
+    <a:masterClrMapping/>
+  </p:clrMapOvr>
+</p:notes>
+</file>
+
+<file path=ppt/notesSlides/notesSlide8.xml><?xml version="1.0" encoding="utf-8"?>
+<p:notes xmlns:a="http://schemas.openxmlformats.org/drawingml/2006/main" xmlns:r="http://schemas.openxmlformats.org/officeDocument/2006/relationships" xmlns:p="http://schemas.openxmlformats.org/presentationml/2006/main">
+  <p:cSld>
+    <p:spTree>
+      <p:nvGrpSpPr>
+        <p:cNvPr id="1" name=""/>
+        <p:cNvGrpSpPr/>
+        <p:nvPr/>
+      </p:nvGrpSpPr>
+      <p:grpSpPr>
+        <a:xfrm>
+          <a:off x="0" y="0"/>
+          <a:ext cx="0" cy="0"/>
+          <a:chOff x="0" y="0"/>
+          <a:chExt cx="0" cy="0"/>
+        </a:xfrm>
+      </p:grpSpPr>
+      <p:sp>
+        <p:nvSpPr>
+          <p:cNvPr id="2" name="Slide Image Placeholder 1"/>
+          <p:cNvSpPr>
+            <a:spLocks noGrp="1" noRot="1" noChangeAspect="1"/>
+          </p:cNvSpPr>
+          <p:nvPr>
+            <p:ph type="sldImg"/>
+          </p:nvPr>
+        </p:nvSpPr>
+        <p:spPr/>
+      </p:sp>
+      <p:sp>
+        <p:nvSpPr>
+          <p:cNvPr id="3" name="Notes Placeholder 2"/>
+          <p:cNvSpPr>
+            <a:spLocks noGrp="1"/>
+          </p:cNvSpPr>
+          <p:nvPr>
+            <p:ph type="body" idx="1"/>
+          </p:nvPr>
+        </p:nvSpPr>
+        <p:spPr/>
+        <p:txBody>
+          <a:bodyPr/>
+          <a:lstStyle/>
+          <a:p>
+            <a:endParaRPr lang="en-US" dirty="0"/>
+          </a:p>
+        </p:txBody>
+      </p:sp>
+      <p:sp>
+        <p:nvSpPr>
+          <p:cNvPr id="4" name="Slide Number Placeholder 3"/>
+          <p:cNvSpPr>
+            <a:spLocks noGrp="1"/>
+          </p:cNvSpPr>
+          <p:nvPr>
             <p:ph type="sldNum" sz="quarter" idx="10"/>
           </p:nvPr>
         </p:nvSpPr>
@@ -1083,7 +1168,7 @@
           <a:p>
             <a:fld id="{9C823843-94FE-4068-B4C4-A27F7642D02E}" type="slidenum">
               <a:rPr lang="en-US" smtClean="0"/>
-              <a:t>34</a:t>
+              <a:t>35</a:t>
             </a:fld>
             <a:endParaRPr lang="en-US"/>
           </a:p>
@@ -43315,7 +43400,7 @@
             </a:pPr>
             <a:r>
               <a:rPr lang="en-US" dirty="0"/>
-              <a:t>The phenotype (or breeding value) of the individual is a results of the  additive combination of many markers across the genome each with their own unique effect on the phenotype. </a:t>
+              <a:t>The phenotype (or breeding value) of the individual is a result of the  additive combination of many markers across the genome each with their own unique effect on the phenotype. </a:t>
             </a:r>
           </a:p>
           <a:p>
@@ -43376,7 +43461,7 @@
           <p:cNvPr id="2" name="Title 1">
             <a:extLst>
               <a:ext uri="{FF2B5EF4-FFF2-40B4-BE49-F238E27FC236}">
-                <a16:creationId xmlns:a16="http://schemas.microsoft.com/office/drawing/2014/main" id="{6A3111EC-B405-4FCF-9C89-1E1AC4530A38}"/>
+                <a16:creationId xmlns:a16="http://schemas.microsoft.com/office/drawing/2014/main" id="{A689E02E-7583-4975-9334-376813620D2F}"/>
               </a:ext>
             </a:extLst>
           </p:cNvPr>
@@ -43387,21 +43472,14 @@
             <p:ph type="title"/>
           </p:nvPr>
         </p:nvSpPr>
-        <p:spPr>
-          <a:xfrm>
-            <a:off x="838200" y="365125"/>
-            <a:ext cx="10515600" cy="2260600"/>
-          </a:xfrm>
-        </p:spPr>
+        <p:spPr/>
         <p:txBody>
-          <a:bodyPr>
-            <a:normAutofit fontScale="90000"/>
-          </a:bodyPr>
+          <a:bodyPr/>
           <a:lstStyle/>
           <a:p>
             <a:r>
               <a:rPr lang="en-US" dirty="0"/>
-              <a:t>We’ve seen we can make models based on the physiology and the sequence information and these models mimic the phenotypic distribution we see.</a:t>
+              <a:t>A quick aside </a:t>
             </a:r>
           </a:p>
         </p:txBody>
@@ -43411,7 +43489,7 @@
           <p:cNvPr id="3" name="Content Placeholder 2">
             <a:extLst>
               <a:ext uri="{FF2B5EF4-FFF2-40B4-BE49-F238E27FC236}">
-                <a16:creationId xmlns:a16="http://schemas.microsoft.com/office/drawing/2014/main" id="{7F36EC7A-6CEA-4416-ABF1-190B41ADFF11}"/>
+                <a16:creationId xmlns:a16="http://schemas.microsoft.com/office/drawing/2014/main" id="{20FD89EE-192E-467F-BD4B-DCE6FAF81509}"/>
               </a:ext>
             </a:extLst>
           </p:cNvPr>
@@ -43422,37 +43500,23 @@
             <p:ph idx="1"/>
           </p:nvPr>
         </p:nvSpPr>
-        <p:spPr>
-          <a:xfrm>
-            <a:off x="660400" y="2625725"/>
-            <a:ext cx="10515600" cy="3559175"/>
-          </a:xfrm>
-        </p:spPr>
+        <p:spPr/>
         <p:txBody>
           <a:bodyPr/>
           <a:lstStyle/>
           <a:p>
             <a:r>
               <a:rPr lang="en-US" dirty="0"/>
-              <a:t>How do we proceed next?</a:t>
+              <a:t>Mathematical concept of ‘additivity’, ‘dominance’, and ‘epistasis’</a:t>
             </a:r>
+          </a:p>
+          <a:p>
+            <a:endParaRPr lang="en-US" dirty="0"/>
           </a:p>
           <a:p>
             <a:r>
               <a:rPr lang="en-US" dirty="0"/>
-              <a:t>In reality we will have the phenotypes (estimated breeding values) and our genotypes</a:t>
-            </a:r>
-          </a:p>
-          <a:p>
-            <a:r>
-              <a:rPr lang="en-US" dirty="0"/>
-              <a:t>We do not know the marker effects – can we estimate them? </a:t>
-            </a:r>
-          </a:p>
-          <a:p>
-            <a:r>
-              <a:rPr lang="en-US" dirty="0"/>
-              <a:t>That is where regression comes in!</a:t>
+              <a:t>Whiteboard!</a:t>
             </a:r>
           </a:p>
         </p:txBody>
@@ -43460,7 +43524,7 @@
     </p:spTree>
     <p:extLst>
       <p:ext uri="{BB962C8B-B14F-4D97-AF65-F5344CB8AC3E}">
-        <p14:creationId xmlns:p14="http://schemas.microsoft.com/office/powerpoint/2010/main" val="3330138882"/>
+        <p14:creationId xmlns:p14="http://schemas.microsoft.com/office/powerpoint/2010/main" val="4110893139"/>
       </p:ext>
     </p:extLst>
   </p:cSld>
@@ -43719,6 +43783,122 @@
           <p:cNvPr id="2" name="Title 1">
             <a:extLst>
               <a:ext uri="{FF2B5EF4-FFF2-40B4-BE49-F238E27FC236}">
+                <a16:creationId xmlns:a16="http://schemas.microsoft.com/office/drawing/2014/main" id="{6A3111EC-B405-4FCF-9C89-1E1AC4530A38}"/>
+              </a:ext>
+            </a:extLst>
+          </p:cNvPr>
+          <p:cNvSpPr>
+            <a:spLocks noGrp="1"/>
+          </p:cNvSpPr>
+          <p:nvPr>
+            <p:ph type="title"/>
+          </p:nvPr>
+        </p:nvSpPr>
+        <p:spPr>
+          <a:xfrm>
+            <a:off x="838200" y="365125"/>
+            <a:ext cx="10515600" cy="2260600"/>
+          </a:xfrm>
+        </p:spPr>
+        <p:txBody>
+          <a:bodyPr>
+            <a:normAutofit fontScale="90000"/>
+          </a:bodyPr>
+          <a:lstStyle/>
+          <a:p>
+            <a:r>
+              <a:rPr lang="en-US" dirty="0"/>
+              <a:t>We’ve seen we can make models based on the physiology and the sequence information and these models mimic the phenotypic distribution we see.</a:t>
+            </a:r>
+          </a:p>
+        </p:txBody>
+      </p:sp>
+      <p:sp>
+        <p:nvSpPr>
+          <p:cNvPr id="3" name="Content Placeholder 2">
+            <a:extLst>
+              <a:ext uri="{FF2B5EF4-FFF2-40B4-BE49-F238E27FC236}">
+                <a16:creationId xmlns:a16="http://schemas.microsoft.com/office/drawing/2014/main" id="{7F36EC7A-6CEA-4416-ABF1-190B41ADFF11}"/>
+              </a:ext>
+            </a:extLst>
+          </p:cNvPr>
+          <p:cNvSpPr>
+            <a:spLocks noGrp="1"/>
+          </p:cNvSpPr>
+          <p:nvPr>
+            <p:ph idx="1"/>
+          </p:nvPr>
+        </p:nvSpPr>
+        <p:spPr>
+          <a:xfrm>
+            <a:off x="660400" y="2625725"/>
+            <a:ext cx="10515600" cy="3559175"/>
+          </a:xfrm>
+        </p:spPr>
+        <p:txBody>
+          <a:bodyPr/>
+          <a:lstStyle/>
+          <a:p>
+            <a:r>
+              <a:rPr lang="en-US" dirty="0"/>
+              <a:t>How do we proceed next?</a:t>
+            </a:r>
+          </a:p>
+          <a:p>
+            <a:r>
+              <a:rPr lang="en-US" dirty="0"/>
+              <a:t>In reality we will have the phenotypes (estimated breeding values) and our genotypes</a:t>
+            </a:r>
+          </a:p>
+          <a:p>
+            <a:r>
+              <a:rPr lang="en-US" dirty="0"/>
+              <a:t>We do not know the marker effects – can we estimate them? </a:t>
+            </a:r>
+          </a:p>
+          <a:p>
+            <a:r>
+              <a:rPr lang="en-US" dirty="0"/>
+              <a:t>That is where regression comes in!</a:t>
+            </a:r>
+          </a:p>
+        </p:txBody>
+      </p:sp>
+    </p:spTree>
+    <p:extLst>
+      <p:ext uri="{BB962C8B-B14F-4D97-AF65-F5344CB8AC3E}">
+        <p14:creationId xmlns:p14="http://schemas.microsoft.com/office/powerpoint/2010/main" val="3330138882"/>
+      </p:ext>
+    </p:extLst>
+  </p:cSld>
+  <p:clrMapOvr>
+    <a:masterClrMapping/>
+  </p:clrMapOvr>
+</p:sld>
+</file>
+
+<file path=ppt/slides/slide21.xml><?xml version="1.0" encoding="utf-8"?>
+<p:sld xmlns:a="http://schemas.openxmlformats.org/drawingml/2006/main" xmlns:r="http://schemas.openxmlformats.org/officeDocument/2006/relationships" xmlns:p="http://schemas.openxmlformats.org/presentationml/2006/main">
+  <p:cSld>
+    <p:spTree>
+      <p:nvGrpSpPr>
+        <p:cNvPr id="1" name=""/>
+        <p:cNvGrpSpPr/>
+        <p:nvPr/>
+      </p:nvGrpSpPr>
+      <p:grpSpPr>
+        <a:xfrm>
+          <a:off x="0" y="0"/>
+          <a:ext cx="0" cy="0"/>
+          <a:chOff x="0" y="0"/>
+          <a:chExt cx="0" cy="0"/>
+        </a:xfrm>
+      </p:grpSpPr>
+      <p:sp>
+        <p:nvSpPr>
+          <p:cNvPr id="2" name="Title 1">
+            <a:extLst>
+              <a:ext uri="{FF2B5EF4-FFF2-40B4-BE49-F238E27FC236}">
                 <a16:creationId xmlns:a16="http://schemas.microsoft.com/office/drawing/2014/main" id="{7DD32426-0CBB-42ED-A9BB-238C22C68A88}"/>
               </a:ext>
             </a:extLst>
@@ -43885,7 +44065,7 @@
 </p:sld>
 </file>
 
-<file path=ppt/slides/slide21.xml><?xml version="1.0" encoding="utf-8"?>
+<file path=ppt/slides/slide22.xml><?xml version="1.0" encoding="utf-8"?>
 <p:sld xmlns:a="http://schemas.openxmlformats.org/drawingml/2006/main" xmlns:r="http://schemas.openxmlformats.org/officeDocument/2006/relationships" xmlns:p="http://schemas.openxmlformats.org/presentationml/2006/main">
   <p:cSld>
     <p:spTree>
@@ -43953,7 +44133,7 @@
           <a:p>
             <a:r>
               <a:rPr lang="en-US" dirty="0"/>
-              <a:t>We find the least squares estimator </a:t>
+              <a:t>We find the least squares estimator = Maximum likelihood estimator</a:t>
             </a:r>
           </a:p>
           <a:p>
@@ -43963,6 +44143,15 @@
             <a:r>
               <a:rPr lang="en-US" dirty="0"/>
               <a:t>Lets work out a small example – white board!</a:t>
+            </a:r>
+          </a:p>
+          <a:p>
+            <a:endParaRPr lang="en-US" dirty="0"/>
+          </a:p>
+          <a:p>
+            <a:r>
+              <a:rPr lang="en-US" dirty="0"/>
+              <a:t>Likelihood vs probability </a:t>
             </a:r>
           </a:p>
         </p:txBody>
@@ -43980,7 +44169,7 @@
 </p:sld>
 </file>
 
-<file path=ppt/slides/slide22.xml><?xml version="1.0" encoding="utf-8"?>
+<file path=ppt/slides/slide23.xml><?xml version="1.0" encoding="utf-8"?>
 <p:sld xmlns:a="http://schemas.openxmlformats.org/drawingml/2006/main" xmlns:r="http://schemas.openxmlformats.org/officeDocument/2006/relationships" xmlns:p="http://schemas.openxmlformats.org/presentationml/2006/main">
   <p:cSld>
     <p:spTree>
@@ -44115,7 +44304,7 @@
 </p:sld>
 </file>
 
-<file path=ppt/slides/slide23.xml><?xml version="1.0" encoding="utf-8"?>
+<file path=ppt/slides/slide24.xml><?xml version="1.0" encoding="utf-8"?>
 <p:sld xmlns:a="http://schemas.openxmlformats.org/drawingml/2006/main" xmlns:r="http://schemas.openxmlformats.org/officeDocument/2006/relationships" xmlns:p="http://schemas.openxmlformats.org/presentationml/2006/main">
   <p:cSld>
     <p:spTree>
@@ -44227,7 +44416,7 @@
 </p:sld>
 </file>
 
-<file path=ppt/slides/slide24.xml><?xml version="1.0" encoding="utf-8"?>
+<file path=ppt/slides/slide25.xml><?xml version="1.0" encoding="utf-8"?>
 <p:sld xmlns:a="http://schemas.openxmlformats.org/drawingml/2006/main" xmlns:r="http://schemas.openxmlformats.org/officeDocument/2006/relationships" xmlns:p="http://schemas.openxmlformats.org/presentationml/2006/main">
   <p:cSld>
     <p:spTree>
@@ -44343,7 +44532,7 @@
 </p:sld>
 </file>
 
-<file path=ppt/slides/slide25.xml><?xml version="1.0" encoding="utf-8"?>
+<file path=ppt/slides/slide26.xml><?xml version="1.0" encoding="utf-8"?>
 <p:sld xmlns:a="http://schemas.openxmlformats.org/drawingml/2006/main" xmlns:r="http://schemas.openxmlformats.org/officeDocument/2006/relationships" xmlns:p="http://schemas.openxmlformats.org/presentationml/2006/main">
   <p:cSld>
     <p:spTree>
@@ -44537,7 +44726,7 @@
 </p:sld>
 </file>
 
-<file path=ppt/slides/slide26.xml><?xml version="1.0" encoding="utf-8"?>
+<file path=ppt/slides/slide27.xml><?xml version="1.0" encoding="utf-8"?>
 <p:sld xmlns:a="http://schemas.openxmlformats.org/drawingml/2006/main" xmlns:r="http://schemas.openxmlformats.org/officeDocument/2006/relationships" xmlns:p="http://schemas.openxmlformats.org/presentationml/2006/main">
   <p:cSld>
     <p:spTree>
@@ -44654,7 +44843,7 @@
 </p:sld>
 </file>
 
-<file path=ppt/slides/slide27.xml><?xml version="1.0" encoding="utf-8"?>
+<file path=ppt/slides/slide28.xml><?xml version="1.0" encoding="utf-8"?>
 <p:sld xmlns:a="http://schemas.openxmlformats.org/drawingml/2006/main" xmlns:r="http://schemas.openxmlformats.org/officeDocument/2006/relationships" xmlns:p="http://schemas.openxmlformats.org/presentationml/2006/main">
   <p:cSld>
     <p:spTree>
@@ -44896,7 +45085,7 @@
 </p:sld>
 </file>
 
-<file path=ppt/slides/slide28.xml><?xml version="1.0" encoding="utf-8"?>
+<file path=ppt/slides/slide29.xml><?xml version="1.0" encoding="utf-8"?>
 <p:sld xmlns:a="http://schemas.openxmlformats.org/drawingml/2006/main" xmlns:r="http://schemas.openxmlformats.org/officeDocument/2006/relationships" xmlns:p="http://schemas.openxmlformats.org/presentationml/2006/main">
   <p:cSld>
     <p:spTree>
@@ -44970,101 +45159,6 @@
     <p:extLst>
       <p:ext uri="{BB962C8B-B14F-4D97-AF65-F5344CB8AC3E}">
         <p14:creationId xmlns:p14="http://schemas.microsoft.com/office/powerpoint/2010/main" val="1810957998"/>
-      </p:ext>
-    </p:extLst>
-  </p:cSld>
-  <p:clrMapOvr>
-    <a:masterClrMapping/>
-  </p:clrMapOvr>
-</p:sld>
-</file>
-
-<file path=ppt/slides/slide29.xml><?xml version="1.0" encoding="utf-8"?>
-<p:sld xmlns:a="http://schemas.openxmlformats.org/drawingml/2006/main" xmlns:r="http://schemas.openxmlformats.org/officeDocument/2006/relationships" xmlns:p="http://schemas.openxmlformats.org/presentationml/2006/main">
-  <p:cSld>
-    <p:spTree>
-      <p:nvGrpSpPr>
-        <p:cNvPr id="1" name=""/>
-        <p:cNvGrpSpPr/>
-        <p:nvPr/>
-      </p:nvGrpSpPr>
-      <p:grpSpPr>
-        <a:xfrm>
-          <a:off x="0" y="0"/>
-          <a:ext cx="0" cy="0"/>
-          <a:chOff x="0" y="0"/>
-          <a:chExt cx="0" cy="0"/>
-        </a:xfrm>
-      </p:grpSpPr>
-      <p:sp>
-        <p:nvSpPr>
-          <p:cNvPr id="2" name="Title 1">
-            <a:extLst>
-              <a:ext uri="{FF2B5EF4-FFF2-40B4-BE49-F238E27FC236}">
-                <a16:creationId xmlns:a16="http://schemas.microsoft.com/office/drawing/2014/main" id="{24410FAC-0943-4FE1-ACFB-EBD257AB924C}"/>
-              </a:ext>
-            </a:extLst>
-          </p:cNvPr>
-          <p:cNvSpPr>
-            <a:spLocks noGrp="1"/>
-          </p:cNvSpPr>
-          <p:nvPr>
-            <p:ph type="title"/>
-          </p:nvPr>
-        </p:nvSpPr>
-        <p:spPr/>
-        <p:txBody>
-          <a:bodyPr/>
-          <a:lstStyle/>
-          <a:p>
-            <a:r>
-              <a:rPr lang="en-US" dirty="0"/>
-              <a:t>A few caveats </a:t>
-            </a:r>
-          </a:p>
-        </p:txBody>
-      </p:sp>
-      <p:sp>
-        <p:nvSpPr>
-          <p:cNvPr id="3" name="Content Placeholder 2">
-            <a:extLst>
-              <a:ext uri="{FF2B5EF4-FFF2-40B4-BE49-F238E27FC236}">
-                <a16:creationId xmlns:a16="http://schemas.microsoft.com/office/drawing/2014/main" id="{9430D89A-1DB9-47F2-B3F4-32AF6B205BAB}"/>
-              </a:ext>
-            </a:extLst>
-          </p:cNvPr>
-          <p:cNvSpPr>
-            <a:spLocks noGrp="1"/>
-          </p:cNvSpPr>
-          <p:nvPr>
-            <p:ph idx="1"/>
-          </p:nvPr>
-        </p:nvSpPr>
-        <p:spPr/>
-        <p:txBody>
-          <a:bodyPr/>
-          <a:lstStyle/>
-          <a:p>
-            <a:r>
-              <a:rPr lang="en-US" dirty="0"/>
-              <a:t>We have been working under the assumption of unlinked markers – Markers are linked!! Especially in a biparental population where there are large LD blocks and limited generations of recombination on the chromosome. </a:t>
-            </a:r>
-          </a:p>
-          <a:p>
-            <a:r>
-              <a:rPr lang="en-US" dirty="0"/>
-              <a:t>Predictions are only as good as your phenotypes and genotypes: lots of errors in = poor prediction out</a:t>
-            </a:r>
-          </a:p>
-          <a:p>
-            <a:endParaRPr lang="en-US" dirty="0"/>
-          </a:p>
-        </p:txBody>
-      </p:sp>
-    </p:spTree>
-    <p:extLst>
-      <p:ext uri="{BB962C8B-B14F-4D97-AF65-F5344CB8AC3E}">
-        <p14:creationId xmlns:p14="http://schemas.microsoft.com/office/powerpoint/2010/main" val="2150579364"/>
       </p:ext>
     </p:extLst>
   </p:cSld>
@@ -45185,13 +45279,13 @@
           <a:p>
             <a:r>
               <a:rPr lang="en-US" dirty="0"/>
-              <a:t>Quick introduction of association mapping</a:t>
+              <a:t>Genomic prediction</a:t>
             </a:r>
           </a:p>
           <a:p>
             <a:r>
               <a:rPr lang="en-US" dirty="0"/>
-              <a:t>Genomic prediction</a:t>
+              <a:t>Quick introduction of association mapping</a:t>
             </a:r>
           </a:p>
           <a:p>
@@ -45289,6 +45383,101 @@
 </file>
 
 <file path=ppt/slides/slide30.xml><?xml version="1.0" encoding="utf-8"?>
+<p:sld xmlns:a="http://schemas.openxmlformats.org/drawingml/2006/main" xmlns:r="http://schemas.openxmlformats.org/officeDocument/2006/relationships" xmlns:p="http://schemas.openxmlformats.org/presentationml/2006/main">
+  <p:cSld>
+    <p:spTree>
+      <p:nvGrpSpPr>
+        <p:cNvPr id="1" name=""/>
+        <p:cNvGrpSpPr/>
+        <p:nvPr/>
+      </p:nvGrpSpPr>
+      <p:grpSpPr>
+        <a:xfrm>
+          <a:off x="0" y="0"/>
+          <a:ext cx="0" cy="0"/>
+          <a:chOff x="0" y="0"/>
+          <a:chExt cx="0" cy="0"/>
+        </a:xfrm>
+      </p:grpSpPr>
+      <p:sp>
+        <p:nvSpPr>
+          <p:cNvPr id="2" name="Title 1">
+            <a:extLst>
+              <a:ext uri="{FF2B5EF4-FFF2-40B4-BE49-F238E27FC236}">
+                <a16:creationId xmlns:a16="http://schemas.microsoft.com/office/drawing/2014/main" id="{24410FAC-0943-4FE1-ACFB-EBD257AB924C}"/>
+              </a:ext>
+            </a:extLst>
+          </p:cNvPr>
+          <p:cNvSpPr>
+            <a:spLocks noGrp="1"/>
+          </p:cNvSpPr>
+          <p:nvPr>
+            <p:ph type="title"/>
+          </p:nvPr>
+        </p:nvSpPr>
+        <p:spPr/>
+        <p:txBody>
+          <a:bodyPr/>
+          <a:lstStyle/>
+          <a:p>
+            <a:r>
+              <a:rPr lang="en-US" dirty="0"/>
+              <a:t>A few caveats </a:t>
+            </a:r>
+          </a:p>
+        </p:txBody>
+      </p:sp>
+      <p:sp>
+        <p:nvSpPr>
+          <p:cNvPr id="3" name="Content Placeholder 2">
+            <a:extLst>
+              <a:ext uri="{FF2B5EF4-FFF2-40B4-BE49-F238E27FC236}">
+                <a16:creationId xmlns:a16="http://schemas.microsoft.com/office/drawing/2014/main" id="{9430D89A-1DB9-47F2-B3F4-32AF6B205BAB}"/>
+              </a:ext>
+            </a:extLst>
+          </p:cNvPr>
+          <p:cNvSpPr>
+            <a:spLocks noGrp="1"/>
+          </p:cNvSpPr>
+          <p:nvPr>
+            <p:ph idx="1"/>
+          </p:nvPr>
+        </p:nvSpPr>
+        <p:spPr/>
+        <p:txBody>
+          <a:bodyPr/>
+          <a:lstStyle/>
+          <a:p>
+            <a:r>
+              <a:rPr lang="en-US" dirty="0"/>
+              <a:t>We have been working under the assumption of unlinked markers – Markers are linked!! Especially in a biparental population where there are large LD blocks and limited generations of recombination on the chromosome. </a:t>
+            </a:r>
+          </a:p>
+          <a:p>
+            <a:r>
+              <a:rPr lang="en-US" dirty="0"/>
+              <a:t>Predictions are only as good as your phenotypes and genotypes: lots of errors in = poor prediction out</a:t>
+            </a:r>
+          </a:p>
+          <a:p>
+            <a:endParaRPr lang="en-US" dirty="0"/>
+          </a:p>
+        </p:txBody>
+      </p:sp>
+    </p:spTree>
+    <p:extLst>
+      <p:ext uri="{BB962C8B-B14F-4D97-AF65-F5344CB8AC3E}">
+        <p14:creationId xmlns:p14="http://schemas.microsoft.com/office/powerpoint/2010/main" val="2150579364"/>
+      </p:ext>
+    </p:extLst>
+  </p:cSld>
+  <p:clrMapOvr>
+    <a:masterClrMapping/>
+  </p:clrMapOvr>
+</p:sld>
+</file>
+
+<file path=ppt/slides/slide31.xml><?xml version="1.0" encoding="utf-8"?>
 <p:sld xmlns:a="http://schemas.openxmlformats.org/drawingml/2006/main" xmlns:r="http://schemas.openxmlformats.org/officeDocument/2006/relationships" xmlns:p="http://schemas.openxmlformats.org/presentationml/2006/main">
   <p:cSld>
     <p:spTree>
@@ -45409,7 +45598,7 @@
 </p:sld>
 </file>
 
-<file path=ppt/slides/slide31.xml><?xml version="1.0" encoding="utf-8"?>
+<file path=ppt/slides/slide32.xml><?xml version="1.0" encoding="utf-8"?>
 <p:sld xmlns:a="http://schemas.openxmlformats.org/drawingml/2006/main" xmlns:r="http://schemas.openxmlformats.org/officeDocument/2006/relationships" xmlns:p="http://schemas.openxmlformats.org/presentationml/2006/main">
   <p:cSld>
     <p:spTree>
@@ -45477,7 +45666,13 @@
           <a:p>
             <a:r>
               <a:rPr lang="en-US" dirty="0"/>
-              <a:t>Actual data and GS – using the Barley data we have, fold cross validation to estimate prediction accuracy.</a:t>
+              <a:t>Actual data and GS – using the Barley data we have, </a:t>
+            </a:r>
+          </a:p>
+          <a:p>
+            <a:r>
+              <a:rPr lang="en-US" dirty="0"/>
+              <a:t>cross validation to estimate prediction accuracy.</a:t>
             </a:r>
           </a:p>
           <a:p>
@@ -45498,7 +45693,7 @@
 </p:sld>
 </file>
 
-<file path=ppt/slides/slide32.xml><?xml version="1.0" encoding="utf-8"?>
+<file path=ppt/slides/slide33.xml><?xml version="1.0" encoding="utf-8"?>
 <p:sld xmlns:a="http://schemas.openxmlformats.org/drawingml/2006/main" xmlns:r="http://schemas.openxmlformats.org/officeDocument/2006/relationships" xmlns:p="http://schemas.openxmlformats.org/presentationml/2006/main">
   <p:cSld>
     <p:spTree>
@@ -45581,7 +45776,7 @@
 </p:sld>
 </file>
 
-<file path=ppt/slides/slide33.xml><?xml version="1.0" encoding="utf-8"?>
+<file path=ppt/slides/slide34.xml><?xml version="1.0" encoding="utf-8"?>
 <p:sld xmlns:a="http://schemas.openxmlformats.org/drawingml/2006/main" xmlns:r="http://schemas.openxmlformats.org/officeDocument/2006/relationships" xmlns:p="http://schemas.openxmlformats.org/presentationml/2006/main">
   <p:cSld>
     <p:spTree>
@@ -45664,7 +45859,7 @@
 </p:sld>
 </file>
 
-<file path=ppt/slides/slide34.xml><?xml version="1.0" encoding="utf-8"?>
+<file path=ppt/slides/slide35.xml><?xml version="1.0" encoding="utf-8"?>
 <p:sld xmlns:a="http://schemas.openxmlformats.org/drawingml/2006/main" xmlns:r="http://schemas.openxmlformats.org/officeDocument/2006/relationships" xmlns:p="http://schemas.openxmlformats.org/presentationml/2006/main">
   <p:cSld>
     <p:spTree>
@@ -47364,7 +47559,7 @@
           <a:p>
             <a:r>
               <a:rPr lang="en-US" dirty="0"/>
-              <a:t>The value of any trait a breeder is interested in measuring or estimating</a:t>
+              <a:t>The value of any trait a breeder is interested in</a:t>
             </a:r>
           </a:p>
           <a:p>

</xml_diff>

<commit_message>
More changes and some additons of GWAS examples to the script. Deciding on whether to include other examples
</commit_message>
<xml_diff>
--- a/AdditiveModels_9_2_2021.pptx
+++ b/AdditiveModels_9_2_2021.pptx
@@ -5,44 +5,46 @@
     <p:sldMasterId id="2147483648" r:id="rId1"/>
   </p:sldMasterIdLst>
   <p:notesMasterIdLst>
-    <p:notesMasterId r:id="rId37"/>
+    <p:notesMasterId r:id="rId39"/>
   </p:notesMasterIdLst>
   <p:sldIdLst>
     <p:sldId id="256" r:id="rId2"/>
     <p:sldId id="272" r:id="rId3"/>
     <p:sldId id="265" r:id="rId4"/>
-    <p:sldId id="257" r:id="rId5"/>
-    <p:sldId id="278" r:id="rId6"/>
-    <p:sldId id="262" r:id="rId7"/>
-    <p:sldId id="259" r:id="rId8"/>
-    <p:sldId id="264" r:id="rId9"/>
-    <p:sldId id="270" r:id="rId10"/>
-    <p:sldId id="266" r:id="rId11"/>
-    <p:sldId id="271" r:id="rId12"/>
-    <p:sldId id="273" r:id="rId13"/>
-    <p:sldId id="274" r:id="rId14"/>
-    <p:sldId id="275" r:id="rId15"/>
-    <p:sldId id="276" r:id="rId16"/>
-    <p:sldId id="282" r:id="rId17"/>
-    <p:sldId id="283" r:id="rId18"/>
+    <p:sldId id="301" r:id="rId5"/>
+    <p:sldId id="257" r:id="rId6"/>
+    <p:sldId id="278" r:id="rId7"/>
+    <p:sldId id="262" r:id="rId8"/>
+    <p:sldId id="259" r:id="rId9"/>
+    <p:sldId id="264" r:id="rId10"/>
+    <p:sldId id="270" r:id="rId11"/>
+    <p:sldId id="266" r:id="rId12"/>
+    <p:sldId id="271" r:id="rId13"/>
+    <p:sldId id="300" r:id="rId14"/>
+    <p:sldId id="273" r:id="rId15"/>
+    <p:sldId id="274" r:id="rId16"/>
+    <p:sldId id="275" r:id="rId17"/>
+    <p:sldId id="276" r:id="rId18"/>
     <p:sldId id="280" r:id="rId19"/>
     <p:sldId id="299" r:id="rId20"/>
-    <p:sldId id="279" r:id="rId21"/>
-    <p:sldId id="284" r:id="rId22"/>
-    <p:sldId id="285" r:id="rId23"/>
-    <p:sldId id="286" r:id="rId24"/>
-    <p:sldId id="287" r:id="rId25"/>
-    <p:sldId id="290" r:id="rId26"/>
-    <p:sldId id="288" r:id="rId27"/>
-    <p:sldId id="289" r:id="rId28"/>
-    <p:sldId id="291" r:id="rId29"/>
-    <p:sldId id="292" r:id="rId30"/>
-    <p:sldId id="294" r:id="rId31"/>
-    <p:sldId id="293" r:id="rId32"/>
-    <p:sldId id="295" r:id="rId33"/>
-    <p:sldId id="296" r:id="rId34"/>
-    <p:sldId id="297" r:id="rId35"/>
-    <p:sldId id="298" r:id="rId36"/>
+    <p:sldId id="283" r:id="rId21"/>
+    <p:sldId id="279" r:id="rId22"/>
+    <p:sldId id="284" r:id="rId23"/>
+    <p:sldId id="285" r:id="rId24"/>
+    <p:sldId id="286" r:id="rId25"/>
+    <p:sldId id="287" r:id="rId26"/>
+    <p:sldId id="290" r:id="rId27"/>
+    <p:sldId id="288" r:id="rId28"/>
+    <p:sldId id="289" r:id="rId29"/>
+    <p:sldId id="291" r:id="rId30"/>
+    <p:sldId id="292" r:id="rId31"/>
+    <p:sldId id="294" r:id="rId32"/>
+    <p:sldId id="302" r:id="rId33"/>
+    <p:sldId id="295" r:id="rId34"/>
+    <p:sldId id="293" r:id="rId35"/>
+    <p:sldId id="296" r:id="rId36"/>
+    <p:sldId id="298" r:id="rId37"/>
+    <p:sldId id="297" r:id="rId38"/>
   </p:sldIdLst>
   <p:sldSz cx="12192000" cy="6858000"/>
   <p:notesSz cx="6858000" cy="9144000"/>
@@ -563,7 +565,7 @@
           <a:p>
             <a:fld id="{2A799501-FF39-4DDB-88D6-1F9BF577AF3F}" type="slidenum">
               <a:rPr lang="en-US" smtClean="0"/>
-              <a:t>7</a:t>
+              <a:t>8</a:t>
             </a:fld>
             <a:endParaRPr lang="en-US"/>
           </a:p>
@@ -647,7 +649,7 @@
           <a:p>
             <a:fld id="{2A799501-FF39-4DDB-88D6-1F9BF577AF3F}" type="slidenum">
               <a:rPr lang="en-US" smtClean="0"/>
-              <a:t>8</a:t>
+              <a:t>9</a:t>
             </a:fld>
             <a:endParaRPr lang="en-US"/>
           </a:p>
@@ -731,7 +733,7 @@
           <a:p>
             <a:fld id="{2A799501-FF39-4DDB-88D6-1F9BF577AF3F}" type="slidenum">
               <a:rPr lang="en-US" smtClean="0"/>
-              <a:t>9</a:t>
+              <a:t>10</a:t>
             </a:fld>
             <a:endParaRPr lang="en-US"/>
           </a:p>
@@ -815,7 +817,7 @@
           <a:p>
             <a:fld id="{2A799501-FF39-4DDB-88D6-1F9BF577AF3F}" type="slidenum">
               <a:rPr lang="en-US" smtClean="0"/>
-              <a:t>11</a:t>
+              <a:t>12</a:t>
             </a:fld>
             <a:endParaRPr lang="en-US"/>
           </a:p>
@@ -1000,7 +1002,7 @@
           <a:p>
             <a:fld id="{2A799501-FF39-4DDB-88D6-1F9BF577AF3F}" type="slidenum">
               <a:rPr lang="en-US" smtClean="0"/>
-              <a:t>20</a:t>
+              <a:t>21</a:t>
             </a:fld>
             <a:endParaRPr lang="en-US"/>
           </a:p>
@@ -1084,7 +1086,7 @@
           <a:p>
             <a:fld id="{2A799501-FF39-4DDB-88D6-1F9BF577AF3F}" type="slidenum">
               <a:rPr lang="en-US" smtClean="0"/>
-              <a:t>22</a:t>
+              <a:t>23</a:t>
             </a:fld>
             <a:endParaRPr lang="en-US"/>
           </a:p>
@@ -1104,6 +1106,121 @@
 </file>
 
 <file path=ppt/notesSlides/notesSlide8.xml><?xml version="1.0" encoding="utf-8"?>
+<p:notes xmlns:a="http://schemas.openxmlformats.org/drawingml/2006/main" xmlns:r="http://schemas.openxmlformats.org/officeDocument/2006/relationships" xmlns:p="http://schemas.openxmlformats.org/presentationml/2006/main">
+  <p:cSld>
+    <p:spTree>
+      <p:nvGrpSpPr>
+        <p:cNvPr id="1" name=""/>
+        <p:cNvGrpSpPr/>
+        <p:nvPr/>
+      </p:nvGrpSpPr>
+      <p:grpSpPr>
+        <a:xfrm>
+          <a:off x="0" y="0"/>
+          <a:ext cx="0" cy="0"/>
+          <a:chOff x="0" y="0"/>
+          <a:chExt cx="0" cy="0"/>
+        </a:xfrm>
+      </p:grpSpPr>
+      <p:sp>
+        <p:nvSpPr>
+          <p:cNvPr id="2" name="Slide Image Placeholder 1"/>
+          <p:cNvSpPr>
+            <a:spLocks noGrp="1" noRot="1" noChangeAspect="1"/>
+          </p:cNvSpPr>
+          <p:nvPr>
+            <p:ph type="sldImg"/>
+          </p:nvPr>
+        </p:nvSpPr>
+        <p:spPr/>
+      </p:sp>
+      <p:sp>
+        <p:nvSpPr>
+          <p:cNvPr id="3" name="Notes Placeholder 2"/>
+          <p:cNvSpPr>
+            <a:spLocks noGrp="1"/>
+          </p:cNvSpPr>
+          <p:nvPr>
+            <p:ph type="body" idx="1"/>
+          </p:nvPr>
+        </p:nvSpPr>
+        <p:spPr/>
+        <p:txBody>
+          <a:bodyPr/>
+          <a:lstStyle/>
+          <a:p>
+            <a:pPr marL="0" marR="0" lvl="0" indent="0" algn="l" defTabSz="914400" rtl="0" eaLnBrk="1" fontAlgn="auto" latinLnBrk="0" hangingPunct="1">
+              <a:lnSpc>
+                <a:spcPct val="100000"/>
+              </a:lnSpc>
+              <a:spcBef>
+                <a:spcPts val="0"/>
+              </a:spcBef>
+              <a:spcAft>
+                <a:spcPts val="0"/>
+              </a:spcAft>
+              <a:buClrTx/>
+              <a:buSzTx/>
+              <a:buFontTx/>
+              <a:buNone/>
+              <a:tabLst/>
+              <a:defRPr/>
+            </a:pPr>
+            <a:r>
+              <a:rPr lang="en-US" dirty="0"/>
+              <a:t>(neigh-</a:t>
+            </a:r>
+            <a:r>
+              <a:rPr lang="en-US" dirty="0" err="1"/>
+              <a:t>bor</a:t>
+            </a:r>
+            <a:r>
+              <a:rPr lang="en-US" dirty="0"/>
+              <a:t>)</a:t>
+            </a:r>
+          </a:p>
+          <a:p>
+            <a:endParaRPr lang="en-US" dirty="0"/>
+          </a:p>
+        </p:txBody>
+      </p:sp>
+      <p:sp>
+        <p:nvSpPr>
+          <p:cNvPr id="4" name="Slide Number Placeholder 3"/>
+          <p:cNvSpPr>
+            <a:spLocks noGrp="1"/>
+          </p:cNvSpPr>
+          <p:nvPr>
+            <p:ph type="sldNum" sz="quarter" idx="5"/>
+          </p:nvPr>
+        </p:nvSpPr>
+        <p:spPr/>
+        <p:txBody>
+          <a:bodyPr/>
+          <a:lstStyle/>
+          <a:p>
+            <a:fld id="{2A799501-FF39-4DDB-88D6-1F9BF577AF3F}" type="slidenum">
+              <a:rPr lang="en-US" smtClean="0"/>
+              <a:t>34</a:t>
+            </a:fld>
+            <a:endParaRPr lang="en-US"/>
+          </a:p>
+        </p:txBody>
+      </p:sp>
+    </p:spTree>
+    <p:extLst>
+      <p:ext uri="{BB962C8B-B14F-4D97-AF65-F5344CB8AC3E}">
+        <p14:creationId xmlns:p14="http://schemas.microsoft.com/office/powerpoint/2010/main" val="1660571086"/>
+      </p:ext>
+    </p:extLst>
+  </p:cSld>
+  <p:clrMapOvr>
+    <a:masterClrMapping/>
+  </p:clrMapOvr>
+</p:notes>
+</file>
+
+<file path=ppt/notesSlides/notesSlide9.xml><?xml version="1.0" encoding="utf-8"?>
 <p:notes xmlns:a="http://schemas.openxmlformats.org/drawingml/2006/main" xmlns:r="http://schemas.openxmlformats.org/officeDocument/2006/relationships" xmlns:p="http://schemas.openxmlformats.org/presentationml/2006/main">
   <p:cSld>
     <p:spTree>
@@ -1168,7 +1285,7 @@
           <a:p>
             <a:fld id="{9C823843-94FE-4068-B4C4-A27F7642D02E}" type="slidenum">
               <a:rPr lang="en-US" smtClean="0"/>
-              <a:t>35</a:t>
+              <a:t>36</a:t>
             </a:fld>
             <a:endParaRPr lang="en-US"/>
           </a:p>
@@ -4504,6 +4621,99 @@
           <p:cNvPr id="2" name="Title 1">
             <a:extLst>
               <a:ext uri="{FF2B5EF4-FFF2-40B4-BE49-F238E27FC236}">
+                <a16:creationId xmlns:a16="http://schemas.microsoft.com/office/drawing/2014/main" id="{9844569C-22FF-4C57-99AE-A053A520AD78}"/>
+              </a:ext>
+            </a:extLst>
+          </p:cNvPr>
+          <p:cNvSpPr>
+            <a:spLocks noGrp="1"/>
+          </p:cNvSpPr>
+          <p:nvPr>
+            <p:ph type="title"/>
+          </p:nvPr>
+        </p:nvSpPr>
+        <p:spPr>
+          <a:xfrm>
+            <a:off x="838200" y="365125"/>
+            <a:ext cx="10515600" cy="1325563"/>
+          </a:xfrm>
+        </p:spPr>
+        <p:txBody>
+          <a:bodyPr/>
+          <a:lstStyle/>
+          <a:p>
+            <a:r>
+              <a:rPr lang="en-US" dirty="0"/>
+              <a:t>When a cross is made what sorts of trait distributions do we get?</a:t>
+            </a:r>
+          </a:p>
+        </p:txBody>
+      </p:sp>
+      <p:pic>
+        <p:nvPicPr>
+          <p:cNvPr id="3" name="Picture 2">
+            <a:extLst>
+              <a:ext uri="{FF2B5EF4-FFF2-40B4-BE49-F238E27FC236}">
+                <a16:creationId xmlns:a16="http://schemas.microsoft.com/office/drawing/2014/main" id="{3D64F39C-2E96-4F5B-8A1C-1BAE631D1B4B}"/>
+              </a:ext>
+            </a:extLst>
+          </p:cNvPr>
+          <p:cNvPicPr>
+            <a:picLocks noChangeAspect="1"/>
+          </p:cNvPicPr>
+          <p:nvPr/>
+        </p:nvPicPr>
+        <p:blipFill>
+          <a:blip r:embed="rId3"/>
+          <a:stretch>
+            <a:fillRect/>
+          </a:stretch>
+        </p:blipFill>
+        <p:spPr>
+          <a:xfrm>
+            <a:off x="3058654" y="1918010"/>
+            <a:ext cx="5380250" cy="4359491"/>
+          </a:xfrm>
+          <a:prstGeom prst="rect">
+            <a:avLst/>
+          </a:prstGeom>
+        </p:spPr>
+      </p:pic>
+    </p:spTree>
+    <p:extLst>
+      <p:ext uri="{BB962C8B-B14F-4D97-AF65-F5344CB8AC3E}">
+        <p14:creationId xmlns:p14="http://schemas.microsoft.com/office/powerpoint/2010/main" val="1513312343"/>
+      </p:ext>
+    </p:extLst>
+  </p:cSld>
+  <p:clrMapOvr>
+    <a:masterClrMapping/>
+  </p:clrMapOvr>
+</p:sld>
+</file>
+
+<file path=ppt/slides/slide11.xml><?xml version="1.0" encoding="utf-8"?>
+<p:sld xmlns:a="http://schemas.openxmlformats.org/drawingml/2006/main" xmlns:r="http://schemas.openxmlformats.org/officeDocument/2006/relationships" xmlns:p="http://schemas.openxmlformats.org/presentationml/2006/main">
+  <p:cSld>
+    <p:spTree>
+      <p:nvGrpSpPr>
+        <p:cNvPr id="1" name=""/>
+        <p:cNvGrpSpPr/>
+        <p:nvPr/>
+      </p:nvGrpSpPr>
+      <p:grpSpPr>
+        <a:xfrm>
+          <a:off x="0" y="0"/>
+          <a:ext cx="0" cy="0"/>
+          <a:chOff x="0" y="0"/>
+          <a:chExt cx="0" cy="0"/>
+        </a:xfrm>
+      </p:grpSpPr>
+      <p:sp>
+        <p:nvSpPr>
+          <p:cNvPr id="2" name="Title 1">
+            <a:extLst>
+              <a:ext uri="{FF2B5EF4-FFF2-40B4-BE49-F238E27FC236}">
                 <a16:creationId xmlns:a16="http://schemas.microsoft.com/office/drawing/2014/main" id="{0D410D82-E430-412C-A7C4-CF2F2D6BC2E1}"/>
               </a:ext>
             </a:extLst>
@@ -4595,7 +4805,7 @@
 </p:sld>
 </file>
 
-<file path=ppt/slides/slide11.xml><?xml version="1.0" encoding="utf-8"?>
+<file path=ppt/slides/slide12.xml><?xml version="1.0" encoding="utf-8"?>
 <p:sld xmlns:a="http://schemas.openxmlformats.org/drawingml/2006/main" xmlns:r="http://schemas.openxmlformats.org/officeDocument/2006/relationships" xmlns:p="http://schemas.openxmlformats.org/presentationml/2006/main">
   <p:cSld>
     <p:spTree>
@@ -4655,7 +4865,111 @@
 </p:sld>
 </file>
 
-<file path=ppt/slides/slide12.xml><?xml version="1.0" encoding="utf-8"?>
+<file path=ppt/slides/slide13.xml><?xml version="1.0" encoding="utf-8"?>
+<p:sld xmlns:a="http://schemas.openxmlformats.org/drawingml/2006/main" xmlns:r="http://schemas.openxmlformats.org/officeDocument/2006/relationships" xmlns:p="http://schemas.openxmlformats.org/presentationml/2006/main">
+  <p:cSld>
+    <p:spTree>
+      <p:nvGrpSpPr>
+        <p:cNvPr id="1" name=""/>
+        <p:cNvGrpSpPr/>
+        <p:nvPr/>
+      </p:nvGrpSpPr>
+      <p:grpSpPr>
+        <a:xfrm>
+          <a:off x="0" y="0"/>
+          <a:ext cx="0" cy="0"/>
+          <a:chOff x="0" y="0"/>
+          <a:chExt cx="0" cy="0"/>
+        </a:xfrm>
+      </p:grpSpPr>
+      <p:sp>
+        <p:nvSpPr>
+          <p:cNvPr id="2" name="Title 1">
+            <a:extLst>
+              <a:ext uri="{FF2B5EF4-FFF2-40B4-BE49-F238E27FC236}">
+                <a16:creationId xmlns:a16="http://schemas.microsoft.com/office/drawing/2014/main" id="{97139274-0305-44AF-8A56-A496EA967A8D}"/>
+              </a:ext>
+            </a:extLst>
+          </p:cNvPr>
+          <p:cNvSpPr>
+            <a:spLocks noGrp="1"/>
+          </p:cNvSpPr>
+          <p:nvPr>
+            <p:ph type="title"/>
+          </p:nvPr>
+        </p:nvSpPr>
+        <p:spPr>
+          <a:xfrm>
+            <a:off x="838200" y="365124"/>
+            <a:ext cx="10515600" cy="2177353"/>
+          </a:xfrm>
+        </p:spPr>
+        <p:txBody>
+          <a:bodyPr>
+            <a:normAutofit/>
+          </a:bodyPr>
+          <a:lstStyle/>
+          <a:p>
+            <a:r>
+              <a:rPr lang="en-US" dirty="0"/>
+              <a:t>How can we integrate these observed trait distributions, and the known physiology to estimate the phenotypes of lines?</a:t>
+            </a:r>
+          </a:p>
+        </p:txBody>
+      </p:sp>
+      <p:sp>
+        <p:nvSpPr>
+          <p:cNvPr id="3" name="Content Placeholder 2">
+            <a:extLst>
+              <a:ext uri="{FF2B5EF4-FFF2-40B4-BE49-F238E27FC236}">
+                <a16:creationId xmlns:a16="http://schemas.microsoft.com/office/drawing/2014/main" id="{610AB8A4-F9C1-4C73-9A26-D4898D80BF38}"/>
+              </a:ext>
+            </a:extLst>
+          </p:cNvPr>
+          <p:cNvSpPr>
+            <a:spLocks noGrp="1"/>
+          </p:cNvSpPr>
+          <p:nvPr>
+            <p:ph idx="1"/>
+          </p:nvPr>
+        </p:nvSpPr>
+        <p:spPr>
+          <a:xfrm>
+            <a:off x="838200" y="2732049"/>
+            <a:ext cx="10515600" cy="3444914"/>
+          </a:xfrm>
+        </p:spPr>
+        <p:txBody>
+          <a:bodyPr/>
+          <a:lstStyle/>
+          <a:p>
+            <a:r>
+              <a:rPr lang="en-US" dirty="0"/>
+              <a:t>We need to develop a model based on what we know about these things that can at least mimic the trait distributions, then we can move on to testing it. </a:t>
+            </a:r>
+          </a:p>
+          <a:p>
+            <a:r>
+              <a:rPr lang="en-US" dirty="0"/>
+              <a:t>We want to estimate the phenotype or breeding value without having to observe the line as cost of genotyping is now &lt; cost of field evaluation. </a:t>
+            </a:r>
+          </a:p>
+        </p:txBody>
+      </p:sp>
+    </p:spTree>
+    <p:extLst>
+      <p:ext uri="{BB962C8B-B14F-4D97-AF65-F5344CB8AC3E}">
+        <p14:creationId xmlns:p14="http://schemas.microsoft.com/office/powerpoint/2010/main" val="3377897219"/>
+      </p:ext>
+    </p:extLst>
+  </p:cSld>
+  <p:clrMapOvr>
+    <a:masterClrMapping/>
+  </p:clrMapOvr>
+</p:sld>
+</file>
+
+<file path=ppt/slides/slide14.xml><?xml version="1.0" encoding="utf-8"?>
 <p:sld xmlns:a="http://schemas.openxmlformats.org/drawingml/2006/main" xmlns:r="http://schemas.openxmlformats.org/officeDocument/2006/relationships" xmlns:p="http://schemas.openxmlformats.org/presentationml/2006/main">
   <p:cSld>
     <p:spTree>
@@ -4695,12 +5009,14 @@
           </a:xfrm>
         </p:spPr>
         <p:txBody>
-          <a:bodyPr/>
+          <a:bodyPr>
+            <a:normAutofit/>
+          </a:bodyPr>
           <a:lstStyle/>
           <a:p>
             <a:r>
               <a:rPr lang="en-US" dirty="0"/>
-              <a:t>This is where the additive model comes in!</a:t>
+              <a:t>This is where the additive model comes in – </a:t>
             </a:r>
           </a:p>
         </p:txBody>
@@ -18336,7 +18652,7 @@
 </p:sld>
 </file>
 
-<file path=ppt/slides/slide13.xml><?xml version="1.0" encoding="utf-8"?>
+<file path=ppt/slides/slide15.xml><?xml version="1.0" encoding="utf-8"?>
 <p:sld xmlns:a="http://schemas.openxmlformats.org/drawingml/2006/main" xmlns:r="http://schemas.openxmlformats.org/officeDocument/2006/relationships" xmlns:p="http://schemas.openxmlformats.org/presentationml/2006/main">
   <p:cSld>
     <p:spTree>
@@ -34961,7 +35277,7 @@
 </p:sld>
 </file>
 
-<file path=ppt/slides/slide14.xml><?xml version="1.0" encoding="utf-8"?>
+<file path=ppt/slides/slide16.xml><?xml version="1.0" encoding="utf-8"?>
 <p:sld xmlns:a="http://schemas.openxmlformats.org/drawingml/2006/main" xmlns:r="http://schemas.openxmlformats.org/officeDocument/2006/relationships" xmlns:p="http://schemas.openxmlformats.org/presentationml/2006/main">
   <p:cSld>
     <p:spTree>
@@ -41943,7 +42259,7 @@
 </p:sld>
 </file>
 
-<file path=ppt/slides/slide15.xml><?xml version="1.0" encoding="utf-8"?>
+<file path=ppt/slides/slide17.xml><?xml version="1.0" encoding="utf-8"?>
 <p:sld xmlns:a="http://schemas.openxmlformats.org/drawingml/2006/main" xmlns:r="http://schemas.openxmlformats.org/officeDocument/2006/relationships" xmlns:p="http://schemas.openxmlformats.org/presentationml/2006/main">
   <p:cSld>
     <p:spTree>
@@ -43101,227 +43417,6 @@
 </p:sld>
 </file>
 
-<file path=ppt/slides/slide16.xml><?xml version="1.0" encoding="utf-8"?>
-<p:sld xmlns:a="http://schemas.openxmlformats.org/drawingml/2006/main" xmlns:r="http://schemas.openxmlformats.org/officeDocument/2006/relationships" xmlns:p="http://schemas.openxmlformats.org/presentationml/2006/main">
-  <p:cSld>
-    <p:spTree>
-      <p:nvGrpSpPr>
-        <p:cNvPr id="1" name=""/>
-        <p:cNvGrpSpPr/>
-        <p:nvPr/>
-      </p:nvGrpSpPr>
-      <p:grpSpPr>
-        <a:xfrm>
-          <a:off x="0" y="0"/>
-          <a:ext cx="0" cy="0"/>
-          <a:chOff x="0" y="0"/>
-          <a:chExt cx="0" cy="0"/>
-        </a:xfrm>
-      </p:grpSpPr>
-      <p:sp>
-        <p:nvSpPr>
-          <p:cNvPr id="2" name="Title 1">
-            <a:extLst>
-              <a:ext uri="{FF2B5EF4-FFF2-40B4-BE49-F238E27FC236}">
-                <a16:creationId xmlns:a16="http://schemas.microsoft.com/office/drawing/2014/main" id="{940AF8A3-34F1-4D10-AF1D-ED3622FFCB37}"/>
-              </a:ext>
-            </a:extLst>
-          </p:cNvPr>
-          <p:cNvSpPr>
-            <a:spLocks noGrp="1"/>
-          </p:cNvSpPr>
-          <p:nvPr>
-            <p:ph type="title"/>
-          </p:nvPr>
-        </p:nvSpPr>
-        <p:spPr/>
-        <p:txBody>
-          <a:bodyPr/>
-          <a:lstStyle/>
-          <a:p>
-            <a:r>
-              <a:rPr lang="en-US" dirty="0"/>
-              <a:t>We could do this for all possible combinations of the parental loci but…</a:t>
-            </a:r>
-          </a:p>
-        </p:txBody>
-      </p:sp>
-      <p:sp>
-        <p:nvSpPr>
-          <p:cNvPr id="3" name="Content Placeholder 2">
-            <a:extLst>
-              <a:ext uri="{FF2B5EF4-FFF2-40B4-BE49-F238E27FC236}">
-                <a16:creationId xmlns:a16="http://schemas.microsoft.com/office/drawing/2014/main" id="{44F5B7FF-1D07-47E5-B5E0-63A743475B9F}"/>
-              </a:ext>
-            </a:extLst>
-          </p:cNvPr>
-          <p:cNvSpPr>
-            <a:spLocks noGrp="1"/>
-          </p:cNvSpPr>
-          <p:nvPr>
-            <p:ph idx="1"/>
-          </p:nvPr>
-        </p:nvSpPr>
-        <p:spPr/>
-        <p:txBody>
-          <a:bodyPr/>
-          <a:lstStyle/>
-          <a:p>
-            <a:r>
-              <a:rPr lang="en-US" dirty="0"/>
-              <a:t>Lets just do some simulations and further extensions</a:t>
-            </a:r>
-          </a:p>
-          <a:p>
-            <a:endParaRPr lang="en-US" dirty="0"/>
-          </a:p>
-        </p:txBody>
-      </p:sp>
-    </p:spTree>
-    <p:extLst>
-      <p:ext uri="{BB962C8B-B14F-4D97-AF65-F5344CB8AC3E}">
-        <p14:creationId xmlns:p14="http://schemas.microsoft.com/office/powerpoint/2010/main" val="3036165403"/>
-      </p:ext>
-    </p:extLst>
-  </p:cSld>
-  <p:clrMapOvr>
-    <a:masterClrMapping/>
-  </p:clrMapOvr>
-</p:sld>
-</file>
-
-<file path=ppt/slides/slide17.xml><?xml version="1.0" encoding="utf-8"?>
-<p:sld xmlns:a="http://schemas.openxmlformats.org/drawingml/2006/main" xmlns:r="http://schemas.openxmlformats.org/officeDocument/2006/relationships" xmlns:p="http://schemas.openxmlformats.org/presentationml/2006/main">
-  <p:cSld>
-    <p:spTree>
-      <p:nvGrpSpPr>
-        <p:cNvPr id="1" name=""/>
-        <p:cNvGrpSpPr/>
-        <p:nvPr/>
-      </p:nvGrpSpPr>
-      <p:grpSpPr>
-        <a:xfrm>
-          <a:off x="0" y="0"/>
-          <a:ext cx="0" cy="0"/>
-          <a:chOff x="0" y="0"/>
-          <a:chExt cx="0" cy="0"/>
-        </a:xfrm>
-      </p:grpSpPr>
-      <p:sp>
-        <p:nvSpPr>
-          <p:cNvPr id="2" name="Title 1">
-            <a:extLst>
-              <a:ext uri="{FF2B5EF4-FFF2-40B4-BE49-F238E27FC236}">
-                <a16:creationId xmlns:a16="http://schemas.microsoft.com/office/drawing/2014/main" id="{1E9BCD57-A934-4961-9271-7D3358F3013E}"/>
-              </a:ext>
-            </a:extLst>
-          </p:cNvPr>
-          <p:cNvSpPr>
-            <a:spLocks noGrp="1"/>
-          </p:cNvSpPr>
-          <p:nvPr>
-            <p:ph type="title"/>
-          </p:nvPr>
-        </p:nvSpPr>
-        <p:spPr/>
-        <p:txBody>
-          <a:bodyPr/>
-          <a:lstStyle/>
-          <a:p>
-            <a:r>
-              <a:rPr lang="en-US" dirty="0"/>
-              <a:t>Let’s jump to R</a:t>
-            </a:r>
-          </a:p>
-        </p:txBody>
-      </p:sp>
-      <p:sp>
-        <p:nvSpPr>
-          <p:cNvPr id="3" name="Content Placeholder 2">
-            <a:extLst>
-              <a:ext uri="{FF2B5EF4-FFF2-40B4-BE49-F238E27FC236}">
-                <a16:creationId xmlns:a16="http://schemas.microsoft.com/office/drawing/2014/main" id="{F1FC7A70-D3FE-4D9C-AF7D-2238B03DA661}"/>
-              </a:ext>
-            </a:extLst>
-          </p:cNvPr>
-          <p:cNvSpPr>
-            <a:spLocks noGrp="1"/>
-          </p:cNvSpPr>
-          <p:nvPr>
-            <p:ph idx="1"/>
-          </p:nvPr>
-        </p:nvSpPr>
-        <p:spPr/>
-        <p:txBody>
-          <a:bodyPr/>
-          <a:lstStyle/>
-          <a:p>
-            <a:r>
-              <a:rPr lang="en-US" dirty="0"/>
-              <a:t>We are going to simulate:</a:t>
-            </a:r>
-          </a:p>
-          <a:p>
-            <a:pPr lvl="1"/>
-            <a:r>
-              <a:rPr lang="en-US" dirty="0"/>
-              <a:t>Our 5 loci model with equal marker effects,</a:t>
-            </a:r>
-          </a:p>
-          <a:p>
-            <a:pPr lvl="1"/>
-            <a:r>
-              <a:rPr lang="en-US" dirty="0"/>
-              <a:t>Our 5 loci model with random effects</a:t>
-            </a:r>
-          </a:p>
-          <a:p>
-            <a:pPr lvl="1"/>
-            <a:r>
-              <a:rPr lang="en-US" dirty="0"/>
-              <a:t>Extend this to 200 loci with</a:t>
-            </a:r>
-          </a:p>
-          <a:p>
-            <a:pPr lvl="2"/>
-            <a:r>
-              <a:rPr lang="en-US" dirty="0"/>
-              <a:t>Equal marker effects</a:t>
-            </a:r>
-          </a:p>
-          <a:p>
-            <a:pPr lvl="2"/>
-            <a:r>
-              <a:rPr lang="en-US" dirty="0"/>
-              <a:t>Single large effect markers</a:t>
-            </a:r>
-          </a:p>
-          <a:p>
-            <a:pPr lvl="2"/>
-            <a:r>
-              <a:rPr lang="en-US" dirty="0"/>
-              <a:t>Randomly assigned marker effects</a:t>
-            </a:r>
-          </a:p>
-          <a:p>
-            <a:pPr lvl="1"/>
-            <a:endParaRPr lang="en-US" dirty="0"/>
-          </a:p>
-        </p:txBody>
-      </p:sp>
-    </p:spTree>
-    <p:extLst>
-      <p:ext uri="{BB962C8B-B14F-4D97-AF65-F5344CB8AC3E}">
-        <p14:creationId xmlns:p14="http://schemas.microsoft.com/office/powerpoint/2010/main" val="519978926"/>
-      </p:ext>
-    </p:extLst>
-  </p:cSld>
-  <p:clrMapOvr>
-    <a:masterClrMapping/>
-  </p:clrMapOvr>
-</p:sld>
-</file>
-
 <file path=ppt/slides/slide18.xml><?xml version="1.0" encoding="utf-8"?>
 <p:sld xmlns:a="http://schemas.openxmlformats.org/drawingml/2006/main" xmlns:r="http://schemas.openxmlformats.org/officeDocument/2006/relationships" xmlns:p="http://schemas.openxmlformats.org/presentationml/2006/main">
   <p:cSld>
@@ -43507,7 +43602,7 @@
           <a:p>
             <a:r>
               <a:rPr lang="en-US" dirty="0"/>
-              <a:t>Mathematical concept of ‘additivity’, ‘dominance’, and ‘epistasis’</a:t>
+              <a:t>Mathematical concept of ‘additivity’ and ‘dominance’</a:t>
             </a:r>
           </a:p>
           <a:p>
@@ -43783,6 +43878,138 @@
           <p:cNvPr id="2" name="Title 1">
             <a:extLst>
               <a:ext uri="{FF2B5EF4-FFF2-40B4-BE49-F238E27FC236}">
+                <a16:creationId xmlns:a16="http://schemas.microsoft.com/office/drawing/2014/main" id="{1E9BCD57-A934-4961-9271-7D3358F3013E}"/>
+              </a:ext>
+            </a:extLst>
+          </p:cNvPr>
+          <p:cNvSpPr>
+            <a:spLocks noGrp="1"/>
+          </p:cNvSpPr>
+          <p:nvPr>
+            <p:ph type="title"/>
+          </p:nvPr>
+        </p:nvSpPr>
+        <p:spPr/>
+        <p:txBody>
+          <a:bodyPr/>
+          <a:lstStyle/>
+          <a:p>
+            <a:r>
+              <a:rPr lang="en-US" dirty="0"/>
+              <a:t>Let’s jump to R</a:t>
+            </a:r>
+          </a:p>
+        </p:txBody>
+      </p:sp>
+      <p:sp>
+        <p:nvSpPr>
+          <p:cNvPr id="3" name="Content Placeholder 2">
+            <a:extLst>
+              <a:ext uri="{FF2B5EF4-FFF2-40B4-BE49-F238E27FC236}">
+                <a16:creationId xmlns:a16="http://schemas.microsoft.com/office/drawing/2014/main" id="{F1FC7A70-D3FE-4D9C-AF7D-2238B03DA661}"/>
+              </a:ext>
+            </a:extLst>
+          </p:cNvPr>
+          <p:cNvSpPr>
+            <a:spLocks noGrp="1"/>
+          </p:cNvSpPr>
+          <p:nvPr>
+            <p:ph idx="1"/>
+          </p:nvPr>
+        </p:nvSpPr>
+        <p:spPr/>
+        <p:txBody>
+          <a:bodyPr/>
+          <a:lstStyle/>
+          <a:p>
+            <a:r>
+              <a:rPr lang="en-US" dirty="0"/>
+              <a:t>We are going to simulate:</a:t>
+            </a:r>
+          </a:p>
+          <a:p>
+            <a:pPr lvl="1"/>
+            <a:r>
+              <a:rPr lang="en-US" dirty="0"/>
+              <a:t>Our 5 loci model with equal marker effects,</a:t>
+            </a:r>
+          </a:p>
+          <a:p>
+            <a:pPr lvl="1"/>
+            <a:r>
+              <a:rPr lang="en-US" dirty="0"/>
+              <a:t>Our 5 loci model with random effects</a:t>
+            </a:r>
+          </a:p>
+          <a:p>
+            <a:pPr lvl="1"/>
+            <a:r>
+              <a:rPr lang="en-US" dirty="0"/>
+              <a:t>Extend this to 200 loci with</a:t>
+            </a:r>
+          </a:p>
+          <a:p>
+            <a:pPr lvl="2"/>
+            <a:r>
+              <a:rPr lang="en-US" dirty="0"/>
+              <a:t>Equal marker effects</a:t>
+            </a:r>
+          </a:p>
+          <a:p>
+            <a:pPr lvl="2"/>
+            <a:r>
+              <a:rPr lang="en-US" dirty="0"/>
+              <a:t>Single large effect markers</a:t>
+            </a:r>
+          </a:p>
+          <a:p>
+            <a:pPr lvl="2"/>
+            <a:r>
+              <a:rPr lang="en-US" dirty="0"/>
+              <a:t>Randomly assigned marker effects</a:t>
+            </a:r>
+          </a:p>
+          <a:p>
+            <a:pPr lvl="1"/>
+            <a:endParaRPr lang="en-US" dirty="0"/>
+          </a:p>
+        </p:txBody>
+      </p:sp>
+    </p:spTree>
+    <p:extLst>
+      <p:ext uri="{BB962C8B-B14F-4D97-AF65-F5344CB8AC3E}">
+        <p14:creationId xmlns:p14="http://schemas.microsoft.com/office/powerpoint/2010/main" val="519978926"/>
+      </p:ext>
+    </p:extLst>
+  </p:cSld>
+  <p:clrMapOvr>
+    <a:masterClrMapping/>
+  </p:clrMapOvr>
+</p:sld>
+</file>
+
+<file path=ppt/slides/slide21.xml><?xml version="1.0" encoding="utf-8"?>
+<p:sld xmlns:a="http://schemas.openxmlformats.org/drawingml/2006/main" xmlns:r="http://schemas.openxmlformats.org/officeDocument/2006/relationships" xmlns:p="http://schemas.openxmlformats.org/presentationml/2006/main">
+  <p:cSld>
+    <p:spTree>
+      <p:nvGrpSpPr>
+        <p:cNvPr id="1" name=""/>
+        <p:cNvGrpSpPr/>
+        <p:nvPr/>
+      </p:nvGrpSpPr>
+      <p:grpSpPr>
+        <a:xfrm>
+          <a:off x="0" y="0"/>
+          <a:ext cx="0" cy="0"/>
+          <a:chOff x="0" y="0"/>
+          <a:chExt cx="0" cy="0"/>
+        </a:xfrm>
+      </p:grpSpPr>
+      <p:sp>
+        <p:nvSpPr>
+          <p:cNvPr id="2" name="Title 1">
+            <a:extLst>
+              <a:ext uri="{FF2B5EF4-FFF2-40B4-BE49-F238E27FC236}">
                 <a16:creationId xmlns:a16="http://schemas.microsoft.com/office/drawing/2014/main" id="{6A3111EC-B405-4FCF-9C89-1E1AC4530A38}"/>
               </a:ext>
             </a:extLst>
@@ -43877,7 +44104,7 @@
 </p:sld>
 </file>
 
-<file path=ppt/slides/slide21.xml><?xml version="1.0" encoding="utf-8"?>
+<file path=ppt/slides/slide22.xml><?xml version="1.0" encoding="utf-8"?>
 <p:sld xmlns:a="http://schemas.openxmlformats.org/drawingml/2006/main" xmlns:r="http://schemas.openxmlformats.org/officeDocument/2006/relationships" xmlns:p="http://schemas.openxmlformats.org/presentationml/2006/main">
   <p:cSld>
     <p:spTree>
@@ -44065,7 +44292,7 @@
 </p:sld>
 </file>
 
-<file path=ppt/slides/slide22.xml><?xml version="1.0" encoding="utf-8"?>
+<file path=ppt/slides/slide23.xml><?xml version="1.0" encoding="utf-8"?>
 <p:sld xmlns:a="http://schemas.openxmlformats.org/drawingml/2006/main" xmlns:r="http://schemas.openxmlformats.org/officeDocument/2006/relationships" xmlns:p="http://schemas.openxmlformats.org/presentationml/2006/main">
   <p:cSld>
     <p:spTree>
@@ -44169,7 +44396,7 @@
 </p:sld>
 </file>
 
-<file path=ppt/slides/slide23.xml><?xml version="1.0" encoding="utf-8"?>
+<file path=ppt/slides/slide24.xml><?xml version="1.0" encoding="utf-8"?>
 <p:sld xmlns:a="http://schemas.openxmlformats.org/drawingml/2006/main" xmlns:r="http://schemas.openxmlformats.org/officeDocument/2006/relationships" xmlns:p="http://schemas.openxmlformats.org/presentationml/2006/main">
   <p:cSld>
     <p:spTree>
@@ -44304,7 +44531,7 @@
 </p:sld>
 </file>
 
-<file path=ppt/slides/slide24.xml><?xml version="1.0" encoding="utf-8"?>
+<file path=ppt/slides/slide25.xml><?xml version="1.0" encoding="utf-8"?>
 <p:sld xmlns:a="http://schemas.openxmlformats.org/drawingml/2006/main" xmlns:r="http://schemas.openxmlformats.org/officeDocument/2006/relationships" xmlns:p="http://schemas.openxmlformats.org/presentationml/2006/main">
   <p:cSld>
     <p:spTree>
@@ -44416,7 +44643,7 @@
 </p:sld>
 </file>
 
-<file path=ppt/slides/slide25.xml><?xml version="1.0" encoding="utf-8"?>
+<file path=ppt/slides/slide26.xml><?xml version="1.0" encoding="utf-8"?>
 <p:sld xmlns:a="http://schemas.openxmlformats.org/drawingml/2006/main" xmlns:r="http://schemas.openxmlformats.org/officeDocument/2006/relationships" xmlns:p="http://schemas.openxmlformats.org/presentationml/2006/main">
   <p:cSld>
     <p:spTree>
@@ -44532,7 +44759,7 @@
 </p:sld>
 </file>
 
-<file path=ppt/slides/slide26.xml><?xml version="1.0" encoding="utf-8"?>
+<file path=ppt/slides/slide27.xml><?xml version="1.0" encoding="utf-8"?>
 <p:sld xmlns:a="http://schemas.openxmlformats.org/drawingml/2006/main" xmlns:r="http://schemas.openxmlformats.org/officeDocument/2006/relationships" xmlns:p="http://schemas.openxmlformats.org/presentationml/2006/main">
   <p:cSld>
     <p:spTree>
@@ -44572,7 +44799,7 @@
           <a:p>
             <a:r>
               <a:rPr lang="en-US" dirty="0"/>
-              <a:t>But we can Regularize! </a:t>
+              <a:t>We can Regularize! </a:t>
             </a:r>
           </a:p>
         </p:txBody>
@@ -44726,7 +44953,7 @@
 </p:sld>
 </file>
 
-<file path=ppt/slides/slide27.xml><?xml version="1.0" encoding="utf-8"?>
+<file path=ppt/slides/slide28.xml><?xml version="1.0" encoding="utf-8"?>
 <p:sld xmlns:a="http://schemas.openxmlformats.org/drawingml/2006/main" xmlns:r="http://schemas.openxmlformats.org/officeDocument/2006/relationships" xmlns:p="http://schemas.openxmlformats.org/presentationml/2006/main">
   <p:cSld>
     <p:spTree>
@@ -44766,7 +44993,7 @@
           <a:p>
             <a:r>
               <a:rPr lang="en-US" dirty="0"/>
-              <a:t>The difference in in the number of Df and sensitivity</a:t>
+              <a:t>The difference is in the number of Df and sensitivity</a:t>
             </a:r>
           </a:p>
         </p:txBody>
@@ -44787,9 +45014,16 @@
             <p:ph idx="1"/>
           </p:nvPr>
         </p:nvSpPr>
-        <p:spPr/>
+        <p:spPr>
+          <a:xfrm>
+            <a:off x="838200" y="1825625"/>
+            <a:ext cx="10515600" cy="4820502"/>
+          </a:xfrm>
+        </p:spPr>
         <p:txBody>
-          <a:bodyPr/>
+          <a:bodyPr>
+            <a:normAutofit/>
+          </a:bodyPr>
           <a:lstStyle/>
           <a:p>
             <a:r>
@@ -44825,7 +45059,7 @@
           <a:p>
             <a:r>
               <a:rPr lang="en-US" dirty="0"/>
-              <a:t>BLUPs are assigned per predictor as well, but are constrained based on assumptions and probabilities of what values those markers can take. For example our marker effects may be estimated based on the normal distribution. </a:t>
+              <a:t>BLUPs are assigned per predictor as well, but are constrained based on assumptions, covariance structures, and probabilities of what values those markers can take. For example our marker effects may be estimated based on the normal distribution. (Shrinkage, parameters needed to be estimated) </a:t>
             </a:r>
           </a:p>
         </p:txBody>
@@ -44843,7 +45077,7 @@
 </p:sld>
 </file>
 
-<file path=ppt/slides/slide28.xml><?xml version="1.0" encoding="utf-8"?>
+<file path=ppt/slides/slide29.xml><?xml version="1.0" encoding="utf-8"?>
 <p:sld xmlns:a="http://schemas.openxmlformats.org/drawingml/2006/main" xmlns:r="http://schemas.openxmlformats.org/officeDocument/2006/relationships" xmlns:p="http://schemas.openxmlformats.org/presentationml/2006/main">
   <p:cSld>
     <p:spTree>
@@ -45037,7 +45271,7 @@
             </a:r>
             <a:r>
               <a:rPr lang="en-US" dirty="0"/>
-              <a:t>is a vector of effects assumed to be drawn from a distribution, typically N(0,Simga</a:t>
+              <a:t>is a vector of effects assumed to be drawn from a distribution, often N(0,Simga</a:t>
             </a:r>
             <a:r>
               <a:rPr lang="en-US" baseline="30000" dirty="0"/>
@@ -45076,89 +45310,6 @@
     <p:extLst>
       <p:ext uri="{BB962C8B-B14F-4D97-AF65-F5344CB8AC3E}">
         <p14:creationId xmlns:p14="http://schemas.microsoft.com/office/powerpoint/2010/main" val="1885800822"/>
-      </p:ext>
-    </p:extLst>
-  </p:cSld>
-  <p:clrMapOvr>
-    <a:masterClrMapping/>
-  </p:clrMapOvr>
-</p:sld>
-</file>
-
-<file path=ppt/slides/slide29.xml><?xml version="1.0" encoding="utf-8"?>
-<p:sld xmlns:a="http://schemas.openxmlformats.org/drawingml/2006/main" xmlns:r="http://schemas.openxmlformats.org/officeDocument/2006/relationships" xmlns:p="http://schemas.openxmlformats.org/presentationml/2006/main">
-  <p:cSld>
-    <p:spTree>
-      <p:nvGrpSpPr>
-        <p:cNvPr id="1" name=""/>
-        <p:cNvGrpSpPr/>
-        <p:nvPr/>
-      </p:nvGrpSpPr>
-      <p:grpSpPr>
-        <a:xfrm>
-          <a:off x="0" y="0"/>
-          <a:ext cx="0" cy="0"/>
-          <a:chOff x="0" y="0"/>
-          <a:chExt cx="0" cy="0"/>
-        </a:xfrm>
-      </p:grpSpPr>
-      <p:sp>
-        <p:nvSpPr>
-          <p:cNvPr id="2" name="Title 1">
-            <a:extLst>
-              <a:ext uri="{FF2B5EF4-FFF2-40B4-BE49-F238E27FC236}">
-                <a16:creationId xmlns:a16="http://schemas.microsoft.com/office/drawing/2014/main" id="{2981A07D-73F4-4184-A7C7-EB5DE5AD47BF}"/>
-              </a:ext>
-            </a:extLst>
-          </p:cNvPr>
-          <p:cNvSpPr>
-            <a:spLocks noGrp="1"/>
-          </p:cNvSpPr>
-          <p:nvPr>
-            <p:ph type="title"/>
-          </p:nvPr>
-        </p:nvSpPr>
-        <p:spPr/>
-        <p:txBody>
-          <a:bodyPr/>
-          <a:lstStyle/>
-          <a:p>
-            <a:r>
-              <a:rPr lang="en-US" dirty="0"/>
-              <a:t>Lets do a little simulation in R</a:t>
-            </a:r>
-          </a:p>
-        </p:txBody>
-      </p:sp>
-      <p:sp>
-        <p:nvSpPr>
-          <p:cNvPr id="3" name="Content Placeholder 2">
-            <a:extLst>
-              <a:ext uri="{FF2B5EF4-FFF2-40B4-BE49-F238E27FC236}">
-                <a16:creationId xmlns:a16="http://schemas.microsoft.com/office/drawing/2014/main" id="{58C303BF-1484-452C-B2D2-D3B042AFB8D7}"/>
-              </a:ext>
-            </a:extLst>
-          </p:cNvPr>
-          <p:cNvSpPr>
-            <a:spLocks noGrp="1"/>
-          </p:cNvSpPr>
-          <p:nvPr>
-            <p:ph idx="1"/>
-          </p:nvPr>
-        </p:nvSpPr>
-        <p:spPr/>
-        <p:txBody>
-          <a:bodyPr/>
-          <a:lstStyle/>
-          <a:p>
-            <a:endParaRPr lang="en-US" dirty="0"/>
-          </a:p>
-        </p:txBody>
-      </p:sp>
-    </p:spTree>
-    <p:extLst>
-      <p:ext uri="{BB962C8B-B14F-4D97-AF65-F5344CB8AC3E}">
-        <p14:creationId xmlns:p14="http://schemas.microsoft.com/office/powerpoint/2010/main" val="1810957998"/>
       </p:ext>
     </p:extLst>
   </p:cSld>
@@ -45404,6 +45555,89 @@
           <p:cNvPr id="2" name="Title 1">
             <a:extLst>
               <a:ext uri="{FF2B5EF4-FFF2-40B4-BE49-F238E27FC236}">
+                <a16:creationId xmlns:a16="http://schemas.microsoft.com/office/drawing/2014/main" id="{2981A07D-73F4-4184-A7C7-EB5DE5AD47BF}"/>
+              </a:ext>
+            </a:extLst>
+          </p:cNvPr>
+          <p:cNvSpPr>
+            <a:spLocks noGrp="1"/>
+          </p:cNvSpPr>
+          <p:nvPr>
+            <p:ph type="title"/>
+          </p:nvPr>
+        </p:nvSpPr>
+        <p:spPr/>
+        <p:txBody>
+          <a:bodyPr/>
+          <a:lstStyle/>
+          <a:p>
+            <a:r>
+              <a:rPr lang="en-US" dirty="0"/>
+              <a:t>Lets do a little simulation in R</a:t>
+            </a:r>
+          </a:p>
+        </p:txBody>
+      </p:sp>
+      <p:sp>
+        <p:nvSpPr>
+          <p:cNvPr id="3" name="Content Placeholder 2">
+            <a:extLst>
+              <a:ext uri="{FF2B5EF4-FFF2-40B4-BE49-F238E27FC236}">
+                <a16:creationId xmlns:a16="http://schemas.microsoft.com/office/drawing/2014/main" id="{58C303BF-1484-452C-B2D2-D3B042AFB8D7}"/>
+              </a:ext>
+            </a:extLst>
+          </p:cNvPr>
+          <p:cNvSpPr>
+            <a:spLocks noGrp="1"/>
+          </p:cNvSpPr>
+          <p:nvPr>
+            <p:ph idx="1"/>
+          </p:nvPr>
+        </p:nvSpPr>
+        <p:spPr/>
+        <p:txBody>
+          <a:bodyPr/>
+          <a:lstStyle/>
+          <a:p>
+            <a:endParaRPr lang="en-US" dirty="0"/>
+          </a:p>
+        </p:txBody>
+      </p:sp>
+    </p:spTree>
+    <p:extLst>
+      <p:ext uri="{BB962C8B-B14F-4D97-AF65-F5344CB8AC3E}">
+        <p14:creationId xmlns:p14="http://schemas.microsoft.com/office/powerpoint/2010/main" val="1810957998"/>
+      </p:ext>
+    </p:extLst>
+  </p:cSld>
+  <p:clrMapOvr>
+    <a:masterClrMapping/>
+  </p:clrMapOvr>
+</p:sld>
+</file>
+
+<file path=ppt/slides/slide31.xml><?xml version="1.0" encoding="utf-8"?>
+<p:sld xmlns:a="http://schemas.openxmlformats.org/drawingml/2006/main" xmlns:r="http://schemas.openxmlformats.org/officeDocument/2006/relationships" xmlns:p="http://schemas.openxmlformats.org/presentationml/2006/main">
+  <p:cSld>
+    <p:spTree>
+      <p:nvGrpSpPr>
+        <p:cNvPr id="1" name=""/>
+        <p:cNvGrpSpPr/>
+        <p:nvPr/>
+      </p:nvGrpSpPr>
+      <p:grpSpPr>
+        <a:xfrm>
+          <a:off x="0" y="0"/>
+          <a:ext cx="0" cy="0"/>
+          <a:chOff x="0" y="0"/>
+          <a:chExt cx="0" cy="0"/>
+        </a:xfrm>
+      </p:grpSpPr>
+      <p:sp>
+        <p:nvSpPr>
+          <p:cNvPr id="2" name="Title 1">
+            <a:extLst>
+              <a:ext uri="{FF2B5EF4-FFF2-40B4-BE49-F238E27FC236}">
                 <a16:creationId xmlns:a16="http://schemas.microsoft.com/office/drawing/2014/main" id="{24410FAC-0943-4FE1-ACFB-EBD257AB924C}"/>
               </a:ext>
             </a:extLst>
@@ -45477,7 +45711,7 @@
 </p:sld>
 </file>
 
-<file path=ppt/slides/slide31.xml><?xml version="1.0" encoding="utf-8"?>
+<file path=ppt/slides/slide32.xml><?xml version="1.0" encoding="utf-8"?>
 <p:sld xmlns:a="http://schemas.openxmlformats.org/drawingml/2006/main" xmlns:r="http://schemas.openxmlformats.org/officeDocument/2006/relationships" xmlns:p="http://schemas.openxmlformats.org/presentationml/2006/main">
   <p:cSld>
     <p:spTree>
@@ -45499,7 +45733,7 @@
           <p:cNvPr id="2" name="Title 1">
             <a:extLst>
               <a:ext uri="{FF2B5EF4-FFF2-40B4-BE49-F238E27FC236}">
-                <a16:creationId xmlns:a16="http://schemas.microsoft.com/office/drawing/2014/main" id="{161DC42C-57D4-44DF-BFDB-BBF756839F09}"/>
+                <a16:creationId xmlns:a16="http://schemas.microsoft.com/office/drawing/2014/main" id="{611C3419-473A-42D3-81FF-F11D6BD40462}"/>
               </a:ext>
             </a:extLst>
           </p:cNvPr>
@@ -45512,12 +45746,14 @@
         </p:nvSpPr>
         <p:spPr/>
         <p:txBody>
-          <a:bodyPr/>
+          <a:bodyPr>
+            <a:normAutofit/>
+          </a:bodyPr>
           <a:lstStyle/>
           <a:p>
             <a:r>
               <a:rPr lang="en-US" dirty="0"/>
-              <a:t>Break time</a:t>
+              <a:t>We have (hopefully) seen:</a:t>
             </a:r>
           </a:p>
         </p:txBody>
@@ -45527,7 +45763,7 @@
           <p:cNvPr id="3" name="Content Placeholder 2">
             <a:extLst>
               <a:ext uri="{FF2B5EF4-FFF2-40B4-BE49-F238E27FC236}">
-                <a16:creationId xmlns:a16="http://schemas.microsoft.com/office/drawing/2014/main" id="{9041C228-E2BB-4AFB-ABC8-A3F4E3BB512A}"/>
+                <a16:creationId xmlns:a16="http://schemas.microsoft.com/office/drawing/2014/main" id="{FBD03B92-F89F-41D9-B31C-424507B42552}"/>
               </a:ext>
             </a:extLst>
           </p:cNvPr>
@@ -45545,50 +45781,49 @@
           <a:p>
             <a:r>
               <a:rPr lang="en-US" dirty="0"/>
-              <a:t>What is a pirates favorite programming language?</a:t>
+              <a:t>That the additive genetic model can reproduce distributions of trait values that we observe in a biparental population.</a:t>
+            </a:r>
+          </a:p>
+          <a:p>
+            <a:pPr lvl="1"/>
+            <a:r>
+              <a:rPr lang="en-US" dirty="0"/>
+              <a:t>IE - The additive model is not incongruous with the data we observe. </a:t>
             </a:r>
           </a:p>
           <a:p>
             <a:r>
               <a:rPr lang="en-US" dirty="0"/>
-              <a:t>Why did the toilet paper role down the hill?</a:t>
+              <a:t>Regression, specifically regularized regression can be used to estimate marker effects well in the scenarios that we can envision within plant breeding. </a:t>
             </a:r>
           </a:p>
           <a:p>
             <a:r>
               <a:rPr lang="en-US" dirty="0"/>
-              <a:t>Why was the geologist’s wife angry?</a:t>
+              <a:t>We have yet to see if it works (I know </a:t>
+            </a:r>
+            <a:r>
+              <a:rPr lang="en-US" dirty="0" err="1"/>
+              <a:t>y’all</a:t>
+            </a:r>
+            <a:r>
+              <a:rPr lang="en-US" dirty="0"/>
+              <a:t> probably know if it does)</a:t>
             </a:r>
           </a:p>
           <a:p>
+            <a:pPr lvl="1"/>
             <a:r>
               <a:rPr lang="en-US" dirty="0"/>
-              <a:t>What do you call a cow jumping over a barbed wire fence?</a:t>
+              <a:t>Let’s see if we can use it to predict within real barley populations.</a:t>
             </a:r>
-          </a:p>
-          <a:p>
-            <a:r>
-              <a:rPr lang="en-US" dirty="0"/>
-              <a:t>What do you call the horse next door? (neigh-</a:t>
-            </a:r>
-            <a:r>
-              <a:rPr lang="en-US" dirty="0" err="1"/>
-              <a:t>bor</a:t>
-            </a:r>
-            <a:r>
-              <a:rPr lang="en-US" dirty="0"/>
-              <a:t>)</a:t>
-            </a:r>
-          </a:p>
-          <a:p>
-            <a:endParaRPr lang="en-US" dirty="0"/>
           </a:p>
         </p:txBody>
       </p:sp>
     </p:spTree>
     <p:extLst>
       <p:ext uri="{BB962C8B-B14F-4D97-AF65-F5344CB8AC3E}">
-        <p14:creationId xmlns:p14="http://schemas.microsoft.com/office/powerpoint/2010/main" val="1867729656"/>
+        <p14:creationId xmlns:p14="http://schemas.microsoft.com/office/powerpoint/2010/main" val="3404698351"/>
       </p:ext>
     </p:extLst>
   </p:cSld>
@@ -45598,7 +45833,7 @@
 </p:sld>
 </file>
 
-<file path=ppt/slides/slide32.xml><?xml version="1.0" encoding="utf-8"?>
+<file path=ppt/slides/slide33.xml><?xml version="1.0" encoding="utf-8"?>
 <p:sld xmlns:a="http://schemas.openxmlformats.org/drawingml/2006/main" xmlns:r="http://schemas.openxmlformats.org/officeDocument/2006/relationships" xmlns:p="http://schemas.openxmlformats.org/presentationml/2006/main">
   <p:cSld>
     <p:spTree>
@@ -45638,7 +45873,7 @@
           <a:p>
             <a:r>
               <a:rPr lang="en-US" dirty="0"/>
-              <a:t>More R demo</a:t>
+              <a:t>Genomic prediction in R with real data</a:t>
             </a:r>
           </a:p>
         </p:txBody>
@@ -45693,7 +45928,118 @@
 </p:sld>
 </file>
 
-<file path=ppt/slides/slide33.xml><?xml version="1.0" encoding="utf-8"?>
+<file path=ppt/slides/slide34.xml><?xml version="1.0" encoding="utf-8"?>
+<p:sld xmlns:a="http://schemas.openxmlformats.org/drawingml/2006/main" xmlns:r="http://schemas.openxmlformats.org/officeDocument/2006/relationships" xmlns:p="http://schemas.openxmlformats.org/presentationml/2006/main">
+  <p:cSld>
+    <p:spTree>
+      <p:nvGrpSpPr>
+        <p:cNvPr id="1" name=""/>
+        <p:cNvGrpSpPr/>
+        <p:nvPr/>
+      </p:nvGrpSpPr>
+      <p:grpSpPr>
+        <a:xfrm>
+          <a:off x="0" y="0"/>
+          <a:ext cx="0" cy="0"/>
+          <a:chOff x="0" y="0"/>
+          <a:chExt cx="0" cy="0"/>
+        </a:xfrm>
+      </p:grpSpPr>
+      <p:sp>
+        <p:nvSpPr>
+          <p:cNvPr id="2" name="Title 1">
+            <a:extLst>
+              <a:ext uri="{FF2B5EF4-FFF2-40B4-BE49-F238E27FC236}">
+                <a16:creationId xmlns:a16="http://schemas.microsoft.com/office/drawing/2014/main" id="{161DC42C-57D4-44DF-BFDB-BBF756839F09}"/>
+              </a:ext>
+            </a:extLst>
+          </p:cNvPr>
+          <p:cNvSpPr>
+            <a:spLocks noGrp="1"/>
+          </p:cNvSpPr>
+          <p:nvPr>
+            <p:ph type="title"/>
+          </p:nvPr>
+        </p:nvSpPr>
+        <p:spPr/>
+        <p:txBody>
+          <a:bodyPr/>
+          <a:lstStyle/>
+          <a:p>
+            <a:r>
+              <a:rPr lang="en-US"/>
+              <a:t>Break time</a:t>
+            </a:r>
+            <a:endParaRPr lang="en-US" dirty="0"/>
+          </a:p>
+        </p:txBody>
+      </p:sp>
+      <p:sp>
+        <p:nvSpPr>
+          <p:cNvPr id="3" name="Content Placeholder 2">
+            <a:extLst>
+              <a:ext uri="{FF2B5EF4-FFF2-40B4-BE49-F238E27FC236}">
+                <a16:creationId xmlns:a16="http://schemas.microsoft.com/office/drawing/2014/main" id="{9041C228-E2BB-4AFB-ABC8-A3F4E3BB512A}"/>
+              </a:ext>
+            </a:extLst>
+          </p:cNvPr>
+          <p:cNvSpPr>
+            <a:spLocks noGrp="1"/>
+          </p:cNvSpPr>
+          <p:nvPr>
+            <p:ph idx="1"/>
+          </p:nvPr>
+        </p:nvSpPr>
+        <p:spPr/>
+        <p:txBody>
+          <a:bodyPr/>
+          <a:lstStyle/>
+          <a:p>
+            <a:r>
+              <a:rPr lang="en-US" dirty="0"/>
+              <a:t>What is a pirates favorite programming language?</a:t>
+            </a:r>
+          </a:p>
+          <a:p>
+            <a:r>
+              <a:rPr lang="en-US" dirty="0"/>
+              <a:t>Why did the toilet paper role down the hill?</a:t>
+            </a:r>
+          </a:p>
+          <a:p>
+            <a:r>
+              <a:rPr lang="en-US" dirty="0"/>
+              <a:t>Why was the geologist’s wife angry?</a:t>
+            </a:r>
+          </a:p>
+          <a:p>
+            <a:r>
+              <a:rPr lang="en-US" dirty="0"/>
+              <a:t>What do you call a cow jumping over a barbed wire fence?</a:t>
+            </a:r>
+          </a:p>
+          <a:p>
+            <a:r>
+              <a:rPr lang="en-US" dirty="0"/>
+              <a:t>What do you call the horse next door? </a:t>
+            </a:r>
+          </a:p>
+        </p:txBody>
+      </p:sp>
+    </p:spTree>
+    <p:extLst>
+      <p:ext uri="{BB962C8B-B14F-4D97-AF65-F5344CB8AC3E}">
+        <p14:creationId xmlns:p14="http://schemas.microsoft.com/office/powerpoint/2010/main" val="1867729656"/>
+      </p:ext>
+    </p:extLst>
+  </p:cSld>
+  <p:clrMapOvr>
+    <a:masterClrMapping/>
+  </p:clrMapOvr>
+</p:sld>
+</file>
+
+<file path=ppt/slides/slide35.xml><?xml version="1.0" encoding="utf-8"?>
 <p:sld xmlns:a="http://schemas.openxmlformats.org/drawingml/2006/main" xmlns:r="http://schemas.openxmlformats.org/officeDocument/2006/relationships" xmlns:p="http://schemas.openxmlformats.org/presentationml/2006/main">
   <p:cSld>
     <p:spTree>
@@ -45733,7 +46079,7 @@
           <a:p>
             <a:r>
               <a:rPr lang="en-US" dirty="0"/>
-              <a:t>Association and genetic locus identification </a:t>
+              <a:t>Association analysis</a:t>
             </a:r>
           </a:p>
         </p:txBody>
@@ -45759,7 +46105,10 @@
           <a:bodyPr/>
           <a:lstStyle/>
           <a:p>
-            <a:endParaRPr lang="en-US"/>
+            <a:r>
+              <a:rPr lang="en-US" dirty="0"/>
+              <a:t>White board</a:t>
+            </a:r>
           </a:p>
         </p:txBody>
       </p:sp>
@@ -45776,90 +46125,7 @@
 </p:sld>
 </file>
 
-<file path=ppt/slides/slide34.xml><?xml version="1.0" encoding="utf-8"?>
-<p:sld xmlns:a="http://schemas.openxmlformats.org/drawingml/2006/main" xmlns:r="http://schemas.openxmlformats.org/officeDocument/2006/relationships" xmlns:p="http://schemas.openxmlformats.org/presentationml/2006/main">
-  <p:cSld>
-    <p:spTree>
-      <p:nvGrpSpPr>
-        <p:cNvPr id="1" name=""/>
-        <p:cNvGrpSpPr/>
-        <p:nvPr/>
-      </p:nvGrpSpPr>
-      <p:grpSpPr>
-        <a:xfrm>
-          <a:off x="0" y="0"/>
-          <a:ext cx="0" cy="0"/>
-          <a:chOff x="0" y="0"/>
-          <a:chExt cx="0" cy="0"/>
-        </a:xfrm>
-      </p:grpSpPr>
-      <p:sp>
-        <p:nvSpPr>
-          <p:cNvPr id="2" name="Title 1">
-            <a:extLst>
-              <a:ext uri="{FF2B5EF4-FFF2-40B4-BE49-F238E27FC236}">
-                <a16:creationId xmlns:a16="http://schemas.microsoft.com/office/drawing/2014/main" id="{F919AE24-50B7-465A-A557-1D60C8FB698A}"/>
-              </a:ext>
-            </a:extLst>
-          </p:cNvPr>
-          <p:cNvSpPr>
-            <a:spLocks noGrp="1"/>
-          </p:cNvSpPr>
-          <p:nvPr>
-            <p:ph type="title"/>
-          </p:nvPr>
-        </p:nvSpPr>
-        <p:spPr/>
-        <p:txBody>
-          <a:bodyPr/>
-          <a:lstStyle/>
-          <a:p>
-            <a:r>
-              <a:rPr lang="en-US" dirty="0"/>
-              <a:t>Time series analysis options and a few examples!</a:t>
-            </a:r>
-          </a:p>
-        </p:txBody>
-      </p:sp>
-      <p:sp>
-        <p:nvSpPr>
-          <p:cNvPr id="3" name="Content Placeholder 2">
-            <a:extLst>
-              <a:ext uri="{FF2B5EF4-FFF2-40B4-BE49-F238E27FC236}">
-                <a16:creationId xmlns:a16="http://schemas.microsoft.com/office/drawing/2014/main" id="{57B66C43-BE51-448A-8BFF-ECFE02354A20}"/>
-              </a:ext>
-            </a:extLst>
-          </p:cNvPr>
-          <p:cNvSpPr>
-            <a:spLocks noGrp="1"/>
-          </p:cNvSpPr>
-          <p:nvPr>
-            <p:ph idx="1"/>
-          </p:nvPr>
-        </p:nvSpPr>
-        <p:spPr/>
-        <p:txBody>
-          <a:bodyPr/>
-          <a:lstStyle/>
-          <a:p>
-            <a:endParaRPr lang="en-US"/>
-          </a:p>
-        </p:txBody>
-      </p:sp>
-    </p:spTree>
-    <p:extLst>
-      <p:ext uri="{BB962C8B-B14F-4D97-AF65-F5344CB8AC3E}">
-        <p14:creationId xmlns:p14="http://schemas.microsoft.com/office/powerpoint/2010/main" val="3636108133"/>
-      </p:ext>
-    </p:extLst>
-  </p:cSld>
-  <p:clrMapOvr>
-    <a:masterClrMapping/>
-  </p:clrMapOvr>
-</p:sld>
-</file>
-
-<file path=ppt/slides/slide35.xml><?xml version="1.0" encoding="utf-8"?>
+<file path=ppt/slides/slide36.xml><?xml version="1.0" encoding="utf-8"?>
 <p:sld xmlns:a="http://schemas.openxmlformats.org/drawingml/2006/main" xmlns:r="http://schemas.openxmlformats.org/officeDocument/2006/relationships" xmlns:p="http://schemas.openxmlformats.org/presentationml/2006/main">
   <p:cSld>
     <p:spTree>
@@ -46453,35 +46719,6 @@
           </a:fontRef>
         </p:style>
       </p:cxnSp>
-      <p:sp>
-        <p:nvSpPr>
-          <p:cNvPr id="50" name="Title 1"/>
-          <p:cNvSpPr>
-            <a:spLocks noGrp="1"/>
-          </p:cNvSpPr>
-          <p:nvPr>
-            <p:ph type="title"/>
-          </p:nvPr>
-        </p:nvSpPr>
-        <p:spPr>
-          <a:xfrm>
-            <a:off x="304396" y="5026333"/>
-            <a:ext cx="5741275" cy="1424577"/>
-          </a:xfrm>
-        </p:spPr>
-        <p:txBody>
-          <a:bodyPr>
-            <a:normAutofit fontScale="90000"/>
-          </a:bodyPr>
-          <a:lstStyle/>
-          <a:p>
-            <a:r>
-              <a:rPr lang="en-US" sz="2400" dirty="0"/>
-              <a:t>This works, but are there better ways to look at time series data and summarize changes over time? So that instead of a GWAS per time point we can look at parameters determined using information from all the time points together?</a:t>
-            </a:r>
-          </a:p>
-        </p:txBody>
-      </p:sp>
     </p:spTree>
     <p:extLst>
       <p:ext uri="{BB962C8B-B14F-4D97-AF65-F5344CB8AC3E}">
@@ -47022,51 +47259,6 @@
                       </p:childTnLst>
                     </p:cTn>
                   </p:par>
-                  <p:par>
-                    <p:cTn id="45" fill="hold">
-                      <p:stCondLst>
-                        <p:cond delay="indefinite"/>
-                      </p:stCondLst>
-                      <p:childTnLst>
-                        <p:par>
-                          <p:cTn id="46" fill="hold">
-                            <p:stCondLst>
-                              <p:cond delay="0"/>
-                            </p:stCondLst>
-                            <p:childTnLst>
-                              <p:par>
-                                <p:cTn id="47" presetID="1" presetClass="entr" presetSubtype="0" fill="hold" grpId="0" nodeType="clickEffect">
-                                  <p:stCondLst>
-                                    <p:cond delay="0"/>
-                                  </p:stCondLst>
-                                  <p:childTnLst>
-                                    <p:set>
-                                      <p:cBhvr>
-                                        <p:cTn id="48" dur="1" fill="hold">
-                                          <p:stCondLst>
-                                            <p:cond delay="0"/>
-                                          </p:stCondLst>
-                                        </p:cTn>
-                                        <p:tgtEl>
-                                          <p:spTgt spid="50"/>
-                                        </p:tgtEl>
-                                        <p:attrNameLst>
-                                          <p:attrName>style.visibility</p:attrName>
-                                        </p:attrNameLst>
-                                      </p:cBhvr>
-                                      <p:to>
-                                        <p:strVal val="visible"/>
-                                      </p:to>
-                                    </p:set>
-                                  </p:childTnLst>
-                                </p:cTn>
-                              </p:par>
-                            </p:childTnLst>
-                          </p:cTn>
-                        </p:par>
-                      </p:childTnLst>
-                    </p:cTn>
-                  </p:par>
                 </p:childTnLst>
               </p:cTn>
               <p:prevCondLst>
@@ -47091,13 +47283,276 @@
     <p:bldLst>
       <p:bldP spid="41" grpId="0"/>
       <p:bldP spid="42" grpId="0"/>
-      <p:bldP spid="50" grpId="0"/>
     </p:bldLst>
   </p:timing>
 </p:sld>
 </file>
 
+<file path=ppt/slides/slide37.xml><?xml version="1.0" encoding="utf-8"?>
+<p:sld xmlns:a="http://schemas.openxmlformats.org/drawingml/2006/main" xmlns:r="http://schemas.openxmlformats.org/officeDocument/2006/relationships" xmlns:p="http://schemas.openxmlformats.org/presentationml/2006/main">
+  <p:cSld>
+    <p:spTree>
+      <p:nvGrpSpPr>
+        <p:cNvPr id="1" name=""/>
+        <p:cNvGrpSpPr/>
+        <p:nvPr/>
+      </p:nvGrpSpPr>
+      <p:grpSpPr>
+        <a:xfrm>
+          <a:off x="0" y="0"/>
+          <a:ext cx="0" cy="0"/>
+          <a:chOff x="0" y="0"/>
+          <a:chExt cx="0" cy="0"/>
+        </a:xfrm>
+      </p:grpSpPr>
+      <p:sp>
+        <p:nvSpPr>
+          <p:cNvPr id="2" name="Title 1">
+            <a:extLst>
+              <a:ext uri="{FF2B5EF4-FFF2-40B4-BE49-F238E27FC236}">
+                <a16:creationId xmlns:a16="http://schemas.microsoft.com/office/drawing/2014/main" id="{F919AE24-50B7-465A-A557-1D60C8FB698A}"/>
+              </a:ext>
+            </a:extLst>
+          </p:cNvPr>
+          <p:cNvSpPr>
+            <a:spLocks noGrp="1"/>
+          </p:cNvSpPr>
+          <p:nvPr>
+            <p:ph type="title"/>
+          </p:nvPr>
+        </p:nvSpPr>
+        <p:spPr/>
+        <p:txBody>
+          <a:bodyPr/>
+          <a:lstStyle/>
+          <a:p>
+            <a:r>
+              <a:rPr lang="en-US" dirty="0"/>
+              <a:t>Time series analysis options and a few examples!</a:t>
+            </a:r>
+          </a:p>
+        </p:txBody>
+      </p:sp>
+      <p:sp>
+        <p:nvSpPr>
+          <p:cNvPr id="3" name="Content Placeholder 2">
+            <a:extLst>
+              <a:ext uri="{FF2B5EF4-FFF2-40B4-BE49-F238E27FC236}">
+                <a16:creationId xmlns:a16="http://schemas.microsoft.com/office/drawing/2014/main" id="{57B66C43-BE51-448A-8BFF-ECFE02354A20}"/>
+              </a:ext>
+            </a:extLst>
+          </p:cNvPr>
+          <p:cNvSpPr>
+            <a:spLocks noGrp="1"/>
+          </p:cNvSpPr>
+          <p:nvPr>
+            <p:ph idx="1"/>
+          </p:nvPr>
+        </p:nvSpPr>
+        <p:spPr/>
+        <p:txBody>
+          <a:bodyPr/>
+          <a:lstStyle/>
+          <a:p>
+            <a:endParaRPr lang="en-US"/>
+          </a:p>
+        </p:txBody>
+      </p:sp>
+    </p:spTree>
+    <p:extLst>
+      <p:ext uri="{BB962C8B-B14F-4D97-AF65-F5344CB8AC3E}">
+        <p14:creationId xmlns:p14="http://schemas.microsoft.com/office/powerpoint/2010/main" val="3636108133"/>
+      </p:ext>
+    </p:extLst>
+  </p:cSld>
+  <p:clrMapOvr>
+    <a:masterClrMapping/>
+  </p:clrMapOvr>
+</p:sld>
+</file>
+
 <file path=ppt/slides/slide4.xml><?xml version="1.0" encoding="utf-8"?>
+<p:sld xmlns:a="http://schemas.openxmlformats.org/drawingml/2006/main" xmlns:r="http://schemas.openxmlformats.org/officeDocument/2006/relationships" xmlns:p="http://schemas.openxmlformats.org/presentationml/2006/main">
+  <p:cSld>
+    <p:spTree>
+      <p:nvGrpSpPr>
+        <p:cNvPr id="1" name=""/>
+        <p:cNvGrpSpPr/>
+        <p:nvPr/>
+      </p:nvGrpSpPr>
+      <p:grpSpPr>
+        <a:xfrm>
+          <a:off x="0" y="0"/>
+          <a:ext cx="0" cy="0"/>
+          <a:chOff x="0" y="0"/>
+          <a:chExt cx="0" cy="0"/>
+        </a:xfrm>
+      </p:grpSpPr>
+      <p:sp>
+        <p:nvSpPr>
+          <p:cNvPr id="2" name="Title 1">
+            <a:extLst>
+              <a:ext uri="{FF2B5EF4-FFF2-40B4-BE49-F238E27FC236}">
+                <a16:creationId xmlns:a16="http://schemas.microsoft.com/office/drawing/2014/main" id="{85BC8685-250F-4CF8-B530-D2C227F465A7}"/>
+              </a:ext>
+            </a:extLst>
+          </p:cNvPr>
+          <p:cNvSpPr>
+            <a:spLocks noGrp="1"/>
+          </p:cNvSpPr>
+          <p:nvPr>
+            <p:ph type="title"/>
+          </p:nvPr>
+        </p:nvSpPr>
+        <p:spPr/>
+        <p:txBody>
+          <a:bodyPr/>
+          <a:lstStyle/>
+          <a:p>
+            <a:r>
+              <a:rPr lang="en-US" dirty="0"/>
+              <a:t>Outline </a:t>
+            </a:r>
+          </a:p>
+        </p:txBody>
+      </p:sp>
+      <p:sp>
+        <p:nvSpPr>
+          <p:cNvPr id="3" name="Content Placeholder 2">
+            <a:extLst>
+              <a:ext uri="{FF2B5EF4-FFF2-40B4-BE49-F238E27FC236}">
+                <a16:creationId xmlns:a16="http://schemas.microsoft.com/office/drawing/2014/main" id="{FE31804F-F74B-4720-B764-B2917AC6E9F1}"/>
+              </a:ext>
+            </a:extLst>
+          </p:cNvPr>
+          <p:cNvSpPr>
+            <a:spLocks noGrp="1"/>
+          </p:cNvSpPr>
+          <p:nvPr>
+            <p:ph idx="1"/>
+          </p:nvPr>
+        </p:nvSpPr>
+        <p:spPr/>
+        <p:txBody>
+          <a:bodyPr/>
+          <a:lstStyle/>
+          <a:p>
+            <a:r>
+              <a:rPr lang="en-US" dirty="0"/>
+              <a:t>Breeders Job and Breeding values </a:t>
+            </a:r>
+          </a:p>
+          <a:p>
+            <a:r>
+              <a:rPr lang="en-US" dirty="0"/>
+              <a:t>Build up from what we observe when we cross parents to a general understanding of the additive genetic model, how it is applied, regression, regularization, and how it can estimate a plants phenotype. </a:t>
+            </a:r>
+          </a:p>
+          <a:p>
+            <a:r>
+              <a:rPr lang="en-US" dirty="0"/>
+              <a:t>Example genomic prediction with barley data.</a:t>
+            </a:r>
+          </a:p>
+          <a:p>
+            <a:r>
+              <a:rPr lang="en-US" dirty="0"/>
+              <a:t>Break at some point</a:t>
+            </a:r>
+          </a:p>
+          <a:p>
+            <a:r>
+              <a:rPr lang="en-US" dirty="0"/>
+              <a:t>Longitudinal genomic prediction </a:t>
+            </a:r>
+          </a:p>
+          <a:p>
+            <a:r>
+              <a:rPr lang="en-US" dirty="0"/>
+              <a:t>Association analysis </a:t>
+            </a:r>
+          </a:p>
+          <a:p>
+            <a:endParaRPr lang="en-US" dirty="0"/>
+          </a:p>
+          <a:p>
+            <a:endParaRPr lang="en-US" dirty="0"/>
+          </a:p>
+          <a:p>
+            <a:endParaRPr lang="en-US" dirty="0"/>
+          </a:p>
+        </p:txBody>
+      </p:sp>
+      <p:sp>
+        <p:nvSpPr>
+          <p:cNvPr id="4" name="Rectangle 3">
+            <a:extLst>
+              <a:ext uri="{FF2B5EF4-FFF2-40B4-BE49-F238E27FC236}">
+                <a16:creationId xmlns:a16="http://schemas.microsoft.com/office/drawing/2014/main" id="{217D15BD-960A-4F44-B914-DA3B27D070AB}"/>
+              </a:ext>
+            </a:extLst>
+          </p:cNvPr>
+          <p:cNvSpPr/>
+          <p:nvPr/>
+        </p:nvSpPr>
+        <p:spPr>
+          <a:xfrm>
+            <a:off x="8175393" y="4460197"/>
+            <a:ext cx="3895493" cy="1965480"/>
+          </a:xfrm>
+          <a:prstGeom prst="rect">
+            <a:avLst/>
+          </a:prstGeom>
+        </p:spPr>
+        <p:style>
+          <a:lnRef idx="2">
+            <a:schemeClr val="accent1">
+              <a:shade val="50000"/>
+            </a:schemeClr>
+          </a:lnRef>
+          <a:fillRef idx="1">
+            <a:schemeClr val="accent1"/>
+          </a:fillRef>
+          <a:effectRef idx="0">
+            <a:schemeClr val="accent1"/>
+          </a:effectRef>
+          <a:fontRef idx="minor">
+            <a:schemeClr val="lt1"/>
+          </a:fontRef>
+        </p:style>
+        <p:txBody>
+          <a:bodyPr rtlCol="0" anchor="ctr"/>
+          <a:lstStyle/>
+          <a:p>
+            <a:pPr algn="ctr"/>
+            <a:r>
+              <a:rPr lang="en-US" sz="2800" dirty="0"/>
+              <a:t>Please stop me and ask questions at any time!</a:t>
+            </a:r>
+          </a:p>
+          <a:p>
+            <a:pPr algn="ctr"/>
+            <a:r>
+              <a:rPr lang="en-US" sz="2800" dirty="0"/>
+              <a:t>Ask questions in context!</a:t>
+            </a:r>
+          </a:p>
+        </p:txBody>
+      </p:sp>
+    </p:spTree>
+    <p:extLst>
+      <p:ext uri="{BB962C8B-B14F-4D97-AF65-F5344CB8AC3E}">
+        <p14:creationId xmlns:p14="http://schemas.microsoft.com/office/powerpoint/2010/main" val="4001972637"/>
+      </p:ext>
+    </p:extLst>
+  </p:cSld>
+  <p:clrMapOvr>
+    <a:masterClrMapping/>
+  </p:clrMapOvr>
+</p:sld>
+</file>
+
+<file path=ppt/slides/slide5.xml><?xml version="1.0" encoding="utf-8"?>
 <p:sld xmlns:a="http://schemas.openxmlformats.org/drawingml/2006/main" xmlns:r="http://schemas.openxmlformats.org/officeDocument/2006/relationships" xmlns:p="http://schemas.openxmlformats.org/presentationml/2006/main">
   <p:cSld>
     <p:spTree>
@@ -47195,7 +47650,7 @@
           <a:p>
             <a:r>
               <a:rPr lang="en-US" dirty="0"/>
-              <a:t>Statistics and evaluation </a:t>
+              <a:t>Statistics and evaluation – Genomic selection is part of this!</a:t>
             </a:r>
           </a:p>
         </p:txBody>
@@ -47491,7 +47946,7 @@
 </p:sld>
 </file>
 
-<file path=ppt/slides/slide5.xml><?xml version="1.0" encoding="utf-8"?>
+<file path=ppt/slides/slide6.xml><?xml version="1.0" encoding="utf-8"?>
 <p:sld xmlns:a="http://schemas.openxmlformats.org/drawingml/2006/main" xmlns:r="http://schemas.openxmlformats.org/officeDocument/2006/relationships" xmlns:p="http://schemas.openxmlformats.org/presentationml/2006/main">
   <p:cSld>
     <p:spTree>
@@ -47559,7 +48014,7 @@
           <a:p>
             <a:r>
               <a:rPr lang="en-US" dirty="0"/>
-              <a:t>The value of any trait a breeder is interested in</a:t>
+              <a:t>The value of any trait a breeder is interested in:</a:t>
             </a:r>
           </a:p>
           <a:p>
@@ -47593,7 +48048,7 @@
           <a:p>
             <a:r>
               <a:rPr lang="en-US" dirty="0"/>
-              <a:t>Breeding values can never be measured because measurement is always confounded with error – they must be estimated statistically. </a:t>
+              <a:t>Breeding values can never be measured per se because measurement is always confounded with error (but also other reasons)– they must be estimated statistically. </a:t>
             </a:r>
           </a:p>
           <a:p>
@@ -47617,7 +48072,7 @@
 </p:sld>
 </file>
 
-<file path=ppt/slides/slide6.xml><?xml version="1.0" encoding="utf-8"?>
+<file path=ppt/slides/slide7.xml><?xml version="1.0" encoding="utf-8"?>
 <p:sld xmlns:a="http://schemas.openxmlformats.org/drawingml/2006/main" xmlns:r="http://schemas.openxmlformats.org/officeDocument/2006/relationships" xmlns:p="http://schemas.openxmlformats.org/presentationml/2006/main">
   <p:cSld>
     <p:spTree>
@@ -47702,35 +48157,6 @@
             <a:pPr marL="0" indent="0">
               <a:buNone/>
             </a:pPr>
-            <a:r>
-              <a:rPr lang="en-US" dirty="0"/>
-              <a:t>The first generation is called the F</a:t>
-            </a:r>
-            <a:r>
-              <a:rPr lang="en-US" baseline="-25000" dirty="0"/>
-              <a:t>1</a:t>
-            </a:r>
-            <a:r>
-              <a:rPr lang="en-US" dirty="0"/>
-              <a:t> or filial generation 1. Each successive (if self pollination is performed) is called the </a:t>
-            </a:r>
-            <a:r>
-              <a:rPr lang="en-US" dirty="0" err="1"/>
-              <a:t>F</a:t>
-            </a:r>
-            <a:r>
-              <a:rPr lang="en-US" i="1" baseline="-25000" dirty="0" err="1"/>
-              <a:t>n</a:t>
-            </a:r>
-            <a:r>
-              <a:rPr lang="en-US" dirty="0"/>
-              <a:t> </a:t>
-            </a:r>
-          </a:p>
-          <a:p>
-            <a:pPr marL="0" indent="0">
-              <a:buNone/>
-            </a:pPr>
             <a:endParaRPr lang="en-US" dirty="0"/>
           </a:p>
           <a:p>
@@ -47757,7 +48183,7 @@
 </p:sld>
 </file>
 
-<file path=ppt/slides/slide7.xml><?xml version="1.0" encoding="utf-8"?>
+<file path=ppt/slides/slide8.xml><?xml version="1.0" encoding="utf-8"?>
 <p:sld xmlns:a="http://schemas.openxmlformats.org/drawingml/2006/main" xmlns:r="http://schemas.openxmlformats.org/officeDocument/2006/relationships" xmlns:p="http://schemas.openxmlformats.org/presentationml/2006/main">
   <p:cSld>
     <p:spTree>
@@ -52435,7 +52861,7 @@
 </p:sld>
 </file>
 
-<file path=ppt/slides/slide8.xml><?xml version="1.0" encoding="utf-8"?>
+<file path=ppt/slides/slide9.xml><?xml version="1.0" encoding="utf-8"?>
 <p:sld xmlns:a="http://schemas.openxmlformats.org/drawingml/2006/main" xmlns:r="http://schemas.openxmlformats.org/officeDocument/2006/relationships" xmlns:p="http://schemas.openxmlformats.org/presentationml/2006/main">
   <p:cSld>
     <p:spTree>
@@ -52549,99 +52975,6 @@
     <p:extLst>
       <p:ext uri="{BB962C8B-B14F-4D97-AF65-F5344CB8AC3E}">
         <p14:creationId xmlns:p14="http://schemas.microsoft.com/office/powerpoint/2010/main" val="198583894"/>
-      </p:ext>
-    </p:extLst>
-  </p:cSld>
-  <p:clrMapOvr>
-    <a:masterClrMapping/>
-  </p:clrMapOvr>
-</p:sld>
-</file>
-
-<file path=ppt/slides/slide9.xml><?xml version="1.0" encoding="utf-8"?>
-<p:sld xmlns:a="http://schemas.openxmlformats.org/drawingml/2006/main" xmlns:r="http://schemas.openxmlformats.org/officeDocument/2006/relationships" xmlns:p="http://schemas.openxmlformats.org/presentationml/2006/main">
-  <p:cSld>
-    <p:spTree>
-      <p:nvGrpSpPr>
-        <p:cNvPr id="1" name=""/>
-        <p:cNvGrpSpPr/>
-        <p:nvPr/>
-      </p:nvGrpSpPr>
-      <p:grpSpPr>
-        <a:xfrm>
-          <a:off x="0" y="0"/>
-          <a:ext cx="0" cy="0"/>
-          <a:chOff x="0" y="0"/>
-          <a:chExt cx="0" cy="0"/>
-        </a:xfrm>
-      </p:grpSpPr>
-      <p:sp>
-        <p:nvSpPr>
-          <p:cNvPr id="2" name="Title 1">
-            <a:extLst>
-              <a:ext uri="{FF2B5EF4-FFF2-40B4-BE49-F238E27FC236}">
-                <a16:creationId xmlns:a16="http://schemas.microsoft.com/office/drawing/2014/main" id="{9844569C-22FF-4C57-99AE-A053A520AD78}"/>
-              </a:ext>
-            </a:extLst>
-          </p:cNvPr>
-          <p:cNvSpPr>
-            <a:spLocks noGrp="1"/>
-          </p:cNvSpPr>
-          <p:nvPr>
-            <p:ph type="title"/>
-          </p:nvPr>
-        </p:nvSpPr>
-        <p:spPr>
-          <a:xfrm>
-            <a:off x="838200" y="365125"/>
-            <a:ext cx="10515600" cy="1325563"/>
-          </a:xfrm>
-        </p:spPr>
-        <p:txBody>
-          <a:bodyPr/>
-          <a:lstStyle/>
-          <a:p>
-            <a:r>
-              <a:rPr lang="en-US" dirty="0"/>
-              <a:t>When a cross is made what sorts of trait distributions do we get?</a:t>
-            </a:r>
-          </a:p>
-        </p:txBody>
-      </p:sp>
-      <p:pic>
-        <p:nvPicPr>
-          <p:cNvPr id="3" name="Picture 2">
-            <a:extLst>
-              <a:ext uri="{FF2B5EF4-FFF2-40B4-BE49-F238E27FC236}">
-                <a16:creationId xmlns:a16="http://schemas.microsoft.com/office/drawing/2014/main" id="{3D64F39C-2E96-4F5B-8A1C-1BAE631D1B4B}"/>
-              </a:ext>
-            </a:extLst>
-          </p:cNvPr>
-          <p:cNvPicPr>
-            <a:picLocks noChangeAspect="1"/>
-          </p:cNvPicPr>
-          <p:nvPr/>
-        </p:nvPicPr>
-        <p:blipFill>
-          <a:blip r:embed="rId3"/>
-          <a:stretch>
-            <a:fillRect/>
-          </a:stretch>
-        </p:blipFill>
-        <p:spPr>
-          <a:xfrm>
-            <a:off x="3058654" y="1918010"/>
-            <a:ext cx="5380250" cy="4359491"/>
-          </a:xfrm>
-          <a:prstGeom prst="rect">
-            <a:avLst/>
-          </a:prstGeom>
-        </p:spPr>
-      </p:pic>
-    </p:spTree>
-    <p:extLst>
-      <p:ext uri="{BB962C8B-B14F-4D97-AF65-F5344CB8AC3E}">
-        <p14:creationId xmlns:p14="http://schemas.microsoft.com/office/powerpoint/2010/main" val="1513312343"/>
       </p:ext>
     </p:extLst>
   </p:cSld>

</xml_diff>

<commit_message>
changes to presentaion and heavily edited code blocks.
</commit_message>
<xml_diff>
--- a/AdditiveModels_9_2_2021.pptx
+++ b/AdditiveModels_9_2_2021.pptx
@@ -233,7 +233,7 @@
           <a:p>
             <a:fld id="{C148EF82-3550-4E2E-A923-6D425E2E1F1E}" type="datetimeFigureOut">
               <a:rPr lang="en-US" smtClean="0"/>
-              <a:t>8/20/2021</a:t>
+              <a:t>8/26/2021</a:t>
             </a:fld>
             <a:endParaRPr lang="en-US"/>
           </a:p>
@@ -1451,7 +1451,7 @@
           <a:p>
             <a:fld id="{0C8916EF-510E-4505-B6BD-8984124DB551}" type="datetimeFigureOut">
               <a:rPr lang="en-US" smtClean="0"/>
-              <a:t>8/20/2021</a:t>
+              <a:t>8/26/2021</a:t>
             </a:fld>
             <a:endParaRPr lang="en-US"/>
           </a:p>
@@ -1649,7 +1649,7 @@
           <a:p>
             <a:fld id="{0C8916EF-510E-4505-B6BD-8984124DB551}" type="datetimeFigureOut">
               <a:rPr lang="en-US" smtClean="0"/>
-              <a:t>8/20/2021</a:t>
+              <a:t>8/26/2021</a:t>
             </a:fld>
             <a:endParaRPr lang="en-US"/>
           </a:p>
@@ -1857,7 +1857,7 @@
           <a:p>
             <a:fld id="{0C8916EF-510E-4505-B6BD-8984124DB551}" type="datetimeFigureOut">
               <a:rPr lang="en-US" smtClean="0"/>
-              <a:t>8/20/2021</a:t>
+              <a:t>8/26/2021</a:t>
             </a:fld>
             <a:endParaRPr lang="en-US"/>
           </a:p>
@@ -2055,7 +2055,7 @@
           <a:p>
             <a:fld id="{0C8916EF-510E-4505-B6BD-8984124DB551}" type="datetimeFigureOut">
               <a:rPr lang="en-US" smtClean="0"/>
-              <a:t>8/20/2021</a:t>
+              <a:t>8/26/2021</a:t>
             </a:fld>
             <a:endParaRPr lang="en-US"/>
           </a:p>
@@ -2330,7 +2330,7 @@
           <a:p>
             <a:fld id="{0C8916EF-510E-4505-B6BD-8984124DB551}" type="datetimeFigureOut">
               <a:rPr lang="en-US" smtClean="0"/>
-              <a:t>8/20/2021</a:t>
+              <a:t>8/26/2021</a:t>
             </a:fld>
             <a:endParaRPr lang="en-US"/>
           </a:p>
@@ -2595,7 +2595,7 @@
           <a:p>
             <a:fld id="{0C8916EF-510E-4505-B6BD-8984124DB551}" type="datetimeFigureOut">
               <a:rPr lang="en-US" smtClean="0"/>
-              <a:t>8/20/2021</a:t>
+              <a:t>8/26/2021</a:t>
             </a:fld>
             <a:endParaRPr lang="en-US"/>
           </a:p>
@@ -3007,7 +3007,7 @@
           <a:p>
             <a:fld id="{0C8916EF-510E-4505-B6BD-8984124DB551}" type="datetimeFigureOut">
               <a:rPr lang="en-US" smtClean="0"/>
-              <a:t>8/20/2021</a:t>
+              <a:t>8/26/2021</a:t>
             </a:fld>
             <a:endParaRPr lang="en-US"/>
           </a:p>
@@ -3148,7 +3148,7 @@
           <a:p>
             <a:fld id="{0C8916EF-510E-4505-B6BD-8984124DB551}" type="datetimeFigureOut">
               <a:rPr lang="en-US" smtClean="0"/>
-              <a:t>8/20/2021</a:t>
+              <a:t>8/26/2021</a:t>
             </a:fld>
             <a:endParaRPr lang="en-US"/>
           </a:p>
@@ -3261,7 +3261,7 @@
           <a:p>
             <a:fld id="{0C8916EF-510E-4505-B6BD-8984124DB551}" type="datetimeFigureOut">
               <a:rPr lang="en-US" smtClean="0"/>
-              <a:t>8/20/2021</a:t>
+              <a:t>8/26/2021</a:t>
             </a:fld>
             <a:endParaRPr lang="en-US"/>
           </a:p>
@@ -3572,7 +3572,7 @@
           <a:p>
             <a:fld id="{0C8916EF-510E-4505-B6BD-8984124DB551}" type="datetimeFigureOut">
               <a:rPr lang="en-US" smtClean="0"/>
-              <a:t>8/20/2021</a:t>
+              <a:t>8/26/2021</a:t>
             </a:fld>
             <a:endParaRPr lang="en-US"/>
           </a:p>
@@ -3860,7 +3860,7 @@
           <a:p>
             <a:fld id="{0C8916EF-510E-4505-B6BD-8984124DB551}" type="datetimeFigureOut">
               <a:rPr lang="en-US" smtClean="0"/>
-              <a:t>8/20/2021</a:t>
+              <a:t>8/26/2021</a:t>
             </a:fld>
             <a:endParaRPr lang="en-US"/>
           </a:p>
@@ -4101,7 +4101,7 @@
           <a:p>
             <a:fld id="{0C8916EF-510E-4505-B6BD-8984124DB551}" type="datetimeFigureOut">
               <a:rPr lang="en-US" smtClean="0"/>
-              <a:t>8/20/2021</a:t>
+              <a:t>8/26/2021</a:t>
             </a:fld>
             <a:endParaRPr lang="en-US"/>
           </a:p>
@@ -45146,12 +45146,12 @@
         <p:spPr>
           <a:xfrm>
             <a:off x="838200" y="1155700"/>
-            <a:ext cx="10515600" cy="5460999"/>
+            <a:ext cx="10515600" cy="5613090"/>
           </a:xfrm>
         </p:spPr>
         <p:txBody>
           <a:bodyPr>
-            <a:normAutofit lnSpcReduction="10000"/>
+            <a:normAutofit fontScale="92500" lnSpcReduction="10000"/>
           </a:bodyPr>
           <a:lstStyle/>
           <a:p>
@@ -45283,7 +45283,7 @@
             </a:r>
             <a:r>
               <a:rPr lang="en-US" dirty="0"/>
-              <a:t>), Z is a marker matrix, and error is assumed to be N(0,sigma</a:t>
+              <a:t>*G) where G is a covariance matrix, Z is a marker matrix, and error is assumed to be N(0,sigma</a:t>
             </a:r>
             <a:r>
               <a:rPr lang="en-US" baseline="30000" dirty="0"/>
@@ -45295,7 +45295,7 @@
             </a:r>
             <a:r>
               <a:rPr lang="en-US" dirty="0"/>
-              <a:t>)</a:t>
+              <a:t>*E) where E is a error covariance structure (often the identity matrix)</a:t>
             </a:r>
           </a:p>
           <a:p>

</xml_diff>

<commit_message>
more chnages and restructuring the presentation
</commit_message>
<xml_diff>
--- a/AdditiveModels_9_2_2021.pptx
+++ b/AdditiveModels_9_2_2021.pptx
@@ -5,46 +5,49 @@
     <p:sldMasterId id="2147483648" r:id="rId1"/>
   </p:sldMasterIdLst>
   <p:notesMasterIdLst>
-    <p:notesMasterId r:id="rId39"/>
+    <p:notesMasterId r:id="rId42"/>
   </p:notesMasterIdLst>
   <p:sldIdLst>
-    <p:sldId id="256" r:id="rId2"/>
-    <p:sldId id="272" r:id="rId3"/>
-    <p:sldId id="265" r:id="rId4"/>
+    <p:sldId id="303" r:id="rId2"/>
+    <p:sldId id="256" r:id="rId3"/>
+    <p:sldId id="272" r:id="rId4"/>
     <p:sldId id="301" r:id="rId5"/>
-    <p:sldId id="257" r:id="rId6"/>
-    <p:sldId id="278" r:id="rId7"/>
-    <p:sldId id="262" r:id="rId8"/>
-    <p:sldId id="259" r:id="rId9"/>
-    <p:sldId id="264" r:id="rId10"/>
-    <p:sldId id="270" r:id="rId11"/>
-    <p:sldId id="266" r:id="rId12"/>
-    <p:sldId id="271" r:id="rId13"/>
-    <p:sldId id="300" r:id="rId14"/>
-    <p:sldId id="273" r:id="rId15"/>
-    <p:sldId id="274" r:id="rId16"/>
-    <p:sldId id="275" r:id="rId17"/>
-    <p:sldId id="276" r:id="rId18"/>
-    <p:sldId id="280" r:id="rId19"/>
-    <p:sldId id="299" r:id="rId20"/>
-    <p:sldId id="283" r:id="rId21"/>
-    <p:sldId id="279" r:id="rId22"/>
-    <p:sldId id="284" r:id="rId23"/>
-    <p:sldId id="285" r:id="rId24"/>
-    <p:sldId id="286" r:id="rId25"/>
-    <p:sldId id="287" r:id="rId26"/>
-    <p:sldId id="290" r:id="rId27"/>
-    <p:sldId id="288" r:id="rId28"/>
-    <p:sldId id="289" r:id="rId29"/>
-    <p:sldId id="291" r:id="rId30"/>
-    <p:sldId id="292" r:id="rId31"/>
-    <p:sldId id="294" r:id="rId32"/>
-    <p:sldId id="302" r:id="rId33"/>
-    <p:sldId id="295" r:id="rId34"/>
-    <p:sldId id="293" r:id="rId35"/>
-    <p:sldId id="296" r:id="rId36"/>
-    <p:sldId id="298" r:id="rId37"/>
-    <p:sldId id="297" r:id="rId38"/>
+    <p:sldId id="265" r:id="rId6"/>
+    <p:sldId id="257" r:id="rId7"/>
+    <p:sldId id="278" r:id="rId8"/>
+    <p:sldId id="262" r:id="rId9"/>
+    <p:sldId id="259" r:id="rId10"/>
+    <p:sldId id="264" r:id="rId11"/>
+    <p:sldId id="270" r:id="rId12"/>
+    <p:sldId id="266" r:id="rId13"/>
+    <p:sldId id="271" r:id="rId14"/>
+    <p:sldId id="300" r:id="rId15"/>
+    <p:sldId id="273" r:id="rId16"/>
+    <p:sldId id="274" r:id="rId17"/>
+    <p:sldId id="275" r:id="rId18"/>
+    <p:sldId id="276" r:id="rId19"/>
+    <p:sldId id="283" r:id="rId20"/>
+    <p:sldId id="304" r:id="rId21"/>
+    <p:sldId id="280" r:id="rId22"/>
+    <p:sldId id="299" r:id="rId23"/>
+    <p:sldId id="279" r:id="rId24"/>
+    <p:sldId id="284" r:id="rId25"/>
+    <p:sldId id="285" r:id="rId26"/>
+    <p:sldId id="286" r:id="rId27"/>
+    <p:sldId id="287" r:id="rId28"/>
+    <p:sldId id="290" r:id="rId29"/>
+    <p:sldId id="288" r:id="rId30"/>
+    <p:sldId id="289" r:id="rId31"/>
+    <p:sldId id="291" r:id="rId32"/>
+    <p:sldId id="305" r:id="rId33"/>
+    <p:sldId id="292" r:id="rId34"/>
+    <p:sldId id="294" r:id="rId35"/>
+    <p:sldId id="302" r:id="rId36"/>
+    <p:sldId id="295" r:id="rId37"/>
+    <p:sldId id="293" r:id="rId38"/>
+    <p:sldId id="296" r:id="rId39"/>
+    <p:sldId id="298" r:id="rId40"/>
+    <p:sldId id="297" r:id="rId41"/>
   </p:sldIdLst>
   <p:sldSz cx="12192000" cy="6858000"/>
   <p:notesSz cx="6858000" cy="9144000"/>
@@ -565,7 +568,7 @@
           <a:p>
             <a:fld id="{2A799501-FF39-4DDB-88D6-1F9BF577AF3F}" type="slidenum">
               <a:rPr lang="en-US" smtClean="0"/>
-              <a:t>8</a:t>
+              <a:t>9</a:t>
             </a:fld>
             <a:endParaRPr lang="en-US"/>
           </a:p>
@@ -575,6 +578,90 @@
     <p:extLst>
       <p:ext uri="{BB962C8B-B14F-4D97-AF65-F5344CB8AC3E}">
         <p14:creationId xmlns:p14="http://schemas.microsoft.com/office/powerpoint/2010/main" val="2840031670"/>
+      </p:ext>
+    </p:extLst>
+  </p:cSld>
+  <p:clrMapOvr>
+    <a:masterClrMapping/>
+  </p:clrMapOvr>
+</p:notes>
+</file>
+
+<file path=ppt/notesSlides/notesSlide10.xml><?xml version="1.0" encoding="utf-8"?>
+<p:notes xmlns:a="http://schemas.openxmlformats.org/drawingml/2006/main" xmlns:r="http://schemas.openxmlformats.org/officeDocument/2006/relationships" xmlns:p="http://schemas.openxmlformats.org/presentationml/2006/main">
+  <p:cSld>
+    <p:spTree>
+      <p:nvGrpSpPr>
+        <p:cNvPr id="1" name=""/>
+        <p:cNvGrpSpPr/>
+        <p:nvPr/>
+      </p:nvGrpSpPr>
+      <p:grpSpPr>
+        <a:xfrm>
+          <a:off x="0" y="0"/>
+          <a:ext cx="0" cy="0"/>
+          <a:chOff x="0" y="0"/>
+          <a:chExt cx="0" cy="0"/>
+        </a:xfrm>
+      </p:grpSpPr>
+      <p:sp>
+        <p:nvSpPr>
+          <p:cNvPr id="2" name="Slide Image Placeholder 1"/>
+          <p:cNvSpPr>
+            <a:spLocks noGrp="1" noRot="1" noChangeAspect="1"/>
+          </p:cNvSpPr>
+          <p:nvPr>
+            <p:ph type="sldImg"/>
+          </p:nvPr>
+        </p:nvSpPr>
+        <p:spPr/>
+      </p:sp>
+      <p:sp>
+        <p:nvSpPr>
+          <p:cNvPr id="3" name="Notes Placeholder 2"/>
+          <p:cNvSpPr>
+            <a:spLocks noGrp="1"/>
+          </p:cNvSpPr>
+          <p:nvPr>
+            <p:ph type="body" idx="1"/>
+          </p:nvPr>
+        </p:nvSpPr>
+        <p:spPr/>
+        <p:txBody>
+          <a:bodyPr/>
+          <a:lstStyle/>
+          <a:p>
+            <a:endParaRPr lang="en-US" dirty="0"/>
+          </a:p>
+        </p:txBody>
+      </p:sp>
+      <p:sp>
+        <p:nvSpPr>
+          <p:cNvPr id="4" name="Slide Number Placeholder 3"/>
+          <p:cNvSpPr>
+            <a:spLocks noGrp="1"/>
+          </p:cNvSpPr>
+          <p:nvPr>
+            <p:ph type="sldNum" sz="quarter" idx="10"/>
+          </p:nvPr>
+        </p:nvSpPr>
+        <p:spPr/>
+        <p:txBody>
+          <a:bodyPr/>
+          <a:lstStyle/>
+          <a:p>
+            <a:fld id="{9C823843-94FE-4068-B4C4-A27F7642D02E}" type="slidenum">
+              <a:rPr lang="en-US" smtClean="0"/>
+              <a:t>39</a:t>
+            </a:fld>
+            <a:endParaRPr lang="en-US"/>
+          </a:p>
+        </p:txBody>
+      </p:sp>
+    </p:spTree>
+    <p:extLst>
+      <p:ext uri="{BB962C8B-B14F-4D97-AF65-F5344CB8AC3E}">
+        <p14:creationId xmlns:p14="http://schemas.microsoft.com/office/powerpoint/2010/main" val="790573215"/>
       </p:ext>
     </p:extLst>
   </p:cSld>
@@ -649,7 +736,7 @@
           <a:p>
             <a:fld id="{2A799501-FF39-4DDB-88D6-1F9BF577AF3F}" type="slidenum">
               <a:rPr lang="en-US" smtClean="0"/>
-              <a:t>9</a:t>
+              <a:t>10</a:t>
             </a:fld>
             <a:endParaRPr lang="en-US"/>
           </a:p>
@@ -733,7 +820,7 @@
           <a:p>
             <a:fld id="{2A799501-FF39-4DDB-88D6-1F9BF577AF3F}" type="slidenum">
               <a:rPr lang="en-US" smtClean="0"/>
-              <a:t>10</a:t>
+              <a:t>11</a:t>
             </a:fld>
             <a:endParaRPr lang="en-US"/>
           </a:p>
@@ -817,7 +904,7 @@
           <a:p>
             <a:fld id="{2A799501-FF39-4DDB-88D6-1F9BF577AF3F}" type="slidenum">
               <a:rPr lang="en-US" smtClean="0"/>
-              <a:t>12</a:t>
+              <a:t>13</a:t>
             </a:fld>
             <a:endParaRPr lang="en-US"/>
           </a:p>
@@ -837,6 +924,93 @@
 </file>
 
 <file path=ppt/notesSlides/notesSlide5.xml><?xml version="1.0" encoding="utf-8"?>
+<p:notes xmlns:a="http://schemas.openxmlformats.org/drawingml/2006/main" xmlns:r="http://schemas.openxmlformats.org/officeDocument/2006/relationships" xmlns:p="http://schemas.openxmlformats.org/presentationml/2006/main">
+  <p:cSld>
+    <p:spTree>
+      <p:nvGrpSpPr>
+        <p:cNvPr id="1" name=""/>
+        <p:cNvGrpSpPr/>
+        <p:nvPr/>
+      </p:nvGrpSpPr>
+      <p:grpSpPr>
+        <a:xfrm>
+          <a:off x="0" y="0"/>
+          <a:ext cx="0" cy="0"/>
+          <a:chOff x="0" y="0"/>
+          <a:chExt cx="0" cy="0"/>
+        </a:xfrm>
+      </p:grpSpPr>
+      <p:sp>
+        <p:nvSpPr>
+          <p:cNvPr id="2" name="Slide Image Placeholder 1"/>
+          <p:cNvSpPr>
+            <a:spLocks noGrp="1" noRot="1" noChangeAspect="1"/>
+          </p:cNvSpPr>
+          <p:nvPr>
+            <p:ph type="sldImg"/>
+          </p:nvPr>
+        </p:nvSpPr>
+        <p:spPr/>
+      </p:sp>
+      <p:sp>
+        <p:nvSpPr>
+          <p:cNvPr id="3" name="Notes Placeholder 2"/>
+          <p:cNvSpPr>
+            <a:spLocks noGrp="1"/>
+          </p:cNvSpPr>
+          <p:nvPr>
+            <p:ph type="body" idx="1"/>
+          </p:nvPr>
+        </p:nvSpPr>
+        <p:spPr/>
+        <p:txBody>
+          <a:bodyPr/>
+          <a:lstStyle/>
+          <a:p>
+            <a:r>
+              <a:rPr lang="en-US" dirty="0"/>
+              <a:t>All fine and good, lets see if this can actually give us the trait distributions that we want to get out.</a:t>
+            </a:r>
+          </a:p>
+        </p:txBody>
+      </p:sp>
+      <p:sp>
+        <p:nvSpPr>
+          <p:cNvPr id="4" name="Slide Number Placeholder 3"/>
+          <p:cNvSpPr>
+            <a:spLocks noGrp="1"/>
+          </p:cNvSpPr>
+          <p:nvPr>
+            <p:ph type="sldNum" sz="quarter" idx="5"/>
+          </p:nvPr>
+        </p:nvSpPr>
+        <p:spPr/>
+        <p:txBody>
+          <a:bodyPr/>
+          <a:lstStyle/>
+          <a:p>
+            <a:fld id="{2A799501-FF39-4DDB-88D6-1F9BF577AF3F}" type="slidenum">
+              <a:rPr lang="en-US" smtClean="0"/>
+              <a:t>18</a:t>
+            </a:fld>
+            <a:endParaRPr lang="en-US"/>
+          </a:p>
+        </p:txBody>
+      </p:sp>
+    </p:spTree>
+    <p:extLst>
+      <p:ext uri="{BB962C8B-B14F-4D97-AF65-F5344CB8AC3E}">
+        <p14:creationId xmlns:p14="http://schemas.microsoft.com/office/powerpoint/2010/main" val="17289123"/>
+      </p:ext>
+    </p:extLst>
+  </p:cSld>
+  <p:clrMapOvr>
+    <a:masterClrMapping/>
+  </p:clrMapOvr>
+</p:notes>
+</file>
+
+<file path=ppt/notesSlides/notesSlide6.xml><?xml version="1.0" encoding="utf-8"?>
 <p:notes xmlns:a="http://schemas.openxmlformats.org/drawingml/2006/main" xmlns:r="http://schemas.openxmlformats.org/officeDocument/2006/relationships" xmlns:p="http://schemas.openxmlformats.org/presentationml/2006/main">
   <p:cSld>
     <p:spTree>
@@ -918,7 +1092,7 @@
           <a:p>
             <a:fld id="{2A799501-FF39-4DDB-88D6-1F9BF577AF3F}" type="slidenum">
               <a:rPr lang="en-US" smtClean="0"/>
-              <a:t>18</a:t>
+              <a:t>21</a:t>
             </a:fld>
             <a:endParaRPr lang="en-US"/>
           </a:p>
@@ -928,90 +1102,6 @@
     <p:extLst>
       <p:ext uri="{BB962C8B-B14F-4D97-AF65-F5344CB8AC3E}">
         <p14:creationId xmlns:p14="http://schemas.microsoft.com/office/powerpoint/2010/main" val="80761967"/>
-      </p:ext>
-    </p:extLst>
-  </p:cSld>
-  <p:clrMapOvr>
-    <a:masterClrMapping/>
-  </p:clrMapOvr>
-</p:notes>
-</file>
-
-<file path=ppt/notesSlides/notesSlide6.xml><?xml version="1.0" encoding="utf-8"?>
-<p:notes xmlns:a="http://schemas.openxmlformats.org/drawingml/2006/main" xmlns:r="http://schemas.openxmlformats.org/officeDocument/2006/relationships" xmlns:p="http://schemas.openxmlformats.org/presentationml/2006/main">
-  <p:cSld>
-    <p:spTree>
-      <p:nvGrpSpPr>
-        <p:cNvPr id="1" name=""/>
-        <p:cNvGrpSpPr/>
-        <p:nvPr/>
-      </p:nvGrpSpPr>
-      <p:grpSpPr>
-        <a:xfrm>
-          <a:off x="0" y="0"/>
-          <a:ext cx="0" cy="0"/>
-          <a:chOff x="0" y="0"/>
-          <a:chExt cx="0" cy="0"/>
-        </a:xfrm>
-      </p:grpSpPr>
-      <p:sp>
-        <p:nvSpPr>
-          <p:cNvPr id="2" name="Slide Image Placeholder 1"/>
-          <p:cNvSpPr>
-            <a:spLocks noGrp="1" noRot="1" noChangeAspect="1"/>
-          </p:cNvSpPr>
-          <p:nvPr>
-            <p:ph type="sldImg"/>
-          </p:nvPr>
-        </p:nvSpPr>
-        <p:spPr/>
-      </p:sp>
-      <p:sp>
-        <p:nvSpPr>
-          <p:cNvPr id="3" name="Notes Placeholder 2"/>
-          <p:cNvSpPr>
-            <a:spLocks noGrp="1"/>
-          </p:cNvSpPr>
-          <p:nvPr>
-            <p:ph type="body" idx="1"/>
-          </p:nvPr>
-        </p:nvSpPr>
-        <p:spPr/>
-        <p:txBody>
-          <a:bodyPr/>
-          <a:lstStyle/>
-          <a:p>
-            <a:endParaRPr lang="en-US" dirty="0"/>
-          </a:p>
-        </p:txBody>
-      </p:sp>
-      <p:sp>
-        <p:nvSpPr>
-          <p:cNvPr id="4" name="Slide Number Placeholder 3"/>
-          <p:cNvSpPr>
-            <a:spLocks noGrp="1"/>
-          </p:cNvSpPr>
-          <p:nvPr>
-            <p:ph type="sldNum" sz="quarter" idx="5"/>
-          </p:nvPr>
-        </p:nvSpPr>
-        <p:spPr/>
-        <p:txBody>
-          <a:bodyPr/>
-          <a:lstStyle/>
-          <a:p>
-            <a:fld id="{2A799501-FF39-4DDB-88D6-1F9BF577AF3F}" type="slidenum">
-              <a:rPr lang="en-US" smtClean="0"/>
-              <a:t>21</a:t>
-            </a:fld>
-            <a:endParaRPr lang="en-US"/>
-          </a:p>
-        </p:txBody>
-      </p:sp>
-    </p:spTree>
-    <p:extLst>
-      <p:ext uri="{BB962C8B-B14F-4D97-AF65-F5344CB8AC3E}">
-        <p14:creationId xmlns:p14="http://schemas.microsoft.com/office/powerpoint/2010/main" val="3027344375"/>
       </p:ext>
     </p:extLst>
   </p:cSld>
@@ -1095,6 +1185,90 @@
     </p:spTree>
     <p:extLst>
       <p:ext uri="{BB962C8B-B14F-4D97-AF65-F5344CB8AC3E}">
+        <p14:creationId xmlns:p14="http://schemas.microsoft.com/office/powerpoint/2010/main" val="3027344375"/>
+      </p:ext>
+    </p:extLst>
+  </p:cSld>
+  <p:clrMapOvr>
+    <a:masterClrMapping/>
+  </p:clrMapOvr>
+</p:notes>
+</file>
+
+<file path=ppt/notesSlides/notesSlide8.xml><?xml version="1.0" encoding="utf-8"?>
+<p:notes xmlns:a="http://schemas.openxmlformats.org/drawingml/2006/main" xmlns:r="http://schemas.openxmlformats.org/officeDocument/2006/relationships" xmlns:p="http://schemas.openxmlformats.org/presentationml/2006/main">
+  <p:cSld>
+    <p:spTree>
+      <p:nvGrpSpPr>
+        <p:cNvPr id="1" name=""/>
+        <p:cNvGrpSpPr/>
+        <p:nvPr/>
+      </p:nvGrpSpPr>
+      <p:grpSpPr>
+        <a:xfrm>
+          <a:off x="0" y="0"/>
+          <a:ext cx="0" cy="0"/>
+          <a:chOff x="0" y="0"/>
+          <a:chExt cx="0" cy="0"/>
+        </a:xfrm>
+      </p:grpSpPr>
+      <p:sp>
+        <p:nvSpPr>
+          <p:cNvPr id="2" name="Slide Image Placeholder 1"/>
+          <p:cNvSpPr>
+            <a:spLocks noGrp="1" noRot="1" noChangeAspect="1"/>
+          </p:cNvSpPr>
+          <p:nvPr>
+            <p:ph type="sldImg"/>
+          </p:nvPr>
+        </p:nvSpPr>
+        <p:spPr/>
+      </p:sp>
+      <p:sp>
+        <p:nvSpPr>
+          <p:cNvPr id="3" name="Notes Placeholder 2"/>
+          <p:cNvSpPr>
+            <a:spLocks noGrp="1"/>
+          </p:cNvSpPr>
+          <p:nvPr>
+            <p:ph type="body" idx="1"/>
+          </p:nvPr>
+        </p:nvSpPr>
+        <p:spPr/>
+        <p:txBody>
+          <a:bodyPr/>
+          <a:lstStyle/>
+          <a:p>
+            <a:endParaRPr lang="en-US" dirty="0"/>
+          </a:p>
+        </p:txBody>
+      </p:sp>
+      <p:sp>
+        <p:nvSpPr>
+          <p:cNvPr id="4" name="Slide Number Placeholder 3"/>
+          <p:cNvSpPr>
+            <a:spLocks noGrp="1"/>
+          </p:cNvSpPr>
+          <p:nvPr>
+            <p:ph type="sldNum" sz="quarter" idx="5"/>
+          </p:nvPr>
+        </p:nvSpPr>
+        <p:spPr/>
+        <p:txBody>
+          <a:bodyPr/>
+          <a:lstStyle/>
+          <a:p>
+            <a:fld id="{2A799501-FF39-4DDB-88D6-1F9BF577AF3F}" type="slidenum">
+              <a:rPr lang="en-US" smtClean="0"/>
+              <a:t>25</a:t>
+            </a:fld>
+            <a:endParaRPr lang="en-US"/>
+          </a:p>
+        </p:txBody>
+      </p:sp>
+    </p:spTree>
+    <p:extLst>
+      <p:ext uri="{BB962C8B-B14F-4D97-AF65-F5344CB8AC3E}">
         <p14:creationId xmlns:p14="http://schemas.microsoft.com/office/powerpoint/2010/main" val="832779747"/>
       </p:ext>
     </p:extLst>
@@ -1105,7 +1279,7 @@
 </p:notes>
 </file>
 
-<file path=ppt/notesSlides/notesSlide8.xml><?xml version="1.0" encoding="utf-8"?>
+<file path=ppt/notesSlides/notesSlide9.xml><?xml version="1.0" encoding="utf-8"?>
 <p:notes xmlns:a="http://schemas.openxmlformats.org/drawingml/2006/main" xmlns:r="http://schemas.openxmlformats.org/officeDocument/2006/relationships" xmlns:p="http://schemas.openxmlformats.org/presentationml/2006/main">
   <p:cSld>
     <p:spTree>
@@ -1201,7 +1375,7 @@
           <a:p>
             <a:fld id="{2A799501-FF39-4DDB-88D6-1F9BF577AF3F}" type="slidenum">
               <a:rPr lang="en-US" smtClean="0"/>
-              <a:t>34</a:t>
+              <a:t>37</a:t>
             </a:fld>
             <a:endParaRPr lang="en-US"/>
           </a:p>
@@ -1211,90 +1385,6 @@
     <p:extLst>
       <p:ext uri="{BB962C8B-B14F-4D97-AF65-F5344CB8AC3E}">
         <p14:creationId xmlns:p14="http://schemas.microsoft.com/office/powerpoint/2010/main" val="1660571086"/>
-      </p:ext>
-    </p:extLst>
-  </p:cSld>
-  <p:clrMapOvr>
-    <a:masterClrMapping/>
-  </p:clrMapOvr>
-</p:notes>
-</file>
-
-<file path=ppt/notesSlides/notesSlide9.xml><?xml version="1.0" encoding="utf-8"?>
-<p:notes xmlns:a="http://schemas.openxmlformats.org/drawingml/2006/main" xmlns:r="http://schemas.openxmlformats.org/officeDocument/2006/relationships" xmlns:p="http://schemas.openxmlformats.org/presentationml/2006/main">
-  <p:cSld>
-    <p:spTree>
-      <p:nvGrpSpPr>
-        <p:cNvPr id="1" name=""/>
-        <p:cNvGrpSpPr/>
-        <p:nvPr/>
-      </p:nvGrpSpPr>
-      <p:grpSpPr>
-        <a:xfrm>
-          <a:off x="0" y="0"/>
-          <a:ext cx="0" cy="0"/>
-          <a:chOff x="0" y="0"/>
-          <a:chExt cx="0" cy="0"/>
-        </a:xfrm>
-      </p:grpSpPr>
-      <p:sp>
-        <p:nvSpPr>
-          <p:cNvPr id="2" name="Slide Image Placeholder 1"/>
-          <p:cNvSpPr>
-            <a:spLocks noGrp="1" noRot="1" noChangeAspect="1"/>
-          </p:cNvSpPr>
-          <p:nvPr>
-            <p:ph type="sldImg"/>
-          </p:nvPr>
-        </p:nvSpPr>
-        <p:spPr/>
-      </p:sp>
-      <p:sp>
-        <p:nvSpPr>
-          <p:cNvPr id="3" name="Notes Placeholder 2"/>
-          <p:cNvSpPr>
-            <a:spLocks noGrp="1"/>
-          </p:cNvSpPr>
-          <p:nvPr>
-            <p:ph type="body" idx="1"/>
-          </p:nvPr>
-        </p:nvSpPr>
-        <p:spPr/>
-        <p:txBody>
-          <a:bodyPr/>
-          <a:lstStyle/>
-          <a:p>
-            <a:endParaRPr lang="en-US" dirty="0"/>
-          </a:p>
-        </p:txBody>
-      </p:sp>
-      <p:sp>
-        <p:nvSpPr>
-          <p:cNvPr id="4" name="Slide Number Placeholder 3"/>
-          <p:cNvSpPr>
-            <a:spLocks noGrp="1"/>
-          </p:cNvSpPr>
-          <p:nvPr>
-            <p:ph type="sldNum" sz="quarter" idx="10"/>
-          </p:nvPr>
-        </p:nvSpPr>
-        <p:spPr/>
-        <p:txBody>
-          <a:bodyPr/>
-          <a:lstStyle/>
-          <a:p>
-            <a:fld id="{9C823843-94FE-4068-B4C4-A27F7642D02E}" type="slidenum">
-              <a:rPr lang="en-US" smtClean="0"/>
-              <a:t>36</a:t>
-            </a:fld>
-            <a:endParaRPr lang="en-US"/>
-          </a:p>
-        </p:txBody>
-      </p:sp>
-    </p:spTree>
-    <p:extLst>
-      <p:ext uri="{BB962C8B-B14F-4D97-AF65-F5344CB8AC3E}">
-        <p14:creationId xmlns:p14="http://schemas.microsoft.com/office/powerpoint/2010/main" val="790573215"/>
       </p:ext>
     </p:extLst>
   </p:cSld>
@@ -4523,7 +4613,7 @@
           <p:cNvPr id="2" name="Title 1">
             <a:extLst>
               <a:ext uri="{FF2B5EF4-FFF2-40B4-BE49-F238E27FC236}">
-                <a16:creationId xmlns:a16="http://schemas.microsoft.com/office/drawing/2014/main" id="{401177DD-263C-4948-A038-AE390B935D5A}"/>
+                <a16:creationId xmlns:a16="http://schemas.microsoft.com/office/drawing/2014/main" id="{78DA0891-73E7-4CD5-841D-FA187B3DB0F0}"/>
               </a:ext>
             </a:extLst>
           </p:cNvPr>
@@ -4531,7 +4621,37 @@
             <a:spLocks noGrp="1"/>
           </p:cNvSpPr>
           <p:nvPr>
-            <p:ph type="ctrTitle"/>
+            <p:ph type="title"/>
+          </p:nvPr>
+        </p:nvSpPr>
+        <p:spPr/>
+        <p:txBody>
+          <a:bodyPr>
+            <a:normAutofit fontScale="90000"/>
+          </a:bodyPr>
+          <a:lstStyle/>
+          <a:p>
+            <a:r>
+              <a:rPr lang="en-US" dirty="0"/>
+              <a:t>Go to https://github.com/ter56/September2_2021_class</a:t>
+            </a:r>
+          </a:p>
+        </p:txBody>
+      </p:sp>
+      <p:sp>
+        <p:nvSpPr>
+          <p:cNvPr id="3" name="Content Placeholder 2">
+            <a:extLst>
+              <a:ext uri="{FF2B5EF4-FFF2-40B4-BE49-F238E27FC236}">
+                <a16:creationId xmlns:a16="http://schemas.microsoft.com/office/drawing/2014/main" id="{28098526-038F-4033-BB00-A95A9B0C32AA}"/>
+              </a:ext>
+            </a:extLst>
+          </p:cNvPr>
+          <p:cNvSpPr>
+            <a:spLocks noGrp="1"/>
+          </p:cNvSpPr>
+          <p:nvPr>
+            <p:ph idx="1"/>
           </p:nvPr>
         </p:nvSpPr>
         <p:spPr/>
@@ -4541,55 +4661,53 @@
           <a:p>
             <a:r>
               <a:rPr lang="en-US" dirty="0"/>
-              <a:t>Additive models and genomic prediction</a:t>
+              <a:t>If you have git integrated into R go ahead and clone into it  - if not download the contents ad open ‘</a:t>
+            </a:r>
+            <a:r>
+              <a:rPr lang="en-US" dirty="0" err="1"/>
+              <a:t>Sim_Vis.R</a:t>
+            </a:r>
+            <a:r>
+              <a:rPr lang="en-US" dirty="0"/>
+              <a:t>’ in R</a:t>
             </a:r>
           </a:p>
         </p:txBody>
       </p:sp>
-      <p:sp>
-        <p:nvSpPr>
-          <p:cNvPr id="3" name="Subtitle 2">
+      <p:pic>
+        <p:nvPicPr>
+          <p:cNvPr id="4" name="Picture 3">
             <a:extLst>
               <a:ext uri="{FF2B5EF4-FFF2-40B4-BE49-F238E27FC236}">
-                <a16:creationId xmlns:a16="http://schemas.microsoft.com/office/drawing/2014/main" id="{5835CD36-2C8E-43D3-842A-DE256DE63D5E}"/>
+                <a16:creationId xmlns:a16="http://schemas.microsoft.com/office/drawing/2014/main" id="{470325CC-57BE-44EF-83B1-BEEABF8B9C81}"/>
               </a:ext>
             </a:extLst>
           </p:cNvPr>
-          <p:cNvSpPr>
-            <a:spLocks noGrp="1"/>
-          </p:cNvSpPr>
-          <p:nvPr>
-            <p:ph type="subTitle" idx="1"/>
-          </p:nvPr>
-        </p:nvSpPr>
-        <p:spPr/>
-        <p:txBody>
-          <a:bodyPr/>
-          <a:lstStyle/>
-          <a:p>
-            <a:r>
-              <a:rPr lang="en-US" dirty="0"/>
-              <a:t>Travis Rooney</a:t>
-            </a:r>
-          </a:p>
-          <a:p>
-            <a:r>
-              <a:rPr lang="en-US" dirty="0"/>
-              <a:t>September 2, 2021</a:t>
-            </a:r>
-          </a:p>
-          <a:p>
-            <a:r>
-              <a:rPr lang="en-US" dirty="0"/>
-              <a:t>PLBRG 4080</a:t>
-            </a:r>
-          </a:p>
-        </p:txBody>
-      </p:sp>
+          <p:cNvPicPr>
+            <a:picLocks noChangeAspect="1"/>
+          </p:cNvPicPr>
+          <p:nvPr/>
+        </p:nvPicPr>
+        <p:blipFill>
+          <a:blip r:embed="rId2"/>
+          <a:stretch>
+            <a:fillRect/>
+          </a:stretch>
+        </p:blipFill>
+        <p:spPr>
+          <a:xfrm>
+            <a:off x="2609385" y="3216064"/>
+            <a:ext cx="7471666" cy="3276811"/>
+          </a:xfrm>
+          <a:prstGeom prst="rect">
+            <a:avLst/>
+          </a:prstGeom>
+        </p:spPr>
+      </p:pic>
     </p:spTree>
     <p:extLst>
       <p:ext uri="{BB962C8B-B14F-4D97-AF65-F5344CB8AC3E}">
-        <p14:creationId xmlns:p14="http://schemas.microsoft.com/office/powerpoint/2010/main" val="2834949495"/>
+        <p14:creationId xmlns:p14="http://schemas.microsoft.com/office/powerpoint/2010/main" val="2428055585"/>
       </p:ext>
     </p:extLst>
   </p:cSld>
@@ -4600,6 +4718,129 @@
 </file>
 
 <file path=ppt/slides/slide10.xml><?xml version="1.0" encoding="utf-8"?>
+<p:sld xmlns:a="http://schemas.openxmlformats.org/drawingml/2006/main" xmlns:r="http://schemas.openxmlformats.org/officeDocument/2006/relationships" xmlns:p="http://schemas.openxmlformats.org/presentationml/2006/main">
+  <p:cSld>
+    <p:spTree>
+      <p:nvGrpSpPr>
+        <p:cNvPr id="1" name=""/>
+        <p:cNvGrpSpPr/>
+        <p:nvPr/>
+      </p:nvGrpSpPr>
+      <p:grpSpPr>
+        <a:xfrm>
+          <a:off x="0" y="0"/>
+          <a:ext cx="0" cy="0"/>
+          <a:chOff x="0" y="0"/>
+          <a:chExt cx="0" cy="0"/>
+        </a:xfrm>
+      </p:grpSpPr>
+      <p:sp>
+        <p:nvSpPr>
+          <p:cNvPr id="2" name="Title 1">
+            <a:extLst>
+              <a:ext uri="{FF2B5EF4-FFF2-40B4-BE49-F238E27FC236}">
+                <a16:creationId xmlns:a16="http://schemas.microsoft.com/office/drawing/2014/main" id="{9844569C-22FF-4C57-99AE-A053A520AD78}"/>
+              </a:ext>
+            </a:extLst>
+          </p:cNvPr>
+          <p:cNvSpPr>
+            <a:spLocks noGrp="1"/>
+          </p:cNvSpPr>
+          <p:nvPr>
+            <p:ph type="title"/>
+          </p:nvPr>
+        </p:nvSpPr>
+        <p:spPr>
+          <a:xfrm>
+            <a:off x="838200" y="365125"/>
+            <a:ext cx="10515600" cy="1325563"/>
+          </a:xfrm>
+        </p:spPr>
+        <p:txBody>
+          <a:bodyPr/>
+          <a:lstStyle/>
+          <a:p>
+            <a:r>
+              <a:rPr lang="en-US" dirty="0"/>
+              <a:t>When a cross is made what sorts of trait distributions do we get?</a:t>
+            </a:r>
+          </a:p>
+        </p:txBody>
+      </p:sp>
+      <p:pic>
+        <p:nvPicPr>
+          <p:cNvPr id="120" name="Picture 119">
+            <a:extLst>
+              <a:ext uri="{FF2B5EF4-FFF2-40B4-BE49-F238E27FC236}">
+                <a16:creationId xmlns:a16="http://schemas.microsoft.com/office/drawing/2014/main" id="{C69C7F82-25C2-4E92-9FBC-467C294F12A2}"/>
+              </a:ext>
+            </a:extLst>
+          </p:cNvPr>
+          <p:cNvPicPr>
+            <a:picLocks noChangeAspect="1"/>
+          </p:cNvPicPr>
+          <p:nvPr/>
+        </p:nvPicPr>
+        <p:blipFill>
+          <a:blip r:embed="rId3"/>
+          <a:stretch>
+            <a:fillRect/>
+          </a:stretch>
+        </p:blipFill>
+        <p:spPr>
+          <a:xfrm>
+            <a:off x="436755" y="1886687"/>
+            <a:ext cx="2920105" cy="4804044"/>
+          </a:xfrm>
+          <a:prstGeom prst="rect">
+            <a:avLst/>
+          </a:prstGeom>
+        </p:spPr>
+      </p:pic>
+      <p:pic>
+        <p:nvPicPr>
+          <p:cNvPr id="122" name="Picture 121">
+            <a:extLst>
+              <a:ext uri="{FF2B5EF4-FFF2-40B4-BE49-F238E27FC236}">
+                <a16:creationId xmlns:a16="http://schemas.microsoft.com/office/drawing/2014/main" id="{B9736C0D-CA45-4665-93AB-A6EAE39CBFDE}"/>
+              </a:ext>
+            </a:extLst>
+          </p:cNvPr>
+          <p:cNvPicPr>
+            <a:picLocks noChangeAspect="1"/>
+          </p:cNvPicPr>
+          <p:nvPr/>
+        </p:nvPicPr>
+        <p:blipFill>
+          <a:blip r:embed="rId4"/>
+          <a:stretch>
+            <a:fillRect/>
+          </a:stretch>
+        </p:blipFill>
+        <p:spPr>
+          <a:xfrm>
+            <a:off x="3613338" y="2006544"/>
+            <a:ext cx="6080214" cy="4241004"/>
+          </a:xfrm>
+          <a:prstGeom prst="rect">
+            <a:avLst/>
+          </a:prstGeom>
+        </p:spPr>
+      </p:pic>
+    </p:spTree>
+    <p:extLst>
+      <p:ext uri="{BB962C8B-B14F-4D97-AF65-F5344CB8AC3E}">
+        <p14:creationId xmlns:p14="http://schemas.microsoft.com/office/powerpoint/2010/main" val="198583894"/>
+      </p:ext>
+    </p:extLst>
+  </p:cSld>
+  <p:clrMapOvr>
+    <a:masterClrMapping/>
+  </p:clrMapOvr>
+</p:sld>
+</file>
+
+<file path=ppt/slides/slide11.xml><?xml version="1.0" encoding="utf-8"?>
 <p:sld xmlns:a="http://schemas.openxmlformats.org/drawingml/2006/main" xmlns:r="http://schemas.openxmlformats.org/officeDocument/2006/relationships" xmlns:p="http://schemas.openxmlformats.org/presentationml/2006/main">
   <p:cSld>
     <p:spTree>
@@ -4692,7 +4933,7 @@
 </p:sld>
 </file>
 
-<file path=ppt/slides/slide11.xml><?xml version="1.0" encoding="utf-8"?>
+<file path=ppt/slides/slide12.xml><?xml version="1.0" encoding="utf-8"?>
 <p:sld xmlns:a="http://schemas.openxmlformats.org/drawingml/2006/main" xmlns:r="http://schemas.openxmlformats.org/officeDocument/2006/relationships" xmlns:p="http://schemas.openxmlformats.org/presentationml/2006/main">
   <p:cSld>
     <p:spTree>
@@ -4805,7 +5046,7 @@
 </p:sld>
 </file>
 
-<file path=ppt/slides/slide12.xml><?xml version="1.0" encoding="utf-8"?>
+<file path=ppt/slides/slide13.xml><?xml version="1.0" encoding="utf-8"?>
 <p:sld xmlns:a="http://schemas.openxmlformats.org/drawingml/2006/main" xmlns:r="http://schemas.openxmlformats.org/officeDocument/2006/relationships" xmlns:p="http://schemas.openxmlformats.org/presentationml/2006/main">
   <p:cSld>
     <p:spTree>
@@ -4865,7 +5106,7 @@
 </p:sld>
 </file>
 
-<file path=ppt/slides/slide13.xml><?xml version="1.0" encoding="utf-8"?>
+<file path=ppt/slides/slide14.xml><?xml version="1.0" encoding="utf-8"?>
 <p:sld xmlns:a="http://schemas.openxmlformats.org/drawingml/2006/main" xmlns:r="http://schemas.openxmlformats.org/officeDocument/2006/relationships" xmlns:p="http://schemas.openxmlformats.org/presentationml/2006/main">
   <p:cSld>
     <p:spTree>
@@ -4951,7 +5192,7 @@
           <a:p>
             <a:r>
               <a:rPr lang="en-US" dirty="0"/>
-              <a:t>We want to estimate the phenotype or breeding value without having to observe the line as cost of genotyping is now &lt; cost of field evaluation. </a:t>
+              <a:t>We want to estimate the phenotype or breeding value without having to observe all lines as cost of genotyping is now &lt; cost of field evaluation. </a:t>
             </a:r>
           </a:p>
         </p:txBody>
@@ -4969,7 +5210,7 @@
 </p:sld>
 </file>
 
-<file path=ppt/slides/slide14.xml><?xml version="1.0" encoding="utf-8"?>
+<file path=ppt/slides/slide15.xml><?xml version="1.0" encoding="utf-8"?>
 <p:sld xmlns:a="http://schemas.openxmlformats.org/drawingml/2006/main" xmlns:r="http://schemas.openxmlformats.org/officeDocument/2006/relationships" xmlns:p="http://schemas.openxmlformats.org/presentationml/2006/main">
   <p:cSld>
     <p:spTree>
@@ -5014,10 +5255,7 @@
           </a:bodyPr>
           <a:lstStyle/>
           <a:p>
-            <a:r>
-              <a:rPr lang="en-US" dirty="0"/>
-              <a:t>This is where the additive model comes in – </a:t>
-            </a:r>
+            <a:endParaRPr lang="en-US" dirty="0"/>
           </a:p>
         </p:txBody>
       </p:sp>
@@ -18652,7 +18890,7 @@
 </p:sld>
 </file>
 
-<file path=ppt/slides/slide15.xml><?xml version="1.0" encoding="utf-8"?>
+<file path=ppt/slides/slide16.xml><?xml version="1.0" encoding="utf-8"?>
 <p:sld xmlns:a="http://schemas.openxmlformats.org/drawingml/2006/main" xmlns:r="http://schemas.openxmlformats.org/officeDocument/2006/relationships" xmlns:p="http://schemas.openxmlformats.org/presentationml/2006/main">
   <p:cSld>
     <p:spTree>
@@ -35277,7 +35515,7 @@
 </p:sld>
 </file>
 
-<file path=ppt/slides/slide16.xml><?xml version="1.0" encoding="utf-8"?>
+<file path=ppt/slides/slide17.xml><?xml version="1.0" encoding="utf-8"?>
 <p:sld xmlns:a="http://schemas.openxmlformats.org/drawingml/2006/main" xmlns:r="http://schemas.openxmlformats.org/officeDocument/2006/relationships" xmlns:p="http://schemas.openxmlformats.org/presentationml/2006/main">
   <p:cSld>
     <p:spTree>
@@ -42259,7 +42497,7 @@
 </p:sld>
 </file>
 
-<file path=ppt/slides/slide17.xml><?xml version="1.0" encoding="utf-8"?>
+<file path=ppt/slides/slide18.xml><?xml version="1.0" encoding="utf-8"?>
 <p:sld xmlns:a="http://schemas.openxmlformats.org/drawingml/2006/main" xmlns:r="http://schemas.openxmlformats.org/officeDocument/2006/relationships" xmlns:p="http://schemas.openxmlformats.org/presentationml/2006/main">
   <p:cSld>
     <p:spTree>
@@ -42788,7 +43026,7 @@
                 <a:avLst/>
               </a:prstGeom>
               <a:blipFill>
-                <a:blip r:embed="rId2"/>
+                <a:blip r:embed="rId3"/>
                 <a:stretch>
                   <a:fillRect/>
                 </a:stretch>
@@ -43417,7 +43655,339 @@
 </p:sld>
 </file>
 
-<file path=ppt/slides/slide18.xml><?xml version="1.0" encoding="utf-8"?>
+<file path=ppt/slides/slide19.xml><?xml version="1.0" encoding="utf-8"?>
+<p:sld xmlns:a="http://schemas.openxmlformats.org/drawingml/2006/main" xmlns:r="http://schemas.openxmlformats.org/officeDocument/2006/relationships" xmlns:p="http://schemas.openxmlformats.org/presentationml/2006/main">
+  <p:cSld>
+    <p:spTree>
+      <p:nvGrpSpPr>
+        <p:cNvPr id="1" name=""/>
+        <p:cNvGrpSpPr/>
+        <p:nvPr/>
+      </p:nvGrpSpPr>
+      <p:grpSpPr>
+        <a:xfrm>
+          <a:off x="0" y="0"/>
+          <a:ext cx="0" cy="0"/>
+          <a:chOff x="0" y="0"/>
+          <a:chExt cx="0" cy="0"/>
+        </a:xfrm>
+      </p:grpSpPr>
+      <p:sp>
+        <p:nvSpPr>
+          <p:cNvPr id="2" name="Title 1">
+            <a:extLst>
+              <a:ext uri="{FF2B5EF4-FFF2-40B4-BE49-F238E27FC236}">
+                <a16:creationId xmlns:a16="http://schemas.microsoft.com/office/drawing/2014/main" id="{1E9BCD57-A934-4961-9271-7D3358F3013E}"/>
+              </a:ext>
+            </a:extLst>
+          </p:cNvPr>
+          <p:cNvSpPr>
+            <a:spLocks noGrp="1"/>
+          </p:cNvSpPr>
+          <p:nvPr>
+            <p:ph type="title"/>
+          </p:nvPr>
+        </p:nvSpPr>
+        <p:spPr/>
+        <p:txBody>
+          <a:bodyPr/>
+          <a:lstStyle/>
+          <a:p>
+            <a:r>
+              <a:rPr lang="en-US" dirty="0"/>
+              <a:t>Let’s jump to R</a:t>
+            </a:r>
+          </a:p>
+        </p:txBody>
+      </p:sp>
+      <p:sp>
+        <p:nvSpPr>
+          <p:cNvPr id="3" name="Content Placeholder 2">
+            <a:extLst>
+              <a:ext uri="{FF2B5EF4-FFF2-40B4-BE49-F238E27FC236}">
+                <a16:creationId xmlns:a16="http://schemas.microsoft.com/office/drawing/2014/main" id="{F1FC7A70-D3FE-4D9C-AF7D-2238B03DA661}"/>
+              </a:ext>
+            </a:extLst>
+          </p:cNvPr>
+          <p:cNvSpPr>
+            <a:spLocks noGrp="1"/>
+          </p:cNvSpPr>
+          <p:nvPr>
+            <p:ph idx="1"/>
+          </p:nvPr>
+        </p:nvSpPr>
+        <p:spPr/>
+        <p:txBody>
+          <a:bodyPr/>
+          <a:lstStyle/>
+          <a:p>
+            <a:r>
+              <a:rPr lang="en-US" dirty="0"/>
+              <a:t>We are going to simulate:</a:t>
+            </a:r>
+          </a:p>
+          <a:p>
+            <a:pPr lvl="1"/>
+            <a:r>
+              <a:rPr lang="en-US" dirty="0"/>
+              <a:t>Our 5 loci model with equal marker effects,</a:t>
+            </a:r>
+          </a:p>
+          <a:p>
+            <a:pPr lvl="1"/>
+            <a:r>
+              <a:rPr lang="en-US" dirty="0"/>
+              <a:t>Our 5 loci model with random effects</a:t>
+            </a:r>
+          </a:p>
+          <a:p>
+            <a:pPr lvl="1"/>
+            <a:r>
+              <a:rPr lang="en-US" dirty="0"/>
+              <a:t>Extend this to 200 loci with</a:t>
+            </a:r>
+          </a:p>
+          <a:p>
+            <a:pPr lvl="2"/>
+            <a:r>
+              <a:rPr lang="en-US" dirty="0"/>
+              <a:t>Equal marker effects</a:t>
+            </a:r>
+          </a:p>
+          <a:p>
+            <a:pPr lvl="2"/>
+            <a:r>
+              <a:rPr lang="en-US" dirty="0"/>
+              <a:t>Single large effect markers</a:t>
+            </a:r>
+          </a:p>
+          <a:p>
+            <a:pPr lvl="2"/>
+            <a:r>
+              <a:rPr lang="en-US" dirty="0"/>
+              <a:t>Randomly assigned marker effects</a:t>
+            </a:r>
+          </a:p>
+          <a:p>
+            <a:pPr lvl="1"/>
+            <a:endParaRPr lang="en-US" dirty="0"/>
+          </a:p>
+        </p:txBody>
+      </p:sp>
+    </p:spTree>
+    <p:extLst>
+      <p:ext uri="{BB962C8B-B14F-4D97-AF65-F5344CB8AC3E}">
+        <p14:creationId xmlns:p14="http://schemas.microsoft.com/office/powerpoint/2010/main" val="519978926"/>
+      </p:ext>
+    </p:extLst>
+  </p:cSld>
+  <p:clrMapOvr>
+    <a:masterClrMapping/>
+  </p:clrMapOvr>
+</p:sld>
+</file>
+
+<file path=ppt/slides/slide2.xml><?xml version="1.0" encoding="utf-8"?>
+<p:sld xmlns:a="http://schemas.openxmlformats.org/drawingml/2006/main" xmlns:r="http://schemas.openxmlformats.org/officeDocument/2006/relationships" xmlns:p="http://schemas.openxmlformats.org/presentationml/2006/main">
+  <p:cSld>
+    <p:spTree>
+      <p:nvGrpSpPr>
+        <p:cNvPr id="1" name=""/>
+        <p:cNvGrpSpPr/>
+        <p:nvPr/>
+      </p:nvGrpSpPr>
+      <p:grpSpPr>
+        <a:xfrm>
+          <a:off x="0" y="0"/>
+          <a:ext cx="0" cy="0"/>
+          <a:chOff x="0" y="0"/>
+          <a:chExt cx="0" cy="0"/>
+        </a:xfrm>
+      </p:grpSpPr>
+      <p:sp>
+        <p:nvSpPr>
+          <p:cNvPr id="2" name="Title 1">
+            <a:extLst>
+              <a:ext uri="{FF2B5EF4-FFF2-40B4-BE49-F238E27FC236}">
+                <a16:creationId xmlns:a16="http://schemas.microsoft.com/office/drawing/2014/main" id="{401177DD-263C-4948-A038-AE390B935D5A}"/>
+              </a:ext>
+            </a:extLst>
+          </p:cNvPr>
+          <p:cNvSpPr>
+            <a:spLocks noGrp="1"/>
+          </p:cNvSpPr>
+          <p:nvPr>
+            <p:ph type="ctrTitle"/>
+          </p:nvPr>
+        </p:nvSpPr>
+        <p:spPr/>
+        <p:txBody>
+          <a:bodyPr/>
+          <a:lstStyle/>
+          <a:p>
+            <a:r>
+              <a:rPr lang="en-US" dirty="0"/>
+              <a:t>Additive models and genomic prediction</a:t>
+            </a:r>
+          </a:p>
+        </p:txBody>
+      </p:sp>
+      <p:sp>
+        <p:nvSpPr>
+          <p:cNvPr id="3" name="Subtitle 2">
+            <a:extLst>
+              <a:ext uri="{FF2B5EF4-FFF2-40B4-BE49-F238E27FC236}">
+                <a16:creationId xmlns:a16="http://schemas.microsoft.com/office/drawing/2014/main" id="{5835CD36-2C8E-43D3-842A-DE256DE63D5E}"/>
+              </a:ext>
+            </a:extLst>
+          </p:cNvPr>
+          <p:cNvSpPr>
+            <a:spLocks noGrp="1"/>
+          </p:cNvSpPr>
+          <p:nvPr>
+            <p:ph type="subTitle" idx="1"/>
+          </p:nvPr>
+        </p:nvSpPr>
+        <p:spPr/>
+        <p:txBody>
+          <a:bodyPr/>
+          <a:lstStyle/>
+          <a:p>
+            <a:r>
+              <a:rPr lang="en-US" dirty="0"/>
+              <a:t>Travis Rooney</a:t>
+            </a:r>
+          </a:p>
+          <a:p>
+            <a:r>
+              <a:rPr lang="en-US" dirty="0"/>
+              <a:t>September 2, 2021</a:t>
+            </a:r>
+          </a:p>
+          <a:p>
+            <a:r>
+              <a:rPr lang="en-US" dirty="0"/>
+              <a:t>PLBRG 4080</a:t>
+            </a:r>
+          </a:p>
+        </p:txBody>
+      </p:sp>
+    </p:spTree>
+    <p:extLst>
+      <p:ext uri="{BB962C8B-B14F-4D97-AF65-F5344CB8AC3E}">
+        <p14:creationId xmlns:p14="http://schemas.microsoft.com/office/powerpoint/2010/main" val="2834949495"/>
+      </p:ext>
+    </p:extLst>
+  </p:cSld>
+  <p:clrMapOvr>
+    <a:masterClrMapping/>
+  </p:clrMapOvr>
+</p:sld>
+</file>
+
+<file path=ppt/slides/slide20.xml><?xml version="1.0" encoding="utf-8"?>
+<p:sld xmlns:a="http://schemas.openxmlformats.org/drawingml/2006/main" xmlns:r="http://schemas.openxmlformats.org/officeDocument/2006/relationships" xmlns:p="http://schemas.openxmlformats.org/presentationml/2006/main">
+  <p:cSld>
+    <p:spTree>
+      <p:nvGrpSpPr>
+        <p:cNvPr id="1" name=""/>
+        <p:cNvGrpSpPr/>
+        <p:nvPr/>
+      </p:nvGrpSpPr>
+      <p:grpSpPr>
+        <a:xfrm>
+          <a:off x="0" y="0"/>
+          <a:ext cx="0" cy="0"/>
+          <a:chOff x="0" y="0"/>
+          <a:chExt cx="0" cy="0"/>
+        </a:xfrm>
+      </p:grpSpPr>
+      <p:sp>
+        <p:nvSpPr>
+          <p:cNvPr id="2" name="Title 1">
+            <a:extLst>
+              <a:ext uri="{FF2B5EF4-FFF2-40B4-BE49-F238E27FC236}">
+                <a16:creationId xmlns:a16="http://schemas.microsoft.com/office/drawing/2014/main" id="{2E1027D1-9C33-4F4D-92E3-E48812348640}"/>
+              </a:ext>
+            </a:extLst>
+          </p:cNvPr>
+          <p:cNvSpPr>
+            <a:spLocks noGrp="1"/>
+          </p:cNvSpPr>
+          <p:nvPr>
+            <p:ph type="title"/>
+          </p:nvPr>
+        </p:nvSpPr>
+        <p:spPr>
+          <a:xfrm>
+            <a:off x="838200" y="1134559"/>
+            <a:ext cx="10515600" cy="1325563"/>
+          </a:xfrm>
+        </p:spPr>
+        <p:txBody>
+          <a:bodyPr>
+            <a:normAutofit fontScale="90000"/>
+          </a:bodyPr>
+          <a:lstStyle/>
+          <a:p>
+            <a:r>
+              <a:rPr lang="en-US" dirty="0"/>
+              <a:t>We’ve seen we can make models based on the physiology and the sequence information and these models mimic the phenotypic distribution we see.</a:t>
+            </a:r>
+            <a:br>
+              <a:rPr lang="en-US" dirty="0"/>
+            </a:br>
+            <a:endParaRPr lang="en-US" dirty="0"/>
+          </a:p>
+        </p:txBody>
+      </p:sp>
+      <p:sp>
+        <p:nvSpPr>
+          <p:cNvPr id="3" name="Content Placeholder 2">
+            <a:extLst>
+              <a:ext uri="{FF2B5EF4-FFF2-40B4-BE49-F238E27FC236}">
+                <a16:creationId xmlns:a16="http://schemas.microsoft.com/office/drawing/2014/main" id="{D85DCD29-D8C6-4DE8-BC37-56CA89195384}"/>
+              </a:ext>
+            </a:extLst>
+          </p:cNvPr>
+          <p:cNvSpPr>
+            <a:spLocks noGrp="1"/>
+          </p:cNvSpPr>
+          <p:nvPr>
+            <p:ph idx="1"/>
+          </p:nvPr>
+        </p:nvSpPr>
+        <p:spPr>
+          <a:xfrm>
+            <a:off x="838200" y="2899317"/>
+            <a:ext cx="10515600" cy="3277646"/>
+          </a:xfrm>
+        </p:spPr>
+        <p:txBody>
+          <a:bodyPr/>
+          <a:lstStyle/>
+          <a:p>
+            <a:r>
+              <a:rPr lang="en-US" dirty="0"/>
+              <a:t>Congratulations, This is the additive genetic model.</a:t>
+            </a:r>
+          </a:p>
+        </p:txBody>
+      </p:sp>
+    </p:spTree>
+    <p:extLst>
+      <p:ext uri="{BB962C8B-B14F-4D97-AF65-F5344CB8AC3E}">
+        <p14:creationId xmlns:p14="http://schemas.microsoft.com/office/powerpoint/2010/main" val="3759824108"/>
+      </p:ext>
+    </p:extLst>
+  </p:cSld>
+  <p:clrMapOvr>
+    <a:masterClrMapping/>
+  </p:clrMapOvr>
+</p:sld>
+</file>
+
+<file path=ppt/slides/slide21.xml><?xml version="1.0" encoding="utf-8"?>
 <p:sld xmlns:a="http://schemas.openxmlformats.org/drawingml/2006/main" xmlns:r="http://schemas.openxmlformats.org/officeDocument/2006/relationships" xmlns:p="http://schemas.openxmlformats.org/presentationml/2006/main">
   <p:cSld>
     <p:spTree>
@@ -43495,7 +44065,7 @@
             </a:pPr>
             <a:r>
               <a:rPr lang="en-US" dirty="0"/>
-              <a:t>The phenotype (or breeding value) of the individual is a result of the  additive combination of many markers across the genome each with their own unique effect on the phenotype. </a:t>
+              <a:t>The phenotype (or breeding value) of the individual is a result of the  additive combination of many polymorphisms across the genome each with their own effect on the phenotype. </a:t>
             </a:r>
           </a:p>
           <a:p>
@@ -43534,7 +44104,7 @@
 </p:sld>
 </file>
 
-<file path=ppt/slides/slide19.xml><?xml version="1.0" encoding="utf-8"?>
+<file path=ppt/slides/slide22.xml><?xml version="1.0" encoding="utf-8"?>
 <p:sld xmlns:a="http://schemas.openxmlformats.org/drawingml/2006/main" xmlns:r="http://schemas.openxmlformats.org/officeDocument/2006/relationships" xmlns:p="http://schemas.openxmlformats.org/presentationml/2006/main">
   <p:cSld>
     <p:spTree>
@@ -43629,7 +44199,1318 @@
 </p:sld>
 </file>
 
-<file path=ppt/slides/slide2.xml><?xml version="1.0" encoding="utf-8"?>
+<file path=ppt/slides/slide23.xml><?xml version="1.0" encoding="utf-8"?>
+<p:sld xmlns:a="http://schemas.openxmlformats.org/drawingml/2006/main" xmlns:r="http://schemas.openxmlformats.org/officeDocument/2006/relationships" xmlns:p="http://schemas.openxmlformats.org/presentationml/2006/main">
+  <p:cSld>
+    <p:spTree>
+      <p:nvGrpSpPr>
+        <p:cNvPr id="1" name=""/>
+        <p:cNvGrpSpPr/>
+        <p:nvPr/>
+      </p:nvGrpSpPr>
+      <p:grpSpPr>
+        <a:xfrm>
+          <a:off x="0" y="0"/>
+          <a:ext cx="0" cy="0"/>
+          <a:chOff x="0" y="0"/>
+          <a:chExt cx="0" cy="0"/>
+        </a:xfrm>
+      </p:grpSpPr>
+      <p:sp>
+        <p:nvSpPr>
+          <p:cNvPr id="2" name="Title 1">
+            <a:extLst>
+              <a:ext uri="{FF2B5EF4-FFF2-40B4-BE49-F238E27FC236}">
+                <a16:creationId xmlns:a16="http://schemas.microsoft.com/office/drawing/2014/main" id="{6A3111EC-B405-4FCF-9C89-1E1AC4530A38}"/>
+              </a:ext>
+            </a:extLst>
+          </p:cNvPr>
+          <p:cNvSpPr>
+            <a:spLocks noGrp="1"/>
+          </p:cNvSpPr>
+          <p:nvPr>
+            <p:ph type="title"/>
+          </p:nvPr>
+        </p:nvSpPr>
+        <p:spPr>
+          <a:xfrm>
+            <a:off x="838200" y="365125"/>
+            <a:ext cx="10515600" cy="2260600"/>
+          </a:xfrm>
+        </p:spPr>
+        <p:txBody>
+          <a:bodyPr>
+            <a:normAutofit/>
+          </a:bodyPr>
+          <a:lstStyle/>
+          <a:p>
+            <a:r>
+              <a:rPr lang="en-US" dirty="0"/>
+              <a:t>How can we apply the additive model to real breeding populations?</a:t>
+            </a:r>
+          </a:p>
+        </p:txBody>
+      </p:sp>
+      <p:sp>
+        <p:nvSpPr>
+          <p:cNvPr id="3" name="Content Placeholder 2">
+            <a:extLst>
+              <a:ext uri="{FF2B5EF4-FFF2-40B4-BE49-F238E27FC236}">
+                <a16:creationId xmlns:a16="http://schemas.microsoft.com/office/drawing/2014/main" id="{7F36EC7A-6CEA-4416-ABF1-190B41ADFF11}"/>
+              </a:ext>
+            </a:extLst>
+          </p:cNvPr>
+          <p:cNvSpPr>
+            <a:spLocks noGrp="1"/>
+          </p:cNvSpPr>
+          <p:nvPr>
+            <p:ph idx="1"/>
+          </p:nvPr>
+        </p:nvSpPr>
+        <p:spPr>
+          <a:xfrm>
+            <a:off x="660400" y="2625725"/>
+            <a:ext cx="10515600" cy="3559175"/>
+          </a:xfrm>
+        </p:spPr>
+        <p:txBody>
+          <a:bodyPr/>
+          <a:lstStyle/>
+          <a:p>
+            <a:r>
+              <a:rPr lang="en-US" dirty="0"/>
+              <a:t>How do we proceed next?</a:t>
+            </a:r>
+          </a:p>
+          <a:p>
+            <a:r>
+              <a:rPr lang="en-US" dirty="0"/>
+              <a:t>In reality we will have the phenotypes (estimated breeding values) and our genotypes</a:t>
+            </a:r>
+          </a:p>
+          <a:p>
+            <a:r>
+              <a:rPr lang="en-US" dirty="0"/>
+              <a:t>We do not know the marker effects – can we estimate them? </a:t>
+            </a:r>
+          </a:p>
+          <a:p>
+            <a:r>
+              <a:rPr lang="en-US" dirty="0"/>
+              <a:t>That is where regression comes in!</a:t>
+            </a:r>
+          </a:p>
+        </p:txBody>
+      </p:sp>
+    </p:spTree>
+    <p:extLst>
+      <p:ext uri="{BB962C8B-B14F-4D97-AF65-F5344CB8AC3E}">
+        <p14:creationId xmlns:p14="http://schemas.microsoft.com/office/powerpoint/2010/main" val="3330138882"/>
+      </p:ext>
+    </p:extLst>
+  </p:cSld>
+  <p:clrMapOvr>
+    <a:masterClrMapping/>
+  </p:clrMapOvr>
+</p:sld>
+</file>
+
+<file path=ppt/slides/slide24.xml><?xml version="1.0" encoding="utf-8"?>
+<p:sld xmlns:a="http://schemas.openxmlformats.org/drawingml/2006/main" xmlns:r="http://schemas.openxmlformats.org/officeDocument/2006/relationships" xmlns:p="http://schemas.openxmlformats.org/presentationml/2006/main">
+  <p:cSld>
+    <p:spTree>
+      <p:nvGrpSpPr>
+        <p:cNvPr id="1" name=""/>
+        <p:cNvGrpSpPr/>
+        <p:nvPr/>
+      </p:nvGrpSpPr>
+      <p:grpSpPr>
+        <a:xfrm>
+          <a:off x="0" y="0"/>
+          <a:ext cx="0" cy="0"/>
+          <a:chOff x="0" y="0"/>
+          <a:chExt cx="0" cy="0"/>
+        </a:xfrm>
+      </p:grpSpPr>
+      <p:sp>
+        <p:nvSpPr>
+          <p:cNvPr id="2" name="Title 1">
+            <a:extLst>
+              <a:ext uri="{FF2B5EF4-FFF2-40B4-BE49-F238E27FC236}">
+                <a16:creationId xmlns:a16="http://schemas.microsoft.com/office/drawing/2014/main" id="{7DD32426-0CBB-42ED-A9BB-238C22C68A88}"/>
+              </a:ext>
+            </a:extLst>
+          </p:cNvPr>
+          <p:cNvSpPr>
+            <a:spLocks noGrp="1"/>
+          </p:cNvSpPr>
+          <p:nvPr>
+            <p:ph type="title"/>
+          </p:nvPr>
+        </p:nvSpPr>
+        <p:spPr/>
+        <p:txBody>
+          <a:bodyPr/>
+          <a:lstStyle/>
+          <a:p>
+            <a:r>
+              <a:rPr lang="en-US" dirty="0"/>
+              <a:t>What is regression? </a:t>
+            </a:r>
+          </a:p>
+        </p:txBody>
+      </p:sp>
+      <p:sp>
+        <p:nvSpPr>
+          <p:cNvPr id="3" name="Content Placeholder 2">
+            <a:extLst>
+              <a:ext uri="{FF2B5EF4-FFF2-40B4-BE49-F238E27FC236}">
+                <a16:creationId xmlns:a16="http://schemas.microsoft.com/office/drawing/2014/main" id="{34420326-A596-43B6-BF5E-EA714CFED70B}"/>
+              </a:ext>
+            </a:extLst>
+          </p:cNvPr>
+          <p:cNvSpPr>
+            <a:spLocks noGrp="1"/>
+          </p:cNvSpPr>
+          <p:nvPr>
+            <p:ph idx="1"/>
+          </p:nvPr>
+        </p:nvSpPr>
+        <p:spPr/>
+        <p:txBody>
+          <a:bodyPr/>
+          <a:lstStyle/>
+          <a:p>
+            <a:r>
+              <a:rPr lang="en-US" dirty="0"/>
+              <a:t>Fitting a line to data:</a:t>
+            </a:r>
+          </a:p>
+        </p:txBody>
+      </p:sp>
+      <p:pic>
+        <p:nvPicPr>
+          <p:cNvPr id="4" name="Picture 3">
+            <a:extLst>
+              <a:ext uri="{FF2B5EF4-FFF2-40B4-BE49-F238E27FC236}">
+                <a16:creationId xmlns:a16="http://schemas.microsoft.com/office/drawing/2014/main" id="{F0A82382-85FB-49C0-A136-3B73A522DA47}"/>
+              </a:ext>
+            </a:extLst>
+          </p:cNvPr>
+          <p:cNvPicPr>
+            <a:picLocks noChangeAspect="1"/>
+          </p:cNvPicPr>
+          <p:nvPr/>
+        </p:nvPicPr>
+        <p:blipFill>
+          <a:blip r:embed="rId2"/>
+          <a:stretch>
+            <a:fillRect/>
+          </a:stretch>
+        </p:blipFill>
+        <p:spPr>
+          <a:xfrm>
+            <a:off x="673305" y="2420222"/>
+            <a:ext cx="4508090" cy="3756741"/>
+          </a:xfrm>
+          <a:prstGeom prst="rect">
+            <a:avLst/>
+          </a:prstGeom>
+        </p:spPr>
+      </p:pic>
+      <p:cxnSp>
+        <p:nvCxnSpPr>
+          <p:cNvPr id="6" name="Straight Arrow Connector 5">
+            <a:extLst>
+              <a:ext uri="{FF2B5EF4-FFF2-40B4-BE49-F238E27FC236}">
+                <a16:creationId xmlns:a16="http://schemas.microsoft.com/office/drawing/2014/main" id="{6DEF197B-ECA0-4352-9AA5-697B2F064993}"/>
+              </a:ext>
+            </a:extLst>
+          </p:cNvPr>
+          <p:cNvCxnSpPr>
+            <a:cxnSpLocks/>
+            <a:stCxn id="4" idx="3"/>
+          </p:cNvCxnSpPr>
+          <p:nvPr/>
+        </p:nvCxnSpPr>
+        <p:spPr>
+          <a:xfrm>
+            <a:off x="5181395" y="4298593"/>
+            <a:ext cx="1311235" cy="630380"/>
+          </a:xfrm>
+          <a:prstGeom prst="straightConnector1">
+            <a:avLst/>
+          </a:prstGeom>
+          <a:ln w="38100">
+            <a:tailEnd type="triangle"/>
+          </a:ln>
+        </p:spPr>
+        <p:style>
+          <a:lnRef idx="1">
+            <a:schemeClr val="accent1"/>
+          </a:lnRef>
+          <a:fillRef idx="0">
+            <a:schemeClr val="accent1"/>
+          </a:fillRef>
+          <a:effectRef idx="0">
+            <a:schemeClr val="accent1"/>
+          </a:effectRef>
+          <a:fontRef idx="minor">
+            <a:schemeClr val="tx1"/>
+          </a:fontRef>
+        </p:style>
+      </p:cxnSp>
+      <p:pic>
+        <p:nvPicPr>
+          <p:cNvPr id="7" name="Picture 6">
+            <a:extLst>
+              <a:ext uri="{FF2B5EF4-FFF2-40B4-BE49-F238E27FC236}">
+                <a16:creationId xmlns:a16="http://schemas.microsoft.com/office/drawing/2014/main" id="{DBC8F6CB-4DDE-4FB6-9624-4CD0351D8677}"/>
+              </a:ext>
+            </a:extLst>
+          </p:cNvPr>
+          <p:cNvPicPr>
+            <a:picLocks noChangeAspect="1"/>
+          </p:cNvPicPr>
+          <p:nvPr/>
+        </p:nvPicPr>
+        <p:blipFill>
+          <a:blip r:embed="rId3"/>
+          <a:stretch>
+            <a:fillRect/>
+          </a:stretch>
+        </p:blipFill>
+        <p:spPr>
+          <a:xfrm>
+            <a:off x="6492630" y="3177747"/>
+            <a:ext cx="5204070" cy="3527853"/>
+          </a:xfrm>
+          <a:prstGeom prst="rect">
+            <a:avLst/>
+          </a:prstGeom>
+        </p:spPr>
+      </p:pic>
+    </p:spTree>
+    <p:extLst>
+      <p:ext uri="{BB962C8B-B14F-4D97-AF65-F5344CB8AC3E}">
+        <p14:creationId xmlns:p14="http://schemas.microsoft.com/office/powerpoint/2010/main" val="944347445"/>
+      </p:ext>
+    </p:extLst>
+  </p:cSld>
+  <p:clrMapOvr>
+    <a:masterClrMapping/>
+  </p:clrMapOvr>
+</p:sld>
+</file>
+
+<file path=ppt/slides/slide25.xml><?xml version="1.0" encoding="utf-8"?>
+<p:sld xmlns:a="http://schemas.openxmlformats.org/drawingml/2006/main" xmlns:r="http://schemas.openxmlformats.org/officeDocument/2006/relationships" xmlns:p="http://schemas.openxmlformats.org/presentationml/2006/main">
+  <p:cSld>
+    <p:spTree>
+      <p:nvGrpSpPr>
+        <p:cNvPr id="1" name=""/>
+        <p:cNvGrpSpPr/>
+        <p:nvPr/>
+      </p:nvGrpSpPr>
+      <p:grpSpPr>
+        <a:xfrm>
+          <a:off x="0" y="0"/>
+          <a:ext cx="0" cy="0"/>
+          <a:chOff x="0" y="0"/>
+          <a:chExt cx="0" cy="0"/>
+        </a:xfrm>
+      </p:grpSpPr>
+      <p:sp>
+        <p:nvSpPr>
+          <p:cNvPr id="2" name="Title 1">
+            <a:extLst>
+              <a:ext uri="{FF2B5EF4-FFF2-40B4-BE49-F238E27FC236}">
+                <a16:creationId xmlns:a16="http://schemas.microsoft.com/office/drawing/2014/main" id="{0E7097DF-88E2-41DF-938D-E1FDFBFF1580}"/>
+              </a:ext>
+            </a:extLst>
+          </p:cNvPr>
+          <p:cNvSpPr>
+            <a:spLocks noGrp="1"/>
+          </p:cNvSpPr>
+          <p:nvPr>
+            <p:ph type="title"/>
+          </p:nvPr>
+        </p:nvSpPr>
+        <p:spPr/>
+        <p:txBody>
+          <a:bodyPr/>
+          <a:lstStyle/>
+          <a:p>
+            <a:r>
+              <a:rPr lang="en-US" dirty="0"/>
+              <a:t>How do we do that?</a:t>
+            </a:r>
+          </a:p>
+        </p:txBody>
+      </p:sp>
+      <p:sp>
+        <p:nvSpPr>
+          <p:cNvPr id="3" name="Content Placeholder 2">
+            <a:extLst>
+              <a:ext uri="{FF2B5EF4-FFF2-40B4-BE49-F238E27FC236}">
+                <a16:creationId xmlns:a16="http://schemas.microsoft.com/office/drawing/2014/main" id="{4635633E-1633-40FB-97A9-E68DBDA0004F}"/>
+              </a:ext>
+            </a:extLst>
+          </p:cNvPr>
+          <p:cNvSpPr>
+            <a:spLocks noGrp="1"/>
+          </p:cNvSpPr>
+          <p:nvPr>
+            <p:ph idx="1"/>
+          </p:nvPr>
+        </p:nvSpPr>
+        <p:spPr/>
+        <p:txBody>
+          <a:bodyPr/>
+          <a:lstStyle/>
+          <a:p>
+            <a:r>
+              <a:rPr lang="en-US" dirty="0"/>
+              <a:t>We find the least squares estimator = Maximum likelihood estimator</a:t>
+            </a:r>
+          </a:p>
+          <a:p>
+            <a:endParaRPr lang="en-US" dirty="0"/>
+          </a:p>
+          <a:p>
+            <a:r>
+              <a:rPr lang="en-US" dirty="0"/>
+              <a:t>Lets work out a small example – white board!</a:t>
+            </a:r>
+          </a:p>
+          <a:p>
+            <a:endParaRPr lang="en-US" dirty="0"/>
+          </a:p>
+          <a:p>
+            <a:r>
+              <a:rPr lang="en-US" dirty="0"/>
+              <a:t>Likelihood vs probability </a:t>
+            </a:r>
+          </a:p>
+        </p:txBody>
+      </p:sp>
+    </p:spTree>
+    <p:extLst>
+      <p:ext uri="{BB962C8B-B14F-4D97-AF65-F5344CB8AC3E}">
+        <p14:creationId xmlns:p14="http://schemas.microsoft.com/office/powerpoint/2010/main" val="1592822334"/>
+      </p:ext>
+    </p:extLst>
+  </p:cSld>
+  <p:clrMapOvr>
+    <a:masterClrMapping/>
+  </p:clrMapOvr>
+</p:sld>
+</file>
+
+<file path=ppt/slides/slide26.xml><?xml version="1.0" encoding="utf-8"?>
+<p:sld xmlns:a="http://schemas.openxmlformats.org/drawingml/2006/main" xmlns:r="http://schemas.openxmlformats.org/officeDocument/2006/relationships" xmlns:p="http://schemas.openxmlformats.org/presentationml/2006/main">
+  <p:cSld>
+    <p:spTree>
+      <p:nvGrpSpPr>
+        <p:cNvPr id="1" name=""/>
+        <p:cNvGrpSpPr/>
+        <p:nvPr/>
+      </p:nvGrpSpPr>
+      <p:grpSpPr>
+        <a:xfrm>
+          <a:off x="0" y="0"/>
+          <a:ext cx="0" cy="0"/>
+          <a:chOff x="0" y="0"/>
+          <a:chExt cx="0" cy="0"/>
+        </a:xfrm>
+      </p:grpSpPr>
+      <p:sp>
+        <p:nvSpPr>
+          <p:cNvPr id="2" name="Title 1">
+            <a:extLst>
+              <a:ext uri="{FF2B5EF4-FFF2-40B4-BE49-F238E27FC236}">
+                <a16:creationId xmlns:a16="http://schemas.microsoft.com/office/drawing/2014/main" id="{E8F578A4-D5B6-4ED6-AB89-D2343D32205A}"/>
+              </a:ext>
+            </a:extLst>
+          </p:cNvPr>
+          <p:cNvSpPr>
+            <a:spLocks noGrp="1"/>
+          </p:cNvSpPr>
+          <p:nvPr>
+            <p:ph type="title"/>
+          </p:nvPr>
+        </p:nvSpPr>
+        <p:spPr/>
+        <p:txBody>
+          <a:bodyPr/>
+          <a:lstStyle/>
+          <a:p>
+            <a:r>
+              <a:rPr lang="en-US" dirty="0"/>
+              <a:t>How does this help us find marker effects?</a:t>
+            </a:r>
+          </a:p>
+        </p:txBody>
+      </p:sp>
+      <p:pic>
+        <p:nvPicPr>
+          <p:cNvPr id="10" name="Picture 9">
+            <a:extLst>
+              <a:ext uri="{FF2B5EF4-FFF2-40B4-BE49-F238E27FC236}">
+                <a16:creationId xmlns:a16="http://schemas.microsoft.com/office/drawing/2014/main" id="{42359743-658E-436D-80F0-CE508A7FC942}"/>
+              </a:ext>
+            </a:extLst>
+          </p:cNvPr>
+          <p:cNvPicPr>
+            <a:picLocks noChangeAspect="1"/>
+          </p:cNvPicPr>
+          <p:nvPr/>
+        </p:nvPicPr>
+        <p:blipFill>
+          <a:blip r:embed="rId2"/>
+          <a:stretch>
+            <a:fillRect/>
+          </a:stretch>
+        </p:blipFill>
+        <p:spPr>
+          <a:xfrm>
+            <a:off x="6692902" y="2629985"/>
+            <a:ext cx="5035120" cy="3419024"/>
+          </a:xfrm>
+          <a:prstGeom prst="rect">
+            <a:avLst/>
+          </a:prstGeom>
+        </p:spPr>
+      </p:pic>
+      <p:sp>
+        <p:nvSpPr>
+          <p:cNvPr id="11" name="Content Placeholder 2">
+            <a:extLst>
+              <a:ext uri="{FF2B5EF4-FFF2-40B4-BE49-F238E27FC236}">
+                <a16:creationId xmlns:a16="http://schemas.microsoft.com/office/drawing/2014/main" id="{308AA01F-202D-486B-A6C8-9DAE18834132}"/>
+              </a:ext>
+            </a:extLst>
+          </p:cNvPr>
+          <p:cNvSpPr>
+            <a:spLocks noGrp="1"/>
+          </p:cNvSpPr>
+          <p:nvPr>
+            <p:ph idx="1"/>
+          </p:nvPr>
+        </p:nvSpPr>
+        <p:spPr>
+          <a:xfrm>
+            <a:off x="838200" y="1825625"/>
+            <a:ext cx="5676900" cy="4667250"/>
+          </a:xfrm>
+        </p:spPr>
+        <p:txBody>
+          <a:bodyPr>
+            <a:normAutofit/>
+          </a:bodyPr>
+          <a:lstStyle/>
+          <a:p>
+            <a:r>
+              <a:rPr lang="en-US" dirty="0"/>
+              <a:t>The difference in marker scores is a linear regression where X takes on two (or three in heterozygotes) values {-1,0,1}. Remember though, we may have lots of markers that we need to solve for simultaneously.</a:t>
+            </a:r>
+          </a:p>
+          <a:p>
+            <a:r>
+              <a:rPr lang="en-US" dirty="0"/>
+              <a:t>This is called multiple linear regression</a:t>
+            </a:r>
+          </a:p>
+        </p:txBody>
+      </p:sp>
+    </p:spTree>
+    <p:extLst>
+      <p:ext uri="{BB962C8B-B14F-4D97-AF65-F5344CB8AC3E}">
+        <p14:creationId xmlns:p14="http://schemas.microsoft.com/office/powerpoint/2010/main" val="1569912516"/>
+      </p:ext>
+    </p:extLst>
+  </p:cSld>
+  <p:clrMapOvr>
+    <a:masterClrMapping/>
+  </p:clrMapOvr>
+</p:sld>
+</file>
+
+<file path=ppt/slides/slide27.xml><?xml version="1.0" encoding="utf-8"?>
+<p:sld xmlns:a="http://schemas.openxmlformats.org/drawingml/2006/main" xmlns:r="http://schemas.openxmlformats.org/officeDocument/2006/relationships" xmlns:p="http://schemas.openxmlformats.org/presentationml/2006/main">
+  <p:cSld>
+    <p:spTree>
+      <p:nvGrpSpPr>
+        <p:cNvPr id="1" name=""/>
+        <p:cNvGrpSpPr/>
+        <p:nvPr/>
+      </p:nvGrpSpPr>
+      <p:grpSpPr>
+        <a:xfrm>
+          <a:off x="0" y="0"/>
+          <a:ext cx="0" cy="0"/>
+          <a:chOff x="0" y="0"/>
+          <a:chExt cx="0" cy="0"/>
+        </a:xfrm>
+      </p:grpSpPr>
+      <p:sp>
+        <p:nvSpPr>
+          <p:cNvPr id="2" name="Title 1">
+            <a:extLst>
+              <a:ext uri="{FF2B5EF4-FFF2-40B4-BE49-F238E27FC236}">
+                <a16:creationId xmlns:a16="http://schemas.microsoft.com/office/drawing/2014/main" id="{FE24D50C-D80C-428B-9003-686128220FDA}"/>
+              </a:ext>
+            </a:extLst>
+          </p:cNvPr>
+          <p:cNvSpPr>
+            <a:spLocks noGrp="1"/>
+          </p:cNvSpPr>
+          <p:nvPr>
+            <p:ph type="title"/>
+          </p:nvPr>
+        </p:nvSpPr>
+        <p:spPr/>
+        <p:txBody>
+          <a:bodyPr/>
+          <a:lstStyle/>
+          <a:p>
+            <a:r>
+              <a:rPr lang="en-US" dirty="0"/>
+              <a:t>N &lt; P problem</a:t>
+            </a:r>
+          </a:p>
+        </p:txBody>
+      </p:sp>
+      <p:sp>
+        <p:nvSpPr>
+          <p:cNvPr id="3" name="Content Placeholder 2">
+            <a:extLst>
+              <a:ext uri="{FF2B5EF4-FFF2-40B4-BE49-F238E27FC236}">
+                <a16:creationId xmlns:a16="http://schemas.microsoft.com/office/drawing/2014/main" id="{299D1946-6411-4B0B-9B86-42E792102361}"/>
+              </a:ext>
+            </a:extLst>
+          </p:cNvPr>
+          <p:cNvSpPr>
+            <a:spLocks noGrp="1"/>
+          </p:cNvSpPr>
+          <p:nvPr>
+            <p:ph idx="1"/>
+          </p:nvPr>
+        </p:nvSpPr>
+        <p:spPr>
+          <a:xfrm>
+            <a:off x="838200" y="1690688"/>
+            <a:ext cx="10515600" cy="4729163"/>
+          </a:xfrm>
+        </p:spPr>
+        <p:txBody>
+          <a:bodyPr/>
+          <a:lstStyle/>
+          <a:p>
+            <a:r>
+              <a:rPr lang="en-US" dirty="0"/>
+              <a:t>In a linear system of equations (think back to algebra) one has to have more equations than predictors are being solved for:</a:t>
+            </a:r>
+          </a:p>
+          <a:p>
+            <a:pPr lvl="1"/>
+            <a:r>
+              <a:rPr lang="en-US" dirty="0"/>
+              <a:t>In order for a unique solution to exist the number of observations (N) has to be greater than the number of predictors (P).</a:t>
+            </a:r>
+          </a:p>
+          <a:p>
+            <a:pPr lvl="1"/>
+            <a:r>
+              <a:rPr lang="en-US" dirty="0"/>
+              <a:t>In the context of genomic selection this means we need more observations of genetically unique individuals than we have markers.</a:t>
+            </a:r>
+          </a:p>
+          <a:p>
+            <a:pPr lvl="1"/>
+            <a:r>
+              <a:rPr lang="en-US" dirty="0"/>
+              <a:t>Commonly 1000’s or greater markers are used, but phenotyping any number of individuals can be very challenging. </a:t>
+            </a:r>
+          </a:p>
+        </p:txBody>
+      </p:sp>
+    </p:spTree>
+    <p:extLst>
+      <p:ext uri="{BB962C8B-B14F-4D97-AF65-F5344CB8AC3E}">
+        <p14:creationId xmlns:p14="http://schemas.microsoft.com/office/powerpoint/2010/main" val="1500212203"/>
+      </p:ext>
+    </p:extLst>
+  </p:cSld>
+  <p:clrMapOvr>
+    <a:masterClrMapping/>
+  </p:clrMapOvr>
+</p:sld>
+</file>
+
+<file path=ppt/slides/slide28.xml><?xml version="1.0" encoding="utf-8"?>
+<p:sld xmlns:a="http://schemas.openxmlformats.org/drawingml/2006/main" xmlns:r="http://schemas.openxmlformats.org/officeDocument/2006/relationships" xmlns:p="http://schemas.openxmlformats.org/presentationml/2006/main">
+  <p:cSld>
+    <p:spTree>
+      <p:nvGrpSpPr>
+        <p:cNvPr id="1" name=""/>
+        <p:cNvGrpSpPr/>
+        <p:nvPr/>
+      </p:nvGrpSpPr>
+      <p:grpSpPr>
+        <a:xfrm>
+          <a:off x="0" y="0"/>
+          <a:ext cx="0" cy="0"/>
+          <a:chOff x="0" y="0"/>
+          <a:chExt cx="0" cy="0"/>
+        </a:xfrm>
+      </p:grpSpPr>
+      <p:sp>
+        <p:nvSpPr>
+          <p:cNvPr id="2" name="Title 1">
+            <a:extLst>
+              <a:ext uri="{FF2B5EF4-FFF2-40B4-BE49-F238E27FC236}">
+                <a16:creationId xmlns:a16="http://schemas.microsoft.com/office/drawing/2014/main" id="{762B22C4-40C5-4873-890D-C5BF1EA84377}"/>
+              </a:ext>
+            </a:extLst>
+          </p:cNvPr>
+          <p:cNvSpPr>
+            <a:spLocks noGrp="1"/>
+          </p:cNvSpPr>
+          <p:nvPr>
+            <p:ph type="title"/>
+          </p:nvPr>
+        </p:nvSpPr>
+        <p:spPr/>
+        <p:txBody>
+          <a:bodyPr/>
+          <a:lstStyle/>
+          <a:p>
+            <a:r>
+              <a:rPr lang="en-US" dirty="0"/>
+              <a:t>Can’t we just subset down to N&gt;P markers?</a:t>
+            </a:r>
+          </a:p>
+        </p:txBody>
+      </p:sp>
+      <p:sp>
+        <p:nvSpPr>
+          <p:cNvPr id="3" name="Content Placeholder 2">
+            <a:extLst>
+              <a:ext uri="{FF2B5EF4-FFF2-40B4-BE49-F238E27FC236}">
+                <a16:creationId xmlns:a16="http://schemas.microsoft.com/office/drawing/2014/main" id="{E7E97833-DAB8-4D56-90F5-48FCAD66AB44}"/>
+              </a:ext>
+            </a:extLst>
+          </p:cNvPr>
+          <p:cNvSpPr>
+            <a:spLocks noGrp="1"/>
+          </p:cNvSpPr>
+          <p:nvPr>
+            <p:ph idx="1"/>
+          </p:nvPr>
+        </p:nvSpPr>
+        <p:spPr/>
+        <p:txBody>
+          <a:bodyPr/>
+          <a:lstStyle/>
+          <a:p>
+            <a:r>
+              <a:rPr lang="en-US" dirty="0"/>
+              <a:t>Yes… but </a:t>
+            </a:r>
+          </a:p>
+          <a:p>
+            <a:r>
+              <a:rPr lang="en-US" dirty="0"/>
+              <a:t>Commonly leads to marker effects being “over-fit” and not well estimated and a model that cannot be used as well to predict other individuals. </a:t>
+            </a:r>
+          </a:p>
+          <a:p>
+            <a:r>
+              <a:rPr lang="en-US" dirty="0"/>
+              <a:t>Which markers to subset?</a:t>
+            </a:r>
+          </a:p>
+          <a:p>
+            <a:r>
+              <a:rPr lang="en-US" dirty="0"/>
+              <a:t>N&gt;P to get good estimates of marker effects (how much greater depends)</a:t>
+            </a:r>
+          </a:p>
+          <a:p>
+            <a:endParaRPr lang="en-US" dirty="0"/>
+          </a:p>
+          <a:p>
+            <a:endParaRPr lang="en-US" dirty="0"/>
+          </a:p>
+          <a:p>
+            <a:endParaRPr lang="en-US" dirty="0"/>
+          </a:p>
+          <a:p>
+            <a:endParaRPr lang="en-US" dirty="0"/>
+          </a:p>
+        </p:txBody>
+      </p:sp>
+    </p:spTree>
+    <p:extLst>
+      <p:ext uri="{BB962C8B-B14F-4D97-AF65-F5344CB8AC3E}">
+        <p14:creationId xmlns:p14="http://schemas.microsoft.com/office/powerpoint/2010/main" val="2214432749"/>
+      </p:ext>
+    </p:extLst>
+  </p:cSld>
+  <p:clrMapOvr>
+    <a:masterClrMapping/>
+  </p:clrMapOvr>
+</p:sld>
+</file>
+
+<file path=ppt/slides/slide29.xml><?xml version="1.0" encoding="utf-8"?>
+<p:sld xmlns:a="http://schemas.openxmlformats.org/drawingml/2006/main" xmlns:r="http://schemas.openxmlformats.org/officeDocument/2006/relationships" xmlns:p="http://schemas.openxmlformats.org/presentationml/2006/main">
+  <p:cSld>
+    <p:spTree>
+      <p:nvGrpSpPr>
+        <p:cNvPr id="1" name=""/>
+        <p:cNvGrpSpPr/>
+        <p:nvPr/>
+      </p:nvGrpSpPr>
+      <p:grpSpPr>
+        <a:xfrm>
+          <a:off x="0" y="0"/>
+          <a:ext cx="0" cy="0"/>
+          <a:chOff x="0" y="0"/>
+          <a:chExt cx="0" cy="0"/>
+        </a:xfrm>
+      </p:grpSpPr>
+      <p:sp>
+        <p:nvSpPr>
+          <p:cNvPr id="2" name="Title 1">
+            <a:extLst>
+              <a:ext uri="{FF2B5EF4-FFF2-40B4-BE49-F238E27FC236}">
+                <a16:creationId xmlns:a16="http://schemas.microsoft.com/office/drawing/2014/main" id="{2A00BB86-0552-407D-92EE-9FE32B84B398}"/>
+              </a:ext>
+            </a:extLst>
+          </p:cNvPr>
+          <p:cNvSpPr>
+            <a:spLocks noGrp="1"/>
+          </p:cNvSpPr>
+          <p:nvPr>
+            <p:ph type="title"/>
+          </p:nvPr>
+        </p:nvSpPr>
+        <p:spPr/>
+        <p:txBody>
+          <a:bodyPr/>
+          <a:lstStyle/>
+          <a:p>
+            <a:r>
+              <a:rPr lang="en-US" dirty="0"/>
+              <a:t>We can Regularize! </a:t>
+            </a:r>
+          </a:p>
+        </p:txBody>
+      </p:sp>
+      <p:sp>
+        <p:nvSpPr>
+          <p:cNvPr id="3" name="Content Placeholder 2">
+            <a:extLst>
+              <a:ext uri="{FF2B5EF4-FFF2-40B4-BE49-F238E27FC236}">
+                <a16:creationId xmlns:a16="http://schemas.microsoft.com/office/drawing/2014/main" id="{A1C5FD0C-B5E2-49A0-9DFB-5B758348B2BF}"/>
+              </a:ext>
+            </a:extLst>
+          </p:cNvPr>
+          <p:cNvSpPr>
+            <a:spLocks noGrp="1"/>
+          </p:cNvSpPr>
+          <p:nvPr>
+            <p:ph idx="1"/>
+          </p:nvPr>
+        </p:nvSpPr>
+        <p:spPr>
+          <a:xfrm>
+            <a:off x="838200" y="1825625"/>
+            <a:ext cx="10515600" cy="4930776"/>
+          </a:xfrm>
+        </p:spPr>
+        <p:txBody>
+          <a:bodyPr>
+            <a:normAutofit/>
+          </a:bodyPr>
+          <a:lstStyle/>
+          <a:p>
+            <a:r>
+              <a:rPr lang="en-US" dirty="0"/>
+              <a:t>“desensitization” </a:t>
+            </a:r>
+            <a:r>
+              <a:rPr lang="en-US" dirty="0" err="1"/>
+              <a:t>ie</a:t>
+            </a:r>
+            <a:r>
+              <a:rPr lang="en-US" dirty="0"/>
+              <a:t> less sensitive to changes in predictor – introduces a bias during estimation to reduce variance of predictions. </a:t>
+            </a:r>
+          </a:p>
+          <a:p>
+            <a:r>
+              <a:rPr lang="en-US" dirty="0"/>
+              <a:t>In the least squares fit:</a:t>
+            </a:r>
+          </a:p>
+          <a:p>
+            <a:pPr lvl="1"/>
+            <a:r>
+              <a:rPr lang="en-US" dirty="0"/>
+              <a:t>Min(residual</a:t>
+            </a:r>
+            <a:r>
+              <a:rPr lang="en-US" baseline="30000" dirty="0"/>
+              <a:t>2</a:t>
+            </a:r>
+            <a:r>
+              <a:rPr lang="en-US" dirty="0"/>
+              <a:t>) -&gt; Parameters = (X’X)</a:t>
+            </a:r>
+            <a:r>
+              <a:rPr lang="en-US" baseline="30000" dirty="0"/>
+              <a:t>-1 </a:t>
+            </a:r>
+            <a:r>
+              <a:rPr lang="en-US" dirty="0"/>
+              <a:t>XY </a:t>
+            </a:r>
+          </a:p>
+          <a:p>
+            <a:r>
+              <a:rPr lang="en-US" dirty="0"/>
+              <a:t>In a regularized fit:</a:t>
+            </a:r>
+          </a:p>
+          <a:p>
+            <a:pPr lvl="1"/>
+            <a:r>
+              <a:rPr lang="en-US" dirty="0"/>
+              <a:t>Min(residual</a:t>
+            </a:r>
+            <a:r>
+              <a:rPr lang="en-US" baseline="30000" dirty="0"/>
+              <a:t>2 </a:t>
+            </a:r>
+            <a:r>
+              <a:rPr lang="en-US" dirty="0"/>
+              <a:t>+ penalization process</a:t>
+            </a:r>
+            <a:r>
+              <a:rPr lang="en-US" dirty="0">
+                <a:latin typeface="Abadi" panose="020B0604020202020204" pitchFamily="34" charset="0"/>
+              </a:rPr>
+              <a:t>)</a:t>
+            </a:r>
+          </a:p>
+          <a:p>
+            <a:r>
+              <a:rPr lang="en-US" dirty="0"/>
+              <a:t>In ridge regression this is:</a:t>
+            </a:r>
+          </a:p>
+          <a:p>
+            <a:pPr lvl="1"/>
+            <a:r>
+              <a:rPr lang="en-US" dirty="0"/>
+              <a:t>Min(residual</a:t>
+            </a:r>
+            <a:r>
+              <a:rPr lang="en-US" baseline="30000" dirty="0"/>
+              <a:t>2 </a:t>
+            </a:r>
+            <a:r>
+              <a:rPr lang="en-US" dirty="0"/>
+              <a:t>+ λ*</a:t>
+            </a:r>
+            <a:r>
+              <a:rPr lang="en-US" b="1" dirty="0"/>
+              <a:t>Slope Parameters</a:t>
+            </a:r>
+            <a:r>
+              <a:rPr lang="en-US" baseline="30000" dirty="0"/>
+              <a:t>2</a:t>
+            </a:r>
+            <a:r>
+              <a:rPr lang="en-US" dirty="0"/>
+              <a:t>) </a:t>
+            </a:r>
+          </a:p>
+          <a:p>
+            <a:r>
+              <a:rPr lang="en-US" dirty="0"/>
+              <a:t>Ridge regression is equivalent to a BLUP vs a BLUE. </a:t>
+            </a:r>
+          </a:p>
+          <a:p>
+            <a:pPr marL="0" indent="0">
+              <a:buNone/>
+            </a:pPr>
+            <a:endParaRPr lang="en-US" dirty="0"/>
+          </a:p>
+        </p:txBody>
+      </p:sp>
+      <p:sp>
+        <p:nvSpPr>
+          <p:cNvPr id="4" name="Rectangle 1">
+            <a:extLst>
+              <a:ext uri="{FF2B5EF4-FFF2-40B4-BE49-F238E27FC236}">
+                <a16:creationId xmlns:a16="http://schemas.microsoft.com/office/drawing/2014/main" id="{9E16DCD4-DED8-45E6-B2BD-977710A4CFBB}"/>
+              </a:ext>
+            </a:extLst>
+          </p:cNvPr>
+          <p:cNvSpPr>
+            <a:spLocks noChangeArrowheads="1"/>
+          </p:cNvSpPr>
+          <p:nvPr/>
+        </p:nvSpPr>
+        <p:spPr bwMode="auto">
+          <a:xfrm>
+            <a:off x="0" y="0"/>
+            <a:ext cx="12192000" cy="0"/>
+          </a:xfrm>
+          <a:prstGeom prst="rect">
+            <a:avLst/>
+          </a:prstGeom>
+          <a:noFill/>
+          <a:ln>
+            <a:noFill/>
+          </a:ln>
+          <a:effectLst/>
+          <a:extLst>
+            <a:ext uri="{909E8E84-426E-40DD-AFC4-6F175D3DCCD1}">
+              <a14:hiddenFill xmlns:a14="http://schemas.microsoft.com/office/drawing/2010/main">
+                <a:solidFill>
+                  <a:schemeClr val="accent1"/>
+                </a:solidFill>
+              </a14:hiddenFill>
+            </a:ext>
+            <a:ext uri="{91240B29-F687-4F45-9708-019B960494DF}">
+              <a14:hiddenLine xmlns:a14="http://schemas.microsoft.com/office/drawing/2010/main" w="9525">
+                <a:solidFill>
+                  <a:schemeClr val="tx1"/>
+                </a:solidFill>
+                <a:miter lim="800000"/>
+                <a:headEnd/>
+                <a:tailEnd/>
+              </a14:hiddenLine>
+            </a:ext>
+            <a:ext uri="{AF507438-7753-43E0-B8FC-AC1667EBCBE1}">
+              <a14:hiddenEffects xmlns:a14="http://schemas.microsoft.com/office/drawing/2010/main">
+                <a:effectLst>
+                  <a:outerShdw dist="35921" dir="2700000" algn="ctr" rotWithShape="0">
+                    <a:schemeClr val="bg2"/>
+                  </a:outerShdw>
+                </a:effectLst>
+              </a14:hiddenEffects>
+            </a:ext>
+          </a:extLst>
+        </p:spPr>
+        <p:txBody>
+          <a:bodyPr vert="horz" wrap="none" lIns="91440" tIns="45720" rIns="91440" bIns="45720" numCol="1" anchor="ctr" anchorCtr="0" compatLnSpc="1">
+            <a:prstTxWarp prst="textNoShape">
+              <a:avLst/>
+            </a:prstTxWarp>
+            <a:spAutoFit/>
+          </a:bodyPr>
+          <a:lstStyle>
+            <a:lvl1pPr eaLnBrk="0" fontAlgn="base" hangingPunct="0">
+              <a:spcBef>
+                <a:spcPct val="0"/>
+              </a:spcBef>
+              <a:spcAft>
+                <a:spcPct val="0"/>
+              </a:spcAft>
+              <a:defRPr>
+                <a:solidFill>
+                  <a:schemeClr val="tx1"/>
+                </a:solidFill>
+                <a:latin typeface="Arial" panose="020B0604020202020204" pitchFamily="34" charset="0"/>
+              </a:defRPr>
+            </a:lvl1pPr>
+            <a:lvl2pPr eaLnBrk="0" fontAlgn="base" hangingPunct="0">
+              <a:spcBef>
+                <a:spcPct val="0"/>
+              </a:spcBef>
+              <a:spcAft>
+                <a:spcPct val="0"/>
+              </a:spcAft>
+              <a:defRPr>
+                <a:solidFill>
+                  <a:schemeClr val="tx1"/>
+                </a:solidFill>
+                <a:latin typeface="Arial" panose="020B0604020202020204" pitchFamily="34" charset="0"/>
+              </a:defRPr>
+            </a:lvl2pPr>
+            <a:lvl3pPr eaLnBrk="0" fontAlgn="base" hangingPunct="0">
+              <a:spcBef>
+                <a:spcPct val="0"/>
+              </a:spcBef>
+              <a:spcAft>
+                <a:spcPct val="0"/>
+              </a:spcAft>
+              <a:defRPr>
+                <a:solidFill>
+                  <a:schemeClr val="tx1"/>
+                </a:solidFill>
+                <a:latin typeface="Arial" panose="020B0604020202020204" pitchFamily="34" charset="0"/>
+              </a:defRPr>
+            </a:lvl3pPr>
+            <a:lvl4pPr eaLnBrk="0" fontAlgn="base" hangingPunct="0">
+              <a:spcBef>
+                <a:spcPct val="0"/>
+              </a:spcBef>
+              <a:spcAft>
+                <a:spcPct val="0"/>
+              </a:spcAft>
+              <a:defRPr>
+                <a:solidFill>
+                  <a:schemeClr val="tx1"/>
+                </a:solidFill>
+                <a:latin typeface="Arial" panose="020B0604020202020204" pitchFamily="34" charset="0"/>
+              </a:defRPr>
+            </a:lvl4pPr>
+            <a:lvl5pPr eaLnBrk="0" fontAlgn="base" hangingPunct="0">
+              <a:spcBef>
+                <a:spcPct val="0"/>
+              </a:spcBef>
+              <a:spcAft>
+                <a:spcPct val="0"/>
+              </a:spcAft>
+              <a:defRPr>
+                <a:solidFill>
+                  <a:schemeClr val="tx1"/>
+                </a:solidFill>
+                <a:latin typeface="Arial" panose="020B0604020202020204" pitchFamily="34" charset="0"/>
+              </a:defRPr>
+            </a:lvl5pPr>
+            <a:lvl6pPr eaLnBrk="0" fontAlgn="base" hangingPunct="0">
+              <a:spcBef>
+                <a:spcPct val="0"/>
+              </a:spcBef>
+              <a:spcAft>
+                <a:spcPct val="0"/>
+              </a:spcAft>
+              <a:defRPr>
+                <a:solidFill>
+                  <a:schemeClr val="tx1"/>
+                </a:solidFill>
+                <a:latin typeface="Arial" panose="020B0604020202020204" pitchFamily="34" charset="0"/>
+              </a:defRPr>
+            </a:lvl6pPr>
+            <a:lvl7pPr eaLnBrk="0" fontAlgn="base" hangingPunct="0">
+              <a:spcBef>
+                <a:spcPct val="0"/>
+              </a:spcBef>
+              <a:spcAft>
+                <a:spcPct val="0"/>
+              </a:spcAft>
+              <a:defRPr>
+                <a:solidFill>
+                  <a:schemeClr val="tx1"/>
+                </a:solidFill>
+                <a:latin typeface="Arial" panose="020B0604020202020204" pitchFamily="34" charset="0"/>
+              </a:defRPr>
+            </a:lvl7pPr>
+            <a:lvl8pPr eaLnBrk="0" fontAlgn="base" hangingPunct="0">
+              <a:spcBef>
+                <a:spcPct val="0"/>
+              </a:spcBef>
+              <a:spcAft>
+                <a:spcPct val="0"/>
+              </a:spcAft>
+              <a:defRPr>
+                <a:solidFill>
+                  <a:schemeClr val="tx1"/>
+                </a:solidFill>
+                <a:latin typeface="Arial" panose="020B0604020202020204" pitchFamily="34" charset="0"/>
+              </a:defRPr>
+            </a:lvl8pPr>
+            <a:lvl9pPr eaLnBrk="0" fontAlgn="base" hangingPunct="0">
+              <a:spcBef>
+                <a:spcPct val="0"/>
+              </a:spcBef>
+              <a:spcAft>
+                <a:spcPct val="0"/>
+              </a:spcAft>
+              <a:defRPr>
+                <a:solidFill>
+                  <a:schemeClr val="tx1"/>
+                </a:solidFill>
+                <a:latin typeface="Arial" panose="020B0604020202020204" pitchFamily="34" charset="0"/>
+              </a:defRPr>
+            </a:lvl9pPr>
+          </a:lstStyle>
+          <a:p>
+            <a:pPr marL="0" marR="0" lvl="0" indent="0" algn="l" defTabSz="914400" rtl="0" eaLnBrk="0" fontAlgn="base" latinLnBrk="0" hangingPunct="0">
+              <a:lnSpc>
+                <a:spcPct val="100000"/>
+              </a:lnSpc>
+              <a:spcBef>
+                <a:spcPct val="0"/>
+              </a:spcBef>
+              <a:spcAft>
+                <a:spcPct val="0"/>
+              </a:spcAft>
+              <a:buClrTx/>
+              <a:buSzTx/>
+              <a:buFontTx/>
+              <a:buNone/>
+              <a:tabLst/>
+            </a:pPr>
+            <a:r>
+              <a:rPr kumimoji="0" lang="en-US" altLang="en-US" sz="1200" b="0" i="0" u="none" strike="noStrike" cap="none" normalizeH="0" baseline="0">
+                <a:ln>
+                  <a:noFill/>
+                </a:ln>
+                <a:solidFill>
+                  <a:srgbClr val="1C1D1E"/>
+                </a:solidFill>
+                <a:effectLst/>
+                <a:latin typeface="Open Sans"/>
+              </a:rPr>
+              <a:t> </a:t>
+            </a:r>
+            <a:r>
+              <a:rPr kumimoji="0" lang="en-US" altLang="en-US" sz="800" b="0" i="0" u="none" strike="noStrike" cap="none" normalizeH="0" baseline="0">
+                <a:ln>
+                  <a:noFill/>
+                </a:ln>
+                <a:solidFill>
+                  <a:schemeClr val="tx1"/>
+                </a:solidFill>
+                <a:effectLst/>
+              </a:rPr>
+              <a:t>  </a:t>
+            </a:r>
+            <a:r>
+              <a:rPr kumimoji="0" lang="en-US" altLang="en-US" sz="1500" b="0" i="0" u="none" strike="noStrike" cap="none" normalizeH="0" baseline="0">
+                <a:ln>
+                  <a:noFill/>
+                </a:ln>
+                <a:solidFill>
+                  <a:srgbClr val="1C1D1E"/>
+                </a:solidFill>
+                <a:effectLst/>
+                <a:latin typeface="Open Sans"/>
+              </a:rPr>
+              <a:t> </a:t>
+            </a:r>
+            <a:r>
+              <a:rPr kumimoji="0" lang="en-US" altLang="en-US" sz="1200" b="0" i="0" u="none" strike="noStrike" cap="none" normalizeH="0" baseline="0">
+                <a:ln>
+                  <a:noFill/>
+                </a:ln>
+                <a:solidFill>
+                  <a:srgbClr val="1C1D1E"/>
+                </a:solidFill>
+                <a:effectLst/>
+                <a:latin typeface="Open Sans"/>
+              </a:rPr>
+              <a:t>or </a:t>
+            </a:r>
+            <a:r>
+              <a:rPr kumimoji="0" lang="en-US" altLang="en-US" sz="800" b="0" i="0" u="none" strike="noStrike" cap="none" normalizeH="0" baseline="0">
+                <a:ln>
+                  <a:noFill/>
+                </a:ln>
+                <a:solidFill>
+                  <a:schemeClr val="tx1"/>
+                </a:solidFill>
+                <a:effectLst/>
+              </a:rPr>
+              <a:t>  </a:t>
+            </a:r>
+            <a:r>
+              <a:rPr kumimoji="0" lang="en-US" altLang="en-US" sz="1500" b="0" i="0" u="none" strike="noStrike" cap="none" normalizeH="0" baseline="0">
+                <a:ln>
+                  <a:noFill/>
+                </a:ln>
+                <a:solidFill>
+                  <a:schemeClr val="tx1"/>
+                </a:solidFill>
+                <a:effectLst/>
+                <a:latin typeface="Arial" panose="020B0604020202020204" pitchFamily="34" charset="0"/>
+              </a:rPr>
+              <a:t> </a:t>
+            </a:r>
+            <a:endParaRPr kumimoji="0" lang="en-US" altLang="en-US" sz="1800" b="0" i="0" u="none" strike="noStrike" cap="none" normalizeH="0" baseline="0">
+              <a:ln>
+                <a:noFill/>
+              </a:ln>
+              <a:solidFill>
+                <a:schemeClr val="tx1"/>
+              </a:solidFill>
+              <a:effectLst/>
+              <a:latin typeface="Arial" panose="020B0604020202020204" pitchFamily="34" charset="0"/>
+            </a:endParaRPr>
+          </a:p>
+        </p:txBody>
+      </p:sp>
+      <p:pic>
+        <p:nvPicPr>
+          <p:cNvPr id="1027" name="Picture 3" descr="urn:x-wiley:19403372:equation:tpg2plantgenome2011080024-math-0004">
+            <a:extLst>
+              <a:ext uri="{FF2B5EF4-FFF2-40B4-BE49-F238E27FC236}">
+                <a16:creationId xmlns:a16="http://schemas.microsoft.com/office/drawing/2014/main" id="{4EC14A8C-6433-4DB9-8BAE-5674CD44AAC4}"/>
+              </a:ext>
+            </a:extLst>
+          </p:cNvPr>
+          <p:cNvPicPr>
+            <a:picLocks noChangeAspect="1" noChangeArrowheads="1"/>
+          </p:cNvPicPr>
+          <p:nvPr/>
+        </p:nvPicPr>
+        <p:blipFill>
+          <a:blip r:embed="rId2">
+            <a:extLst>
+              <a:ext uri="{28A0092B-C50C-407E-A947-70E740481C1C}">
+                <a14:useLocalDpi xmlns:a14="http://schemas.microsoft.com/office/drawing/2010/main" val="0"/>
+              </a:ext>
+            </a:extLst>
+          </a:blip>
+          <a:srcRect/>
+          <a:stretch>
+            <a:fillRect/>
+          </a:stretch>
+        </p:blipFill>
+        <p:spPr bwMode="auto">
+          <a:xfrm>
+            <a:off x="6807044" y="4917688"/>
+            <a:ext cx="2532446" cy="424907"/>
+          </a:xfrm>
+          <a:prstGeom prst="rect">
+            <a:avLst/>
+          </a:prstGeom>
+          <a:noFill/>
+          <a:extLst>
+            <a:ext uri="{909E8E84-426E-40DD-AFC4-6F175D3DCCD1}">
+              <a14:hiddenFill xmlns:a14="http://schemas.microsoft.com/office/drawing/2010/main">
+                <a:solidFill>
+                  <a:srgbClr val="FFFFFF"/>
+                </a:solidFill>
+              </a14:hiddenFill>
+            </a:ext>
+          </a:extLst>
+        </p:spPr>
+      </p:pic>
+    </p:spTree>
+    <p:extLst>
+      <p:ext uri="{BB962C8B-B14F-4D97-AF65-F5344CB8AC3E}">
+        <p14:creationId xmlns:p14="http://schemas.microsoft.com/office/powerpoint/2010/main" val="3264755123"/>
+      </p:ext>
+    </p:extLst>
+  </p:cSld>
+  <p:clrMapOvr>
+    <a:masterClrMapping/>
+  </p:clrMapOvr>
+</p:sld>
+</file>
+
+<file path=ppt/slides/slide3.xml><?xml version="1.0" encoding="utf-8"?>
 <p:sld xmlns:a="http://schemas.openxmlformats.org/drawingml/2006/main" xmlns:r="http://schemas.openxmlformats.org/officeDocument/2006/relationships" xmlns:p="http://schemas.openxmlformats.org/presentationml/2006/main">
   <p:cSld>
     <p:spTree>
@@ -43856,1104 +45737,7 @@
 </p:sld>
 </file>
 
-<file path=ppt/slides/slide20.xml><?xml version="1.0" encoding="utf-8"?>
-<p:sld xmlns:a="http://schemas.openxmlformats.org/drawingml/2006/main" xmlns:r="http://schemas.openxmlformats.org/officeDocument/2006/relationships" xmlns:p="http://schemas.openxmlformats.org/presentationml/2006/main">
-  <p:cSld>
-    <p:spTree>
-      <p:nvGrpSpPr>
-        <p:cNvPr id="1" name=""/>
-        <p:cNvGrpSpPr/>
-        <p:nvPr/>
-      </p:nvGrpSpPr>
-      <p:grpSpPr>
-        <a:xfrm>
-          <a:off x="0" y="0"/>
-          <a:ext cx="0" cy="0"/>
-          <a:chOff x="0" y="0"/>
-          <a:chExt cx="0" cy="0"/>
-        </a:xfrm>
-      </p:grpSpPr>
-      <p:sp>
-        <p:nvSpPr>
-          <p:cNvPr id="2" name="Title 1">
-            <a:extLst>
-              <a:ext uri="{FF2B5EF4-FFF2-40B4-BE49-F238E27FC236}">
-                <a16:creationId xmlns:a16="http://schemas.microsoft.com/office/drawing/2014/main" id="{1E9BCD57-A934-4961-9271-7D3358F3013E}"/>
-              </a:ext>
-            </a:extLst>
-          </p:cNvPr>
-          <p:cNvSpPr>
-            <a:spLocks noGrp="1"/>
-          </p:cNvSpPr>
-          <p:nvPr>
-            <p:ph type="title"/>
-          </p:nvPr>
-        </p:nvSpPr>
-        <p:spPr/>
-        <p:txBody>
-          <a:bodyPr/>
-          <a:lstStyle/>
-          <a:p>
-            <a:r>
-              <a:rPr lang="en-US" dirty="0"/>
-              <a:t>Let’s jump to R</a:t>
-            </a:r>
-          </a:p>
-        </p:txBody>
-      </p:sp>
-      <p:sp>
-        <p:nvSpPr>
-          <p:cNvPr id="3" name="Content Placeholder 2">
-            <a:extLst>
-              <a:ext uri="{FF2B5EF4-FFF2-40B4-BE49-F238E27FC236}">
-                <a16:creationId xmlns:a16="http://schemas.microsoft.com/office/drawing/2014/main" id="{F1FC7A70-D3FE-4D9C-AF7D-2238B03DA661}"/>
-              </a:ext>
-            </a:extLst>
-          </p:cNvPr>
-          <p:cNvSpPr>
-            <a:spLocks noGrp="1"/>
-          </p:cNvSpPr>
-          <p:nvPr>
-            <p:ph idx="1"/>
-          </p:nvPr>
-        </p:nvSpPr>
-        <p:spPr/>
-        <p:txBody>
-          <a:bodyPr/>
-          <a:lstStyle/>
-          <a:p>
-            <a:r>
-              <a:rPr lang="en-US" dirty="0"/>
-              <a:t>We are going to simulate:</a:t>
-            </a:r>
-          </a:p>
-          <a:p>
-            <a:pPr lvl="1"/>
-            <a:r>
-              <a:rPr lang="en-US" dirty="0"/>
-              <a:t>Our 5 loci model with equal marker effects,</a:t>
-            </a:r>
-          </a:p>
-          <a:p>
-            <a:pPr lvl="1"/>
-            <a:r>
-              <a:rPr lang="en-US" dirty="0"/>
-              <a:t>Our 5 loci model with random effects</a:t>
-            </a:r>
-          </a:p>
-          <a:p>
-            <a:pPr lvl="1"/>
-            <a:r>
-              <a:rPr lang="en-US" dirty="0"/>
-              <a:t>Extend this to 200 loci with</a:t>
-            </a:r>
-          </a:p>
-          <a:p>
-            <a:pPr lvl="2"/>
-            <a:r>
-              <a:rPr lang="en-US" dirty="0"/>
-              <a:t>Equal marker effects</a:t>
-            </a:r>
-          </a:p>
-          <a:p>
-            <a:pPr lvl="2"/>
-            <a:r>
-              <a:rPr lang="en-US" dirty="0"/>
-              <a:t>Single large effect markers</a:t>
-            </a:r>
-          </a:p>
-          <a:p>
-            <a:pPr lvl="2"/>
-            <a:r>
-              <a:rPr lang="en-US" dirty="0"/>
-              <a:t>Randomly assigned marker effects</a:t>
-            </a:r>
-          </a:p>
-          <a:p>
-            <a:pPr lvl="1"/>
-            <a:endParaRPr lang="en-US" dirty="0"/>
-          </a:p>
-        </p:txBody>
-      </p:sp>
-    </p:spTree>
-    <p:extLst>
-      <p:ext uri="{BB962C8B-B14F-4D97-AF65-F5344CB8AC3E}">
-        <p14:creationId xmlns:p14="http://schemas.microsoft.com/office/powerpoint/2010/main" val="519978926"/>
-      </p:ext>
-    </p:extLst>
-  </p:cSld>
-  <p:clrMapOvr>
-    <a:masterClrMapping/>
-  </p:clrMapOvr>
-</p:sld>
-</file>
-
-<file path=ppt/slides/slide21.xml><?xml version="1.0" encoding="utf-8"?>
-<p:sld xmlns:a="http://schemas.openxmlformats.org/drawingml/2006/main" xmlns:r="http://schemas.openxmlformats.org/officeDocument/2006/relationships" xmlns:p="http://schemas.openxmlformats.org/presentationml/2006/main">
-  <p:cSld>
-    <p:spTree>
-      <p:nvGrpSpPr>
-        <p:cNvPr id="1" name=""/>
-        <p:cNvGrpSpPr/>
-        <p:nvPr/>
-      </p:nvGrpSpPr>
-      <p:grpSpPr>
-        <a:xfrm>
-          <a:off x="0" y="0"/>
-          <a:ext cx="0" cy="0"/>
-          <a:chOff x="0" y="0"/>
-          <a:chExt cx="0" cy="0"/>
-        </a:xfrm>
-      </p:grpSpPr>
-      <p:sp>
-        <p:nvSpPr>
-          <p:cNvPr id="2" name="Title 1">
-            <a:extLst>
-              <a:ext uri="{FF2B5EF4-FFF2-40B4-BE49-F238E27FC236}">
-                <a16:creationId xmlns:a16="http://schemas.microsoft.com/office/drawing/2014/main" id="{6A3111EC-B405-4FCF-9C89-1E1AC4530A38}"/>
-              </a:ext>
-            </a:extLst>
-          </p:cNvPr>
-          <p:cNvSpPr>
-            <a:spLocks noGrp="1"/>
-          </p:cNvSpPr>
-          <p:nvPr>
-            <p:ph type="title"/>
-          </p:nvPr>
-        </p:nvSpPr>
-        <p:spPr>
-          <a:xfrm>
-            <a:off x="838200" y="365125"/>
-            <a:ext cx="10515600" cy="2260600"/>
-          </a:xfrm>
-        </p:spPr>
-        <p:txBody>
-          <a:bodyPr>
-            <a:normAutofit fontScale="90000"/>
-          </a:bodyPr>
-          <a:lstStyle/>
-          <a:p>
-            <a:r>
-              <a:rPr lang="en-US" dirty="0"/>
-              <a:t>We’ve seen we can make models based on the physiology and the sequence information and these models mimic the phenotypic distribution we see.</a:t>
-            </a:r>
-          </a:p>
-        </p:txBody>
-      </p:sp>
-      <p:sp>
-        <p:nvSpPr>
-          <p:cNvPr id="3" name="Content Placeholder 2">
-            <a:extLst>
-              <a:ext uri="{FF2B5EF4-FFF2-40B4-BE49-F238E27FC236}">
-                <a16:creationId xmlns:a16="http://schemas.microsoft.com/office/drawing/2014/main" id="{7F36EC7A-6CEA-4416-ABF1-190B41ADFF11}"/>
-              </a:ext>
-            </a:extLst>
-          </p:cNvPr>
-          <p:cNvSpPr>
-            <a:spLocks noGrp="1"/>
-          </p:cNvSpPr>
-          <p:nvPr>
-            <p:ph idx="1"/>
-          </p:nvPr>
-        </p:nvSpPr>
-        <p:spPr>
-          <a:xfrm>
-            <a:off x="660400" y="2625725"/>
-            <a:ext cx="10515600" cy="3559175"/>
-          </a:xfrm>
-        </p:spPr>
-        <p:txBody>
-          <a:bodyPr/>
-          <a:lstStyle/>
-          <a:p>
-            <a:r>
-              <a:rPr lang="en-US" dirty="0"/>
-              <a:t>How do we proceed next?</a:t>
-            </a:r>
-          </a:p>
-          <a:p>
-            <a:r>
-              <a:rPr lang="en-US" dirty="0"/>
-              <a:t>In reality we will have the phenotypes (estimated breeding values) and our genotypes</a:t>
-            </a:r>
-          </a:p>
-          <a:p>
-            <a:r>
-              <a:rPr lang="en-US" dirty="0"/>
-              <a:t>We do not know the marker effects – can we estimate them? </a:t>
-            </a:r>
-          </a:p>
-          <a:p>
-            <a:r>
-              <a:rPr lang="en-US" dirty="0"/>
-              <a:t>That is where regression comes in!</a:t>
-            </a:r>
-          </a:p>
-        </p:txBody>
-      </p:sp>
-    </p:spTree>
-    <p:extLst>
-      <p:ext uri="{BB962C8B-B14F-4D97-AF65-F5344CB8AC3E}">
-        <p14:creationId xmlns:p14="http://schemas.microsoft.com/office/powerpoint/2010/main" val="3330138882"/>
-      </p:ext>
-    </p:extLst>
-  </p:cSld>
-  <p:clrMapOvr>
-    <a:masterClrMapping/>
-  </p:clrMapOvr>
-</p:sld>
-</file>
-
-<file path=ppt/slides/slide22.xml><?xml version="1.0" encoding="utf-8"?>
-<p:sld xmlns:a="http://schemas.openxmlformats.org/drawingml/2006/main" xmlns:r="http://schemas.openxmlformats.org/officeDocument/2006/relationships" xmlns:p="http://schemas.openxmlformats.org/presentationml/2006/main">
-  <p:cSld>
-    <p:spTree>
-      <p:nvGrpSpPr>
-        <p:cNvPr id="1" name=""/>
-        <p:cNvGrpSpPr/>
-        <p:nvPr/>
-      </p:nvGrpSpPr>
-      <p:grpSpPr>
-        <a:xfrm>
-          <a:off x="0" y="0"/>
-          <a:ext cx="0" cy="0"/>
-          <a:chOff x="0" y="0"/>
-          <a:chExt cx="0" cy="0"/>
-        </a:xfrm>
-      </p:grpSpPr>
-      <p:sp>
-        <p:nvSpPr>
-          <p:cNvPr id="2" name="Title 1">
-            <a:extLst>
-              <a:ext uri="{FF2B5EF4-FFF2-40B4-BE49-F238E27FC236}">
-                <a16:creationId xmlns:a16="http://schemas.microsoft.com/office/drawing/2014/main" id="{7DD32426-0CBB-42ED-A9BB-238C22C68A88}"/>
-              </a:ext>
-            </a:extLst>
-          </p:cNvPr>
-          <p:cNvSpPr>
-            <a:spLocks noGrp="1"/>
-          </p:cNvSpPr>
-          <p:nvPr>
-            <p:ph type="title"/>
-          </p:nvPr>
-        </p:nvSpPr>
-        <p:spPr/>
-        <p:txBody>
-          <a:bodyPr/>
-          <a:lstStyle/>
-          <a:p>
-            <a:r>
-              <a:rPr lang="en-US" dirty="0"/>
-              <a:t>What is regression? </a:t>
-            </a:r>
-          </a:p>
-        </p:txBody>
-      </p:sp>
-      <p:sp>
-        <p:nvSpPr>
-          <p:cNvPr id="3" name="Content Placeholder 2">
-            <a:extLst>
-              <a:ext uri="{FF2B5EF4-FFF2-40B4-BE49-F238E27FC236}">
-                <a16:creationId xmlns:a16="http://schemas.microsoft.com/office/drawing/2014/main" id="{34420326-A596-43B6-BF5E-EA714CFED70B}"/>
-              </a:ext>
-            </a:extLst>
-          </p:cNvPr>
-          <p:cNvSpPr>
-            <a:spLocks noGrp="1"/>
-          </p:cNvSpPr>
-          <p:nvPr>
-            <p:ph idx="1"/>
-          </p:nvPr>
-        </p:nvSpPr>
-        <p:spPr/>
-        <p:txBody>
-          <a:bodyPr/>
-          <a:lstStyle/>
-          <a:p>
-            <a:r>
-              <a:rPr lang="en-US" dirty="0"/>
-              <a:t>Fitting a line to data:</a:t>
-            </a:r>
-          </a:p>
-        </p:txBody>
-      </p:sp>
-      <p:pic>
-        <p:nvPicPr>
-          <p:cNvPr id="4" name="Picture 3">
-            <a:extLst>
-              <a:ext uri="{FF2B5EF4-FFF2-40B4-BE49-F238E27FC236}">
-                <a16:creationId xmlns:a16="http://schemas.microsoft.com/office/drawing/2014/main" id="{F0A82382-85FB-49C0-A136-3B73A522DA47}"/>
-              </a:ext>
-            </a:extLst>
-          </p:cNvPr>
-          <p:cNvPicPr>
-            <a:picLocks noChangeAspect="1"/>
-          </p:cNvPicPr>
-          <p:nvPr/>
-        </p:nvPicPr>
-        <p:blipFill>
-          <a:blip r:embed="rId2"/>
-          <a:stretch>
-            <a:fillRect/>
-          </a:stretch>
-        </p:blipFill>
-        <p:spPr>
-          <a:xfrm>
-            <a:off x="673305" y="2420222"/>
-            <a:ext cx="4508090" cy="3756741"/>
-          </a:xfrm>
-          <a:prstGeom prst="rect">
-            <a:avLst/>
-          </a:prstGeom>
-        </p:spPr>
-      </p:pic>
-      <p:cxnSp>
-        <p:nvCxnSpPr>
-          <p:cNvPr id="6" name="Straight Arrow Connector 5">
-            <a:extLst>
-              <a:ext uri="{FF2B5EF4-FFF2-40B4-BE49-F238E27FC236}">
-                <a16:creationId xmlns:a16="http://schemas.microsoft.com/office/drawing/2014/main" id="{6DEF197B-ECA0-4352-9AA5-697B2F064993}"/>
-              </a:ext>
-            </a:extLst>
-          </p:cNvPr>
-          <p:cNvCxnSpPr>
-            <a:cxnSpLocks/>
-            <a:stCxn id="4" idx="3"/>
-          </p:cNvCxnSpPr>
-          <p:nvPr/>
-        </p:nvCxnSpPr>
-        <p:spPr>
-          <a:xfrm>
-            <a:off x="5181395" y="4298593"/>
-            <a:ext cx="1311235" cy="630380"/>
-          </a:xfrm>
-          <a:prstGeom prst="straightConnector1">
-            <a:avLst/>
-          </a:prstGeom>
-          <a:ln w="38100">
-            <a:tailEnd type="triangle"/>
-          </a:ln>
-        </p:spPr>
-        <p:style>
-          <a:lnRef idx="1">
-            <a:schemeClr val="accent1"/>
-          </a:lnRef>
-          <a:fillRef idx="0">
-            <a:schemeClr val="accent1"/>
-          </a:fillRef>
-          <a:effectRef idx="0">
-            <a:schemeClr val="accent1"/>
-          </a:effectRef>
-          <a:fontRef idx="minor">
-            <a:schemeClr val="tx1"/>
-          </a:fontRef>
-        </p:style>
-      </p:cxnSp>
-      <p:pic>
-        <p:nvPicPr>
-          <p:cNvPr id="7" name="Picture 6">
-            <a:extLst>
-              <a:ext uri="{FF2B5EF4-FFF2-40B4-BE49-F238E27FC236}">
-                <a16:creationId xmlns:a16="http://schemas.microsoft.com/office/drawing/2014/main" id="{DBC8F6CB-4DDE-4FB6-9624-4CD0351D8677}"/>
-              </a:ext>
-            </a:extLst>
-          </p:cNvPr>
-          <p:cNvPicPr>
-            <a:picLocks noChangeAspect="1"/>
-          </p:cNvPicPr>
-          <p:nvPr/>
-        </p:nvPicPr>
-        <p:blipFill>
-          <a:blip r:embed="rId3"/>
-          <a:stretch>
-            <a:fillRect/>
-          </a:stretch>
-        </p:blipFill>
-        <p:spPr>
-          <a:xfrm>
-            <a:off x="6492630" y="3177747"/>
-            <a:ext cx="5204070" cy="3527853"/>
-          </a:xfrm>
-          <a:prstGeom prst="rect">
-            <a:avLst/>
-          </a:prstGeom>
-        </p:spPr>
-      </p:pic>
-    </p:spTree>
-    <p:extLst>
-      <p:ext uri="{BB962C8B-B14F-4D97-AF65-F5344CB8AC3E}">
-        <p14:creationId xmlns:p14="http://schemas.microsoft.com/office/powerpoint/2010/main" val="944347445"/>
-      </p:ext>
-    </p:extLst>
-  </p:cSld>
-  <p:clrMapOvr>
-    <a:masterClrMapping/>
-  </p:clrMapOvr>
-</p:sld>
-</file>
-
-<file path=ppt/slides/slide23.xml><?xml version="1.0" encoding="utf-8"?>
-<p:sld xmlns:a="http://schemas.openxmlformats.org/drawingml/2006/main" xmlns:r="http://schemas.openxmlformats.org/officeDocument/2006/relationships" xmlns:p="http://schemas.openxmlformats.org/presentationml/2006/main">
-  <p:cSld>
-    <p:spTree>
-      <p:nvGrpSpPr>
-        <p:cNvPr id="1" name=""/>
-        <p:cNvGrpSpPr/>
-        <p:nvPr/>
-      </p:nvGrpSpPr>
-      <p:grpSpPr>
-        <a:xfrm>
-          <a:off x="0" y="0"/>
-          <a:ext cx="0" cy="0"/>
-          <a:chOff x="0" y="0"/>
-          <a:chExt cx="0" cy="0"/>
-        </a:xfrm>
-      </p:grpSpPr>
-      <p:sp>
-        <p:nvSpPr>
-          <p:cNvPr id="2" name="Title 1">
-            <a:extLst>
-              <a:ext uri="{FF2B5EF4-FFF2-40B4-BE49-F238E27FC236}">
-                <a16:creationId xmlns:a16="http://schemas.microsoft.com/office/drawing/2014/main" id="{0E7097DF-88E2-41DF-938D-E1FDFBFF1580}"/>
-              </a:ext>
-            </a:extLst>
-          </p:cNvPr>
-          <p:cNvSpPr>
-            <a:spLocks noGrp="1"/>
-          </p:cNvSpPr>
-          <p:nvPr>
-            <p:ph type="title"/>
-          </p:nvPr>
-        </p:nvSpPr>
-        <p:spPr/>
-        <p:txBody>
-          <a:bodyPr/>
-          <a:lstStyle/>
-          <a:p>
-            <a:r>
-              <a:rPr lang="en-US" dirty="0"/>
-              <a:t>How do we do that?</a:t>
-            </a:r>
-          </a:p>
-        </p:txBody>
-      </p:sp>
-      <p:sp>
-        <p:nvSpPr>
-          <p:cNvPr id="3" name="Content Placeholder 2">
-            <a:extLst>
-              <a:ext uri="{FF2B5EF4-FFF2-40B4-BE49-F238E27FC236}">
-                <a16:creationId xmlns:a16="http://schemas.microsoft.com/office/drawing/2014/main" id="{4635633E-1633-40FB-97A9-E68DBDA0004F}"/>
-              </a:ext>
-            </a:extLst>
-          </p:cNvPr>
-          <p:cNvSpPr>
-            <a:spLocks noGrp="1"/>
-          </p:cNvSpPr>
-          <p:nvPr>
-            <p:ph idx="1"/>
-          </p:nvPr>
-        </p:nvSpPr>
-        <p:spPr/>
-        <p:txBody>
-          <a:bodyPr/>
-          <a:lstStyle/>
-          <a:p>
-            <a:r>
-              <a:rPr lang="en-US" dirty="0"/>
-              <a:t>We find the least squares estimator = Maximum likelihood estimator</a:t>
-            </a:r>
-          </a:p>
-          <a:p>
-            <a:endParaRPr lang="en-US" dirty="0"/>
-          </a:p>
-          <a:p>
-            <a:r>
-              <a:rPr lang="en-US" dirty="0"/>
-              <a:t>Lets work out a small example – white board!</a:t>
-            </a:r>
-          </a:p>
-          <a:p>
-            <a:endParaRPr lang="en-US" dirty="0"/>
-          </a:p>
-          <a:p>
-            <a:r>
-              <a:rPr lang="en-US" dirty="0"/>
-              <a:t>Likelihood vs probability </a:t>
-            </a:r>
-          </a:p>
-        </p:txBody>
-      </p:sp>
-    </p:spTree>
-    <p:extLst>
-      <p:ext uri="{BB962C8B-B14F-4D97-AF65-F5344CB8AC3E}">
-        <p14:creationId xmlns:p14="http://schemas.microsoft.com/office/powerpoint/2010/main" val="1592822334"/>
-      </p:ext>
-    </p:extLst>
-  </p:cSld>
-  <p:clrMapOvr>
-    <a:masterClrMapping/>
-  </p:clrMapOvr>
-</p:sld>
-</file>
-
-<file path=ppt/slides/slide24.xml><?xml version="1.0" encoding="utf-8"?>
-<p:sld xmlns:a="http://schemas.openxmlformats.org/drawingml/2006/main" xmlns:r="http://schemas.openxmlformats.org/officeDocument/2006/relationships" xmlns:p="http://schemas.openxmlformats.org/presentationml/2006/main">
-  <p:cSld>
-    <p:spTree>
-      <p:nvGrpSpPr>
-        <p:cNvPr id="1" name=""/>
-        <p:cNvGrpSpPr/>
-        <p:nvPr/>
-      </p:nvGrpSpPr>
-      <p:grpSpPr>
-        <a:xfrm>
-          <a:off x="0" y="0"/>
-          <a:ext cx="0" cy="0"/>
-          <a:chOff x="0" y="0"/>
-          <a:chExt cx="0" cy="0"/>
-        </a:xfrm>
-      </p:grpSpPr>
-      <p:sp>
-        <p:nvSpPr>
-          <p:cNvPr id="2" name="Title 1">
-            <a:extLst>
-              <a:ext uri="{FF2B5EF4-FFF2-40B4-BE49-F238E27FC236}">
-                <a16:creationId xmlns:a16="http://schemas.microsoft.com/office/drawing/2014/main" id="{E8F578A4-D5B6-4ED6-AB89-D2343D32205A}"/>
-              </a:ext>
-            </a:extLst>
-          </p:cNvPr>
-          <p:cNvSpPr>
-            <a:spLocks noGrp="1"/>
-          </p:cNvSpPr>
-          <p:nvPr>
-            <p:ph type="title"/>
-          </p:nvPr>
-        </p:nvSpPr>
-        <p:spPr/>
-        <p:txBody>
-          <a:bodyPr/>
-          <a:lstStyle/>
-          <a:p>
-            <a:r>
-              <a:rPr lang="en-US" dirty="0"/>
-              <a:t>How does this help us find marker effects?</a:t>
-            </a:r>
-          </a:p>
-        </p:txBody>
-      </p:sp>
-      <p:pic>
-        <p:nvPicPr>
-          <p:cNvPr id="10" name="Picture 9">
-            <a:extLst>
-              <a:ext uri="{FF2B5EF4-FFF2-40B4-BE49-F238E27FC236}">
-                <a16:creationId xmlns:a16="http://schemas.microsoft.com/office/drawing/2014/main" id="{42359743-658E-436D-80F0-CE508A7FC942}"/>
-              </a:ext>
-            </a:extLst>
-          </p:cNvPr>
-          <p:cNvPicPr>
-            <a:picLocks noChangeAspect="1"/>
-          </p:cNvPicPr>
-          <p:nvPr/>
-        </p:nvPicPr>
-        <p:blipFill>
-          <a:blip r:embed="rId2"/>
-          <a:stretch>
-            <a:fillRect/>
-          </a:stretch>
-        </p:blipFill>
-        <p:spPr>
-          <a:xfrm>
-            <a:off x="6692902" y="2629985"/>
-            <a:ext cx="5035120" cy="3419024"/>
-          </a:xfrm>
-          <a:prstGeom prst="rect">
-            <a:avLst/>
-          </a:prstGeom>
-        </p:spPr>
-      </p:pic>
-      <p:sp>
-        <p:nvSpPr>
-          <p:cNvPr id="11" name="Content Placeholder 2">
-            <a:extLst>
-              <a:ext uri="{FF2B5EF4-FFF2-40B4-BE49-F238E27FC236}">
-                <a16:creationId xmlns:a16="http://schemas.microsoft.com/office/drawing/2014/main" id="{308AA01F-202D-486B-A6C8-9DAE18834132}"/>
-              </a:ext>
-            </a:extLst>
-          </p:cNvPr>
-          <p:cNvSpPr>
-            <a:spLocks noGrp="1"/>
-          </p:cNvSpPr>
-          <p:nvPr>
-            <p:ph idx="1"/>
-          </p:nvPr>
-        </p:nvSpPr>
-        <p:spPr>
-          <a:xfrm>
-            <a:off x="838200" y="1825625"/>
-            <a:ext cx="5676900" cy="4667250"/>
-          </a:xfrm>
-        </p:spPr>
-        <p:txBody>
-          <a:bodyPr>
-            <a:normAutofit/>
-          </a:bodyPr>
-          <a:lstStyle/>
-          <a:p>
-            <a:r>
-              <a:rPr lang="en-US" dirty="0"/>
-              <a:t>The difference in marker scores is a linear regression where X takes on two values {0,1}. This is basically the same as an ANOVA.</a:t>
-            </a:r>
-          </a:p>
-          <a:p>
-            <a:r>
-              <a:rPr lang="en-US" dirty="0"/>
-              <a:t>Remember though, we may have lots of markers that we need to solve for simultaneously.</a:t>
-            </a:r>
-          </a:p>
-          <a:p>
-            <a:r>
-              <a:rPr lang="en-US" dirty="0"/>
-              <a:t>This is called multiple linear regression</a:t>
-            </a:r>
-          </a:p>
-        </p:txBody>
-      </p:sp>
-    </p:spTree>
-    <p:extLst>
-      <p:ext uri="{BB962C8B-B14F-4D97-AF65-F5344CB8AC3E}">
-        <p14:creationId xmlns:p14="http://schemas.microsoft.com/office/powerpoint/2010/main" val="1569912516"/>
-      </p:ext>
-    </p:extLst>
-  </p:cSld>
-  <p:clrMapOvr>
-    <a:masterClrMapping/>
-  </p:clrMapOvr>
-</p:sld>
-</file>
-
-<file path=ppt/slides/slide25.xml><?xml version="1.0" encoding="utf-8"?>
-<p:sld xmlns:a="http://schemas.openxmlformats.org/drawingml/2006/main" xmlns:r="http://schemas.openxmlformats.org/officeDocument/2006/relationships" xmlns:p="http://schemas.openxmlformats.org/presentationml/2006/main">
-  <p:cSld>
-    <p:spTree>
-      <p:nvGrpSpPr>
-        <p:cNvPr id="1" name=""/>
-        <p:cNvGrpSpPr/>
-        <p:nvPr/>
-      </p:nvGrpSpPr>
-      <p:grpSpPr>
-        <a:xfrm>
-          <a:off x="0" y="0"/>
-          <a:ext cx="0" cy="0"/>
-          <a:chOff x="0" y="0"/>
-          <a:chExt cx="0" cy="0"/>
-        </a:xfrm>
-      </p:grpSpPr>
-      <p:sp>
-        <p:nvSpPr>
-          <p:cNvPr id="2" name="Title 1">
-            <a:extLst>
-              <a:ext uri="{FF2B5EF4-FFF2-40B4-BE49-F238E27FC236}">
-                <a16:creationId xmlns:a16="http://schemas.microsoft.com/office/drawing/2014/main" id="{FE24D50C-D80C-428B-9003-686128220FDA}"/>
-              </a:ext>
-            </a:extLst>
-          </p:cNvPr>
-          <p:cNvSpPr>
-            <a:spLocks noGrp="1"/>
-          </p:cNvSpPr>
-          <p:nvPr>
-            <p:ph type="title"/>
-          </p:nvPr>
-        </p:nvSpPr>
-        <p:spPr/>
-        <p:txBody>
-          <a:bodyPr/>
-          <a:lstStyle/>
-          <a:p>
-            <a:r>
-              <a:rPr lang="en-US" dirty="0"/>
-              <a:t>N &lt; P problem</a:t>
-            </a:r>
-          </a:p>
-        </p:txBody>
-      </p:sp>
-      <p:sp>
-        <p:nvSpPr>
-          <p:cNvPr id="3" name="Content Placeholder 2">
-            <a:extLst>
-              <a:ext uri="{FF2B5EF4-FFF2-40B4-BE49-F238E27FC236}">
-                <a16:creationId xmlns:a16="http://schemas.microsoft.com/office/drawing/2014/main" id="{299D1946-6411-4B0B-9B86-42E792102361}"/>
-              </a:ext>
-            </a:extLst>
-          </p:cNvPr>
-          <p:cNvSpPr>
-            <a:spLocks noGrp="1"/>
-          </p:cNvSpPr>
-          <p:nvPr>
-            <p:ph idx="1"/>
-          </p:nvPr>
-        </p:nvSpPr>
-        <p:spPr>
-          <a:xfrm>
-            <a:off x="838200" y="1690688"/>
-            <a:ext cx="10515600" cy="4729163"/>
-          </a:xfrm>
-        </p:spPr>
-        <p:txBody>
-          <a:bodyPr/>
-          <a:lstStyle/>
-          <a:p>
-            <a:r>
-              <a:rPr lang="en-US" dirty="0"/>
-              <a:t>In a linear system of equations (think back to algebra) one has to have more equations than predictors are being solved for:</a:t>
-            </a:r>
-          </a:p>
-          <a:p>
-            <a:pPr lvl="1"/>
-            <a:r>
-              <a:rPr lang="en-US" dirty="0"/>
-              <a:t>In order for a unique solution to exist the number of observations (N) has to be greater than the number of predictors (P).</a:t>
-            </a:r>
-          </a:p>
-          <a:p>
-            <a:pPr lvl="1"/>
-            <a:r>
-              <a:rPr lang="en-US" dirty="0"/>
-              <a:t>In the context of genomic selection this means we need more observations of genetically unique individuals than we have markers.</a:t>
-            </a:r>
-          </a:p>
-          <a:p>
-            <a:pPr lvl="1"/>
-            <a:r>
-              <a:rPr lang="en-US" dirty="0"/>
-              <a:t>Commonly 1000’s or greater markers are used, but phenotyping any number of individuals can be very challenging. </a:t>
-            </a:r>
-          </a:p>
-        </p:txBody>
-      </p:sp>
-    </p:spTree>
-    <p:extLst>
-      <p:ext uri="{BB962C8B-B14F-4D97-AF65-F5344CB8AC3E}">
-        <p14:creationId xmlns:p14="http://schemas.microsoft.com/office/powerpoint/2010/main" val="1500212203"/>
-      </p:ext>
-    </p:extLst>
-  </p:cSld>
-  <p:clrMapOvr>
-    <a:masterClrMapping/>
-  </p:clrMapOvr>
-</p:sld>
-</file>
-
-<file path=ppt/slides/slide26.xml><?xml version="1.0" encoding="utf-8"?>
-<p:sld xmlns:a="http://schemas.openxmlformats.org/drawingml/2006/main" xmlns:r="http://schemas.openxmlformats.org/officeDocument/2006/relationships" xmlns:p="http://schemas.openxmlformats.org/presentationml/2006/main">
-  <p:cSld>
-    <p:spTree>
-      <p:nvGrpSpPr>
-        <p:cNvPr id="1" name=""/>
-        <p:cNvGrpSpPr/>
-        <p:nvPr/>
-      </p:nvGrpSpPr>
-      <p:grpSpPr>
-        <a:xfrm>
-          <a:off x="0" y="0"/>
-          <a:ext cx="0" cy="0"/>
-          <a:chOff x="0" y="0"/>
-          <a:chExt cx="0" cy="0"/>
-        </a:xfrm>
-      </p:grpSpPr>
-      <p:sp>
-        <p:nvSpPr>
-          <p:cNvPr id="2" name="Title 1">
-            <a:extLst>
-              <a:ext uri="{FF2B5EF4-FFF2-40B4-BE49-F238E27FC236}">
-                <a16:creationId xmlns:a16="http://schemas.microsoft.com/office/drawing/2014/main" id="{762B22C4-40C5-4873-890D-C5BF1EA84377}"/>
-              </a:ext>
-            </a:extLst>
-          </p:cNvPr>
-          <p:cNvSpPr>
-            <a:spLocks noGrp="1"/>
-          </p:cNvSpPr>
-          <p:nvPr>
-            <p:ph type="title"/>
-          </p:nvPr>
-        </p:nvSpPr>
-        <p:spPr/>
-        <p:txBody>
-          <a:bodyPr/>
-          <a:lstStyle/>
-          <a:p>
-            <a:r>
-              <a:rPr lang="en-US" dirty="0"/>
-              <a:t>Can’t we just subset down to N&gt;P markers?</a:t>
-            </a:r>
-          </a:p>
-        </p:txBody>
-      </p:sp>
-      <p:sp>
-        <p:nvSpPr>
-          <p:cNvPr id="3" name="Content Placeholder 2">
-            <a:extLst>
-              <a:ext uri="{FF2B5EF4-FFF2-40B4-BE49-F238E27FC236}">
-                <a16:creationId xmlns:a16="http://schemas.microsoft.com/office/drawing/2014/main" id="{E7E97833-DAB8-4D56-90F5-48FCAD66AB44}"/>
-              </a:ext>
-            </a:extLst>
-          </p:cNvPr>
-          <p:cNvSpPr>
-            <a:spLocks noGrp="1"/>
-          </p:cNvSpPr>
-          <p:nvPr>
-            <p:ph idx="1"/>
-          </p:nvPr>
-        </p:nvSpPr>
-        <p:spPr/>
-        <p:txBody>
-          <a:bodyPr/>
-          <a:lstStyle/>
-          <a:p>
-            <a:r>
-              <a:rPr lang="en-US" dirty="0"/>
-              <a:t>Yes… but </a:t>
-            </a:r>
-          </a:p>
-          <a:p>
-            <a:r>
-              <a:rPr lang="en-US" dirty="0"/>
-              <a:t>Commonly leads to marker effects being “over-fit” and not well estimated and a model that cannot be used as well to predict other individuals. </a:t>
-            </a:r>
-          </a:p>
-          <a:p>
-            <a:r>
-              <a:rPr lang="en-US" dirty="0"/>
-              <a:t>Which markers to subset?</a:t>
-            </a:r>
-          </a:p>
-          <a:p>
-            <a:r>
-              <a:rPr lang="en-US" dirty="0"/>
-              <a:t>N&gt;P to get good estimates of marker effects (how much greater depends)</a:t>
-            </a:r>
-          </a:p>
-          <a:p>
-            <a:endParaRPr lang="en-US" dirty="0"/>
-          </a:p>
-          <a:p>
-            <a:endParaRPr lang="en-US" dirty="0"/>
-          </a:p>
-          <a:p>
-            <a:endParaRPr lang="en-US" dirty="0"/>
-          </a:p>
-          <a:p>
-            <a:endParaRPr lang="en-US" dirty="0"/>
-          </a:p>
-        </p:txBody>
-      </p:sp>
-    </p:spTree>
-    <p:extLst>
-      <p:ext uri="{BB962C8B-B14F-4D97-AF65-F5344CB8AC3E}">
-        <p14:creationId xmlns:p14="http://schemas.microsoft.com/office/powerpoint/2010/main" val="2214432749"/>
-      </p:ext>
-    </p:extLst>
-  </p:cSld>
-  <p:clrMapOvr>
-    <a:masterClrMapping/>
-  </p:clrMapOvr>
-</p:sld>
-</file>
-
-<file path=ppt/slides/slide27.xml><?xml version="1.0" encoding="utf-8"?>
-<p:sld xmlns:a="http://schemas.openxmlformats.org/drawingml/2006/main" xmlns:r="http://schemas.openxmlformats.org/officeDocument/2006/relationships" xmlns:p="http://schemas.openxmlformats.org/presentationml/2006/main">
-  <p:cSld>
-    <p:spTree>
-      <p:nvGrpSpPr>
-        <p:cNvPr id="1" name=""/>
-        <p:cNvGrpSpPr/>
-        <p:nvPr/>
-      </p:nvGrpSpPr>
-      <p:grpSpPr>
-        <a:xfrm>
-          <a:off x="0" y="0"/>
-          <a:ext cx="0" cy="0"/>
-          <a:chOff x="0" y="0"/>
-          <a:chExt cx="0" cy="0"/>
-        </a:xfrm>
-      </p:grpSpPr>
-      <p:sp>
-        <p:nvSpPr>
-          <p:cNvPr id="2" name="Title 1">
-            <a:extLst>
-              <a:ext uri="{FF2B5EF4-FFF2-40B4-BE49-F238E27FC236}">
-                <a16:creationId xmlns:a16="http://schemas.microsoft.com/office/drawing/2014/main" id="{2A00BB86-0552-407D-92EE-9FE32B84B398}"/>
-              </a:ext>
-            </a:extLst>
-          </p:cNvPr>
-          <p:cNvSpPr>
-            <a:spLocks noGrp="1"/>
-          </p:cNvSpPr>
-          <p:nvPr>
-            <p:ph type="title"/>
-          </p:nvPr>
-        </p:nvSpPr>
-        <p:spPr/>
-        <p:txBody>
-          <a:bodyPr/>
-          <a:lstStyle/>
-          <a:p>
-            <a:r>
-              <a:rPr lang="en-US" dirty="0"/>
-              <a:t>We can Regularize! </a:t>
-            </a:r>
-          </a:p>
-        </p:txBody>
-      </p:sp>
-      <p:sp>
-        <p:nvSpPr>
-          <p:cNvPr id="3" name="Content Placeholder 2">
-            <a:extLst>
-              <a:ext uri="{FF2B5EF4-FFF2-40B4-BE49-F238E27FC236}">
-                <a16:creationId xmlns:a16="http://schemas.microsoft.com/office/drawing/2014/main" id="{A1C5FD0C-B5E2-49A0-9DFB-5B758348B2BF}"/>
-              </a:ext>
-            </a:extLst>
-          </p:cNvPr>
-          <p:cNvSpPr>
-            <a:spLocks noGrp="1"/>
-          </p:cNvSpPr>
-          <p:nvPr>
-            <p:ph idx="1"/>
-          </p:nvPr>
-        </p:nvSpPr>
-        <p:spPr>
-          <a:xfrm>
-            <a:off x="838200" y="1825625"/>
-            <a:ext cx="10515600" cy="4930776"/>
-          </a:xfrm>
-        </p:spPr>
-        <p:txBody>
-          <a:bodyPr>
-            <a:normAutofit/>
-          </a:bodyPr>
-          <a:lstStyle/>
-          <a:p>
-            <a:r>
-              <a:rPr lang="en-US" dirty="0"/>
-              <a:t>“desensitization” </a:t>
-            </a:r>
-            <a:r>
-              <a:rPr lang="en-US" dirty="0" err="1"/>
-              <a:t>ie</a:t>
-            </a:r>
-            <a:r>
-              <a:rPr lang="en-US" dirty="0"/>
-              <a:t> less sensitive to changes in predictor – introduces a bias during estimation to reduce variance of predictions. </a:t>
-            </a:r>
-          </a:p>
-          <a:p>
-            <a:r>
-              <a:rPr lang="en-US" dirty="0"/>
-              <a:t>In the least squares fit:</a:t>
-            </a:r>
-          </a:p>
-          <a:p>
-            <a:pPr lvl="1"/>
-            <a:r>
-              <a:rPr lang="en-US" dirty="0"/>
-              <a:t>Min(residual</a:t>
-            </a:r>
-            <a:r>
-              <a:rPr lang="en-US" baseline="30000" dirty="0"/>
-              <a:t>2</a:t>
-            </a:r>
-            <a:r>
-              <a:rPr lang="en-US" dirty="0"/>
-              <a:t>)</a:t>
-            </a:r>
-          </a:p>
-          <a:p>
-            <a:r>
-              <a:rPr lang="en-US" dirty="0"/>
-              <a:t>In a regularized fit:</a:t>
-            </a:r>
-          </a:p>
-          <a:p>
-            <a:pPr lvl="1"/>
-            <a:r>
-              <a:rPr lang="en-US" dirty="0"/>
-              <a:t>Min(residual</a:t>
-            </a:r>
-            <a:r>
-              <a:rPr lang="en-US" baseline="30000" dirty="0"/>
-              <a:t>2 </a:t>
-            </a:r>
-            <a:r>
-              <a:rPr lang="en-US" dirty="0"/>
-              <a:t>+ penalization process</a:t>
-            </a:r>
-            <a:r>
-              <a:rPr lang="en-US" dirty="0">
-                <a:latin typeface="Abadi" panose="020B0604020202020204" pitchFamily="34" charset="0"/>
-              </a:rPr>
-              <a:t>)</a:t>
-            </a:r>
-          </a:p>
-          <a:p>
-            <a:r>
-              <a:rPr lang="en-US" dirty="0"/>
-              <a:t>In ridge regression this is:</a:t>
-            </a:r>
-          </a:p>
-          <a:p>
-            <a:pPr lvl="1"/>
-            <a:r>
-              <a:rPr lang="en-US" dirty="0"/>
-              <a:t>Min(residual</a:t>
-            </a:r>
-            <a:r>
-              <a:rPr lang="en-US" baseline="30000" dirty="0"/>
-              <a:t>2 </a:t>
-            </a:r>
-            <a:r>
-              <a:rPr lang="en-US" dirty="0"/>
-              <a:t>+ λ*</a:t>
-            </a:r>
-            <a:r>
-              <a:rPr lang="en-US" b="1" dirty="0"/>
-              <a:t>Slope Parameters</a:t>
-            </a:r>
-            <a:r>
-              <a:rPr lang="en-US" baseline="30000" dirty="0"/>
-              <a:t>2</a:t>
-            </a:r>
-            <a:r>
-              <a:rPr lang="en-US" dirty="0"/>
-              <a:t>)</a:t>
-            </a:r>
-          </a:p>
-          <a:p>
-            <a:r>
-              <a:rPr lang="en-US" dirty="0"/>
-              <a:t>Ridge regression is equivalent to a BLUP vs a BLUE. </a:t>
-            </a:r>
-          </a:p>
-          <a:p>
-            <a:pPr marL="0" indent="0">
-              <a:buNone/>
-            </a:pPr>
-            <a:endParaRPr lang="en-US" dirty="0"/>
-          </a:p>
-        </p:txBody>
-      </p:sp>
-    </p:spTree>
-    <p:extLst>
-      <p:ext uri="{BB962C8B-B14F-4D97-AF65-F5344CB8AC3E}">
-        <p14:creationId xmlns:p14="http://schemas.microsoft.com/office/powerpoint/2010/main" val="3264755123"/>
-      </p:ext>
-    </p:extLst>
-  </p:cSld>
-  <p:clrMapOvr>
-    <a:masterClrMapping/>
-  </p:clrMapOvr>
-</p:sld>
-</file>
-
-<file path=ppt/slides/slide28.xml><?xml version="1.0" encoding="utf-8"?>
+<file path=ppt/slides/slide30.xml><?xml version="1.0" encoding="utf-8"?>
 <p:sld xmlns:a="http://schemas.openxmlformats.org/drawingml/2006/main" xmlns:r="http://schemas.openxmlformats.org/officeDocument/2006/relationships" xmlns:p="http://schemas.openxmlformats.org/presentationml/2006/main">
   <p:cSld>
     <p:spTree>
@@ -45077,7 +45861,7 @@
 </p:sld>
 </file>
 
-<file path=ppt/slides/slide29.xml><?xml version="1.0" encoding="utf-8"?>
+<file path=ppt/slides/slide31.xml><?xml version="1.0" encoding="utf-8"?>
 <p:sld xmlns:a="http://schemas.openxmlformats.org/drawingml/2006/main" xmlns:r="http://schemas.openxmlformats.org/officeDocument/2006/relationships" xmlns:p="http://schemas.openxmlformats.org/presentationml/2006/main">
   <p:cSld>
     <p:spTree>
@@ -45151,7 +45935,7 @@
         </p:spPr>
         <p:txBody>
           <a:bodyPr>
-            <a:normAutofit fontScale="92500" lnSpcReduction="10000"/>
+            <a:normAutofit/>
           </a:bodyPr>
           <a:lstStyle/>
           <a:p>
@@ -45219,7 +46003,26 @@
             </a:r>
             <a:r>
               <a:rPr lang="en-US" dirty="0"/>
-              <a:t>)</a:t>
+              <a:t>) </a:t>
+            </a:r>
+          </a:p>
+          <a:p>
+            <a:pPr lvl="1"/>
+            <a:r>
+              <a:rPr lang="en-US" b="1" dirty="0"/>
+              <a:t>B = </a:t>
+            </a:r>
+            <a:r>
+              <a:rPr lang="en-US" dirty="0"/>
+              <a:t>Parameters = (X’X)</a:t>
+            </a:r>
+            <a:r>
+              <a:rPr lang="en-US" baseline="30000" dirty="0"/>
+              <a:t>-1 </a:t>
+            </a:r>
+            <a:r>
+              <a:rPr lang="en-US" dirty="0"/>
+              <a:t>XY </a:t>
             </a:r>
           </a:p>
           <a:p>
@@ -45299,13 +46102,116 @@
             </a:r>
           </a:p>
           <a:p>
+            <a:pPr lvl="1"/>
             <a:r>
               <a:rPr lang="en-US" dirty="0"/>
-              <a:t>The normal linear regression is calculated as discussed, the regularized regression uses more complex algorithms, cross-validation, maximum likelihood and restricted maximum likelihood processes to estimate effects. If you would like to learn more about how that is done Dr. Kelly Robbins is a good source here on campus. </a:t>
+              <a:t> </a:t>
             </a:r>
+          </a:p>
+          <a:p>
+            <a:pPr lvl="1"/>
+            <a:endParaRPr lang="en-US" dirty="0"/>
+          </a:p>
+          <a:p>
+            <a:pPr lvl="1"/>
+            <a:endParaRPr lang="en-US" dirty="0"/>
           </a:p>
         </p:txBody>
       </p:sp>
+      <p:pic>
+        <p:nvPicPr>
+          <p:cNvPr id="4" name="Picture 3" descr="urn:x-wiley:19403372:equation:tpg2plantgenome2011080024-math-0004">
+            <a:extLst>
+              <a:ext uri="{FF2B5EF4-FFF2-40B4-BE49-F238E27FC236}">
+                <a16:creationId xmlns:a16="http://schemas.microsoft.com/office/drawing/2014/main" id="{3C091A28-A647-4C6D-BC6C-47A573808387}"/>
+              </a:ext>
+            </a:extLst>
+          </p:cNvPr>
+          <p:cNvPicPr>
+            <a:picLocks noChangeAspect="1" noChangeArrowheads="1"/>
+          </p:cNvPicPr>
+          <p:nvPr/>
+        </p:nvPicPr>
+        <p:blipFill>
+          <a:blip r:embed="rId2">
+            <a:extLst>
+              <a:ext uri="{28A0092B-C50C-407E-A947-70E740481C1C}">
+                <a14:useLocalDpi xmlns:a14="http://schemas.microsoft.com/office/drawing/2010/main" val="0"/>
+              </a:ext>
+            </a:extLst>
+          </a:blip>
+          <a:srcRect/>
+          <a:stretch>
+            <a:fillRect/>
+          </a:stretch>
+        </p:blipFill>
+        <p:spPr bwMode="auto">
+          <a:xfrm>
+            <a:off x="1710937" y="5702300"/>
+            <a:ext cx="2532446" cy="424907"/>
+          </a:xfrm>
+          <a:prstGeom prst="rect">
+            <a:avLst/>
+          </a:prstGeom>
+          <a:noFill/>
+          <a:extLst>
+            <a:ext uri="{909E8E84-426E-40DD-AFC4-6F175D3DCCD1}">
+              <a14:hiddenFill xmlns:a14="http://schemas.microsoft.com/office/drawing/2010/main">
+                <a:solidFill>
+                  <a:srgbClr val="FFFFFF"/>
+                </a:solidFill>
+              </a14:hiddenFill>
+            </a:ext>
+          </a:extLst>
+        </p:spPr>
+      </p:pic>
+      <p:pic>
+        <p:nvPicPr>
+          <p:cNvPr id="2050" name="Picture 2" descr="urn:x-wiley:19403372:equation:tpg2plantgenome2011080024-math-0005">
+            <a:extLst>
+              <a:ext uri="{FF2B5EF4-FFF2-40B4-BE49-F238E27FC236}">
+                <a16:creationId xmlns:a16="http://schemas.microsoft.com/office/drawing/2014/main" id="{D6B7F4C0-BD89-4D76-B494-5F9D442CE09E}"/>
+              </a:ext>
+            </a:extLst>
+          </p:cNvPr>
+          <p:cNvPicPr>
+            <a:picLocks noChangeAspect="1" noChangeArrowheads="1"/>
+          </p:cNvPicPr>
+          <p:nvPr/>
+        </p:nvPicPr>
+        <p:blipFill>
+          <a:blip r:embed="rId3">
+            <a:extLst>
+              <a:ext uri="{28A0092B-C50C-407E-A947-70E740481C1C}">
+                <a14:useLocalDpi xmlns:a14="http://schemas.microsoft.com/office/drawing/2010/main" val="0"/>
+              </a:ext>
+            </a:extLst>
+          </a:blip>
+          <a:srcRect/>
+          <a:stretch>
+            <a:fillRect/>
+          </a:stretch>
+        </p:blipFill>
+        <p:spPr bwMode="auto">
+          <a:xfrm>
+            <a:off x="1710937" y="6237752"/>
+            <a:ext cx="1274721" cy="424907"/>
+          </a:xfrm>
+          <a:prstGeom prst="rect">
+            <a:avLst/>
+          </a:prstGeom>
+          <a:noFill/>
+          <a:extLst>
+            <a:ext uri="{909E8E84-426E-40DD-AFC4-6F175D3DCCD1}">
+              <a14:hiddenFill xmlns:a14="http://schemas.microsoft.com/office/drawing/2010/main">
+                <a:solidFill>
+                  <a:srgbClr val="FFFFFF"/>
+                </a:solidFill>
+              </a14:hiddenFill>
+            </a:ext>
+          </a:extLst>
+        </p:spPr>
+      </p:pic>
     </p:spTree>
     <p:extLst>
       <p:ext uri="{BB962C8B-B14F-4D97-AF65-F5344CB8AC3E}">
@@ -45319,7 +46225,7 @@
 </p:sld>
 </file>
 
-<file path=ppt/slides/slide3.xml><?xml version="1.0" encoding="utf-8"?>
+<file path=ppt/slides/slide32.xml><?xml version="1.0" encoding="utf-8"?>
 <p:sld xmlns:a="http://schemas.openxmlformats.org/drawingml/2006/main" xmlns:r="http://schemas.openxmlformats.org/officeDocument/2006/relationships" xmlns:p="http://schemas.openxmlformats.org/presentationml/2006/main">
   <p:cSld>
     <p:spTree>
@@ -45341,7 +46247,7 @@
           <p:cNvPr id="2" name="Title 1">
             <a:extLst>
               <a:ext uri="{FF2B5EF4-FFF2-40B4-BE49-F238E27FC236}">
-                <a16:creationId xmlns:a16="http://schemas.microsoft.com/office/drawing/2014/main" id="{59F4B60F-7767-4054-892B-172E8B02303C}"/>
+                <a16:creationId xmlns:a16="http://schemas.microsoft.com/office/drawing/2014/main" id="{B031CFB8-C786-43D0-B95D-AE0C5A54C758}"/>
               </a:ext>
             </a:extLst>
           </p:cNvPr>
@@ -45359,7 +46265,7 @@
           <a:p>
             <a:r>
               <a:rPr lang="en-US" dirty="0"/>
-              <a:t>Outline</a:t>
+              <a:t>Formulas continued</a:t>
             </a:r>
           </a:p>
         </p:txBody>
@@ -45369,7 +46275,7 @@
           <p:cNvPr id="3" name="Content Placeholder 2">
             <a:extLst>
               <a:ext uri="{FF2B5EF4-FFF2-40B4-BE49-F238E27FC236}">
-                <a16:creationId xmlns:a16="http://schemas.microsoft.com/office/drawing/2014/main" id="{9BB0AB9C-4773-4BAA-A020-0CDDEAD207D0}"/>
+                <a16:creationId xmlns:a16="http://schemas.microsoft.com/office/drawing/2014/main" id="{6D8B84A1-006D-4876-88BB-BEE0C5BE5576}"/>
               </a:ext>
             </a:extLst>
           </p:cNvPr>
@@ -45380,83 +46286,20 @@
             <p:ph idx="1"/>
           </p:nvPr>
         </p:nvSpPr>
-        <p:spPr>
-          <a:xfrm>
-            <a:off x="838200" y="1825624"/>
-            <a:ext cx="10515600" cy="4879975"/>
-          </a:xfrm>
-        </p:spPr>
+        <p:spPr/>
         <p:txBody>
-          <a:bodyPr>
-            <a:normAutofit fontScale="92500" lnSpcReduction="10000"/>
-          </a:bodyPr>
+          <a:bodyPr/>
           <a:lstStyle/>
           <a:p>
             <a:r>
               <a:rPr lang="en-US" dirty="0"/>
-              <a:t>What is a breeders job?</a:t>
+              <a:t>The normal linear regression is calculated as discussed, the regularized regression uses more complex algorithms, cross-validation, maximum likelihood and restricted maximum likelihood processes to estimate effects. Key to this is estimating lambda.</a:t>
             </a:r>
           </a:p>
           <a:p>
             <a:r>
               <a:rPr lang="en-US" dirty="0"/>
-              <a:t>What do trait distributions look like?</a:t>
-            </a:r>
-          </a:p>
-          <a:p>
-            <a:r>
-              <a:rPr lang="en-US" dirty="0"/>
-              <a:t>How can we conceptualize them under a mathematical model?</a:t>
-            </a:r>
-          </a:p>
-          <a:p>
-            <a:r>
-              <a:rPr lang="en-US" dirty="0"/>
-              <a:t>Additive genetic model</a:t>
-            </a:r>
-          </a:p>
-          <a:p>
-            <a:r>
-              <a:rPr lang="en-US" dirty="0"/>
-              <a:t>Basis of regression, regularization, and marker effects</a:t>
-            </a:r>
-          </a:p>
-          <a:p>
-            <a:r>
-              <a:rPr lang="en-US" dirty="0"/>
-              <a:t>Break</a:t>
-            </a:r>
-          </a:p>
-          <a:p>
-            <a:r>
-              <a:rPr lang="en-US" dirty="0"/>
-              <a:t>Genomic prediction</a:t>
-            </a:r>
-          </a:p>
-          <a:p>
-            <a:r>
-              <a:rPr lang="en-US" dirty="0"/>
-              <a:t>Quick introduction of association mapping</a:t>
-            </a:r>
-          </a:p>
-          <a:p>
-            <a:r>
-              <a:rPr lang="en-US" dirty="0"/>
-              <a:t>Longitudinal analysis</a:t>
-            </a:r>
-          </a:p>
-          <a:p>
-            <a:pPr lvl="1"/>
-            <a:r>
-              <a:rPr lang="en-US" dirty="0"/>
-              <a:t>Functional PCA</a:t>
-            </a:r>
-          </a:p>
-          <a:p>
-            <a:pPr lvl="1"/>
-            <a:r>
-              <a:rPr lang="en-US" dirty="0"/>
-              <a:t>Logistic regression</a:t>
+              <a:t>If you would like to learn more about how that is done Dr. Kelly Robbins is a good source here on campus. </a:t>
             </a:r>
           </a:p>
           <a:p>
@@ -45464,66 +46307,10 @@
           </a:p>
         </p:txBody>
       </p:sp>
-      <p:sp>
-        <p:nvSpPr>
-          <p:cNvPr id="4" name="Rectangle 3">
-            <a:extLst>
-              <a:ext uri="{FF2B5EF4-FFF2-40B4-BE49-F238E27FC236}">
-                <a16:creationId xmlns:a16="http://schemas.microsoft.com/office/drawing/2014/main" id="{84DA9075-4A79-490C-B8BB-67B70AA04B6B}"/>
-              </a:ext>
-            </a:extLst>
-          </p:cNvPr>
-          <p:cNvSpPr/>
-          <p:nvPr/>
-        </p:nvSpPr>
-        <p:spPr>
-          <a:xfrm>
-            <a:off x="7852007" y="4382139"/>
-            <a:ext cx="3895493" cy="1965480"/>
-          </a:xfrm>
-          <a:prstGeom prst="rect">
-            <a:avLst/>
-          </a:prstGeom>
-        </p:spPr>
-        <p:style>
-          <a:lnRef idx="2">
-            <a:schemeClr val="accent1">
-              <a:shade val="50000"/>
-            </a:schemeClr>
-          </a:lnRef>
-          <a:fillRef idx="1">
-            <a:schemeClr val="accent1"/>
-          </a:fillRef>
-          <a:effectRef idx="0">
-            <a:schemeClr val="accent1"/>
-          </a:effectRef>
-          <a:fontRef idx="minor">
-            <a:schemeClr val="lt1"/>
-          </a:fontRef>
-        </p:style>
-        <p:txBody>
-          <a:bodyPr rtlCol="0" anchor="ctr"/>
-          <a:lstStyle/>
-          <a:p>
-            <a:pPr algn="ctr"/>
-            <a:r>
-              <a:rPr lang="en-US" sz="2800" dirty="0"/>
-              <a:t>Please stop me and ask questions at any time!</a:t>
-            </a:r>
-          </a:p>
-          <a:p>
-            <a:pPr algn="ctr"/>
-            <a:r>
-              <a:rPr lang="en-US" sz="2800" dirty="0"/>
-              <a:t>Ask questions in context!</a:t>
-            </a:r>
-          </a:p>
-        </p:txBody>
-      </p:sp>
     </p:spTree>
     <p:extLst>
       <p:ext uri="{BB962C8B-B14F-4D97-AF65-F5344CB8AC3E}">
-        <p14:creationId xmlns:p14="http://schemas.microsoft.com/office/powerpoint/2010/main" val="3482473849"/>
+        <p14:creationId xmlns:p14="http://schemas.microsoft.com/office/powerpoint/2010/main" val="1104633031"/>
       </p:ext>
     </p:extLst>
   </p:cSld>
@@ -45533,7 +46320,7 @@
 </p:sld>
 </file>
 
-<file path=ppt/slides/slide30.xml><?xml version="1.0" encoding="utf-8"?>
+<file path=ppt/slides/slide33.xml><?xml version="1.0" encoding="utf-8"?>
 <p:sld xmlns:a="http://schemas.openxmlformats.org/drawingml/2006/main" xmlns:r="http://schemas.openxmlformats.org/officeDocument/2006/relationships" xmlns:p="http://schemas.openxmlformats.org/presentationml/2006/main">
   <p:cSld>
     <p:spTree>
@@ -45616,7 +46403,7 @@
 </p:sld>
 </file>
 
-<file path=ppt/slides/slide31.xml><?xml version="1.0" encoding="utf-8"?>
+<file path=ppt/slides/slide34.xml><?xml version="1.0" encoding="utf-8"?>
 <p:sld xmlns:a="http://schemas.openxmlformats.org/drawingml/2006/main" xmlns:r="http://schemas.openxmlformats.org/officeDocument/2006/relationships" xmlns:p="http://schemas.openxmlformats.org/presentationml/2006/main">
   <p:cSld>
     <p:spTree>
@@ -45711,7 +46498,7 @@
 </p:sld>
 </file>
 
-<file path=ppt/slides/slide32.xml><?xml version="1.0" encoding="utf-8"?>
+<file path=ppt/slides/slide35.xml><?xml version="1.0" encoding="utf-8"?>
 <p:sld xmlns:a="http://schemas.openxmlformats.org/drawingml/2006/main" xmlns:r="http://schemas.openxmlformats.org/officeDocument/2006/relationships" xmlns:p="http://schemas.openxmlformats.org/presentationml/2006/main">
   <p:cSld>
     <p:spTree>
@@ -45833,7 +46620,7 @@
 </p:sld>
 </file>
 
-<file path=ppt/slides/slide33.xml><?xml version="1.0" encoding="utf-8"?>
+<file path=ppt/slides/slide36.xml><?xml version="1.0" encoding="utf-8"?>
 <p:sld xmlns:a="http://schemas.openxmlformats.org/drawingml/2006/main" xmlns:r="http://schemas.openxmlformats.org/officeDocument/2006/relationships" xmlns:p="http://schemas.openxmlformats.org/presentationml/2006/main">
   <p:cSld>
     <p:spTree>
@@ -45928,7 +46715,7 @@
 </p:sld>
 </file>
 
-<file path=ppt/slides/slide34.xml><?xml version="1.0" encoding="utf-8"?>
+<file path=ppt/slides/slide37.xml><?xml version="1.0" encoding="utf-8"?>
 <p:sld xmlns:a="http://schemas.openxmlformats.org/drawingml/2006/main" xmlns:r="http://schemas.openxmlformats.org/officeDocument/2006/relationships" xmlns:p="http://schemas.openxmlformats.org/presentationml/2006/main">
   <p:cSld>
     <p:spTree>
@@ -46003,12 +46790,6 @@
           <a:p>
             <a:r>
               <a:rPr lang="en-US" dirty="0"/>
-              <a:t>Why did the toilet paper role down the hill?</a:t>
-            </a:r>
-          </a:p>
-          <a:p>
-            <a:r>
-              <a:rPr lang="en-US" dirty="0"/>
               <a:t>Why was the geologist’s wife angry?</a:t>
             </a:r>
           </a:p>
@@ -46039,7 +46820,7 @@
 </p:sld>
 </file>
 
-<file path=ppt/slides/slide35.xml><?xml version="1.0" encoding="utf-8"?>
+<file path=ppt/slides/slide38.xml><?xml version="1.0" encoding="utf-8"?>
 <p:sld xmlns:a="http://schemas.openxmlformats.org/drawingml/2006/main" xmlns:r="http://schemas.openxmlformats.org/officeDocument/2006/relationships" xmlns:p="http://schemas.openxmlformats.org/presentationml/2006/main">
   <p:cSld>
     <p:spTree>
@@ -46072,11 +46853,25 @@
             <p:ph type="title"/>
           </p:nvPr>
         </p:nvSpPr>
-        <p:spPr/>
+        <p:spPr>
+          <a:xfrm>
+            <a:off x="838200" y="365125"/>
+            <a:ext cx="10515600" cy="2177353"/>
+          </a:xfrm>
+        </p:spPr>
         <p:txBody>
-          <a:bodyPr/>
+          <a:bodyPr>
+            <a:normAutofit/>
+          </a:bodyPr>
           <a:lstStyle/>
           <a:p>
+            <a:r>
+              <a:rPr lang="en-US" dirty="0"/>
+              <a:t>Lets talk about something that goes hand in hand with the additive model: </a:t>
+            </a:r>
+            <a:br>
+              <a:rPr lang="en-US" dirty="0"/>
+            </a:br>
             <a:r>
               <a:rPr lang="en-US" dirty="0"/>
               <a:t>Association analysis</a:t>
@@ -46100,7 +46895,12 @@
             <p:ph idx="1"/>
           </p:nvPr>
         </p:nvSpPr>
-        <p:spPr/>
+        <p:spPr>
+          <a:xfrm>
+            <a:off x="838200" y="3041921"/>
+            <a:ext cx="10515600" cy="2388723"/>
+          </a:xfrm>
+        </p:spPr>
         <p:txBody>
           <a:bodyPr/>
           <a:lstStyle/>
@@ -46125,7 +46925,7 @@
 </p:sld>
 </file>
 
-<file path=ppt/slides/slide36.xml><?xml version="1.0" encoding="utf-8"?>
+<file path=ppt/slides/slide39.xml><?xml version="1.0" encoding="utf-8"?>
 <p:sld xmlns:a="http://schemas.openxmlformats.org/drawingml/2006/main" xmlns:r="http://schemas.openxmlformats.org/officeDocument/2006/relationships" xmlns:p="http://schemas.openxmlformats.org/presentationml/2006/main">
   <p:cSld>
     <p:spTree>
@@ -47288,89 +48088,6 @@
 </p:sld>
 </file>
 
-<file path=ppt/slides/slide37.xml><?xml version="1.0" encoding="utf-8"?>
-<p:sld xmlns:a="http://schemas.openxmlformats.org/drawingml/2006/main" xmlns:r="http://schemas.openxmlformats.org/officeDocument/2006/relationships" xmlns:p="http://schemas.openxmlformats.org/presentationml/2006/main">
-  <p:cSld>
-    <p:spTree>
-      <p:nvGrpSpPr>
-        <p:cNvPr id="1" name=""/>
-        <p:cNvGrpSpPr/>
-        <p:nvPr/>
-      </p:nvGrpSpPr>
-      <p:grpSpPr>
-        <a:xfrm>
-          <a:off x="0" y="0"/>
-          <a:ext cx="0" cy="0"/>
-          <a:chOff x="0" y="0"/>
-          <a:chExt cx="0" cy="0"/>
-        </a:xfrm>
-      </p:grpSpPr>
-      <p:sp>
-        <p:nvSpPr>
-          <p:cNvPr id="2" name="Title 1">
-            <a:extLst>
-              <a:ext uri="{FF2B5EF4-FFF2-40B4-BE49-F238E27FC236}">
-                <a16:creationId xmlns:a16="http://schemas.microsoft.com/office/drawing/2014/main" id="{F919AE24-50B7-465A-A557-1D60C8FB698A}"/>
-              </a:ext>
-            </a:extLst>
-          </p:cNvPr>
-          <p:cNvSpPr>
-            <a:spLocks noGrp="1"/>
-          </p:cNvSpPr>
-          <p:nvPr>
-            <p:ph type="title"/>
-          </p:nvPr>
-        </p:nvSpPr>
-        <p:spPr/>
-        <p:txBody>
-          <a:bodyPr/>
-          <a:lstStyle/>
-          <a:p>
-            <a:r>
-              <a:rPr lang="en-US" dirty="0"/>
-              <a:t>Time series analysis options and a few examples!</a:t>
-            </a:r>
-          </a:p>
-        </p:txBody>
-      </p:sp>
-      <p:sp>
-        <p:nvSpPr>
-          <p:cNvPr id="3" name="Content Placeholder 2">
-            <a:extLst>
-              <a:ext uri="{FF2B5EF4-FFF2-40B4-BE49-F238E27FC236}">
-                <a16:creationId xmlns:a16="http://schemas.microsoft.com/office/drawing/2014/main" id="{57B66C43-BE51-448A-8BFF-ECFE02354A20}"/>
-              </a:ext>
-            </a:extLst>
-          </p:cNvPr>
-          <p:cNvSpPr>
-            <a:spLocks noGrp="1"/>
-          </p:cNvSpPr>
-          <p:nvPr>
-            <p:ph idx="1"/>
-          </p:nvPr>
-        </p:nvSpPr>
-        <p:spPr/>
-        <p:txBody>
-          <a:bodyPr/>
-          <a:lstStyle/>
-          <a:p>
-            <a:endParaRPr lang="en-US"/>
-          </a:p>
-        </p:txBody>
-      </p:sp>
-    </p:spTree>
-    <p:extLst>
-      <p:ext uri="{BB962C8B-B14F-4D97-AF65-F5344CB8AC3E}">
-        <p14:creationId xmlns:p14="http://schemas.microsoft.com/office/powerpoint/2010/main" val="3636108133"/>
-      </p:ext>
-    </p:extLst>
-  </p:cSld>
-  <p:clrMapOvr>
-    <a:masterClrMapping/>
-  </p:clrMapOvr>
-</p:sld>
-</file>
-
 <file path=ppt/slides/slide4.xml><?xml version="1.0" encoding="utf-8"?>
 <p:sld xmlns:a="http://schemas.openxmlformats.org/drawingml/2006/main" xmlns:r="http://schemas.openxmlformats.org/officeDocument/2006/relationships" xmlns:p="http://schemas.openxmlformats.org/presentationml/2006/main">
   <p:cSld>
@@ -47552,7 +48269,304 @@
 </p:sld>
 </file>
 
+<file path=ppt/slides/slide40.xml><?xml version="1.0" encoding="utf-8"?>
+<p:sld xmlns:a="http://schemas.openxmlformats.org/drawingml/2006/main" xmlns:r="http://schemas.openxmlformats.org/officeDocument/2006/relationships" xmlns:p="http://schemas.openxmlformats.org/presentationml/2006/main">
+  <p:cSld>
+    <p:spTree>
+      <p:nvGrpSpPr>
+        <p:cNvPr id="1" name=""/>
+        <p:cNvGrpSpPr/>
+        <p:nvPr/>
+      </p:nvGrpSpPr>
+      <p:grpSpPr>
+        <a:xfrm>
+          <a:off x="0" y="0"/>
+          <a:ext cx="0" cy="0"/>
+          <a:chOff x="0" y="0"/>
+          <a:chExt cx="0" cy="0"/>
+        </a:xfrm>
+      </p:grpSpPr>
+      <p:sp>
+        <p:nvSpPr>
+          <p:cNvPr id="2" name="Title 1">
+            <a:extLst>
+              <a:ext uri="{FF2B5EF4-FFF2-40B4-BE49-F238E27FC236}">
+                <a16:creationId xmlns:a16="http://schemas.microsoft.com/office/drawing/2014/main" id="{F919AE24-50B7-465A-A557-1D60C8FB698A}"/>
+              </a:ext>
+            </a:extLst>
+          </p:cNvPr>
+          <p:cNvSpPr>
+            <a:spLocks noGrp="1"/>
+          </p:cNvSpPr>
+          <p:nvPr>
+            <p:ph type="title"/>
+          </p:nvPr>
+        </p:nvSpPr>
+        <p:spPr/>
+        <p:txBody>
+          <a:bodyPr/>
+          <a:lstStyle/>
+          <a:p>
+            <a:r>
+              <a:rPr lang="en-US" dirty="0"/>
+              <a:t>Time series analysis options and a few examples!</a:t>
+            </a:r>
+          </a:p>
+        </p:txBody>
+      </p:sp>
+      <p:sp>
+        <p:nvSpPr>
+          <p:cNvPr id="3" name="Content Placeholder 2">
+            <a:extLst>
+              <a:ext uri="{FF2B5EF4-FFF2-40B4-BE49-F238E27FC236}">
+                <a16:creationId xmlns:a16="http://schemas.microsoft.com/office/drawing/2014/main" id="{57B66C43-BE51-448A-8BFF-ECFE02354A20}"/>
+              </a:ext>
+            </a:extLst>
+          </p:cNvPr>
+          <p:cNvSpPr>
+            <a:spLocks noGrp="1"/>
+          </p:cNvSpPr>
+          <p:nvPr>
+            <p:ph idx="1"/>
+          </p:nvPr>
+        </p:nvSpPr>
+        <p:spPr/>
+        <p:txBody>
+          <a:bodyPr/>
+          <a:lstStyle/>
+          <a:p>
+            <a:endParaRPr lang="en-US"/>
+          </a:p>
+        </p:txBody>
+      </p:sp>
+    </p:spTree>
+    <p:extLst>
+      <p:ext uri="{BB962C8B-B14F-4D97-AF65-F5344CB8AC3E}">
+        <p14:creationId xmlns:p14="http://schemas.microsoft.com/office/powerpoint/2010/main" val="3636108133"/>
+      </p:ext>
+    </p:extLst>
+  </p:cSld>
+  <p:clrMapOvr>
+    <a:masterClrMapping/>
+  </p:clrMapOvr>
+</p:sld>
+</file>
+
 <file path=ppt/slides/slide5.xml><?xml version="1.0" encoding="utf-8"?>
+<p:sld xmlns:a="http://schemas.openxmlformats.org/drawingml/2006/main" xmlns:r="http://schemas.openxmlformats.org/officeDocument/2006/relationships" xmlns:p="http://schemas.openxmlformats.org/presentationml/2006/main" show="0">
+  <p:cSld>
+    <p:spTree>
+      <p:nvGrpSpPr>
+        <p:cNvPr id="1" name=""/>
+        <p:cNvGrpSpPr/>
+        <p:nvPr/>
+      </p:nvGrpSpPr>
+      <p:grpSpPr>
+        <a:xfrm>
+          <a:off x="0" y="0"/>
+          <a:ext cx="0" cy="0"/>
+          <a:chOff x="0" y="0"/>
+          <a:chExt cx="0" cy="0"/>
+        </a:xfrm>
+      </p:grpSpPr>
+      <p:sp>
+        <p:nvSpPr>
+          <p:cNvPr id="2" name="Title 1">
+            <a:extLst>
+              <a:ext uri="{FF2B5EF4-FFF2-40B4-BE49-F238E27FC236}">
+                <a16:creationId xmlns:a16="http://schemas.microsoft.com/office/drawing/2014/main" id="{59F4B60F-7767-4054-892B-172E8B02303C}"/>
+              </a:ext>
+            </a:extLst>
+          </p:cNvPr>
+          <p:cNvSpPr>
+            <a:spLocks noGrp="1"/>
+          </p:cNvSpPr>
+          <p:nvPr>
+            <p:ph type="title"/>
+          </p:nvPr>
+        </p:nvSpPr>
+        <p:spPr/>
+        <p:txBody>
+          <a:bodyPr/>
+          <a:lstStyle/>
+          <a:p>
+            <a:r>
+              <a:rPr lang="en-US" dirty="0"/>
+              <a:t>Outline</a:t>
+            </a:r>
+          </a:p>
+        </p:txBody>
+      </p:sp>
+      <p:sp>
+        <p:nvSpPr>
+          <p:cNvPr id="3" name="Content Placeholder 2">
+            <a:extLst>
+              <a:ext uri="{FF2B5EF4-FFF2-40B4-BE49-F238E27FC236}">
+                <a16:creationId xmlns:a16="http://schemas.microsoft.com/office/drawing/2014/main" id="{9BB0AB9C-4773-4BAA-A020-0CDDEAD207D0}"/>
+              </a:ext>
+            </a:extLst>
+          </p:cNvPr>
+          <p:cNvSpPr>
+            <a:spLocks noGrp="1"/>
+          </p:cNvSpPr>
+          <p:nvPr>
+            <p:ph idx="1"/>
+          </p:nvPr>
+        </p:nvSpPr>
+        <p:spPr>
+          <a:xfrm>
+            <a:off x="838200" y="1825624"/>
+            <a:ext cx="10515600" cy="4879975"/>
+          </a:xfrm>
+        </p:spPr>
+        <p:txBody>
+          <a:bodyPr>
+            <a:normAutofit fontScale="92500" lnSpcReduction="10000"/>
+          </a:bodyPr>
+          <a:lstStyle/>
+          <a:p>
+            <a:r>
+              <a:rPr lang="en-US" dirty="0"/>
+              <a:t>What is a breeders job?</a:t>
+            </a:r>
+          </a:p>
+          <a:p>
+            <a:r>
+              <a:rPr lang="en-US" dirty="0"/>
+              <a:t>What do trait distributions look like?</a:t>
+            </a:r>
+          </a:p>
+          <a:p>
+            <a:r>
+              <a:rPr lang="en-US" dirty="0"/>
+              <a:t>How can we conceptualize them under a mathematical model?</a:t>
+            </a:r>
+          </a:p>
+          <a:p>
+            <a:r>
+              <a:rPr lang="en-US" dirty="0"/>
+              <a:t>Additive genetic model</a:t>
+            </a:r>
+          </a:p>
+          <a:p>
+            <a:r>
+              <a:rPr lang="en-US" dirty="0"/>
+              <a:t>Basis of regression, regularization, and marker effects</a:t>
+            </a:r>
+          </a:p>
+          <a:p>
+            <a:r>
+              <a:rPr lang="en-US" dirty="0"/>
+              <a:t>Break</a:t>
+            </a:r>
+          </a:p>
+          <a:p>
+            <a:r>
+              <a:rPr lang="en-US" dirty="0"/>
+              <a:t>Genomic prediction</a:t>
+            </a:r>
+          </a:p>
+          <a:p>
+            <a:r>
+              <a:rPr lang="en-US" dirty="0"/>
+              <a:t>Quick introduction of association mapping</a:t>
+            </a:r>
+          </a:p>
+          <a:p>
+            <a:r>
+              <a:rPr lang="en-US" dirty="0"/>
+              <a:t>Longitudinal analysis</a:t>
+            </a:r>
+          </a:p>
+          <a:p>
+            <a:pPr lvl="1"/>
+            <a:r>
+              <a:rPr lang="en-US" dirty="0"/>
+              <a:t>Functional PCA</a:t>
+            </a:r>
+          </a:p>
+          <a:p>
+            <a:pPr lvl="1"/>
+            <a:r>
+              <a:rPr lang="en-US" dirty="0"/>
+              <a:t>Logistic regression</a:t>
+            </a:r>
+          </a:p>
+          <a:p>
+            <a:endParaRPr lang="en-US" dirty="0"/>
+          </a:p>
+        </p:txBody>
+      </p:sp>
+      <p:sp>
+        <p:nvSpPr>
+          <p:cNvPr id="4" name="Rectangle 3">
+            <a:extLst>
+              <a:ext uri="{FF2B5EF4-FFF2-40B4-BE49-F238E27FC236}">
+                <a16:creationId xmlns:a16="http://schemas.microsoft.com/office/drawing/2014/main" id="{84DA9075-4A79-490C-B8BB-67B70AA04B6B}"/>
+              </a:ext>
+            </a:extLst>
+          </p:cNvPr>
+          <p:cNvSpPr/>
+          <p:nvPr/>
+        </p:nvSpPr>
+        <p:spPr>
+          <a:xfrm>
+            <a:off x="7852007" y="4382139"/>
+            <a:ext cx="3895493" cy="1965480"/>
+          </a:xfrm>
+          <a:prstGeom prst="rect">
+            <a:avLst/>
+          </a:prstGeom>
+        </p:spPr>
+        <p:style>
+          <a:lnRef idx="2">
+            <a:schemeClr val="accent1">
+              <a:shade val="50000"/>
+            </a:schemeClr>
+          </a:lnRef>
+          <a:fillRef idx="1">
+            <a:schemeClr val="accent1"/>
+          </a:fillRef>
+          <a:effectRef idx="0">
+            <a:schemeClr val="accent1"/>
+          </a:effectRef>
+          <a:fontRef idx="minor">
+            <a:schemeClr val="lt1"/>
+          </a:fontRef>
+        </p:style>
+        <p:txBody>
+          <a:bodyPr rtlCol="0" anchor="ctr"/>
+          <a:lstStyle/>
+          <a:p>
+            <a:pPr algn="ctr"/>
+            <a:r>
+              <a:rPr lang="en-US" sz="2800" dirty="0"/>
+              <a:t>Please stop me and ask questions at any time!</a:t>
+            </a:r>
+          </a:p>
+          <a:p>
+            <a:pPr algn="ctr"/>
+            <a:r>
+              <a:rPr lang="en-US" sz="2800" dirty="0"/>
+              <a:t>Ask questions in context!</a:t>
+            </a:r>
+          </a:p>
+        </p:txBody>
+      </p:sp>
+    </p:spTree>
+    <p:extLst>
+      <p:ext uri="{BB962C8B-B14F-4D97-AF65-F5344CB8AC3E}">
+        <p14:creationId xmlns:p14="http://schemas.microsoft.com/office/powerpoint/2010/main" val="3482473849"/>
+      </p:ext>
+    </p:extLst>
+  </p:cSld>
+  <p:clrMapOvr>
+    <a:masterClrMapping/>
+  </p:clrMapOvr>
+</p:sld>
+</file>
+
+<file path=ppt/slides/slide6.xml><?xml version="1.0" encoding="utf-8"?>
 <p:sld xmlns:a="http://schemas.openxmlformats.org/drawingml/2006/main" xmlns:r="http://schemas.openxmlformats.org/officeDocument/2006/relationships" xmlns:p="http://schemas.openxmlformats.org/presentationml/2006/main">
   <p:cSld>
     <p:spTree>
@@ -47946,7 +48960,7 @@
 </p:sld>
 </file>
 
-<file path=ppt/slides/slide6.xml><?xml version="1.0" encoding="utf-8"?>
+<file path=ppt/slides/slide7.xml><?xml version="1.0" encoding="utf-8"?>
 <p:sld xmlns:a="http://schemas.openxmlformats.org/drawingml/2006/main" xmlns:r="http://schemas.openxmlformats.org/officeDocument/2006/relationships" xmlns:p="http://schemas.openxmlformats.org/presentationml/2006/main">
   <p:cSld>
     <p:spTree>
@@ -48072,7 +49086,7 @@
 </p:sld>
 </file>
 
-<file path=ppt/slides/slide7.xml><?xml version="1.0" encoding="utf-8"?>
+<file path=ppt/slides/slide8.xml><?xml version="1.0" encoding="utf-8"?>
 <p:sld xmlns:a="http://schemas.openxmlformats.org/drawingml/2006/main" xmlns:r="http://schemas.openxmlformats.org/officeDocument/2006/relationships" xmlns:p="http://schemas.openxmlformats.org/presentationml/2006/main">
   <p:cSld>
     <p:spTree>
@@ -48183,7 +49197,7 @@
 </p:sld>
 </file>
 
-<file path=ppt/slides/slide8.xml><?xml version="1.0" encoding="utf-8"?>
+<file path=ppt/slides/slide9.xml><?xml version="1.0" encoding="utf-8"?>
 <p:sld xmlns:a="http://schemas.openxmlformats.org/drawingml/2006/main" xmlns:r="http://schemas.openxmlformats.org/officeDocument/2006/relationships" xmlns:p="http://schemas.openxmlformats.org/presentationml/2006/main">
   <p:cSld>
     <p:spTree>
@@ -52861,129 +53875,6 @@
 </p:sld>
 </file>
 
-<file path=ppt/slides/slide9.xml><?xml version="1.0" encoding="utf-8"?>
-<p:sld xmlns:a="http://schemas.openxmlformats.org/drawingml/2006/main" xmlns:r="http://schemas.openxmlformats.org/officeDocument/2006/relationships" xmlns:p="http://schemas.openxmlformats.org/presentationml/2006/main">
-  <p:cSld>
-    <p:spTree>
-      <p:nvGrpSpPr>
-        <p:cNvPr id="1" name=""/>
-        <p:cNvGrpSpPr/>
-        <p:nvPr/>
-      </p:nvGrpSpPr>
-      <p:grpSpPr>
-        <a:xfrm>
-          <a:off x="0" y="0"/>
-          <a:ext cx="0" cy="0"/>
-          <a:chOff x="0" y="0"/>
-          <a:chExt cx="0" cy="0"/>
-        </a:xfrm>
-      </p:grpSpPr>
-      <p:sp>
-        <p:nvSpPr>
-          <p:cNvPr id="2" name="Title 1">
-            <a:extLst>
-              <a:ext uri="{FF2B5EF4-FFF2-40B4-BE49-F238E27FC236}">
-                <a16:creationId xmlns:a16="http://schemas.microsoft.com/office/drawing/2014/main" id="{9844569C-22FF-4C57-99AE-A053A520AD78}"/>
-              </a:ext>
-            </a:extLst>
-          </p:cNvPr>
-          <p:cNvSpPr>
-            <a:spLocks noGrp="1"/>
-          </p:cNvSpPr>
-          <p:nvPr>
-            <p:ph type="title"/>
-          </p:nvPr>
-        </p:nvSpPr>
-        <p:spPr>
-          <a:xfrm>
-            <a:off x="838200" y="365125"/>
-            <a:ext cx="10515600" cy="1325563"/>
-          </a:xfrm>
-        </p:spPr>
-        <p:txBody>
-          <a:bodyPr/>
-          <a:lstStyle/>
-          <a:p>
-            <a:r>
-              <a:rPr lang="en-US" dirty="0"/>
-              <a:t>When a cross is made what sorts of trait distributions do we get?</a:t>
-            </a:r>
-          </a:p>
-        </p:txBody>
-      </p:sp>
-      <p:pic>
-        <p:nvPicPr>
-          <p:cNvPr id="120" name="Picture 119">
-            <a:extLst>
-              <a:ext uri="{FF2B5EF4-FFF2-40B4-BE49-F238E27FC236}">
-                <a16:creationId xmlns:a16="http://schemas.microsoft.com/office/drawing/2014/main" id="{C69C7F82-25C2-4E92-9FBC-467C294F12A2}"/>
-              </a:ext>
-            </a:extLst>
-          </p:cNvPr>
-          <p:cNvPicPr>
-            <a:picLocks noChangeAspect="1"/>
-          </p:cNvPicPr>
-          <p:nvPr/>
-        </p:nvPicPr>
-        <p:blipFill>
-          <a:blip r:embed="rId3"/>
-          <a:stretch>
-            <a:fillRect/>
-          </a:stretch>
-        </p:blipFill>
-        <p:spPr>
-          <a:xfrm>
-            <a:off x="436755" y="1886687"/>
-            <a:ext cx="2920105" cy="4804044"/>
-          </a:xfrm>
-          <a:prstGeom prst="rect">
-            <a:avLst/>
-          </a:prstGeom>
-        </p:spPr>
-      </p:pic>
-      <p:pic>
-        <p:nvPicPr>
-          <p:cNvPr id="122" name="Picture 121">
-            <a:extLst>
-              <a:ext uri="{FF2B5EF4-FFF2-40B4-BE49-F238E27FC236}">
-                <a16:creationId xmlns:a16="http://schemas.microsoft.com/office/drawing/2014/main" id="{B9736C0D-CA45-4665-93AB-A6EAE39CBFDE}"/>
-              </a:ext>
-            </a:extLst>
-          </p:cNvPr>
-          <p:cNvPicPr>
-            <a:picLocks noChangeAspect="1"/>
-          </p:cNvPicPr>
-          <p:nvPr/>
-        </p:nvPicPr>
-        <p:blipFill>
-          <a:blip r:embed="rId4"/>
-          <a:stretch>
-            <a:fillRect/>
-          </a:stretch>
-        </p:blipFill>
-        <p:spPr>
-          <a:xfrm>
-            <a:off x="3613338" y="2006544"/>
-            <a:ext cx="6080214" cy="4241004"/>
-          </a:xfrm>
-          <a:prstGeom prst="rect">
-            <a:avLst/>
-          </a:prstGeom>
-        </p:spPr>
-      </p:pic>
-    </p:spTree>
-    <p:extLst>
-      <p:ext uri="{BB962C8B-B14F-4D97-AF65-F5344CB8AC3E}">
-        <p14:creationId xmlns:p14="http://schemas.microsoft.com/office/powerpoint/2010/main" val="198583894"/>
-      </p:ext>
-    </p:extLst>
-  </p:cSld>
-  <p:clrMapOvr>
-    <a:masterClrMapping/>
-  </p:clrMapOvr>
-</p:sld>
-</file>
-
 <file path=ppt/theme/theme1.xml><?xml version="1.0" encoding="utf-8"?>
 <a:theme xmlns:a="http://schemas.openxmlformats.org/drawingml/2006/main" name="Office Theme">
   <a:themeElements>

</xml_diff>

<commit_message>
some last changes here
</commit_message>
<xml_diff>
--- a/AdditiveModels_9_2_2021.pptx
+++ b/AdditiveModels_9_2_2021.pptx
@@ -5,7 +5,7 @@
     <p:sldMasterId id="2147483648" r:id="rId1"/>
   </p:sldMasterIdLst>
   <p:notesMasterIdLst>
-    <p:notesMasterId r:id="rId42"/>
+    <p:notesMasterId r:id="rId41"/>
   </p:notesMasterIdLst>
   <p:sldIdLst>
     <p:sldId id="303" r:id="rId2"/>
@@ -39,15 +39,14 @@
     <p:sldId id="288" r:id="rId30"/>
     <p:sldId id="289" r:id="rId31"/>
     <p:sldId id="291" r:id="rId32"/>
-    <p:sldId id="305" r:id="rId33"/>
-    <p:sldId id="292" r:id="rId34"/>
-    <p:sldId id="294" r:id="rId35"/>
-    <p:sldId id="302" r:id="rId36"/>
-    <p:sldId id="295" r:id="rId37"/>
-    <p:sldId id="293" r:id="rId38"/>
-    <p:sldId id="296" r:id="rId39"/>
-    <p:sldId id="298" r:id="rId40"/>
-    <p:sldId id="297" r:id="rId41"/>
+    <p:sldId id="292" r:id="rId33"/>
+    <p:sldId id="294" r:id="rId34"/>
+    <p:sldId id="302" r:id="rId35"/>
+    <p:sldId id="295" r:id="rId36"/>
+    <p:sldId id="293" r:id="rId37"/>
+    <p:sldId id="296" r:id="rId38"/>
+    <p:sldId id="298" r:id="rId39"/>
+    <p:sldId id="297" r:id="rId40"/>
   </p:sldIdLst>
   <p:sldSz cx="12192000" cy="6858000"/>
   <p:notesSz cx="6858000" cy="9144000"/>
@@ -652,7 +651,7 @@
           <a:p>
             <a:fld id="{9C823843-94FE-4068-B4C4-A27F7642D02E}" type="slidenum">
               <a:rPr lang="en-US" smtClean="0"/>
-              <a:t>39</a:t>
+              <a:t>38</a:t>
             </a:fld>
             <a:endParaRPr lang="en-US"/>
           </a:p>
@@ -1375,7 +1374,7 @@
           <a:p>
             <a:fld id="{2A799501-FF39-4DDB-88D6-1F9BF577AF3F}" type="slidenum">
               <a:rPr lang="en-US" smtClean="0"/>
-              <a:t>37</a:t>
+              <a:t>36</a:t>
             </a:fld>
             <a:endParaRPr lang="en-US"/>
           </a:p>
@@ -4672,6 +4671,12 @@
               <a:t>’ in R</a:t>
             </a:r>
           </a:p>
+          <a:p>
+            <a:r>
+              <a:rPr lang="en-US" dirty="0"/>
+              <a:t>If you do not already have the packages that are listed at the top of the script start installing them!</a:t>
+            </a:r>
+          </a:p>
         </p:txBody>
       </p:sp>
       <p:pic>
@@ -4696,8 +4701,8 @@
         </p:blipFill>
         <p:spPr>
           <a:xfrm>
-            <a:off x="2609385" y="3216064"/>
-            <a:ext cx="7471666" cy="3276811"/>
+            <a:off x="2599163" y="3690459"/>
+            <a:ext cx="6993673" cy="3067180"/>
           </a:xfrm>
           <a:prstGeom prst="rect">
             <a:avLst/>
@@ -44065,7 +44070,7 @@
             </a:pPr>
             <a:r>
               <a:rPr lang="en-US" dirty="0"/>
-              <a:t>The phenotype (or breeding value) of the individual is a result of the  additive combination of many polymorphisms across the genome each with their own effect on the phenotype. </a:t>
+              <a:t>The phenotype (or breeding value) of the individual is a result of the  additive combination of many polymorphisms across the genome each with their own effect on the phenotype and that act independently. </a:t>
             </a:r>
           </a:p>
           <a:p>
@@ -44543,7 +44548,14 @@
           <a:p>
             <a:r>
               <a:rPr lang="en-US" dirty="0"/>
-              <a:t>How do we do that?</a:t>
+              <a:t>How do we do that? </a:t>
+            </a:r>
+            <a:br>
+              <a:rPr lang="en-US" dirty="0"/>
+            </a:br>
+            <a:r>
+              <a:rPr lang="en-US" dirty="0"/>
+              <a:t>Matrix Math</a:t>
             </a:r>
           </a:p>
         </p:txBody>
@@ -45047,7 +45059,7 @@
             </a:r>
             <a:r>
               <a:rPr lang="en-US" dirty="0"/>
-              <a:t> less sensitive to changes in predictor – introduces a bias during estimation to reduce variance of predictions. </a:t>
+              <a:t> less sensitive to changes in predictor – introduces a bias during estimation to reduce variance of predictions and also allows us to solve for N&lt;&lt;P. </a:t>
             </a:r>
           </a:p>
           <a:p>
@@ -45076,7 +45088,7 @@
             </a:r>
             <a:r>
               <a:rPr lang="en-US" dirty="0"/>
-              <a:t>XY </a:t>
+              <a:t>X’Y </a:t>
             </a:r>
           </a:p>
           <a:p>
@@ -45450,53 +45462,6 @@
           </a:p>
         </p:txBody>
       </p:sp>
-      <p:pic>
-        <p:nvPicPr>
-          <p:cNvPr id="1027" name="Picture 3" descr="urn:x-wiley:19403372:equation:tpg2plantgenome2011080024-math-0004">
-            <a:extLst>
-              <a:ext uri="{FF2B5EF4-FFF2-40B4-BE49-F238E27FC236}">
-                <a16:creationId xmlns:a16="http://schemas.microsoft.com/office/drawing/2014/main" id="{4EC14A8C-6433-4DB9-8BAE-5674CD44AAC4}"/>
-              </a:ext>
-            </a:extLst>
-          </p:cNvPr>
-          <p:cNvPicPr>
-            <a:picLocks noChangeAspect="1" noChangeArrowheads="1"/>
-          </p:cNvPicPr>
-          <p:nvPr/>
-        </p:nvPicPr>
-        <p:blipFill>
-          <a:blip r:embed="rId2">
-            <a:extLst>
-              <a:ext uri="{28A0092B-C50C-407E-A947-70E740481C1C}">
-                <a14:useLocalDpi xmlns:a14="http://schemas.microsoft.com/office/drawing/2010/main" val="0"/>
-              </a:ext>
-            </a:extLst>
-          </a:blip>
-          <a:srcRect/>
-          <a:stretch>
-            <a:fillRect/>
-          </a:stretch>
-        </p:blipFill>
-        <p:spPr bwMode="auto">
-          <a:xfrm>
-            <a:off x="6807044" y="4917688"/>
-            <a:ext cx="2532446" cy="424907"/>
-          </a:xfrm>
-          <a:prstGeom prst="rect">
-            <a:avLst/>
-          </a:prstGeom>
-          <a:noFill/>
-          <a:extLst>
-            <a:ext uri="{909E8E84-426E-40DD-AFC4-6F175D3DCCD1}">
-              <a14:hiddenFill xmlns:a14="http://schemas.microsoft.com/office/drawing/2010/main">
-                <a:solidFill>
-                  <a:srgbClr val="FFFFFF"/>
-                </a:solidFill>
-              </a14:hiddenFill>
-            </a:ext>
-          </a:extLst>
-        </p:spPr>
-      </p:pic>
     </p:spTree>
     <p:extLst>
       <p:ext uri="{BB962C8B-B14F-4D97-AF65-F5344CB8AC3E}">
@@ -45906,7 +45871,7 @@
           <a:p>
             <a:r>
               <a:rPr lang="en-US" dirty="0"/>
-              <a:t>Formulas</a:t>
+              <a:t>Formulas in our case</a:t>
             </a:r>
           </a:p>
         </p:txBody>
@@ -46074,7 +46039,7 @@
             </a:r>
             <a:r>
               <a:rPr lang="en-US" dirty="0"/>
-              <a:t>is a vector of effects assumed to be drawn from a distribution, often N(0,Simga</a:t>
+              <a:t>is a vector of effects assumed to be drawn from a distribution, N(0,Simga</a:t>
             </a:r>
             <a:r>
               <a:rPr lang="en-US" baseline="30000" dirty="0"/>
@@ -46086,7 +46051,7 @@
             </a:r>
             <a:r>
               <a:rPr lang="en-US" dirty="0"/>
-              <a:t>*G) where G is a covariance matrix, Z is a marker matrix, and error is assumed to be N(0,sigma</a:t>
+              <a:t>*I), Z is a marker matrix, and error is assumed to be N(0,sigma</a:t>
             </a:r>
             <a:r>
               <a:rPr lang="en-US" baseline="30000" dirty="0"/>
@@ -46247,101 +46212,6 @@
           <p:cNvPr id="2" name="Title 1">
             <a:extLst>
               <a:ext uri="{FF2B5EF4-FFF2-40B4-BE49-F238E27FC236}">
-                <a16:creationId xmlns:a16="http://schemas.microsoft.com/office/drawing/2014/main" id="{B031CFB8-C786-43D0-B95D-AE0C5A54C758}"/>
-              </a:ext>
-            </a:extLst>
-          </p:cNvPr>
-          <p:cNvSpPr>
-            <a:spLocks noGrp="1"/>
-          </p:cNvSpPr>
-          <p:nvPr>
-            <p:ph type="title"/>
-          </p:nvPr>
-        </p:nvSpPr>
-        <p:spPr/>
-        <p:txBody>
-          <a:bodyPr/>
-          <a:lstStyle/>
-          <a:p>
-            <a:r>
-              <a:rPr lang="en-US" dirty="0"/>
-              <a:t>Formulas continued</a:t>
-            </a:r>
-          </a:p>
-        </p:txBody>
-      </p:sp>
-      <p:sp>
-        <p:nvSpPr>
-          <p:cNvPr id="3" name="Content Placeholder 2">
-            <a:extLst>
-              <a:ext uri="{FF2B5EF4-FFF2-40B4-BE49-F238E27FC236}">
-                <a16:creationId xmlns:a16="http://schemas.microsoft.com/office/drawing/2014/main" id="{6D8B84A1-006D-4876-88BB-BEE0C5BE5576}"/>
-              </a:ext>
-            </a:extLst>
-          </p:cNvPr>
-          <p:cNvSpPr>
-            <a:spLocks noGrp="1"/>
-          </p:cNvSpPr>
-          <p:nvPr>
-            <p:ph idx="1"/>
-          </p:nvPr>
-        </p:nvSpPr>
-        <p:spPr/>
-        <p:txBody>
-          <a:bodyPr/>
-          <a:lstStyle/>
-          <a:p>
-            <a:r>
-              <a:rPr lang="en-US" dirty="0"/>
-              <a:t>The normal linear regression is calculated as discussed, the regularized regression uses more complex algorithms, cross-validation, maximum likelihood and restricted maximum likelihood processes to estimate effects. Key to this is estimating lambda.</a:t>
-            </a:r>
-          </a:p>
-          <a:p>
-            <a:r>
-              <a:rPr lang="en-US" dirty="0"/>
-              <a:t>If you would like to learn more about how that is done Dr. Kelly Robbins is a good source here on campus. </a:t>
-            </a:r>
-          </a:p>
-          <a:p>
-            <a:endParaRPr lang="en-US" dirty="0"/>
-          </a:p>
-        </p:txBody>
-      </p:sp>
-    </p:spTree>
-    <p:extLst>
-      <p:ext uri="{BB962C8B-B14F-4D97-AF65-F5344CB8AC3E}">
-        <p14:creationId xmlns:p14="http://schemas.microsoft.com/office/powerpoint/2010/main" val="1104633031"/>
-      </p:ext>
-    </p:extLst>
-  </p:cSld>
-  <p:clrMapOvr>
-    <a:masterClrMapping/>
-  </p:clrMapOvr>
-</p:sld>
-</file>
-
-<file path=ppt/slides/slide33.xml><?xml version="1.0" encoding="utf-8"?>
-<p:sld xmlns:a="http://schemas.openxmlformats.org/drawingml/2006/main" xmlns:r="http://schemas.openxmlformats.org/officeDocument/2006/relationships" xmlns:p="http://schemas.openxmlformats.org/presentationml/2006/main">
-  <p:cSld>
-    <p:spTree>
-      <p:nvGrpSpPr>
-        <p:cNvPr id="1" name=""/>
-        <p:cNvGrpSpPr/>
-        <p:nvPr/>
-      </p:nvGrpSpPr>
-      <p:grpSpPr>
-        <a:xfrm>
-          <a:off x="0" y="0"/>
-          <a:ext cx="0" cy="0"/>
-          <a:chOff x="0" y="0"/>
-          <a:chExt cx="0" cy="0"/>
-        </a:xfrm>
-      </p:grpSpPr>
-      <p:sp>
-        <p:nvSpPr>
-          <p:cNvPr id="2" name="Title 1">
-            <a:extLst>
-              <a:ext uri="{FF2B5EF4-FFF2-40B4-BE49-F238E27FC236}">
                 <a16:creationId xmlns:a16="http://schemas.microsoft.com/office/drawing/2014/main" id="{2981A07D-73F4-4184-A7C7-EB5DE5AD47BF}"/>
               </a:ext>
             </a:extLst>
@@ -46403,7 +46273,7 @@
 </p:sld>
 </file>
 
-<file path=ppt/slides/slide34.xml><?xml version="1.0" encoding="utf-8"?>
+<file path=ppt/slides/slide33.xml><?xml version="1.0" encoding="utf-8"?>
 <p:sld xmlns:a="http://schemas.openxmlformats.org/drawingml/2006/main" xmlns:r="http://schemas.openxmlformats.org/officeDocument/2006/relationships" xmlns:p="http://schemas.openxmlformats.org/presentationml/2006/main">
   <p:cSld>
     <p:spTree>
@@ -46498,7 +46368,7 @@
 </p:sld>
 </file>
 
-<file path=ppt/slides/slide35.xml><?xml version="1.0" encoding="utf-8"?>
+<file path=ppt/slides/slide34.xml><?xml version="1.0" encoding="utf-8"?>
 <p:sld xmlns:a="http://schemas.openxmlformats.org/drawingml/2006/main" xmlns:r="http://schemas.openxmlformats.org/officeDocument/2006/relationships" xmlns:p="http://schemas.openxmlformats.org/presentationml/2006/main">
   <p:cSld>
     <p:spTree>
@@ -46620,7 +46490,7 @@
 </p:sld>
 </file>
 
-<file path=ppt/slides/slide36.xml><?xml version="1.0" encoding="utf-8"?>
+<file path=ppt/slides/slide35.xml><?xml version="1.0" encoding="utf-8"?>
 <p:sld xmlns:a="http://schemas.openxmlformats.org/drawingml/2006/main" xmlns:r="http://schemas.openxmlformats.org/officeDocument/2006/relationships" xmlns:p="http://schemas.openxmlformats.org/presentationml/2006/main">
   <p:cSld>
     <p:spTree>
@@ -46715,7 +46585,7 @@
 </p:sld>
 </file>
 
-<file path=ppt/slides/slide37.xml><?xml version="1.0" encoding="utf-8"?>
+<file path=ppt/slides/slide36.xml><?xml version="1.0" encoding="utf-8"?>
 <p:sld xmlns:a="http://schemas.openxmlformats.org/drawingml/2006/main" xmlns:r="http://schemas.openxmlformats.org/officeDocument/2006/relationships" xmlns:p="http://schemas.openxmlformats.org/presentationml/2006/main">
   <p:cSld>
     <p:spTree>
@@ -46820,7 +46690,7 @@
 </p:sld>
 </file>
 
-<file path=ppt/slides/slide38.xml><?xml version="1.0" encoding="utf-8"?>
+<file path=ppt/slides/slide37.xml><?xml version="1.0" encoding="utf-8"?>
 <p:sld xmlns:a="http://schemas.openxmlformats.org/drawingml/2006/main" xmlns:r="http://schemas.openxmlformats.org/officeDocument/2006/relationships" xmlns:p="http://schemas.openxmlformats.org/presentationml/2006/main">
   <p:cSld>
     <p:spTree>
@@ -46925,7 +46795,7 @@
 </p:sld>
 </file>
 
-<file path=ppt/slides/slide39.xml><?xml version="1.0" encoding="utf-8"?>
+<file path=ppt/slides/slide38.xml><?xml version="1.0" encoding="utf-8"?>
 <p:sld xmlns:a="http://schemas.openxmlformats.org/drawingml/2006/main" xmlns:r="http://schemas.openxmlformats.org/officeDocument/2006/relationships" xmlns:p="http://schemas.openxmlformats.org/presentationml/2006/main">
   <p:cSld>
     <p:spTree>
@@ -48088,6 +47958,89 @@
 </p:sld>
 </file>
 
+<file path=ppt/slides/slide39.xml><?xml version="1.0" encoding="utf-8"?>
+<p:sld xmlns:a="http://schemas.openxmlformats.org/drawingml/2006/main" xmlns:r="http://schemas.openxmlformats.org/officeDocument/2006/relationships" xmlns:p="http://schemas.openxmlformats.org/presentationml/2006/main">
+  <p:cSld>
+    <p:spTree>
+      <p:nvGrpSpPr>
+        <p:cNvPr id="1" name=""/>
+        <p:cNvGrpSpPr/>
+        <p:nvPr/>
+      </p:nvGrpSpPr>
+      <p:grpSpPr>
+        <a:xfrm>
+          <a:off x="0" y="0"/>
+          <a:ext cx="0" cy="0"/>
+          <a:chOff x="0" y="0"/>
+          <a:chExt cx="0" cy="0"/>
+        </a:xfrm>
+      </p:grpSpPr>
+      <p:sp>
+        <p:nvSpPr>
+          <p:cNvPr id="2" name="Title 1">
+            <a:extLst>
+              <a:ext uri="{FF2B5EF4-FFF2-40B4-BE49-F238E27FC236}">
+                <a16:creationId xmlns:a16="http://schemas.microsoft.com/office/drawing/2014/main" id="{F919AE24-50B7-465A-A557-1D60C8FB698A}"/>
+              </a:ext>
+            </a:extLst>
+          </p:cNvPr>
+          <p:cNvSpPr>
+            <a:spLocks noGrp="1"/>
+          </p:cNvSpPr>
+          <p:nvPr>
+            <p:ph type="title"/>
+          </p:nvPr>
+        </p:nvSpPr>
+        <p:spPr/>
+        <p:txBody>
+          <a:bodyPr/>
+          <a:lstStyle/>
+          <a:p>
+            <a:r>
+              <a:rPr lang="en-US" dirty="0"/>
+              <a:t>Time series analysis options and a few examples!</a:t>
+            </a:r>
+          </a:p>
+        </p:txBody>
+      </p:sp>
+      <p:sp>
+        <p:nvSpPr>
+          <p:cNvPr id="3" name="Content Placeholder 2">
+            <a:extLst>
+              <a:ext uri="{FF2B5EF4-FFF2-40B4-BE49-F238E27FC236}">
+                <a16:creationId xmlns:a16="http://schemas.microsoft.com/office/drawing/2014/main" id="{57B66C43-BE51-448A-8BFF-ECFE02354A20}"/>
+              </a:ext>
+            </a:extLst>
+          </p:cNvPr>
+          <p:cNvSpPr>
+            <a:spLocks noGrp="1"/>
+          </p:cNvSpPr>
+          <p:nvPr>
+            <p:ph idx="1"/>
+          </p:nvPr>
+        </p:nvSpPr>
+        <p:spPr/>
+        <p:txBody>
+          <a:bodyPr/>
+          <a:lstStyle/>
+          <a:p>
+            <a:endParaRPr lang="en-US"/>
+          </a:p>
+        </p:txBody>
+      </p:sp>
+    </p:spTree>
+    <p:extLst>
+      <p:ext uri="{BB962C8B-B14F-4D97-AF65-F5344CB8AC3E}">
+        <p14:creationId xmlns:p14="http://schemas.microsoft.com/office/powerpoint/2010/main" val="3636108133"/>
+      </p:ext>
+    </p:extLst>
+  </p:cSld>
+  <p:clrMapOvr>
+    <a:masterClrMapping/>
+  </p:clrMapOvr>
+</p:sld>
+</file>
+
 <file path=ppt/slides/slide4.xml><?xml version="1.0" encoding="utf-8"?>
 <p:sld xmlns:a="http://schemas.openxmlformats.org/drawingml/2006/main" xmlns:r="http://schemas.openxmlformats.org/officeDocument/2006/relationships" xmlns:p="http://schemas.openxmlformats.org/presentationml/2006/main">
   <p:cSld>
@@ -48260,89 +48213,6 @@
     <p:extLst>
       <p:ext uri="{BB962C8B-B14F-4D97-AF65-F5344CB8AC3E}">
         <p14:creationId xmlns:p14="http://schemas.microsoft.com/office/powerpoint/2010/main" val="4001972637"/>
-      </p:ext>
-    </p:extLst>
-  </p:cSld>
-  <p:clrMapOvr>
-    <a:masterClrMapping/>
-  </p:clrMapOvr>
-</p:sld>
-</file>
-
-<file path=ppt/slides/slide40.xml><?xml version="1.0" encoding="utf-8"?>
-<p:sld xmlns:a="http://schemas.openxmlformats.org/drawingml/2006/main" xmlns:r="http://schemas.openxmlformats.org/officeDocument/2006/relationships" xmlns:p="http://schemas.openxmlformats.org/presentationml/2006/main">
-  <p:cSld>
-    <p:spTree>
-      <p:nvGrpSpPr>
-        <p:cNvPr id="1" name=""/>
-        <p:cNvGrpSpPr/>
-        <p:nvPr/>
-      </p:nvGrpSpPr>
-      <p:grpSpPr>
-        <a:xfrm>
-          <a:off x="0" y="0"/>
-          <a:ext cx="0" cy="0"/>
-          <a:chOff x="0" y="0"/>
-          <a:chExt cx="0" cy="0"/>
-        </a:xfrm>
-      </p:grpSpPr>
-      <p:sp>
-        <p:nvSpPr>
-          <p:cNvPr id="2" name="Title 1">
-            <a:extLst>
-              <a:ext uri="{FF2B5EF4-FFF2-40B4-BE49-F238E27FC236}">
-                <a16:creationId xmlns:a16="http://schemas.microsoft.com/office/drawing/2014/main" id="{F919AE24-50B7-465A-A557-1D60C8FB698A}"/>
-              </a:ext>
-            </a:extLst>
-          </p:cNvPr>
-          <p:cNvSpPr>
-            <a:spLocks noGrp="1"/>
-          </p:cNvSpPr>
-          <p:nvPr>
-            <p:ph type="title"/>
-          </p:nvPr>
-        </p:nvSpPr>
-        <p:spPr/>
-        <p:txBody>
-          <a:bodyPr/>
-          <a:lstStyle/>
-          <a:p>
-            <a:r>
-              <a:rPr lang="en-US" dirty="0"/>
-              <a:t>Time series analysis options and a few examples!</a:t>
-            </a:r>
-          </a:p>
-        </p:txBody>
-      </p:sp>
-      <p:sp>
-        <p:nvSpPr>
-          <p:cNvPr id="3" name="Content Placeholder 2">
-            <a:extLst>
-              <a:ext uri="{FF2B5EF4-FFF2-40B4-BE49-F238E27FC236}">
-                <a16:creationId xmlns:a16="http://schemas.microsoft.com/office/drawing/2014/main" id="{57B66C43-BE51-448A-8BFF-ECFE02354A20}"/>
-              </a:ext>
-            </a:extLst>
-          </p:cNvPr>
-          <p:cNvSpPr>
-            <a:spLocks noGrp="1"/>
-          </p:cNvSpPr>
-          <p:nvPr>
-            <p:ph idx="1"/>
-          </p:nvPr>
-        </p:nvSpPr>
-        <p:spPr/>
-        <p:txBody>
-          <a:bodyPr/>
-          <a:lstStyle/>
-          <a:p>
-            <a:endParaRPr lang="en-US"/>
-          </a:p>
-        </p:txBody>
-      </p:sp>
-    </p:spTree>
-    <p:extLst>
-      <p:ext uri="{BB962C8B-B14F-4D97-AF65-F5344CB8AC3E}">
-        <p14:creationId xmlns:p14="http://schemas.microsoft.com/office/powerpoint/2010/main" val="3636108133"/>
       </p:ext>
     </p:extLst>
   </p:cSld>

</xml_diff>